<commit_message>
updated script and presentation; added images folder'
</commit_message>
<xml_diff>
--- a/presentation.pptx
+++ b/presentation.pptx
@@ -5,17 +5,20 @@
     <p:sldMasterId id="2147483672" r:id="rId1"/>
   </p:sldMasterIdLst>
   <p:notesMasterIdLst>
-    <p:notesMasterId r:id="rId10"/>
+    <p:notesMasterId r:id="rId13"/>
   </p:notesMasterIdLst>
   <p:sldIdLst>
     <p:sldId id="256" r:id="rId2"/>
     <p:sldId id="257" r:id="rId3"/>
     <p:sldId id="258" r:id="rId4"/>
-    <p:sldId id="259" r:id="rId5"/>
-    <p:sldId id="260" r:id="rId6"/>
-    <p:sldId id="261" r:id="rId7"/>
-    <p:sldId id="262" r:id="rId8"/>
-    <p:sldId id="263" r:id="rId9"/>
+    <p:sldId id="264" r:id="rId5"/>
+    <p:sldId id="266" r:id="rId6"/>
+    <p:sldId id="267" r:id="rId7"/>
+    <p:sldId id="259" r:id="rId8"/>
+    <p:sldId id="260" r:id="rId9"/>
+    <p:sldId id="261" r:id="rId10"/>
+    <p:sldId id="262" r:id="rId11"/>
+    <p:sldId id="263" r:id="rId12"/>
   </p:sldIdLst>
   <p:sldSz cx="12192000" cy="6858000"/>
   <p:notesSz cx="6858000" cy="9144000"/>
@@ -125,13 +128,318 @@
 <file path=ppt/revisionInfo.xml><?xml version="1.0" encoding="utf-8"?>
 <p1510:revInfo xmlns:a="http://schemas.openxmlformats.org/drawingml/2006/main" xmlns:r="http://schemas.openxmlformats.org/officeDocument/2006/relationships" xmlns:p1510="http://schemas.microsoft.com/office/powerpoint/2015/10/main">
   <p1510:revLst>
-    <p1510:client id="{D2304C36-6F9A-49D4-BBB1-E2AF6025F6E7}" v="2" dt="2023-05-29T12:23:58.283"/>
+    <p1510:client id="{497DC6A5-6E98-4823-B94B-BA98122E7321}" v="8" dt="2023-06-01T11:02:22.263"/>
   </p1510:revLst>
 </p1510:revInfo>
 </file>
 
 <file path=ppt/changesInfos/changesInfo1.xml><?xml version="1.0" encoding="utf-8"?>
 <pc:chgInfo xmlns:a="http://schemas.openxmlformats.org/drawingml/2006/main" xmlns:r="http://schemas.openxmlformats.org/officeDocument/2006/relationships" xmlns:ac="http://schemas.microsoft.com/office/drawing/2013/main/command" xmlns:pc="http://schemas.microsoft.com/office/powerpoint/2013/main/command">
+  <pc:docChgLst>
+    <pc:chgData name="Maximilian Schlake" userId="d69807565a22ab48" providerId="LiveId" clId="{497DC6A5-6E98-4823-B94B-BA98122E7321}"/>
+    <pc:docChg chg="undo redo custSel addSld delSld modSld">
+      <pc:chgData name="Maximilian Schlake" userId="d69807565a22ab48" providerId="LiveId" clId="{497DC6A5-6E98-4823-B94B-BA98122E7321}" dt="2023-06-01T11:16:19.897" v="578" actId="20577"/>
+      <pc:docMkLst>
+        <pc:docMk/>
+      </pc:docMkLst>
+      <pc:sldChg chg="modSp mod">
+        <pc:chgData name="Maximilian Schlake" userId="d69807565a22ab48" providerId="LiveId" clId="{497DC6A5-6E98-4823-B94B-BA98122E7321}" dt="2023-06-01T11:08:16.225" v="453" actId="1036"/>
+        <pc:sldMkLst>
+          <pc:docMk/>
+          <pc:sldMk cId="2177361413" sldId="256"/>
+        </pc:sldMkLst>
+        <pc:spChg chg="mod">
+          <ac:chgData name="Maximilian Schlake" userId="d69807565a22ab48" providerId="LiveId" clId="{497DC6A5-6E98-4823-B94B-BA98122E7321}" dt="2023-06-01T11:08:16.225" v="453" actId="1036"/>
+          <ac:spMkLst>
+            <pc:docMk/>
+            <pc:sldMk cId="2177361413" sldId="256"/>
+            <ac:spMk id="2" creationId="{1D178E61-77BC-38F0-44A5-449A66BC49F5}"/>
+          </ac:spMkLst>
+        </pc:spChg>
+        <pc:spChg chg="mod">
+          <ac:chgData name="Maximilian Schlake" userId="d69807565a22ab48" providerId="LiveId" clId="{497DC6A5-6E98-4823-B94B-BA98122E7321}" dt="2023-06-01T11:08:06.469" v="387" actId="1076"/>
+          <ac:spMkLst>
+            <pc:docMk/>
+            <pc:sldMk cId="2177361413" sldId="256"/>
+            <ac:spMk id="3" creationId="{BA61D91F-A662-BAB9-6FF7-DC995D5422D5}"/>
+          </ac:spMkLst>
+        </pc:spChg>
+      </pc:sldChg>
+      <pc:sldChg chg="modSp mod">
+        <pc:chgData name="Maximilian Schlake" userId="d69807565a22ab48" providerId="LiveId" clId="{497DC6A5-6E98-4823-B94B-BA98122E7321}" dt="2023-06-01T11:09:13.218" v="535" actId="14100"/>
+        <pc:sldMkLst>
+          <pc:docMk/>
+          <pc:sldMk cId="4972780" sldId="257"/>
+        </pc:sldMkLst>
+        <pc:spChg chg="mod">
+          <ac:chgData name="Maximilian Schlake" userId="d69807565a22ab48" providerId="LiveId" clId="{497DC6A5-6E98-4823-B94B-BA98122E7321}" dt="2023-06-01T11:09:13.218" v="535" actId="14100"/>
+          <ac:spMkLst>
+            <pc:docMk/>
+            <pc:sldMk cId="4972780" sldId="257"/>
+            <ac:spMk id="3" creationId="{9E28193F-FE09-8E4B-A363-00025BEC7E88}"/>
+          </ac:spMkLst>
+        </pc:spChg>
+      </pc:sldChg>
+      <pc:sldChg chg="addSp delSp modSp mod modNotesTx">
+        <pc:chgData name="Maximilian Schlake" userId="d69807565a22ab48" providerId="LiveId" clId="{497DC6A5-6E98-4823-B94B-BA98122E7321}" dt="2023-06-01T11:08:45.581" v="485" actId="20577"/>
+        <pc:sldMkLst>
+          <pc:docMk/>
+          <pc:sldMk cId="2742971747" sldId="258"/>
+        </pc:sldMkLst>
+        <pc:spChg chg="mod">
+          <ac:chgData name="Maximilian Schlake" userId="d69807565a22ab48" providerId="LiveId" clId="{497DC6A5-6E98-4823-B94B-BA98122E7321}" dt="2023-06-01T11:08:45.581" v="485" actId="20577"/>
+          <ac:spMkLst>
+            <pc:docMk/>
+            <pc:sldMk cId="2742971747" sldId="258"/>
+            <ac:spMk id="2" creationId="{9CEF219F-A752-AF3A-FEDC-8EB897838D43}"/>
+          </ac:spMkLst>
+        </pc:spChg>
+        <pc:spChg chg="mod">
+          <ac:chgData name="Maximilian Schlake" userId="d69807565a22ab48" providerId="LiveId" clId="{497DC6A5-6E98-4823-B94B-BA98122E7321}" dt="2023-06-01T10:05:42.163" v="70" actId="20577"/>
+          <ac:spMkLst>
+            <pc:docMk/>
+            <pc:sldMk cId="2742971747" sldId="258"/>
+            <ac:spMk id="3" creationId="{DD7E7B8A-64D7-42FA-69FE-83D28EA0770B}"/>
+          </ac:spMkLst>
+        </pc:spChg>
+        <pc:graphicFrameChg chg="add del mod">
+          <ac:chgData name="Maximilian Schlake" userId="d69807565a22ab48" providerId="LiveId" clId="{497DC6A5-6E98-4823-B94B-BA98122E7321}" dt="2023-06-01T09:24:58.416" v="1"/>
+          <ac:graphicFrameMkLst>
+            <pc:docMk/>
+            <pc:sldMk cId="2742971747" sldId="258"/>
+            <ac:graphicFrameMk id="4" creationId="{212E369F-2394-3BEE-D6A1-CE0A1665F47D}"/>
+          </ac:graphicFrameMkLst>
+        </pc:graphicFrameChg>
+      </pc:sldChg>
+      <pc:sldChg chg="addSp delSp modSp mod">
+        <pc:chgData name="Maximilian Schlake" userId="d69807565a22ab48" providerId="LiveId" clId="{497DC6A5-6E98-4823-B94B-BA98122E7321}" dt="2023-06-01T09:44:53.233" v="5" actId="21"/>
+        <pc:sldMkLst>
+          <pc:docMk/>
+          <pc:sldMk cId="2082576824" sldId="259"/>
+        </pc:sldMkLst>
+        <pc:spChg chg="del">
+          <ac:chgData name="Maximilian Schlake" userId="d69807565a22ab48" providerId="LiveId" clId="{497DC6A5-6E98-4823-B94B-BA98122E7321}" dt="2023-06-01T09:44:41.337" v="2" actId="22"/>
+          <ac:spMkLst>
+            <pc:docMk/>
+            <pc:sldMk cId="2082576824" sldId="259"/>
+            <ac:spMk id="3" creationId="{00097D50-5ACB-4FDD-50C2-902AABD801B5}"/>
+          </ac:spMkLst>
+        </pc:spChg>
+        <pc:spChg chg="add mod">
+          <ac:chgData name="Maximilian Schlake" userId="d69807565a22ab48" providerId="LiveId" clId="{497DC6A5-6E98-4823-B94B-BA98122E7321}" dt="2023-06-01T09:44:53.233" v="5" actId="21"/>
+          <ac:spMkLst>
+            <pc:docMk/>
+            <pc:sldMk cId="2082576824" sldId="259"/>
+            <ac:spMk id="7" creationId="{9C296F9C-B501-5452-9A38-DC9F1E00FA23}"/>
+          </ac:spMkLst>
+        </pc:spChg>
+        <pc:picChg chg="add del mod ord">
+          <ac:chgData name="Maximilian Schlake" userId="d69807565a22ab48" providerId="LiveId" clId="{497DC6A5-6E98-4823-B94B-BA98122E7321}" dt="2023-06-01T09:44:53.233" v="5" actId="21"/>
+          <ac:picMkLst>
+            <pc:docMk/>
+            <pc:sldMk cId="2082576824" sldId="259"/>
+            <ac:picMk id="5" creationId="{CDE566F0-38DB-F343-8DED-3389C1D55D6F}"/>
+          </ac:picMkLst>
+        </pc:picChg>
+      </pc:sldChg>
+      <pc:sldChg chg="addSp delSp modSp add mod modNotesTx">
+        <pc:chgData name="Maximilian Schlake" userId="d69807565a22ab48" providerId="LiveId" clId="{497DC6A5-6E98-4823-B94B-BA98122E7321}" dt="2023-06-01T11:09:20.758" v="536" actId="20577"/>
+        <pc:sldMkLst>
+          <pc:docMk/>
+          <pc:sldMk cId="47249489" sldId="264"/>
+        </pc:sldMkLst>
+        <pc:spChg chg="mod">
+          <ac:chgData name="Maximilian Schlake" userId="d69807565a22ab48" providerId="LiveId" clId="{497DC6A5-6E98-4823-B94B-BA98122E7321}" dt="2023-06-01T11:09:20.758" v="536" actId="20577"/>
+          <ac:spMkLst>
+            <pc:docMk/>
+            <pc:sldMk cId="47249489" sldId="264"/>
+            <ac:spMk id="2" creationId="{9CEF219F-A752-AF3A-FEDC-8EB897838D43}"/>
+          </ac:spMkLst>
+        </pc:spChg>
+        <pc:spChg chg="del mod">
+          <ac:chgData name="Maximilian Schlake" userId="d69807565a22ab48" providerId="LiveId" clId="{497DC6A5-6E98-4823-B94B-BA98122E7321}" dt="2023-06-01T09:45:01.050" v="9"/>
+          <ac:spMkLst>
+            <pc:docMk/>
+            <pc:sldMk cId="47249489" sldId="264"/>
+            <ac:spMk id="3" creationId="{DD7E7B8A-64D7-42FA-69FE-83D28EA0770B}"/>
+          </ac:spMkLst>
+        </pc:spChg>
+        <pc:spChg chg="add mod">
+          <ac:chgData name="Maximilian Schlake" userId="d69807565a22ab48" providerId="LiveId" clId="{497DC6A5-6E98-4823-B94B-BA98122E7321}" dt="2023-06-01T10:07:00.562" v="102" actId="1076"/>
+          <ac:spMkLst>
+            <pc:docMk/>
+            <pc:sldMk cId="47249489" sldId="264"/>
+            <ac:spMk id="7" creationId="{38434C18-E629-8B9D-4E85-3B193564F614}"/>
+          </ac:spMkLst>
+        </pc:spChg>
+        <pc:picChg chg="add del mod">
+          <ac:chgData name="Maximilian Schlake" userId="d69807565a22ab48" providerId="LiveId" clId="{497DC6A5-6E98-4823-B94B-BA98122E7321}" dt="2023-06-01T09:45:35.960" v="14" actId="478"/>
+          <ac:picMkLst>
+            <pc:docMk/>
+            <pc:sldMk cId="47249489" sldId="264"/>
+            <ac:picMk id="4" creationId="{A180C1B9-15D3-8561-4836-13D2188BDB10}"/>
+          </ac:picMkLst>
+        </pc:picChg>
+        <pc:picChg chg="del">
+          <ac:chgData name="Maximilian Schlake" userId="d69807565a22ab48" providerId="LiveId" clId="{497DC6A5-6E98-4823-B94B-BA98122E7321}" dt="2023-06-01T09:44:59.480" v="8" actId="478"/>
+          <ac:picMkLst>
+            <pc:docMk/>
+            <pc:sldMk cId="47249489" sldId="264"/>
+            <ac:picMk id="5" creationId="{5C8ED170-4989-2D1E-ED52-6ED9FFAE4CF9}"/>
+          </ac:picMkLst>
+        </pc:picChg>
+        <pc:picChg chg="add mod">
+          <ac:chgData name="Maximilian Schlake" userId="d69807565a22ab48" providerId="LiveId" clId="{497DC6A5-6E98-4823-B94B-BA98122E7321}" dt="2023-06-01T10:06:38.345" v="80" actId="1076"/>
+          <ac:picMkLst>
+            <pc:docMk/>
+            <pc:sldMk cId="47249489" sldId="264"/>
+            <ac:picMk id="9" creationId="{80148DE4-913D-B647-35B2-CD78F58DC834}"/>
+          </ac:picMkLst>
+        </pc:picChg>
+        <pc:picChg chg="add del mod">
+          <ac:chgData name="Maximilian Schlake" userId="d69807565a22ab48" providerId="LiveId" clId="{497DC6A5-6E98-4823-B94B-BA98122E7321}" dt="2023-06-01T10:06:14.739" v="77" actId="478"/>
+          <ac:picMkLst>
+            <pc:docMk/>
+            <pc:sldMk cId="47249489" sldId="264"/>
+            <ac:picMk id="10" creationId="{A8E7008A-6C42-BC98-7685-D82E7D7D4C4A}"/>
+          </ac:picMkLst>
+        </pc:picChg>
+      </pc:sldChg>
+      <pc:sldChg chg="addSp delSp modSp add del mod modNotesTx">
+        <pc:chgData name="Maximilian Schlake" userId="d69807565a22ab48" providerId="LiveId" clId="{497DC6A5-6E98-4823-B94B-BA98122E7321}" dt="2023-06-01T11:09:30.778" v="539" actId="2696"/>
+        <pc:sldMkLst>
+          <pc:docMk/>
+          <pc:sldMk cId="1034375881" sldId="265"/>
+        </pc:sldMkLst>
+        <pc:spChg chg="add mod">
+          <ac:chgData name="Maximilian Schlake" userId="d69807565a22ab48" providerId="LiveId" clId="{497DC6A5-6E98-4823-B94B-BA98122E7321}" dt="2023-06-01T10:07:41.949" v="139" actId="21"/>
+          <ac:spMkLst>
+            <pc:docMk/>
+            <pc:sldMk cId="1034375881" sldId="265"/>
+            <ac:spMk id="5" creationId="{3F06AFB1-6182-DC3D-F685-DD16604F6CEE}"/>
+          </ac:spMkLst>
+        </pc:spChg>
+        <pc:picChg chg="del mod">
+          <ac:chgData name="Maximilian Schlake" userId="d69807565a22ab48" providerId="LiveId" clId="{497DC6A5-6E98-4823-B94B-BA98122E7321}" dt="2023-06-01T10:07:41.949" v="139" actId="21"/>
+          <ac:picMkLst>
+            <pc:docMk/>
+            <pc:sldMk cId="1034375881" sldId="265"/>
+            <ac:picMk id="4" creationId="{A180C1B9-15D3-8561-4836-13D2188BDB10}"/>
+          </ac:picMkLst>
+        </pc:picChg>
+      </pc:sldChg>
+      <pc:sldChg chg="addSp delSp modSp add mod modNotesTx">
+        <pc:chgData name="Maximilian Schlake" userId="d69807565a22ab48" providerId="LiveId" clId="{497DC6A5-6E98-4823-B94B-BA98122E7321}" dt="2023-06-01T11:16:19.897" v="578" actId="20577"/>
+        <pc:sldMkLst>
+          <pc:docMk/>
+          <pc:sldMk cId="2877771453" sldId="266"/>
+        </pc:sldMkLst>
+        <pc:spChg chg="mod">
+          <ac:chgData name="Maximilian Schlake" userId="d69807565a22ab48" providerId="LiveId" clId="{497DC6A5-6E98-4823-B94B-BA98122E7321}" dt="2023-06-01T11:09:23.172" v="537" actId="20577"/>
+          <ac:spMkLst>
+            <pc:docMk/>
+            <pc:sldMk cId="2877771453" sldId="266"/>
+            <ac:spMk id="2" creationId="{9CEF219F-A752-AF3A-FEDC-8EB897838D43}"/>
+          </ac:spMkLst>
+        </pc:spChg>
+        <pc:spChg chg="mod">
+          <ac:chgData name="Maximilian Schlake" userId="d69807565a22ab48" providerId="LiveId" clId="{497DC6A5-6E98-4823-B94B-BA98122E7321}" dt="2023-06-01T11:16:19.897" v="578" actId="20577"/>
+          <ac:spMkLst>
+            <pc:docMk/>
+            <pc:sldMk cId="2877771453" sldId="266"/>
+            <ac:spMk id="7" creationId="{38434C18-E629-8B9D-4E85-3B193564F614}"/>
+          </ac:spMkLst>
+        </pc:spChg>
+        <pc:picChg chg="add mod">
+          <ac:chgData name="Maximilian Schlake" userId="d69807565a22ab48" providerId="LiveId" clId="{497DC6A5-6E98-4823-B94B-BA98122E7321}" dt="2023-06-01T10:08:21.867" v="151" actId="1076"/>
+          <ac:picMkLst>
+            <pc:docMk/>
+            <pc:sldMk cId="2877771453" sldId="266"/>
+            <ac:picMk id="3" creationId="{057CC8B5-B4A5-56F9-3445-E53C7CBDE4B1}"/>
+          </ac:picMkLst>
+        </pc:picChg>
+        <pc:picChg chg="add mod">
+          <ac:chgData name="Maximilian Schlake" userId="d69807565a22ab48" providerId="LiveId" clId="{497DC6A5-6E98-4823-B94B-BA98122E7321}" dt="2023-06-01T10:08:31.795" v="152" actId="1076"/>
+          <ac:picMkLst>
+            <pc:docMk/>
+            <pc:sldMk cId="2877771453" sldId="266"/>
+            <ac:picMk id="5" creationId="{DBDEEF7F-1D3B-737D-9027-905F1B043533}"/>
+          </ac:picMkLst>
+        </pc:picChg>
+        <pc:picChg chg="del">
+          <ac:chgData name="Maximilian Schlake" userId="d69807565a22ab48" providerId="LiveId" clId="{497DC6A5-6E98-4823-B94B-BA98122E7321}" dt="2023-06-01T10:07:39.147" v="138" actId="478"/>
+          <ac:picMkLst>
+            <pc:docMk/>
+            <pc:sldMk cId="2877771453" sldId="266"/>
+            <ac:picMk id="9" creationId="{80148DE4-913D-B647-35B2-CD78F58DC834}"/>
+          </ac:picMkLst>
+        </pc:picChg>
+      </pc:sldChg>
+      <pc:sldChg chg="addSp delSp modSp add mod">
+        <pc:chgData name="Maximilian Schlake" userId="d69807565a22ab48" providerId="LiveId" clId="{497DC6A5-6E98-4823-B94B-BA98122E7321}" dt="2023-06-01T11:09:25.438" v="538" actId="20577"/>
+        <pc:sldMkLst>
+          <pc:docMk/>
+          <pc:sldMk cId="852344474" sldId="267"/>
+        </pc:sldMkLst>
+        <pc:spChg chg="mod">
+          <ac:chgData name="Maximilian Schlake" userId="d69807565a22ab48" providerId="LiveId" clId="{497DC6A5-6E98-4823-B94B-BA98122E7321}" dt="2023-06-01T11:09:25.438" v="538" actId="20577"/>
+          <ac:spMkLst>
+            <pc:docMk/>
+            <pc:sldMk cId="852344474" sldId="267"/>
+            <ac:spMk id="2" creationId="{9CEF219F-A752-AF3A-FEDC-8EB897838D43}"/>
+          </ac:spMkLst>
+        </pc:spChg>
+        <pc:spChg chg="mod">
+          <ac:chgData name="Maximilian Schlake" userId="d69807565a22ab48" providerId="LiveId" clId="{497DC6A5-6E98-4823-B94B-BA98122E7321}" dt="2023-06-01T10:34:16.775" v="203" actId="20577"/>
+          <ac:spMkLst>
+            <pc:docMk/>
+            <pc:sldMk cId="852344474" sldId="267"/>
+            <ac:spMk id="7" creationId="{38434C18-E629-8B9D-4E85-3B193564F614}"/>
+          </ac:spMkLst>
+        </pc:spChg>
+        <pc:picChg chg="del">
+          <ac:chgData name="Maximilian Schlake" userId="d69807565a22ab48" providerId="LiveId" clId="{497DC6A5-6E98-4823-B94B-BA98122E7321}" dt="2023-06-01T10:34:23.891" v="205" actId="478"/>
+          <ac:picMkLst>
+            <pc:docMk/>
+            <pc:sldMk cId="852344474" sldId="267"/>
+            <ac:picMk id="3" creationId="{057CC8B5-B4A5-56F9-3445-E53C7CBDE4B1}"/>
+          </ac:picMkLst>
+        </pc:picChg>
+        <pc:picChg chg="del">
+          <ac:chgData name="Maximilian Schlake" userId="d69807565a22ab48" providerId="LiveId" clId="{497DC6A5-6E98-4823-B94B-BA98122E7321}" dt="2023-06-01T10:34:23.239" v="204" actId="478"/>
+          <ac:picMkLst>
+            <pc:docMk/>
+            <pc:sldMk cId="852344474" sldId="267"/>
+            <ac:picMk id="5" creationId="{DBDEEF7F-1D3B-737D-9027-905F1B043533}"/>
+          </ac:picMkLst>
+        </pc:picChg>
+        <pc:picChg chg="add mod">
+          <ac:chgData name="Maximilian Schlake" userId="d69807565a22ab48" providerId="LiveId" clId="{497DC6A5-6E98-4823-B94B-BA98122E7321}" dt="2023-06-01T10:50:34.944" v="241" actId="1076"/>
+          <ac:picMkLst>
+            <pc:docMk/>
+            <pc:sldMk cId="852344474" sldId="267"/>
+            <ac:picMk id="6" creationId="{63D627F6-5C7E-ECDE-6812-5A0255CC8FE1}"/>
+          </ac:picMkLst>
+        </pc:picChg>
+        <pc:picChg chg="add mod">
+          <ac:chgData name="Maximilian Schlake" userId="d69807565a22ab48" providerId="LiveId" clId="{497DC6A5-6E98-4823-B94B-BA98122E7321}" dt="2023-06-01T10:50:34.944" v="241" actId="1076"/>
+          <ac:picMkLst>
+            <pc:docMk/>
+            <pc:sldMk cId="852344474" sldId="267"/>
+            <ac:picMk id="9" creationId="{82C6D728-F90C-831C-54F8-A60161E93EE7}"/>
+          </ac:picMkLst>
+        </pc:picChg>
+        <pc:picChg chg="add mod">
+          <ac:chgData name="Maximilian Schlake" userId="d69807565a22ab48" providerId="LiveId" clId="{497DC6A5-6E98-4823-B94B-BA98122E7321}" dt="2023-06-01T10:50:34.944" v="241" actId="1076"/>
+          <ac:picMkLst>
+            <pc:docMk/>
+            <pc:sldMk cId="852344474" sldId="267"/>
+            <ac:picMk id="11" creationId="{CA2F37BF-7AA0-41BB-813B-DBFE232C748F}"/>
+          </ac:picMkLst>
+        </pc:picChg>
+      </pc:sldChg>
+    </pc:docChg>
+  </pc:docChgLst>
   <pc:docChgLst>
     <pc:chgData name="Maximilian Schlake" userId="d69807565a22ab48" providerId="LiveId" clId="{D2304C36-6F9A-49D4-BBB1-E2AF6025F6E7}"/>
     <pc:docChg chg="undo custSel addSld modSld">
@@ -378,7 +686,7 @@
           <a:p>
             <a:fld id="{0C8215FD-C011-40F7-B8C6-36FA60F83152}" type="datetimeFigureOut">
               <a:rPr lang="en-GB" smtClean="0"/>
-              <a:t>31/05/2023</a:t>
+              <a:t>01/06/2023</a:t>
             </a:fld>
             <a:endParaRPr lang="en-GB"/>
           </a:p>
@@ -817,6 +1125,26 @@
             </a:r>
           </a:p>
           <a:p>
+            <a:r>
+              <a:rPr lang="en-US" b="1" dirty="0"/>
+              <a:t>Creatinine: </a:t>
+            </a:r>
+            <a:r>
+              <a:rPr lang="en-US" b="0" dirty="0"/>
+              <a:t>Serum creatinine level is based on a blood test that measures the amount of creatinine in the blood. When the kidneys are not working well, serum creatinine level goes up. </a:t>
+            </a:r>
+          </a:p>
+          <a:p>
+            <a:r>
+              <a:rPr lang="en-US" b="1" dirty="0"/>
+              <a:t>Platelets</a:t>
+            </a:r>
+            <a:r>
+              <a:rPr lang="en-US" b="0" dirty="0"/>
+              <a:t>: Pieces of very large cells in the bone marrow called megakaryocytes. They help form blood clots to slow or stop bleeding and to help wounds heal. Having too many or too few platelets or having platelets that don't work as they should can cause problems.</a:t>
+            </a:r>
+          </a:p>
+          <a:p>
             <a:pPr marL="0" marR="0" lvl="0" indent="0" algn="l" defTabSz="914400" rtl="0" eaLnBrk="1" fontAlgn="auto" latinLnBrk="0" hangingPunct="1">
               <a:lnSpc>
                 <a:spcPct val="100000"/>
@@ -855,17 +1183,6 @@
               <a:t>An enzyme (a protein that helps to elicit chemical changes in the body) found in the heart, brain, and skeletal muscles. When muscle tissue is damaged, CPK leaks into your blood. Therefore, high levels of CPK usually indicate some sort of stress or injury to the heart or other muscles</a:t>
             </a:r>
             <a:endParaRPr lang="en-GB" b="1" i="0" dirty="0"/>
-          </a:p>
-          <a:p>
-            <a:r>
-              <a:rPr lang="en-US" b="1" dirty="0"/>
-              <a:t>Platelets</a:t>
-            </a:r>
-            <a:r>
-              <a:rPr lang="en-US" b="0" dirty="0"/>
-              <a:t>: Pieces of very large cells in the bone marrow called megakaryocytes. They help form blood clots to slow or stop bleeding and to help wounds heal. Having too many or too few platelets or having platelets that don't work as they should can cause problems.</a:t>
-            </a:r>
-            <a:endParaRPr lang="en-GB" b="0" dirty="0"/>
           </a:p>
         </p:txBody>
       </p:sp>
@@ -949,7 +1266,91 @@
           <a:bodyPr/>
           <a:lstStyle/>
           <a:p>
-            <a:endParaRPr lang="en-GB" dirty="0"/>
+            <a:endParaRPr lang="en-GB" b="0" dirty="0"/>
+          </a:p>
+        </p:txBody>
+      </p:sp>
+      <p:sp>
+        <p:nvSpPr>
+          <p:cNvPr id="4" name="Slide Number Placeholder 3"/>
+          <p:cNvSpPr>
+            <a:spLocks noGrp="1"/>
+          </p:cNvSpPr>
+          <p:nvPr>
+            <p:ph type="sldNum" sz="quarter" idx="5"/>
+          </p:nvPr>
+        </p:nvSpPr>
+        <p:spPr/>
+        <p:txBody>
+          <a:bodyPr/>
+          <a:lstStyle/>
+          <a:p>
+            <a:fld id="{85EBC9E2-2C9A-438E-83DE-17F69134D413}" type="slidenum">
+              <a:rPr lang="en-GB" smtClean="0"/>
+              <a:t>4</a:t>
+            </a:fld>
+            <a:endParaRPr lang="en-GB"/>
+          </a:p>
+        </p:txBody>
+      </p:sp>
+    </p:spTree>
+    <p:extLst>
+      <p:ext uri="{BB962C8B-B14F-4D97-AF65-F5344CB8AC3E}">
+        <p14:creationId xmlns:p14="http://schemas.microsoft.com/office/powerpoint/2010/main" val="622820937"/>
+      </p:ext>
+    </p:extLst>
+  </p:cSld>
+  <p:clrMapOvr>
+    <a:masterClrMapping/>
+  </p:clrMapOvr>
+</p:notes>
+</file>
+
+<file path=ppt/notesSlides/notesSlide4.xml><?xml version="1.0" encoding="utf-8"?>
+<p:notes xmlns:a="http://schemas.openxmlformats.org/drawingml/2006/main" xmlns:r="http://schemas.openxmlformats.org/officeDocument/2006/relationships" xmlns:p="http://schemas.openxmlformats.org/presentationml/2006/main">
+  <p:cSld>
+    <p:spTree>
+      <p:nvGrpSpPr>
+        <p:cNvPr id="1" name=""/>
+        <p:cNvGrpSpPr/>
+        <p:nvPr/>
+      </p:nvGrpSpPr>
+      <p:grpSpPr>
+        <a:xfrm>
+          <a:off x="0" y="0"/>
+          <a:ext cx="0" cy="0"/>
+          <a:chOff x="0" y="0"/>
+          <a:chExt cx="0" cy="0"/>
+        </a:xfrm>
+      </p:grpSpPr>
+      <p:sp>
+        <p:nvSpPr>
+          <p:cNvPr id="2" name="Slide Image Placeholder 1"/>
+          <p:cNvSpPr>
+            <a:spLocks noGrp="1" noRot="1" noChangeAspect="1"/>
+          </p:cNvSpPr>
+          <p:nvPr>
+            <p:ph type="sldImg"/>
+          </p:nvPr>
+        </p:nvSpPr>
+        <p:spPr/>
+      </p:sp>
+      <p:sp>
+        <p:nvSpPr>
+          <p:cNvPr id="3" name="Notes Placeholder 2"/>
+          <p:cNvSpPr>
+            <a:spLocks noGrp="1"/>
+          </p:cNvSpPr>
+          <p:nvPr>
+            <p:ph type="body" idx="1"/>
+          </p:nvPr>
+        </p:nvSpPr>
+        <p:spPr/>
+        <p:txBody>
+          <a:bodyPr/>
+          <a:lstStyle/>
+          <a:p>
+            <a:endParaRPr lang="en-GB" b="0" dirty="0"/>
           </a:p>
         </p:txBody>
       </p:sp>
@@ -971,6 +1372,174 @@
             <a:fld id="{85EBC9E2-2C9A-438E-83DE-17F69134D413}" type="slidenum">
               <a:rPr lang="en-GB" smtClean="0"/>
               <a:t>5</a:t>
+            </a:fld>
+            <a:endParaRPr lang="en-GB"/>
+          </a:p>
+        </p:txBody>
+      </p:sp>
+    </p:spTree>
+    <p:extLst>
+      <p:ext uri="{BB962C8B-B14F-4D97-AF65-F5344CB8AC3E}">
+        <p14:creationId xmlns:p14="http://schemas.microsoft.com/office/powerpoint/2010/main" val="745004438"/>
+      </p:ext>
+    </p:extLst>
+  </p:cSld>
+  <p:clrMapOvr>
+    <a:masterClrMapping/>
+  </p:clrMapOvr>
+</p:notes>
+</file>
+
+<file path=ppt/notesSlides/notesSlide5.xml><?xml version="1.0" encoding="utf-8"?>
+<p:notes xmlns:a="http://schemas.openxmlformats.org/drawingml/2006/main" xmlns:r="http://schemas.openxmlformats.org/officeDocument/2006/relationships" xmlns:p="http://schemas.openxmlformats.org/presentationml/2006/main">
+  <p:cSld>
+    <p:spTree>
+      <p:nvGrpSpPr>
+        <p:cNvPr id="1" name=""/>
+        <p:cNvGrpSpPr/>
+        <p:nvPr/>
+      </p:nvGrpSpPr>
+      <p:grpSpPr>
+        <a:xfrm>
+          <a:off x="0" y="0"/>
+          <a:ext cx="0" cy="0"/>
+          <a:chOff x="0" y="0"/>
+          <a:chExt cx="0" cy="0"/>
+        </a:xfrm>
+      </p:grpSpPr>
+      <p:sp>
+        <p:nvSpPr>
+          <p:cNvPr id="2" name="Slide Image Placeholder 1"/>
+          <p:cNvSpPr>
+            <a:spLocks noGrp="1" noRot="1" noChangeAspect="1"/>
+          </p:cNvSpPr>
+          <p:nvPr>
+            <p:ph type="sldImg"/>
+          </p:nvPr>
+        </p:nvSpPr>
+        <p:spPr/>
+      </p:sp>
+      <p:sp>
+        <p:nvSpPr>
+          <p:cNvPr id="3" name="Notes Placeholder 2"/>
+          <p:cNvSpPr>
+            <a:spLocks noGrp="1"/>
+          </p:cNvSpPr>
+          <p:nvPr>
+            <p:ph type="body" idx="1"/>
+          </p:nvPr>
+        </p:nvSpPr>
+        <p:spPr/>
+        <p:txBody>
+          <a:bodyPr/>
+          <a:lstStyle/>
+          <a:p>
+            <a:endParaRPr lang="en-GB" b="0" dirty="0"/>
+          </a:p>
+        </p:txBody>
+      </p:sp>
+      <p:sp>
+        <p:nvSpPr>
+          <p:cNvPr id="4" name="Slide Number Placeholder 3"/>
+          <p:cNvSpPr>
+            <a:spLocks noGrp="1"/>
+          </p:cNvSpPr>
+          <p:nvPr>
+            <p:ph type="sldNum" sz="quarter" idx="5"/>
+          </p:nvPr>
+        </p:nvSpPr>
+        <p:spPr/>
+        <p:txBody>
+          <a:bodyPr/>
+          <a:lstStyle/>
+          <a:p>
+            <a:fld id="{85EBC9E2-2C9A-438E-83DE-17F69134D413}" type="slidenum">
+              <a:rPr lang="en-GB" smtClean="0"/>
+              <a:t>6</a:t>
+            </a:fld>
+            <a:endParaRPr lang="en-GB"/>
+          </a:p>
+        </p:txBody>
+      </p:sp>
+    </p:spTree>
+    <p:extLst>
+      <p:ext uri="{BB962C8B-B14F-4D97-AF65-F5344CB8AC3E}">
+        <p14:creationId xmlns:p14="http://schemas.microsoft.com/office/powerpoint/2010/main" val="1714189590"/>
+      </p:ext>
+    </p:extLst>
+  </p:cSld>
+  <p:clrMapOvr>
+    <a:masterClrMapping/>
+  </p:clrMapOvr>
+</p:notes>
+</file>
+
+<file path=ppt/notesSlides/notesSlide6.xml><?xml version="1.0" encoding="utf-8"?>
+<p:notes xmlns:a="http://schemas.openxmlformats.org/drawingml/2006/main" xmlns:r="http://schemas.openxmlformats.org/officeDocument/2006/relationships" xmlns:p="http://schemas.openxmlformats.org/presentationml/2006/main">
+  <p:cSld>
+    <p:spTree>
+      <p:nvGrpSpPr>
+        <p:cNvPr id="1" name=""/>
+        <p:cNvGrpSpPr/>
+        <p:nvPr/>
+      </p:nvGrpSpPr>
+      <p:grpSpPr>
+        <a:xfrm>
+          <a:off x="0" y="0"/>
+          <a:ext cx="0" cy="0"/>
+          <a:chOff x="0" y="0"/>
+          <a:chExt cx="0" cy="0"/>
+        </a:xfrm>
+      </p:grpSpPr>
+      <p:sp>
+        <p:nvSpPr>
+          <p:cNvPr id="2" name="Slide Image Placeholder 1"/>
+          <p:cNvSpPr>
+            <a:spLocks noGrp="1" noRot="1" noChangeAspect="1"/>
+          </p:cNvSpPr>
+          <p:nvPr>
+            <p:ph type="sldImg"/>
+          </p:nvPr>
+        </p:nvSpPr>
+        <p:spPr/>
+      </p:sp>
+      <p:sp>
+        <p:nvSpPr>
+          <p:cNvPr id="3" name="Notes Placeholder 2"/>
+          <p:cNvSpPr>
+            <a:spLocks noGrp="1"/>
+          </p:cNvSpPr>
+          <p:nvPr>
+            <p:ph type="body" idx="1"/>
+          </p:nvPr>
+        </p:nvSpPr>
+        <p:spPr/>
+        <p:txBody>
+          <a:bodyPr/>
+          <a:lstStyle/>
+          <a:p>
+            <a:endParaRPr lang="en-GB" dirty="0"/>
+          </a:p>
+        </p:txBody>
+      </p:sp>
+      <p:sp>
+        <p:nvSpPr>
+          <p:cNvPr id="4" name="Slide Number Placeholder 3"/>
+          <p:cNvSpPr>
+            <a:spLocks noGrp="1"/>
+          </p:cNvSpPr>
+          <p:nvPr>
+            <p:ph type="sldNum" sz="quarter" idx="5"/>
+          </p:nvPr>
+        </p:nvSpPr>
+        <p:spPr/>
+        <p:txBody>
+          <a:bodyPr/>
+          <a:lstStyle/>
+          <a:p>
+            <a:fld id="{85EBC9E2-2C9A-438E-83DE-17F69134D413}" type="slidenum">
+              <a:rPr lang="en-GB" smtClean="0"/>
+              <a:t>8</a:t>
             </a:fld>
             <a:endParaRPr lang="en-GB"/>
           </a:p>
@@ -1206,7 +1775,7 @@
           <a:p>
             <a:fld id="{A1B2EB48-0D68-46EB-BB33-70996AFA08CC}" type="datetimeFigureOut">
               <a:rPr lang="en-GB" smtClean="0"/>
-              <a:t>31/05/2023</a:t>
+              <a:t>01/06/2023</a:t>
             </a:fld>
             <a:endParaRPr lang="en-GB"/>
           </a:p>
@@ -1541,7 +2110,7 @@
           <a:p>
             <a:fld id="{A1B2EB48-0D68-46EB-BB33-70996AFA08CC}" type="datetimeFigureOut">
               <a:rPr lang="en-GB" smtClean="0"/>
-              <a:t>31/05/2023</a:t>
+              <a:t>01/06/2023</a:t>
             </a:fld>
             <a:endParaRPr lang="en-GB"/>
           </a:p>
@@ -1844,7 +2413,7 @@
           <a:p>
             <a:fld id="{A1B2EB48-0D68-46EB-BB33-70996AFA08CC}" type="datetimeFigureOut">
               <a:rPr lang="en-GB" smtClean="0"/>
-              <a:t>31/05/2023</a:t>
+              <a:t>01/06/2023</a:t>
             </a:fld>
             <a:endParaRPr lang="en-GB"/>
           </a:p>
@@ -2092,7 +2661,7 @@
           <a:p>
             <a:fld id="{A1B2EB48-0D68-46EB-BB33-70996AFA08CC}" type="datetimeFigureOut">
               <a:rPr lang="en-GB" smtClean="0"/>
-              <a:t>31/05/2023</a:t>
+              <a:t>01/06/2023</a:t>
             </a:fld>
             <a:endParaRPr lang="en-GB"/>
           </a:p>
@@ -2500,7 +3069,7 @@
           <a:p>
             <a:fld id="{A1B2EB48-0D68-46EB-BB33-70996AFA08CC}" type="datetimeFigureOut">
               <a:rPr lang="en-GB" smtClean="0"/>
-              <a:t>31/05/2023</a:t>
+              <a:t>01/06/2023</a:t>
             </a:fld>
             <a:endParaRPr lang="en-GB"/>
           </a:p>
@@ -2815,7 +3384,7 @@
           <a:p>
             <a:fld id="{A1B2EB48-0D68-46EB-BB33-70996AFA08CC}" type="datetimeFigureOut">
               <a:rPr lang="en-GB" smtClean="0"/>
-              <a:t>31/05/2023</a:t>
+              <a:t>01/06/2023</a:t>
             </a:fld>
             <a:endParaRPr lang="en-GB"/>
           </a:p>
@@ -3360,7 +3929,7 @@
           <a:p>
             <a:fld id="{A1B2EB48-0D68-46EB-BB33-70996AFA08CC}" type="datetimeFigureOut">
               <a:rPr lang="en-GB" smtClean="0"/>
-              <a:t>31/05/2023</a:t>
+              <a:t>01/06/2023</a:t>
             </a:fld>
             <a:endParaRPr lang="en-GB"/>
           </a:p>
@@ -3556,7 +4125,7 @@
           <a:p>
             <a:fld id="{A1B2EB48-0D68-46EB-BB33-70996AFA08CC}" type="datetimeFigureOut">
               <a:rPr lang="en-GB" smtClean="0"/>
-              <a:t>31/05/2023</a:t>
+              <a:t>01/06/2023</a:t>
             </a:fld>
             <a:endParaRPr lang="en-GB"/>
           </a:p>
@@ -3770,7 +4339,7 @@
           <a:p>
             <a:fld id="{A1B2EB48-0D68-46EB-BB33-70996AFA08CC}" type="datetimeFigureOut">
               <a:rPr lang="en-GB" smtClean="0"/>
-              <a:t>31/05/2023</a:t>
+              <a:t>01/06/2023</a:t>
             </a:fld>
             <a:endParaRPr lang="en-GB"/>
           </a:p>
@@ -4140,7 +4709,7 @@
           <a:p>
             <a:fld id="{A1B2EB48-0D68-46EB-BB33-70996AFA08CC}" type="datetimeFigureOut">
               <a:rPr lang="en-GB" smtClean="0"/>
-              <a:t>31/05/2023</a:t>
+              <a:t>01/06/2023</a:t>
             </a:fld>
             <a:endParaRPr lang="en-GB"/>
           </a:p>
@@ -4544,7 +5113,7 @@
           <a:p>
             <a:fld id="{A1B2EB48-0D68-46EB-BB33-70996AFA08CC}" type="datetimeFigureOut">
               <a:rPr lang="en-GB" smtClean="0"/>
-              <a:t>31/05/2023</a:t>
+              <a:t>01/06/2023</a:t>
             </a:fld>
             <a:endParaRPr lang="en-GB"/>
           </a:p>
@@ -4856,7 +5425,7 @@
           <a:p>
             <a:fld id="{A1B2EB48-0D68-46EB-BB33-70996AFA08CC}" type="datetimeFigureOut">
               <a:rPr lang="en-GB" smtClean="0"/>
-              <a:t>31/05/2023</a:t>
+              <a:t>01/06/2023</a:t>
             </a:fld>
             <a:endParaRPr lang="en-GB"/>
           </a:p>
@@ -5390,13 +5959,13 @@
         </p:nvSpPr>
         <p:spPr>
           <a:xfrm>
-            <a:off x="2099388" y="3429000"/>
-            <a:ext cx="6030486" cy="2738537"/>
+            <a:off x="2099388" y="3353844"/>
+            <a:ext cx="6030486" cy="3122112"/>
           </a:xfrm>
         </p:spPr>
         <p:txBody>
           <a:bodyPr>
-            <a:normAutofit/>
+            <a:normAutofit fontScale="90000"/>
           </a:bodyPr>
           <a:lstStyle/>
           <a:p>
@@ -5404,7 +5973,21 @@
               <a:rPr lang="en-US" dirty="0"/>
               <a:t>Survival analysis of heart failure patients</a:t>
             </a:r>
-            <a:endParaRPr lang="en-GB" dirty="0"/>
+            <a:br>
+              <a:rPr lang="en-US" dirty="0"/>
+            </a:br>
+            <a:r>
+              <a:rPr lang="en-US" sz="2400" dirty="0"/>
+              <a:t> </a:t>
+            </a:r>
+            <a:br>
+              <a:rPr lang="en-US" sz="2400" dirty="0"/>
+            </a:br>
+            <a:r>
+              <a:rPr lang="en-US" sz="2200" i="1" dirty="0"/>
+              <a:t>– based on a case study by Ahmad et al. (2017)</a:t>
+            </a:r>
+            <a:endParaRPr lang="en-GB" i="1" dirty="0"/>
           </a:p>
         </p:txBody>
       </p:sp>
@@ -5426,22 +6009,38 @@
         </p:nvSpPr>
         <p:spPr>
           <a:xfrm>
-            <a:off x="2772274" y="1559659"/>
+            <a:off x="2772274" y="407266"/>
             <a:ext cx="5357600" cy="1160213"/>
           </a:xfrm>
         </p:spPr>
         <p:txBody>
           <a:bodyPr>
-            <a:normAutofit fontScale="92500" lnSpcReduction="10000"/>
+            <a:normAutofit fontScale="77500" lnSpcReduction="20000"/>
           </a:bodyPr>
           <a:lstStyle/>
           <a:p>
+            <a:pPr>
+              <a:spcBef>
+                <a:spcPts val="0"/>
+              </a:spcBef>
+              <a:spcAft>
+                <a:spcPts val="0"/>
+              </a:spcAft>
+            </a:pPr>
             <a:r>
               <a:rPr lang="en-GB" sz="2000" b="1" dirty="0"/>
               <a:t>Data Science Applications – B0925</a:t>
             </a:r>
           </a:p>
           <a:p>
+            <a:pPr>
+              <a:spcBef>
+                <a:spcPts val="0"/>
+              </a:spcBef>
+              <a:spcAft>
+                <a:spcPts val="0"/>
+              </a:spcAft>
+            </a:pPr>
             <a:r>
               <a:rPr lang="en-GB" dirty="0"/>
               <a:t>Sebastian </a:t>
@@ -5450,9 +6049,20 @@
               <a:rPr lang="en-GB" dirty="0" err="1"/>
               <a:t>Veuskens</a:t>
             </a:r>
+            <a:endParaRPr lang="en-GB" dirty="0"/>
+          </a:p>
+          <a:p>
+            <a:pPr>
+              <a:spcBef>
+                <a:spcPts val="0"/>
+              </a:spcBef>
+              <a:spcAft>
+                <a:spcPts val="0"/>
+              </a:spcAft>
+            </a:pPr>
             <a:r>
               <a:rPr lang="en-GB" dirty="0"/>
-              <a:t>, Jose Gabriel </a:t>
+              <a:t>Jose Gabriel </a:t>
             </a:r>
             <a:r>
               <a:rPr lang="en-GB" dirty="0" err="1"/>
@@ -5460,7 +6070,35 @@
             </a:r>
             <a:r>
               <a:rPr lang="en-GB" dirty="0"/>
-              <a:t>, Desmond Reynolds, Maximilian Schlake</a:t>
+              <a:t> </a:t>
+            </a:r>
+          </a:p>
+          <a:p>
+            <a:pPr>
+              <a:spcBef>
+                <a:spcPts val="0"/>
+              </a:spcBef>
+              <a:spcAft>
+                <a:spcPts val="0"/>
+              </a:spcAft>
+            </a:pPr>
+            <a:r>
+              <a:rPr lang="en-GB" dirty="0"/>
+              <a:t>Desmond Reynolds</a:t>
+            </a:r>
+          </a:p>
+          <a:p>
+            <a:pPr>
+              <a:spcBef>
+                <a:spcPts val="0"/>
+              </a:spcBef>
+              <a:spcAft>
+                <a:spcPts val="0"/>
+              </a:spcAft>
+            </a:pPr>
+            <a:r>
+              <a:rPr lang="en-GB" dirty="0"/>
+              <a:t> Maximilian Schlake</a:t>
             </a:r>
           </a:p>
         </p:txBody>
@@ -5469,6 +6107,268 @@
     <p:extLst>
       <p:ext uri="{BB962C8B-B14F-4D97-AF65-F5344CB8AC3E}">
         <p14:creationId xmlns:p14="http://schemas.microsoft.com/office/powerpoint/2010/main" val="2177361413"/>
+      </p:ext>
+    </p:extLst>
+  </p:cSld>
+  <p:clrMapOvr>
+    <a:masterClrMapping/>
+  </p:clrMapOvr>
+</p:sld>
+</file>
+
+<file path=ppt/slides/slide10.xml><?xml version="1.0" encoding="utf-8"?>
+<p:sld xmlns:a="http://schemas.openxmlformats.org/drawingml/2006/main" xmlns:r="http://schemas.openxmlformats.org/officeDocument/2006/relationships" xmlns:p="http://schemas.openxmlformats.org/presentationml/2006/main">
+  <p:cSld>
+    <p:spTree>
+      <p:nvGrpSpPr>
+        <p:cNvPr id="1" name=""/>
+        <p:cNvGrpSpPr/>
+        <p:nvPr/>
+      </p:nvGrpSpPr>
+      <p:grpSpPr>
+        <a:xfrm>
+          <a:off x="0" y="0"/>
+          <a:ext cx="0" cy="0"/>
+          <a:chOff x="0" y="0"/>
+          <a:chExt cx="0" cy="0"/>
+        </a:xfrm>
+      </p:grpSpPr>
+      <p:sp>
+        <p:nvSpPr>
+          <p:cNvPr id="2" name="Title 1">
+            <a:extLst>
+              <a:ext uri="{FF2B5EF4-FFF2-40B4-BE49-F238E27FC236}">
+                <a16:creationId xmlns:a16="http://schemas.microsoft.com/office/drawing/2014/main" id="{497E08B4-1A21-5C4A-FF59-0254370A8800}"/>
+              </a:ext>
+            </a:extLst>
+          </p:cNvPr>
+          <p:cNvSpPr>
+            <a:spLocks noGrp="1"/>
+          </p:cNvSpPr>
+          <p:nvPr>
+            <p:ph type="title"/>
+          </p:nvPr>
+        </p:nvSpPr>
+        <p:spPr/>
+        <p:txBody>
+          <a:bodyPr/>
+          <a:lstStyle/>
+          <a:p>
+            <a:r>
+              <a:rPr lang="es-ES" dirty="0" err="1"/>
+              <a:t>iv</a:t>
+            </a:r>
+            <a:r>
+              <a:rPr lang="es-ES" dirty="0"/>
+              <a:t>. </a:t>
+            </a:r>
+            <a:r>
+              <a:rPr lang="es-ES" dirty="0" err="1"/>
+              <a:t>Choice</a:t>
+            </a:r>
+            <a:r>
+              <a:rPr lang="es-ES" dirty="0"/>
+              <a:t> </a:t>
+            </a:r>
+            <a:r>
+              <a:rPr lang="es-ES" dirty="0" err="1"/>
+              <a:t>of</a:t>
+            </a:r>
+            <a:r>
+              <a:rPr lang="es-ES" dirty="0"/>
+              <a:t> </a:t>
+            </a:r>
+            <a:r>
+              <a:rPr lang="es-ES" dirty="0" err="1"/>
+              <a:t>the</a:t>
+            </a:r>
+            <a:r>
+              <a:rPr lang="es-ES" dirty="0"/>
+              <a:t> ‘</a:t>
+            </a:r>
+            <a:r>
+              <a:rPr lang="es-ES" dirty="0" err="1"/>
+              <a:t>best</a:t>
+            </a:r>
+            <a:r>
+              <a:rPr lang="es-ES" dirty="0"/>
+              <a:t>’ </a:t>
+            </a:r>
+            <a:r>
+              <a:rPr lang="es-ES" dirty="0" err="1"/>
+              <a:t>parametric</a:t>
+            </a:r>
+            <a:r>
+              <a:rPr lang="es-ES" dirty="0"/>
+              <a:t> </a:t>
+            </a:r>
+            <a:r>
+              <a:rPr lang="es-ES" dirty="0" err="1"/>
+              <a:t>model</a:t>
+            </a:r>
+            <a:endParaRPr lang="en-GB" dirty="0"/>
+          </a:p>
+        </p:txBody>
+      </p:sp>
+      <p:sp>
+        <p:nvSpPr>
+          <p:cNvPr id="3" name="Content Placeholder 2">
+            <a:extLst>
+              <a:ext uri="{FF2B5EF4-FFF2-40B4-BE49-F238E27FC236}">
+                <a16:creationId xmlns:a16="http://schemas.microsoft.com/office/drawing/2014/main" id="{00097D50-5ACB-4FDD-50C2-902AABD801B5}"/>
+              </a:ext>
+            </a:extLst>
+          </p:cNvPr>
+          <p:cNvSpPr>
+            <a:spLocks noGrp="1"/>
+          </p:cNvSpPr>
+          <p:nvPr>
+            <p:ph idx="1"/>
+          </p:nvPr>
+        </p:nvSpPr>
+        <p:spPr/>
+        <p:txBody>
+          <a:bodyPr/>
+          <a:lstStyle/>
+          <a:p>
+            <a:endParaRPr lang="en-GB"/>
+          </a:p>
+        </p:txBody>
+      </p:sp>
+    </p:spTree>
+    <p:extLst>
+      <p:ext uri="{BB962C8B-B14F-4D97-AF65-F5344CB8AC3E}">
+        <p14:creationId xmlns:p14="http://schemas.microsoft.com/office/powerpoint/2010/main" val="2789381983"/>
+      </p:ext>
+    </p:extLst>
+  </p:cSld>
+  <p:clrMapOvr>
+    <a:masterClrMapping/>
+  </p:clrMapOvr>
+</p:sld>
+</file>
+
+<file path=ppt/slides/slide11.xml><?xml version="1.0" encoding="utf-8"?>
+<p:sld xmlns:a="http://schemas.openxmlformats.org/drawingml/2006/main" xmlns:r="http://schemas.openxmlformats.org/officeDocument/2006/relationships" xmlns:p="http://schemas.openxmlformats.org/presentationml/2006/main">
+  <p:cSld>
+    <p:spTree>
+      <p:nvGrpSpPr>
+        <p:cNvPr id="1" name=""/>
+        <p:cNvGrpSpPr/>
+        <p:nvPr/>
+      </p:nvGrpSpPr>
+      <p:grpSpPr>
+        <a:xfrm>
+          <a:off x="0" y="0"/>
+          <a:ext cx="0" cy="0"/>
+          <a:chOff x="0" y="0"/>
+          <a:chExt cx="0" cy="0"/>
+        </a:xfrm>
+      </p:grpSpPr>
+      <p:sp>
+        <p:nvSpPr>
+          <p:cNvPr id="2" name="Title 1">
+            <a:extLst>
+              <a:ext uri="{FF2B5EF4-FFF2-40B4-BE49-F238E27FC236}">
+                <a16:creationId xmlns:a16="http://schemas.microsoft.com/office/drawing/2014/main" id="{4F09B721-2CE6-D091-186A-443E39FF16C9}"/>
+              </a:ext>
+            </a:extLst>
+          </p:cNvPr>
+          <p:cNvSpPr>
+            <a:spLocks noGrp="1"/>
+          </p:cNvSpPr>
+          <p:nvPr>
+            <p:ph type="title"/>
+          </p:nvPr>
+        </p:nvSpPr>
+        <p:spPr/>
+        <p:txBody>
+          <a:bodyPr/>
+          <a:lstStyle/>
+          <a:p>
+            <a:r>
+              <a:rPr lang="es-ES" dirty="0" err="1"/>
+              <a:t>References</a:t>
+            </a:r>
+            <a:endParaRPr lang="en-GB" dirty="0"/>
+          </a:p>
+        </p:txBody>
+      </p:sp>
+      <p:sp>
+        <p:nvSpPr>
+          <p:cNvPr id="3" name="Content Placeholder 2">
+            <a:extLst>
+              <a:ext uri="{FF2B5EF4-FFF2-40B4-BE49-F238E27FC236}">
+                <a16:creationId xmlns:a16="http://schemas.microsoft.com/office/drawing/2014/main" id="{7B93926A-8058-58EE-8571-32D25C423456}"/>
+              </a:ext>
+            </a:extLst>
+          </p:cNvPr>
+          <p:cNvSpPr>
+            <a:spLocks noGrp="1"/>
+          </p:cNvSpPr>
+          <p:nvPr>
+            <p:ph idx="1"/>
+          </p:nvPr>
+        </p:nvSpPr>
+        <p:spPr/>
+        <p:txBody>
+          <a:bodyPr>
+            <a:normAutofit/>
+          </a:bodyPr>
+          <a:lstStyle/>
+          <a:p>
+            <a:r>
+              <a:rPr lang="en-GB" sz="1600" dirty="0"/>
+              <a:t>Tanvir Ahmad, </a:t>
+            </a:r>
+            <a:r>
+              <a:rPr lang="en-GB" sz="1600" dirty="0" err="1"/>
+              <a:t>Assia</a:t>
+            </a:r>
+            <a:r>
+              <a:rPr lang="en-GB" sz="1600" dirty="0"/>
+              <a:t> </a:t>
+            </a:r>
+            <a:r>
+              <a:rPr lang="en-GB" sz="1600" dirty="0" err="1"/>
+              <a:t>Munir,Sajjad</a:t>
+            </a:r>
+            <a:r>
+              <a:rPr lang="en-GB" sz="1600" dirty="0"/>
+              <a:t> Haider Bhatti, Muhammad Aftab, Muhammad Ali Raza (2017): </a:t>
+            </a:r>
+            <a:r>
+              <a:rPr lang="en-US" sz="1600" dirty="0"/>
+              <a:t>Survival analysis of heart failure patients: A case study, </a:t>
+            </a:r>
+            <a:r>
+              <a:rPr lang="en-US" sz="1600" dirty="0" err="1"/>
+              <a:t>PLoS</a:t>
+            </a:r>
+            <a:r>
+              <a:rPr lang="en-US" sz="1600" dirty="0"/>
+              <a:t> ONE 12(7), </a:t>
+            </a:r>
+            <a:r>
+              <a:rPr lang="en-US" sz="1600" dirty="0">
+                <a:hlinkClick r:id="rId2"/>
+              </a:rPr>
+              <a:t>https://journals.plos.org/plosone/article?id=10.1371/journal.pone.0181001</a:t>
+            </a:r>
+            <a:r>
+              <a:rPr lang="en-US" sz="1600" dirty="0"/>
+              <a:t> </a:t>
+            </a:r>
+          </a:p>
+          <a:p>
+            <a:endParaRPr lang="en-GB" sz="1600" dirty="0"/>
+          </a:p>
+        </p:txBody>
+      </p:sp>
+    </p:spTree>
+    <p:extLst>
+      <p:ext uri="{BB962C8B-B14F-4D97-AF65-F5344CB8AC3E}">
+        <p14:creationId xmlns:p14="http://schemas.microsoft.com/office/powerpoint/2010/main" val="1052708400"/>
       </p:ext>
     </p:extLst>
   </p:cSld>
@@ -5554,13 +6454,43 @@
         </p:nvSpPr>
         <p:spPr>
           <a:xfrm>
-            <a:off x="2611808" y="2052116"/>
-            <a:ext cx="7958331" cy="3997828"/>
+            <a:off x="2611808" y="1885285"/>
+            <a:ext cx="7958331" cy="4164659"/>
           </a:xfrm>
         </p:spPr>
         <p:txBody>
           <a:bodyPr/>
           <a:lstStyle/>
+          <a:p>
+            <a:pPr marL="514350" indent="-514350">
+              <a:buFont typeface="+mj-lt"/>
+              <a:buAutoNum type="romanLcPeriod"/>
+            </a:pPr>
+            <a:r>
+              <a:rPr lang="es-ES" dirty="0" err="1"/>
+              <a:t>Introduction</a:t>
+            </a:r>
+            <a:r>
+              <a:rPr lang="es-ES" dirty="0"/>
+              <a:t> </a:t>
+            </a:r>
+            <a:r>
+              <a:rPr lang="es-ES" dirty="0" err="1"/>
+              <a:t>to</a:t>
+            </a:r>
+            <a:r>
+              <a:rPr lang="es-ES" dirty="0"/>
+              <a:t> </a:t>
+            </a:r>
+            <a:r>
+              <a:rPr lang="es-ES" dirty="0" err="1"/>
+              <a:t>the</a:t>
+            </a:r>
+            <a:r>
+              <a:rPr lang="es-ES" dirty="0"/>
+              <a:t> data</a:t>
+            </a:r>
+          </a:p>
           <a:p>
             <a:pPr marL="514350" indent="-514350">
               <a:buFont typeface="+mj-lt"/>
@@ -5780,7 +6710,7 @@
             </a:r>
             <a:r>
               <a:rPr lang="es-ES" dirty="0" err="1"/>
-              <a:t>Univariate</a:t>
+              <a:t>Introduction</a:t>
             </a:r>
             <a:r>
               <a:rPr lang="es-ES" dirty="0"/>
@@ -5788,7 +6718,19 @@
             </a:r>
             <a:r>
               <a:rPr lang="es-ES" dirty="0" err="1"/>
-              <a:t>analysis</a:t>
+              <a:t>to</a:t>
+            </a:r>
+            <a:r>
+              <a:rPr lang="es-ES" dirty="0"/>
+              <a:t> </a:t>
+            </a:r>
+            <a:r>
+              <a:rPr lang="es-ES" dirty="0" err="1"/>
+              <a:t>the</a:t>
+            </a:r>
+            <a:r>
+              <a:rPr lang="es-ES" dirty="0"/>
+              <a:t> data</a:t>
             </a:r>
             <a:endParaRPr lang="en-GB" dirty="0"/>
           </a:p>
@@ -5878,7 +6820,7 @@
             </a:pPr>
             <a:r>
               <a:rPr lang="en-US" dirty="0"/>
-              <a:t>All patients more than 40 years old</a:t>
+              <a:t>more than 40 years old</a:t>
             </a:r>
           </a:p>
           <a:p>
@@ -5892,7 +6834,7 @@
             </a:pPr>
             <a:r>
               <a:rPr lang="en-US" dirty="0"/>
-              <a:t>Left ventricular systolic dysfunction</a:t>
+              <a:t>with left ventricular systolic dysfunction</a:t>
             </a:r>
           </a:p>
           <a:p>
@@ -6365,7 +7307,7 @@
           <p:cNvPr id="2" name="Title 1">
             <a:extLst>
               <a:ext uri="{FF2B5EF4-FFF2-40B4-BE49-F238E27FC236}">
-                <a16:creationId xmlns:a16="http://schemas.microsoft.com/office/drawing/2014/main" id="{497E08B4-1A21-5C4A-FF59-0254370A8800}"/>
+                <a16:creationId xmlns:a16="http://schemas.microsoft.com/office/drawing/2014/main" id="{9CEF219F-A752-AF3A-FEDC-8EB897838D43}"/>
               </a:ext>
             </a:extLst>
           </p:cNvPr>
@@ -6391,15 +7333,7 @@
             </a:r>
             <a:r>
               <a:rPr lang="es-ES" dirty="0" err="1"/>
-              <a:t>Multivariate</a:t>
-            </a:r>
-            <a:r>
-              <a:rPr lang="es-ES" dirty="0"/>
-              <a:t> Cox </a:t>
-            </a:r>
-            <a:r>
-              <a:rPr lang="es-ES" dirty="0" err="1"/>
-              <a:t>regression</a:t>
+              <a:t>Univariate</a:t>
             </a:r>
             <a:r>
               <a:rPr lang="es-ES" dirty="0"/>
@@ -6407,18 +7341,7 @@
             </a:r>
             <a:r>
               <a:rPr lang="es-ES" dirty="0" err="1"/>
-              <a:t>model</a:t>
-            </a:r>
-            <a:br>
-              <a:rPr lang="es-ES" dirty="0"/>
-            </a:br>
-            <a:r>
-              <a:rPr lang="es-ES" dirty="0"/>
-              <a:t>A. Base </a:t>
-            </a:r>
-            <a:r>
-              <a:rPr lang="es-ES" dirty="0" err="1"/>
-              <a:t>model</a:t>
+              <a:t>analysis</a:t>
             </a:r>
             <a:endParaRPr lang="en-GB" dirty="0"/>
           </a:p>
@@ -6426,10 +7349,10 @@
       </p:sp>
       <p:sp>
         <p:nvSpPr>
-          <p:cNvPr id="3" name="Content Placeholder 2">
+          <p:cNvPr id="7" name="Content Placeholder 6">
             <a:extLst>
               <a:ext uri="{FF2B5EF4-FFF2-40B4-BE49-F238E27FC236}">
-                <a16:creationId xmlns:a16="http://schemas.microsoft.com/office/drawing/2014/main" id="{00097D50-5ACB-4FDD-50C2-902AABD801B5}"/>
+                <a16:creationId xmlns:a16="http://schemas.microsoft.com/office/drawing/2014/main" id="{38434C18-E629-8B9D-4E85-3B193564F614}"/>
               </a:ext>
             </a:extLst>
           </p:cNvPr>
@@ -6440,19 +7363,74 @@
             <p:ph idx="1"/>
           </p:nvPr>
         </p:nvSpPr>
-        <p:spPr/>
+        <p:spPr>
+          <a:xfrm>
+            <a:off x="2197729" y="1346670"/>
+            <a:ext cx="7796540" cy="895621"/>
+          </a:xfrm>
+        </p:spPr>
         <p:txBody>
           <a:bodyPr/>
           <a:lstStyle/>
           <a:p>
-            <a:endParaRPr lang="en-GB"/>
-          </a:p>
-        </p:txBody>
-      </p:sp>
+            <a:r>
+              <a:rPr lang="es-ES" dirty="0" err="1"/>
+              <a:t>Overall</a:t>
+            </a:r>
+            <a:r>
+              <a:rPr lang="es-ES" dirty="0"/>
+              <a:t> </a:t>
+            </a:r>
+            <a:r>
+              <a:rPr lang="es-ES" dirty="0" err="1"/>
+              <a:t>Survival</a:t>
+            </a:r>
+            <a:r>
+              <a:rPr lang="es-ES" dirty="0"/>
+              <a:t> </a:t>
+            </a:r>
+            <a:r>
+              <a:rPr lang="es-ES" dirty="0" err="1"/>
+              <a:t>Probability</a:t>
+            </a:r>
+            <a:endParaRPr lang="en-GB" dirty="0"/>
+          </a:p>
+        </p:txBody>
+      </p:sp>
+      <p:pic>
+        <p:nvPicPr>
+          <p:cNvPr id="9" name="Picture 8">
+            <a:extLst>
+              <a:ext uri="{FF2B5EF4-FFF2-40B4-BE49-F238E27FC236}">
+                <a16:creationId xmlns:a16="http://schemas.microsoft.com/office/drawing/2014/main" id="{80148DE4-913D-B647-35B2-CD78F58DC834}"/>
+              </a:ext>
+            </a:extLst>
+          </p:cNvPr>
+          <p:cNvPicPr>
+            <a:picLocks noChangeAspect="1"/>
+          </p:cNvPicPr>
+          <p:nvPr/>
+        </p:nvPicPr>
+        <p:blipFill>
+          <a:blip r:embed="rId3"/>
+          <a:stretch>
+            <a:fillRect/>
+          </a:stretch>
+        </p:blipFill>
+        <p:spPr>
+          <a:xfrm>
+            <a:off x="3874395" y="2104973"/>
+            <a:ext cx="4443209" cy="4443209"/>
+          </a:xfrm>
+          <a:prstGeom prst="rect">
+            <a:avLst/>
+          </a:prstGeom>
+        </p:spPr>
+      </p:pic>
     </p:spTree>
     <p:extLst>
       <p:ext uri="{BB962C8B-B14F-4D97-AF65-F5344CB8AC3E}">
-        <p14:creationId xmlns:p14="http://schemas.microsoft.com/office/powerpoint/2010/main" val="2082576824"/>
+        <p14:creationId xmlns:p14="http://schemas.microsoft.com/office/powerpoint/2010/main" val="47249489"/>
       </p:ext>
     </p:extLst>
   </p:cSld>
@@ -6484,7 +7462,7 @@
           <p:cNvPr id="2" name="Title 1">
             <a:extLst>
               <a:ext uri="{FF2B5EF4-FFF2-40B4-BE49-F238E27FC236}">
-                <a16:creationId xmlns:a16="http://schemas.microsoft.com/office/drawing/2014/main" id="{497E08B4-1A21-5C4A-FF59-0254370A8800}"/>
+                <a16:creationId xmlns:a16="http://schemas.microsoft.com/office/drawing/2014/main" id="{9CEF219F-A752-AF3A-FEDC-8EB897838D43}"/>
               </a:ext>
             </a:extLst>
           </p:cNvPr>
@@ -6510,15 +7488,7 @@
             </a:r>
             <a:r>
               <a:rPr lang="es-ES" dirty="0" err="1"/>
-              <a:t>Multivariate</a:t>
-            </a:r>
-            <a:r>
-              <a:rPr lang="es-ES" dirty="0"/>
-              <a:t> Cox </a:t>
-            </a:r>
-            <a:r>
-              <a:rPr lang="es-ES" dirty="0" err="1"/>
-              <a:t>regression</a:t>
+              <a:t>Univariate</a:t>
             </a:r>
             <a:r>
               <a:rPr lang="es-ES" dirty="0"/>
@@ -6526,34 +7496,7 @@
             </a:r>
             <a:r>
               <a:rPr lang="es-ES" dirty="0" err="1"/>
-              <a:t>model</a:t>
-            </a:r>
-            <a:br>
-              <a:rPr lang="es-ES" dirty="0"/>
-            </a:br>
-            <a:r>
-              <a:rPr lang="es-ES" dirty="0"/>
-              <a:t>B. </a:t>
-            </a:r>
-            <a:r>
-              <a:rPr lang="es-ES" dirty="0" err="1"/>
-              <a:t>With</a:t>
-            </a:r>
-            <a:r>
-              <a:rPr lang="es-ES" dirty="0"/>
-              <a:t> time </a:t>
-            </a:r>
-            <a:r>
-              <a:rPr lang="es-ES" dirty="0" err="1"/>
-              <a:t>varying</a:t>
-            </a:r>
-            <a:r>
-              <a:rPr lang="es-ES" dirty="0"/>
-              <a:t> </a:t>
-            </a:r>
-            <a:r>
-              <a:rPr lang="es-ES" dirty="0" err="1"/>
-              <a:t>coefficients</a:t>
+              <a:t>analysis</a:t>
             </a:r>
             <a:endParaRPr lang="en-GB" dirty="0"/>
           </a:p>
@@ -6561,10 +7504,10 @@
       </p:sp>
       <p:sp>
         <p:nvSpPr>
-          <p:cNvPr id="3" name="Content Placeholder 2">
+          <p:cNvPr id="7" name="Content Placeholder 6">
             <a:extLst>
               <a:ext uri="{FF2B5EF4-FFF2-40B4-BE49-F238E27FC236}">
-                <a16:creationId xmlns:a16="http://schemas.microsoft.com/office/drawing/2014/main" id="{00097D50-5ACB-4FDD-50C2-902AABD801B5}"/>
+                <a16:creationId xmlns:a16="http://schemas.microsoft.com/office/drawing/2014/main" id="{38434C18-E629-8B9D-4E85-3B193564F614}"/>
               </a:ext>
             </a:extLst>
           </p:cNvPr>
@@ -6575,19 +7518,156 @@
             <p:ph idx="1"/>
           </p:nvPr>
         </p:nvSpPr>
-        <p:spPr/>
+        <p:spPr>
+          <a:xfrm>
+            <a:off x="2197729" y="1346670"/>
+            <a:ext cx="7796540" cy="895621"/>
+          </a:xfrm>
+        </p:spPr>
         <p:txBody>
           <a:bodyPr/>
           <a:lstStyle/>
           <a:p>
-            <a:endParaRPr lang="en-GB"/>
-          </a:p>
-        </p:txBody>
-      </p:sp>
+            <a:r>
+              <a:rPr lang="es-ES" dirty="0" err="1"/>
+              <a:t>Survival</a:t>
+            </a:r>
+            <a:r>
+              <a:rPr lang="es-ES" dirty="0"/>
+              <a:t> </a:t>
+            </a:r>
+            <a:r>
+              <a:rPr lang="es-ES" dirty="0" err="1"/>
+              <a:t>Probability</a:t>
+            </a:r>
+            <a:r>
+              <a:rPr lang="es-ES" dirty="0"/>
+              <a:t> </a:t>
+            </a:r>
+            <a:r>
+              <a:rPr lang="es-ES" dirty="0" err="1"/>
+              <a:t>by</a:t>
+            </a:r>
+            <a:r>
+              <a:rPr lang="es-ES" dirty="0"/>
+              <a:t> </a:t>
+            </a:r>
+            <a:r>
+              <a:rPr lang="es-ES" dirty="0" err="1"/>
+              <a:t>Blood</a:t>
+            </a:r>
+            <a:r>
+              <a:rPr lang="es-ES" dirty="0"/>
+              <a:t> </a:t>
+            </a:r>
+            <a:r>
+              <a:rPr lang="es-ES" dirty="0" err="1"/>
+              <a:t>Pressure</a:t>
+            </a:r>
+            <a:r>
+              <a:rPr lang="es-ES" dirty="0"/>
+              <a:t>, </a:t>
+            </a:r>
+            <a:r>
+              <a:rPr lang="es-ES" dirty="0" err="1"/>
+              <a:t>Anaemia</a:t>
+            </a:r>
+            <a:r>
+              <a:rPr lang="es-ES" dirty="0"/>
+              <a:t> and </a:t>
+            </a:r>
+            <a:r>
+              <a:rPr lang="es-ES" dirty="0" err="1"/>
+              <a:t>Creatinine_group</a:t>
+            </a:r>
+            <a:r>
+              <a:rPr lang="es-ES" dirty="0"/>
+              <a:t> (</a:t>
+            </a:r>
+            <a:r>
+              <a:rPr lang="es-ES" dirty="0" err="1"/>
+              <a:t>to</a:t>
+            </a:r>
+            <a:r>
+              <a:rPr lang="es-ES" dirty="0"/>
+              <a:t> be </a:t>
+            </a:r>
+            <a:r>
+              <a:rPr lang="es-ES" dirty="0" err="1"/>
+              <a:t>added</a:t>
+            </a:r>
+            <a:r>
+              <a:rPr lang="es-ES"/>
+              <a:t>)</a:t>
+            </a:r>
+            <a:endParaRPr lang="en-GB" dirty="0"/>
+          </a:p>
+        </p:txBody>
+      </p:sp>
+      <p:pic>
+        <p:nvPicPr>
+          <p:cNvPr id="3" name="Content Placeholder 4">
+            <a:extLst>
+              <a:ext uri="{FF2B5EF4-FFF2-40B4-BE49-F238E27FC236}">
+                <a16:creationId xmlns:a16="http://schemas.microsoft.com/office/drawing/2014/main" id="{057CC8B5-B4A5-56F9-3445-E53C7CBDE4B1}"/>
+              </a:ext>
+            </a:extLst>
+          </p:cNvPr>
+          <p:cNvPicPr>
+            <a:picLocks noChangeAspect="1"/>
+          </p:cNvPicPr>
+          <p:nvPr/>
+        </p:nvPicPr>
+        <p:blipFill>
+          <a:blip r:embed="rId3"/>
+          <a:stretch>
+            <a:fillRect/>
+          </a:stretch>
+        </p:blipFill>
+        <p:spPr>
+          <a:xfrm>
+            <a:off x="6368453" y="2055866"/>
+            <a:ext cx="4704343" cy="4704343"/>
+          </a:xfrm>
+          <a:prstGeom prst="rect">
+            <a:avLst/>
+          </a:prstGeom>
+        </p:spPr>
+      </p:pic>
+      <p:pic>
+        <p:nvPicPr>
+          <p:cNvPr id="5" name="Picture 4">
+            <a:extLst>
+              <a:ext uri="{FF2B5EF4-FFF2-40B4-BE49-F238E27FC236}">
+                <a16:creationId xmlns:a16="http://schemas.microsoft.com/office/drawing/2014/main" id="{DBDEEF7F-1D3B-737D-9027-905F1B043533}"/>
+              </a:ext>
+            </a:extLst>
+          </p:cNvPr>
+          <p:cNvPicPr>
+            <a:picLocks noChangeAspect="1"/>
+          </p:cNvPicPr>
+          <p:nvPr/>
+        </p:nvPicPr>
+        <p:blipFill>
+          <a:blip r:embed="rId4"/>
+          <a:stretch>
+            <a:fillRect/>
+          </a:stretch>
+        </p:blipFill>
+        <p:spPr>
+          <a:xfrm>
+            <a:off x="1119205" y="2055866"/>
+            <a:ext cx="4704343" cy="4704343"/>
+          </a:xfrm>
+          <a:prstGeom prst="rect">
+            <a:avLst/>
+          </a:prstGeom>
+        </p:spPr>
+      </p:pic>
     </p:spTree>
     <p:extLst>
       <p:ext uri="{BB962C8B-B14F-4D97-AF65-F5344CB8AC3E}">
-        <p14:creationId xmlns:p14="http://schemas.microsoft.com/office/powerpoint/2010/main" val="3708354059"/>
+        <p14:creationId xmlns:p14="http://schemas.microsoft.com/office/powerpoint/2010/main" val="2877771453"/>
       </p:ext>
     </p:extLst>
   </p:cSld>
@@ -6619,7 +7699,7 @@
           <p:cNvPr id="2" name="Title 1">
             <a:extLst>
               <a:ext uri="{FF2B5EF4-FFF2-40B4-BE49-F238E27FC236}">
-                <a16:creationId xmlns:a16="http://schemas.microsoft.com/office/drawing/2014/main" id="{497E08B4-1A21-5C4A-FF59-0254370A8800}"/>
+                <a16:creationId xmlns:a16="http://schemas.microsoft.com/office/drawing/2014/main" id="{9CEF219F-A752-AF3A-FEDC-8EB897838D43}"/>
               </a:ext>
             </a:extLst>
           </p:cNvPr>
@@ -6637,7 +7717,7 @@
           <a:p>
             <a:r>
               <a:rPr lang="es-ES" dirty="0" err="1"/>
-              <a:t>iii</a:t>
+              <a:t>ii</a:t>
             </a:r>
             <a:r>
               <a:rPr lang="es-ES" dirty="0"/>
@@ -6645,11 +7725,15 @@
             </a:r>
             <a:r>
               <a:rPr lang="es-ES" dirty="0" err="1"/>
-              <a:t>Linearity</a:t>
+              <a:t>Univariate</a:t>
             </a:r>
             <a:r>
               <a:rPr lang="es-ES" dirty="0"/>
-              <a:t> test</a:t>
+              <a:t> </a:t>
+            </a:r>
+            <a:r>
+              <a:rPr lang="es-ES" dirty="0" err="1"/>
+              <a:t>analysis</a:t>
             </a:r>
             <a:endParaRPr lang="en-GB" dirty="0"/>
           </a:p>
@@ -6657,10 +7741,10 @@
       </p:sp>
       <p:sp>
         <p:nvSpPr>
-          <p:cNvPr id="3" name="Content Placeholder 2">
+          <p:cNvPr id="7" name="Content Placeholder 6">
             <a:extLst>
               <a:ext uri="{FF2B5EF4-FFF2-40B4-BE49-F238E27FC236}">
-                <a16:creationId xmlns:a16="http://schemas.microsoft.com/office/drawing/2014/main" id="{00097D50-5ACB-4FDD-50C2-902AABD801B5}"/>
+                <a16:creationId xmlns:a16="http://schemas.microsoft.com/office/drawing/2014/main" id="{38434C18-E629-8B9D-4E85-3B193564F614}"/>
               </a:ext>
             </a:extLst>
           </p:cNvPr>
@@ -6671,19 +7755,142 @@
             <p:ph idx="1"/>
           </p:nvPr>
         </p:nvSpPr>
-        <p:spPr/>
+        <p:spPr>
+          <a:xfrm>
+            <a:off x="2197729" y="1346670"/>
+            <a:ext cx="7796540" cy="895621"/>
+          </a:xfrm>
+        </p:spPr>
         <p:txBody>
           <a:bodyPr/>
           <a:lstStyle/>
           <a:p>
-            <a:endParaRPr lang="en-GB"/>
-          </a:p>
-        </p:txBody>
-      </p:sp>
+            <a:r>
+              <a:rPr lang="es-ES" dirty="0" err="1"/>
+              <a:t>Cloglog</a:t>
+            </a:r>
+            <a:r>
+              <a:rPr lang="es-ES" dirty="0"/>
+              <a:t> </a:t>
+            </a:r>
+            <a:r>
+              <a:rPr lang="es-ES" dirty="0" err="1"/>
+              <a:t>transformation</a:t>
+            </a:r>
+            <a:r>
+              <a:rPr lang="es-ES" dirty="0"/>
+              <a:t> </a:t>
+            </a:r>
+            <a:r>
+              <a:rPr lang="es-ES" dirty="0" err="1"/>
+              <a:t>to</a:t>
+            </a:r>
+            <a:r>
+              <a:rPr lang="es-ES" dirty="0"/>
+              <a:t> test PH </a:t>
+            </a:r>
+            <a:r>
+              <a:rPr lang="es-ES" dirty="0" err="1"/>
+              <a:t>assumption</a:t>
+            </a:r>
+            <a:endParaRPr lang="en-GB" dirty="0"/>
+          </a:p>
+        </p:txBody>
+      </p:sp>
+      <p:pic>
+        <p:nvPicPr>
+          <p:cNvPr id="6" name="Picture 5">
+            <a:extLst>
+              <a:ext uri="{FF2B5EF4-FFF2-40B4-BE49-F238E27FC236}">
+                <a16:creationId xmlns:a16="http://schemas.microsoft.com/office/drawing/2014/main" id="{63D627F6-5C7E-ECDE-6812-5A0255CC8FE1}"/>
+              </a:ext>
+            </a:extLst>
+          </p:cNvPr>
+          <p:cNvPicPr>
+            <a:picLocks noChangeAspect="1"/>
+          </p:cNvPicPr>
+          <p:nvPr/>
+        </p:nvPicPr>
+        <p:blipFill>
+          <a:blip r:embed="rId3"/>
+          <a:stretch>
+            <a:fillRect/>
+          </a:stretch>
+        </p:blipFill>
+        <p:spPr>
+          <a:xfrm>
+            <a:off x="4525830" y="2250093"/>
+            <a:ext cx="3272625" cy="3272625"/>
+          </a:xfrm>
+          <a:prstGeom prst="rect">
+            <a:avLst/>
+          </a:prstGeom>
+        </p:spPr>
+      </p:pic>
+      <p:pic>
+        <p:nvPicPr>
+          <p:cNvPr id="9" name="Picture 8">
+            <a:extLst>
+              <a:ext uri="{FF2B5EF4-FFF2-40B4-BE49-F238E27FC236}">
+                <a16:creationId xmlns:a16="http://schemas.microsoft.com/office/drawing/2014/main" id="{82C6D728-F90C-831C-54F8-A60161E93EE7}"/>
+              </a:ext>
+            </a:extLst>
+          </p:cNvPr>
+          <p:cNvPicPr>
+            <a:picLocks noChangeAspect="1"/>
+          </p:cNvPicPr>
+          <p:nvPr/>
+        </p:nvPicPr>
+        <p:blipFill>
+          <a:blip r:embed="rId4"/>
+          <a:stretch>
+            <a:fillRect/>
+          </a:stretch>
+        </p:blipFill>
+        <p:spPr>
+          <a:xfrm>
+            <a:off x="1085632" y="2242291"/>
+            <a:ext cx="3272625" cy="3272625"/>
+          </a:xfrm>
+          <a:prstGeom prst="rect">
+            <a:avLst/>
+          </a:prstGeom>
+        </p:spPr>
+      </p:pic>
+      <p:pic>
+        <p:nvPicPr>
+          <p:cNvPr id="11" name="Picture 10">
+            <a:extLst>
+              <a:ext uri="{FF2B5EF4-FFF2-40B4-BE49-F238E27FC236}">
+                <a16:creationId xmlns:a16="http://schemas.microsoft.com/office/drawing/2014/main" id="{CA2F37BF-7AA0-41BB-813B-DBFE232C748F}"/>
+              </a:ext>
+            </a:extLst>
+          </p:cNvPr>
+          <p:cNvPicPr>
+            <a:picLocks noChangeAspect="1"/>
+          </p:cNvPicPr>
+          <p:nvPr/>
+        </p:nvPicPr>
+        <p:blipFill>
+          <a:blip r:embed="rId5"/>
+          <a:stretch>
+            <a:fillRect/>
+          </a:stretch>
+        </p:blipFill>
+        <p:spPr>
+          <a:xfrm>
+            <a:off x="7966028" y="2250093"/>
+            <a:ext cx="3291694" cy="3291694"/>
+          </a:xfrm>
+          <a:prstGeom prst="rect">
+            <a:avLst/>
+          </a:prstGeom>
+        </p:spPr>
+      </p:pic>
     </p:spTree>
     <p:extLst>
       <p:ext uri="{BB962C8B-B14F-4D97-AF65-F5344CB8AC3E}">
-        <p14:creationId xmlns:p14="http://schemas.microsoft.com/office/powerpoint/2010/main" val="3148376159"/>
+        <p14:creationId xmlns:p14="http://schemas.microsoft.com/office/powerpoint/2010/main" val="852344474"/>
       </p:ext>
     </p:extLst>
   </p:cSld>
@@ -6733,7 +7940,7 @@
           <a:p>
             <a:r>
               <a:rPr lang="es-ES" dirty="0" err="1"/>
-              <a:t>iv</a:t>
+              <a:t>ii</a:t>
             </a:r>
             <a:r>
               <a:rPr lang="es-ES" dirty="0"/>
@@ -6741,7 +7948,15 @@
             </a:r>
             <a:r>
               <a:rPr lang="es-ES" dirty="0" err="1"/>
-              <a:t>Choice</a:t>
+              <a:t>Multivariate</a:t>
+            </a:r>
+            <a:r>
+              <a:rPr lang="es-ES" dirty="0"/>
+              <a:t> Cox </a:t>
+            </a:r>
+            <a:r>
+              <a:rPr lang="es-ES" dirty="0" err="1"/>
+              <a:t>regression</a:t>
             </a:r>
             <a:r>
               <a:rPr lang="es-ES" dirty="0"/>
@@ -6749,35 +7964,14 @@
             </a:r>
             <a:r>
               <a:rPr lang="es-ES" dirty="0" err="1"/>
-              <a:t>of</a:t>
-            </a:r>
-            <a:r>
+              <a:t>model</a:t>
+            </a:r>
+            <a:br>
               <a:rPr lang="es-ES" dirty="0"/>
-              <a:t> </a:t>
-            </a:r>
-            <a:r>
-              <a:rPr lang="es-ES" dirty="0" err="1"/>
-              <a:t>the</a:t>
-            </a:r>
+            </a:br>
             <a:r>
               <a:rPr lang="es-ES" dirty="0"/>
-              <a:t> ‘</a:t>
-            </a:r>
-            <a:r>
-              <a:rPr lang="es-ES" dirty="0" err="1"/>
-              <a:t>best</a:t>
-            </a:r>
-            <a:r>
-              <a:rPr lang="es-ES" dirty="0"/>
-              <a:t>’ </a:t>
-            </a:r>
-            <a:r>
-              <a:rPr lang="es-ES" dirty="0" err="1"/>
-              <a:t>parametric</a:t>
-            </a:r>
-            <a:r>
-              <a:rPr lang="es-ES" dirty="0"/>
-              <a:t> </a:t>
+              <a:t>A. Base </a:t>
             </a:r>
             <a:r>
               <a:rPr lang="es-ES" dirty="0" err="1"/>
@@ -6789,10 +7983,10 @@
       </p:sp>
       <p:sp>
         <p:nvSpPr>
-          <p:cNvPr id="3" name="Content Placeholder 2">
+          <p:cNvPr id="7" name="Content Placeholder 6">
             <a:extLst>
               <a:ext uri="{FF2B5EF4-FFF2-40B4-BE49-F238E27FC236}">
-                <a16:creationId xmlns:a16="http://schemas.microsoft.com/office/drawing/2014/main" id="{00097D50-5ACB-4FDD-50C2-902AABD801B5}"/>
+                <a16:creationId xmlns:a16="http://schemas.microsoft.com/office/drawing/2014/main" id="{9C296F9C-B501-5452-9A38-DC9F1E00FA23}"/>
               </a:ext>
             </a:extLst>
           </p:cNvPr>
@@ -6808,14 +8002,14 @@
           <a:bodyPr/>
           <a:lstStyle/>
           <a:p>
-            <a:endParaRPr lang="en-GB"/>
+            <a:endParaRPr lang="en-GB" dirty="0"/>
           </a:p>
         </p:txBody>
       </p:sp>
     </p:spTree>
     <p:extLst>
       <p:ext uri="{BB962C8B-B14F-4D97-AF65-F5344CB8AC3E}">
-        <p14:creationId xmlns:p14="http://schemas.microsoft.com/office/powerpoint/2010/main" val="2789381983"/>
+        <p14:creationId xmlns:p14="http://schemas.microsoft.com/office/powerpoint/2010/main" val="2082576824"/>
       </p:ext>
     </p:extLst>
   </p:cSld>
@@ -6847,7 +8041,7 @@
           <p:cNvPr id="2" name="Title 1">
             <a:extLst>
               <a:ext uri="{FF2B5EF4-FFF2-40B4-BE49-F238E27FC236}">
-                <a16:creationId xmlns:a16="http://schemas.microsoft.com/office/drawing/2014/main" id="{4F09B721-2CE6-D091-186A-443E39FF16C9}"/>
+                <a16:creationId xmlns:a16="http://schemas.microsoft.com/office/drawing/2014/main" id="{497E08B4-1A21-5C4A-FF59-0254370A8800}"/>
               </a:ext>
             </a:extLst>
           </p:cNvPr>
@@ -6865,7 +8059,58 @@
           <a:p>
             <a:r>
               <a:rPr lang="es-ES" dirty="0" err="1"/>
-              <a:t>References</a:t>
+              <a:t>ii</a:t>
+            </a:r>
+            <a:r>
+              <a:rPr lang="es-ES" dirty="0"/>
+              <a:t>. </a:t>
+            </a:r>
+            <a:r>
+              <a:rPr lang="es-ES" dirty="0" err="1"/>
+              <a:t>Multivariate</a:t>
+            </a:r>
+            <a:r>
+              <a:rPr lang="es-ES" dirty="0"/>
+              <a:t> Cox </a:t>
+            </a:r>
+            <a:r>
+              <a:rPr lang="es-ES" dirty="0" err="1"/>
+              <a:t>regression</a:t>
+            </a:r>
+            <a:r>
+              <a:rPr lang="es-ES" dirty="0"/>
+              <a:t> </a:t>
+            </a:r>
+            <a:r>
+              <a:rPr lang="es-ES" dirty="0" err="1"/>
+              <a:t>model</a:t>
+            </a:r>
+            <a:br>
+              <a:rPr lang="es-ES" dirty="0"/>
+            </a:br>
+            <a:r>
+              <a:rPr lang="es-ES" dirty="0"/>
+              <a:t>B. </a:t>
+            </a:r>
+            <a:r>
+              <a:rPr lang="es-ES" dirty="0" err="1"/>
+              <a:t>With</a:t>
+            </a:r>
+            <a:r>
+              <a:rPr lang="es-ES" dirty="0"/>
+              <a:t> time </a:t>
+            </a:r>
+            <a:r>
+              <a:rPr lang="es-ES" dirty="0" err="1"/>
+              <a:t>varying</a:t>
+            </a:r>
+            <a:r>
+              <a:rPr lang="es-ES" dirty="0"/>
+              <a:t> </a:t>
+            </a:r>
+            <a:r>
+              <a:rPr lang="es-ES" dirty="0" err="1"/>
+              <a:t>coefficients</a:t>
             </a:r>
             <a:endParaRPr lang="en-GB" dirty="0"/>
           </a:p>
@@ -6876,7 +8121,7 @@
           <p:cNvPr id="3" name="Content Placeholder 2">
             <a:extLst>
               <a:ext uri="{FF2B5EF4-FFF2-40B4-BE49-F238E27FC236}">
-                <a16:creationId xmlns:a16="http://schemas.microsoft.com/office/drawing/2014/main" id="{7B93926A-8058-58EE-8571-32D25C423456}"/>
+                <a16:creationId xmlns:a16="http://schemas.microsoft.com/office/drawing/2014/main" id="{00097D50-5ACB-4FDD-50C2-902AABD801B5}"/>
               </a:ext>
             </a:extLst>
           </p:cNvPr>
@@ -6889,63 +8134,113 @@
         </p:nvSpPr>
         <p:spPr/>
         <p:txBody>
-          <a:bodyPr>
-            <a:normAutofit/>
-          </a:bodyPr>
-          <a:lstStyle/>
-          <a:p>
-            <a:r>
-              <a:rPr lang="en-GB" sz="1600" dirty="0"/>
-              <a:t>Tanvir Ahmad, </a:t>
-            </a:r>
-            <a:r>
-              <a:rPr lang="en-GB" sz="1600" dirty="0" err="1"/>
-              <a:t>Assia</a:t>
-            </a:r>
-            <a:r>
-              <a:rPr lang="en-GB" sz="1600" dirty="0"/>
-              <a:t> </a:t>
-            </a:r>
-            <a:r>
-              <a:rPr lang="en-GB" sz="1600" dirty="0" err="1"/>
-              <a:t>Munir,Sajjad</a:t>
-            </a:r>
-            <a:r>
-              <a:rPr lang="en-GB" sz="1600" dirty="0"/>
-              <a:t> Haider Bhatti, Muhammad Aftab, Muhammad Ali Raza (2017): </a:t>
-            </a:r>
-            <a:r>
-              <a:rPr lang="en-US" sz="1600" dirty="0"/>
-              <a:t>Survival analysis of heart failure patients: A case study, </a:t>
-            </a:r>
-            <a:r>
-              <a:rPr lang="en-US" sz="1600" dirty="0" err="1"/>
-              <a:t>PLoS</a:t>
-            </a:r>
-            <a:r>
-              <a:rPr lang="en-US" sz="1600" dirty="0"/>
-              <a:t> ONE 12(7), </a:t>
-            </a:r>
-            <a:r>
-              <a:rPr lang="en-US" sz="1600" dirty="0">
-                <a:hlinkClick r:id="rId2"/>
-              </a:rPr>
-              <a:t>https://journals.plos.org/plosone/article?id=10.1371/journal.pone.0181001</a:t>
-            </a:r>
-            <a:r>
-              <a:rPr lang="en-US" sz="1600" dirty="0"/>
-              <a:t> </a:t>
-            </a:r>
-          </a:p>
-          <a:p>
-            <a:endParaRPr lang="en-GB" sz="1600" dirty="0"/>
+          <a:bodyPr/>
+          <a:lstStyle/>
+          <a:p>
+            <a:endParaRPr lang="en-GB"/>
           </a:p>
         </p:txBody>
       </p:sp>
     </p:spTree>
     <p:extLst>
       <p:ext uri="{BB962C8B-B14F-4D97-AF65-F5344CB8AC3E}">
-        <p14:creationId xmlns:p14="http://schemas.microsoft.com/office/powerpoint/2010/main" val="1052708400"/>
+        <p14:creationId xmlns:p14="http://schemas.microsoft.com/office/powerpoint/2010/main" val="3708354059"/>
+      </p:ext>
+    </p:extLst>
+  </p:cSld>
+  <p:clrMapOvr>
+    <a:masterClrMapping/>
+  </p:clrMapOvr>
+</p:sld>
+</file>
+
+<file path=ppt/slides/slide9.xml><?xml version="1.0" encoding="utf-8"?>
+<p:sld xmlns:a="http://schemas.openxmlformats.org/drawingml/2006/main" xmlns:r="http://schemas.openxmlformats.org/officeDocument/2006/relationships" xmlns:p="http://schemas.openxmlformats.org/presentationml/2006/main">
+  <p:cSld>
+    <p:spTree>
+      <p:nvGrpSpPr>
+        <p:cNvPr id="1" name=""/>
+        <p:cNvGrpSpPr/>
+        <p:nvPr/>
+      </p:nvGrpSpPr>
+      <p:grpSpPr>
+        <a:xfrm>
+          <a:off x="0" y="0"/>
+          <a:ext cx="0" cy="0"/>
+          <a:chOff x="0" y="0"/>
+          <a:chExt cx="0" cy="0"/>
+        </a:xfrm>
+      </p:grpSpPr>
+      <p:sp>
+        <p:nvSpPr>
+          <p:cNvPr id="2" name="Title 1">
+            <a:extLst>
+              <a:ext uri="{FF2B5EF4-FFF2-40B4-BE49-F238E27FC236}">
+                <a16:creationId xmlns:a16="http://schemas.microsoft.com/office/drawing/2014/main" id="{497E08B4-1A21-5C4A-FF59-0254370A8800}"/>
+              </a:ext>
+            </a:extLst>
+          </p:cNvPr>
+          <p:cNvSpPr>
+            <a:spLocks noGrp="1"/>
+          </p:cNvSpPr>
+          <p:nvPr>
+            <p:ph type="title"/>
+          </p:nvPr>
+        </p:nvSpPr>
+        <p:spPr/>
+        <p:txBody>
+          <a:bodyPr/>
+          <a:lstStyle/>
+          <a:p>
+            <a:r>
+              <a:rPr lang="es-ES" dirty="0" err="1"/>
+              <a:t>iii</a:t>
+            </a:r>
+            <a:r>
+              <a:rPr lang="es-ES" dirty="0"/>
+              <a:t>. </a:t>
+            </a:r>
+            <a:r>
+              <a:rPr lang="es-ES" dirty="0" err="1"/>
+              <a:t>Linearity</a:t>
+            </a:r>
+            <a:r>
+              <a:rPr lang="es-ES" dirty="0"/>
+              <a:t> test</a:t>
+            </a:r>
+            <a:endParaRPr lang="en-GB" dirty="0"/>
+          </a:p>
+        </p:txBody>
+      </p:sp>
+      <p:sp>
+        <p:nvSpPr>
+          <p:cNvPr id="3" name="Content Placeholder 2">
+            <a:extLst>
+              <a:ext uri="{FF2B5EF4-FFF2-40B4-BE49-F238E27FC236}">
+                <a16:creationId xmlns:a16="http://schemas.microsoft.com/office/drawing/2014/main" id="{00097D50-5ACB-4FDD-50C2-902AABD801B5}"/>
+              </a:ext>
+            </a:extLst>
+          </p:cNvPr>
+          <p:cNvSpPr>
+            <a:spLocks noGrp="1"/>
+          </p:cNvSpPr>
+          <p:nvPr>
+            <p:ph idx="1"/>
+          </p:nvPr>
+        </p:nvSpPr>
+        <p:spPr/>
+        <p:txBody>
+          <a:bodyPr/>
+          <a:lstStyle/>
+          <a:p>
+            <a:endParaRPr lang="en-GB"/>
+          </a:p>
+        </p:txBody>
+      </p:sp>
+    </p:spTree>
+    <p:extLst>
+      <p:ext uri="{BB962C8B-B14F-4D97-AF65-F5344CB8AC3E}">
+        <p14:creationId xmlns:p14="http://schemas.microsoft.com/office/powerpoint/2010/main" val="3148376159"/>
       </p:ext>
     </p:extLst>
   </p:cSld>

</xml_diff>

<commit_message>
updated presentation and script'
</commit_message>
<xml_diff>
--- a/presentation.pptx
+++ b/presentation.pptx
@@ -5,20 +5,24 @@
     <p:sldMasterId id="2147483672" r:id="rId1"/>
   </p:sldMasterIdLst>
   <p:notesMasterIdLst>
-    <p:notesMasterId r:id="rId13"/>
+    <p:notesMasterId r:id="rId17"/>
   </p:notesMasterIdLst>
   <p:sldIdLst>
     <p:sldId id="256" r:id="rId2"/>
     <p:sldId id="257" r:id="rId3"/>
     <p:sldId id="258" r:id="rId4"/>
     <p:sldId id="264" r:id="rId5"/>
-    <p:sldId id="266" r:id="rId6"/>
+    <p:sldId id="268" r:id="rId6"/>
     <p:sldId id="267" r:id="rId7"/>
-    <p:sldId id="259" r:id="rId8"/>
-    <p:sldId id="260" r:id="rId9"/>
-    <p:sldId id="261" r:id="rId10"/>
-    <p:sldId id="262" r:id="rId11"/>
-    <p:sldId id="263" r:id="rId12"/>
+    <p:sldId id="269" r:id="rId8"/>
+    <p:sldId id="271" r:id="rId9"/>
+    <p:sldId id="259" r:id="rId10"/>
+    <p:sldId id="272" r:id="rId11"/>
+    <p:sldId id="273" r:id="rId12"/>
+    <p:sldId id="260" r:id="rId13"/>
+    <p:sldId id="261" r:id="rId14"/>
+    <p:sldId id="262" r:id="rId15"/>
+    <p:sldId id="263" r:id="rId16"/>
   </p:sldIdLst>
   <p:sldSz cx="12192000" cy="6858000"/>
   <p:notesSz cx="6858000" cy="9144000"/>
@@ -128,7 +132,7 @@
 <file path=ppt/revisionInfo.xml><?xml version="1.0" encoding="utf-8"?>
 <p1510:revInfo xmlns:a="http://schemas.openxmlformats.org/drawingml/2006/main" xmlns:r="http://schemas.openxmlformats.org/officeDocument/2006/relationships" xmlns:p1510="http://schemas.microsoft.com/office/powerpoint/2015/10/main">
   <p1510:revLst>
-    <p1510:client id="{497DC6A5-6E98-4823-B94B-BA98122E7321}" v="8" dt="2023-06-01T11:02:22.263"/>
+    <p1510:client id="{497DC6A5-6E98-4823-B94B-BA98122E7321}" v="29" dt="2023-06-01T17:02:33.573"/>
   </p1510:revLst>
 </p1510:revInfo>
 </file>
@@ -137,8 +141,8 @@
 <pc:chgInfo xmlns:a="http://schemas.openxmlformats.org/drawingml/2006/main" xmlns:r="http://schemas.openxmlformats.org/officeDocument/2006/relationships" xmlns:ac="http://schemas.microsoft.com/office/drawing/2013/main/command" xmlns:pc="http://schemas.microsoft.com/office/powerpoint/2013/main/command">
   <pc:docChgLst>
     <pc:chgData name="Maximilian Schlake" userId="d69807565a22ab48" providerId="LiveId" clId="{497DC6A5-6E98-4823-B94B-BA98122E7321}"/>
-    <pc:docChg chg="undo redo custSel addSld delSld modSld">
-      <pc:chgData name="Maximilian Schlake" userId="d69807565a22ab48" providerId="LiveId" clId="{497DC6A5-6E98-4823-B94B-BA98122E7321}" dt="2023-06-01T11:16:19.897" v="578" actId="20577"/>
+    <pc:docChg chg="undo redo custSel addSld delSld modSld sldOrd">
+      <pc:chgData name="Maximilian Schlake" userId="d69807565a22ab48" providerId="LiveId" clId="{497DC6A5-6E98-4823-B94B-BA98122E7321}" dt="2023-06-01T17:36:37.668" v="2011" actId="20577"/>
       <pc:docMkLst>
         <pc:docMk/>
       </pc:docMkLst>
@@ -166,13 +170,13 @@
         </pc:spChg>
       </pc:sldChg>
       <pc:sldChg chg="modSp mod">
-        <pc:chgData name="Maximilian Schlake" userId="d69807565a22ab48" providerId="LiveId" clId="{497DC6A5-6E98-4823-B94B-BA98122E7321}" dt="2023-06-01T11:09:13.218" v="535" actId="14100"/>
+        <pc:chgData name="Maximilian Schlake" userId="d69807565a22ab48" providerId="LiveId" clId="{497DC6A5-6E98-4823-B94B-BA98122E7321}" dt="2023-06-01T17:36:37.668" v="2011" actId="20577"/>
         <pc:sldMkLst>
           <pc:docMk/>
           <pc:sldMk cId="4972780" sldId="257"/>
         </pc:sldMkLst>
         <pc:spChg chg="mod">
-          <ac:chgData name="Maximilian Schlake" userId="d69807565a22ab48" providerId="LiveId" clId="{497DC6A5-6E98-4823-B94B-BA98122E7321}" dt="2023-06-01T11:09:13.218" v="535" actId="14100"/>
+          <ac:chgData name="Maximilian Schlake" userId="d69807565a22ab48" providerId="LiveId" clId="{497DC6A5-6E98-4823-B94B-BA98122E7321}" dt="2023-06-01T17:36:37.668" v="2011" actId="20577"/>
           <ac:spMkLst>
             <pc:docMk/>
             <pc:sldMk cId="4972780" sldId="257"/>
@@ -181,7 +185,7 @@
         </pc:spChg>
       </pc:sldChg>
       <pc:sldChg chg="addSp delSp modSp mod modNotesTx">
-        <pc:chgData name="Maximilian Schlake" userId="d69807565a22ab48" providerId="LiveId" clId="{497DC6A5-6E98-4823-B94B-BA98122E7321}" dt="2023-06-01T11:08:45.581" v="485" actId="20577"/>
+        <pc:chgData name="Maximilian Schlake" userId="d69807565a22ab48" providerId="LiveId" clId="{497DC6A5-6E98-4823-B94B-BA98122E7321}" dt="2023-06-01T13:40:59.845" v="583" actId="20577"/>
         <pc:sldMkLst>
           <pc:docMk/>
           <pc:sldMk cId="2742971747" sldId="258"/>
@@ -195,7 +199,7 @@
           </ac:spMkLst>
         </pc:spChg>
         <pc:spChg chg="mod">
-          <ac:chgData name="Maximilian Schlake" userId="d69807565a22ab48" providerId="LiveId" clId="{497DC6A5-6E98-4823-B94B-BA98122E7321}" dt="2023-06-01T10:05:42.163" v="70" actId="20577"/>
+          <ac:chgData name="Maximilian Schlake" userId="d69807565a22ab48" providerId="LiveId" clId="{497DC6A5-6E98-4823-B94B-BA98122E7321}" dt="2023-06-01T13:40:59.845" v="583" actId="20577"/>
           <ac:spMkLst>
             <pc:docMk/>
             <pc:sldMk cId="2742971747" sldId="258"/>
@@ -212,7 +216,7 @@
         </pc:graphicFrameChg>
       </pc:sldChg>
       <pc:sldChg chg="addSp delSp modSp mod">
-        <pc:chgData name="Maximilian Schlake" userId="d69807565a22ab48" providerId="LiveId" clId="{497DC6A5-6E98-4823-B94B-BA98122E7321}" dt="2023-06-01T09:44:53.233" v="5" actId="21"/>
+        <pc:chgData name="Maximilian Schlake" userId="d69807565a22ab48" providerId="LiveId" clId="{497DC6A5-6E98-4823-B94B-BA98122E7321}" dt="2023-06-01T16:35:05.707" v="1334" actId="20577"/>
         <pc:sldMkLst>
           <pc:docMk/>
           <pc:sldMk cId="2082576824" sldId="259"/>
@@ -225,14 +229,62 @@
             <ac:spMk id="3" creationId="{00097D50-5ACB-4FDD-50C2-902AABD801B5}"/>
           </ac:spMkLst>
         </pc:spChg>
-        <pc:spChg chg="add mod">
-          <ac:chgData name="Maximilian Schlake" userId="d69807565a22ab48" providerId="LiveId" clId="{497DC6A5-6E98-4823-B94B-BA98122E7321}" dt="2023-06-01T09:44:53.233" v="5" actId="21"/>
+        <pc:spChg chg="add del mod">
+          <ac:chgData name="Maximilian Schlake" userId="d69807565a22ab48" providerId="LiveId" clId="{497DC6A5-6E98-4823-B94B-BA98122E7321}" dt="2023-06-01T14:55:39.901" v="608" actId="478"/>
           <ac:spMkLst>
             <pc:docMk/>
             <pc:sldMk cId="2082576824" sldId="259"/>
             <ac:spMk id="7" creationId="{9C296F9C-B501-5452-9A38-DC9F1E00FA23}"/>
           </ac:spMkLst>
         </pc:spChg>
+        <pc:spChg chg="add del">
+          <ac:chgData name="Maximilian Schlake" userId="d69807565a22ab48" providerId="LiveId" clId="{497DC6A5-6E98-4823-B94B-BA98122E7321}" dt="2023-06-01T16:21:55.187" v="1135" actId="11529"/>
+          <ac:spMkLst>
+            <pc:docMk/>
+            <pc:sldMk cId="2082576824" sldId="259"/>
+            <ac:spMk id="25" creationId="{80D3822A-FBFA-848B-708B-103CF9143B6E}"/>
+          </ac:spMkLst>
+        </pc:spChg>
+        <pc:spChg chg="add del">
+          <ac:chgData name="Maximilian Schlake" userId="d69807565a22ab48" providerId="LiveId" clId="{497DC6A5-6E98-4823-B94B-BA98122E7321}" dt="2023-06-01T16:22:32.125" v="1137" actId="11529"/>
+          <ac:spMkLst>
+            <pc:docMk/>
+            <pc:sldMk cId="2082576824" sldId="259"/>
+            <ac:spMk id="26" creationId="{9D0196CD-B069-583F-99D9-63066DD5E440}"/>
+          </ac:spMkLst>
+        </pc:spChg>
+        <pc:spChg chg="add mod">
+          <ac:chgData name="Maximilian Schlake" userId="d69807565a22ab48" providerId="LiveId" clId="{497DC6A5-6E98-4823-B94B-BA98122E7321}" dt="2023-06-01T16:35:05.707" v="1334" actId="20577"/>
+          <ac:spMkLst>
+            <pc:docMk/>
+            <pc:sldMk cId="2082576824" sldId="259"/>
+            <ac:spMk id="27" creationId="{453E651C-77D0-0470-10FA-8D90E1A97A08}"/>
+          </ac:spMkLst>
+        </pc:spChg>
+        <pc:picChg chg="add del mod">
+          <ac:chgData name="Maximilian Schlake" userId="d69807565a22ab48" providerId="LiveId" clId="{497DC6A5-6E98-4823-B94B-BA98122E7321}" dt="2023-06-01T14:55:53.874" v="609" actId="21"/>
+          <ac:picMkLst>
+            <pc:docMk/>
+            <pc:sldMk cId="2082576824" sldId="259"/>
+            <ac:picMk id="3" creationId="{AFD166D9-689D-7B46-4B86-1FA81EFF7D88}"/>
+          </ac:picMkLst>
+        </pc:picChg>
+        <pc:picChg chg="add del mod">
+          <ac:chgData name="Maximilian Schlake" userId="d69807565a22ab48" providerId="LiveId" clId="{497DC6A5-6E98-4823-B94B-BA98122E7321}" dt="2023-06-01T14:55:53.874" v="609" actId="21"/>
+          <ac:picMkLst>
+            <pc:docMk/>
+            <pc:sldMk cId="2082576824" sldId="259"/>
+            <ac:picMk id="4" creationId="{9BB56CCB-894B-771A-59E5-8C5BAD31BE43}"/>
+          </ac:picMkLst>
+        </pc:picChg>
+        <pc:picChg chg="add del mod">
+          <ac:chgData name="Maximilian Schlake" userId="d69807565a22ab48" providerId="LiveId" clId="{497DC6A5-6E98-4823-B94B-BA98122E7321}" dt="2023-06-01T14:55:53.874" v="609" actId="21"/>
+          <ac:picMkLst>
+            <pc:docMk/>
+            <pc:sldMk cId="2082576824" sldId="259"/>
+            <ac:picMk id="5" creationId="{8747AEEC-116D-C66F-25D6-0E4AF09364C2}"/>
+          </ac:picMkLst>
+        </pc:picChg>
         <pc:picChg chg="add del mod ord">
           <ac:chgData name="Maximilian Schlake" userId="d69807565a22ab48" providerId="LiveId" clId="{497DC6A5-6E98-4823-B94B-BA98122E7321}" dt="2023-06-01T09:44:53.233" v="5" actId="21"/>
           <ac:picMkLst>
@@ -241,9 +293,96 @@
             <ac:picMk id="5" creationId="{CDE566F0-38DB-F343-8DED-3389C1D55D6F}"/>
           </ac:picMkLst>
         </pc:picChg>
+        <pc:picChg chg="add mod">
+          <ac:chgData name="Maximilian Schlake" userId="d69807565a22ab48" providerId="LiveId" clId="{497DC6A5-6E98-4823-B94B-BA98122E7321}" dt="2023-06-01T16:29:06.341" v="1262" actId="1035"/>
+          <ac:picMkLst>
+            <pc:docMk/>
+            <pc:sldMk cId="2082576824" sldId="259"/>
+            <ac:picMk id="8" creationId="{A30CBB7A-1EB9-0A6D-51B4-3AC5B27C270F}"/>
+          </ac:picMkLst>
+        </pc:picChg>
+        <pc:picChg chg="add mod">
+          <ac:chgData name="Maximilian Schlake" userId="d69807565a22ab48" providerId="LiveId" clId="{497DC6A5-6E98-4823-B94B-BA98122E7321}" dt="2023-06-01T16:29:06.341" v="1262" actId="1035"/>
+          <ac:picMkLst>
+            <pc:docMk/>
+            <pc:sldMk cId="2082576824" sldId="259"/>
+            <ac:picMk id="10" creationId="{93918629-06E7-5106-3F99-C27FCC165D06}"/>
+          </ac:picMkLst>
+        </pc:picChg>
+        <pc:picChg chg="add del mod">
+          <ac:chgData name="Maximilian Schlake" userId="d69807565a22ab48" providerId="LiveId" clId="{497DC6A5-6E98-4823-B94B-BA98122E7321}" dt="2023-06-01T16:12:20.903" v="1118" actId="478"/>
+          <ac:picMkLst>
+            <pc:docMk/>
+            <pc:sldMk cId="2082576824" sldId="259"/>
+            <ac:picMk id="12" creationId="{5F625B20-BAE8-0883-A90E-7DC733ED0225}"/>
+          </ac:picMkLst>
+        </pc:picChg>
+        <pc:picChg chg="add del mod">
+          <ac:chgData name="Maximilian Schlake" userId="d69807565a22ab48" providerId="LiveId" clId="{497DC6A5-6E98-4823-B94B-BA98122E7321}" dt="2023-06-01T16:10:04.189" v="1104" actId="478"/>
+          <ac:picMkLst>
+            <pc:docMk/>
+            <pc:sldMk cId="2082576824" sldId="259"/>
+            <ac:picMk id="14" creationId="{608C9C84-842E-B180-AFEF-BF0E088C6F7B}"/>
+          </ac:picMkLst>
+        </pc:picChg>
+        <pc:picChg chg="add del mod">
+          <ac:chgData name="Maximilian Schlake" userId="d69807565a22ab48" providerId="LiveId" clId="{497DC6A5-6E98-4823-B94B-BA98122E7321}" dt="2023-06-01T16:10:09.481" v="1108" actId="22"/>
+          <ac:picMkLst>
+            <pc:docMk/>
+            <pc:sldMk cId="2082576824" sldId="259"/>
+            <ac:picMk id="16" creationId="{B2D96605-F47E-C184-DDD6-BC7DDE5FC041}"/>
+          </ac:picMkLst>
+        </pc:picChg>
+        <pc:picChg chg="add mod">
+          <ac:chgData name="Maximilian Schlake" userId="d69807565a22ab48" providerId="LiveId" clId="{497DC6A5-6E98-4823-B94B-BA98122E7321}" dt="2023-06-01T16:29:06.341" v="1262" actId="1035"/>
+          <ac:picMkLst>
+            <pc:docMk/>
+            <pc:sldMk cId="2082576824" sldId="259"/>
+            <ac:picMk id="18" creationId="{279F2486-289C-FE77-D752-22634B8DAECD}"/>
+          </ac:picMkLst>
+        </pc:picChg>
+        <pc:picChg chg="add del mod">
+          <ac:chgData name="Maximilian Schlake" userId="d69807565a22ab48" providerId="LiveId" clId="{497DC6A5-6E98-4823-B94B-BA98122E7321}" dt="2023-06-01T16:14:45.818" v="1121" actId="478"/>
+          <ac:picMkLst>
+            <pc:docMk/>
+            <pc:sldMk cId="2082576824" sldId="259"/>
+            <ac:picMk id="20" creationId="{F1B967A0-6BC6-A0A9-92D5-71DBA32FD79F}"/>
+          </ac:picMkLst>
+        </pc:picChg>
+        <pc:picChg chg="add del mod">
+          <ac:chgData name="Maximilian Schlake" userId="d69807565a22ab48" providerId="LiveId" clId="{497DC6A5-6E98-4823-B94B-BA98122E7321}" dt="2023-06-01T16:15:33.086" v="1132" actId="478"/>
+          <ac:picMkLst>
+            <pc:docMk/>
+            <pc:sldMk cId="2082576824" sldId="259"/>
+            <ac:picMk id="22" creationId="{82584CB7-D0D2-C54F-A119-670736D49C43}"/>
+          </ac:picMkLst>
+        </pc:picChg>
+        <pc:picChg chg="add mod">
+          <ac:chgData name="Maximilian Schlake" userId="d69807565a22ab48" providerId="LiveId" clId="{497DC6A5-6E98-4823-B94B-BA98122E7321}" dt="2023-06-01T16:29:06.341" v="1262" actId="1035"/>
+          <ac:picMkLst>
+            <pc:docMk/>
+            <pc:sldMk cId="2082576824" sldId="259"/>
+            <ac:picMk id="24" creationId="{EADBC34E-9B58-7E6E-2D57-D76381B3C42B}"/>
+          </ac:picMkLst>
+        </pc:picChg>
+      </pc:sldChg>
+      <pc:sldChg chg="modSp mod">
+        <pc:chgData name="Maximilian Schlake" userId="d69807565a22ab48" providerId="LiveId" clId="{497DC6A5-6E98-4823-B94B-BA98122E7321}" dt="2023-06-01T17:36:03.824" v="1990" actId="20577"/>
+        <pc:sldMkLst>
+          <pc:docMk/>
+          <pc:sldMk cId="3708354059" sldId="260"/>
+        </pc:sldMkLst>
+        <pc:spChg chg="mod">
+          <ac:chgData name="Maximilian Schlake" userId="d69807565a22ab48" providerId="LiveId" clId="{497DC6A5-6E98-4823-B94B-BA98122E7321}" dt="2023-06-01T17:36:03.824" v="1990" actId="20577"/>
+          <ac:spMkLst>
+            <pc:docMk/>
+            <pc:sldMk cId="3708354059" sldId="260"/>
+            <ac:spMk id="2" creationId="{497E08B4-1A21-5C4A-FF59-0254370A8800}"/>
+          </ac:spMkLst>
+        </pc:spChg>
       </pc:sldChg>
       <pc:sldChg chg="addSp delSp modSp add mod modNotesTx">
-        <pc:chgData name="Maximilian Schlake" userId="d69807565a22ab48" providerId="LiveId" clId="{497DC6A5-6E98-4823-B94B-BA98122E7321}" dt="2023-06-01T11:09:20.758" v="536" actId="20577"/>
+        <pc:chgData name="Maximilian Schlake" userId="d69807565a22ab48" providerId="LiveId" clId="{497DC6A5-6E98-4823-B94B-BA98122E7321}" dt="2023-06-01T17:19:52.007" v="1959" actId="113"/>
         <pc:sldMkLst>
           <pc:docMk/>
           <pc:sldMk cId="47249489" sldId="264"/>
@@ -265,7 +404,7 @@
           </ac:spMkLst>
         </pc:spChg>
         <pc:spChg chg="add mod">
-          <ac:chgData name="Maximilian Schlake" userId="d69807565a22ab48" providerId="LiveId" clId="{497DC6A5-6E98-4823-B94B-BA98122E7321}" dt="2023-06-01T10:07:00.562" v="102" actId="1076"/>
+          <ac:chgData name="Maximilian Schlake" userId="d69807565a22ab48" providerId="LiveId" clId="{497DC6A5-6E98-4823-B94B-BA98122E7321}" dt="2023-06-01T17:19:52.007" v="1959" actId="113"/>
           <ac:spMkLst>
             <pc:docMk/>
             <pc:sldMk cId="47249489" sldId="264"/>
@@ -328,8 +467,8 @@
           </ac:picMkLst>
         </pc:picChg>
       </pc:sldChg>
-      <pc:sldChg chg="addSp delSp modSp add mod modNotesTx">
-        <pc:chgData name="Maximilian Schlake" userId="d69807565a22ab48" providerId="LiveId" clId="{497DC6A5-6E98-4823-B94B-BA98122E7321}" dt="2023-06-01T11:16:19.897" v="578" actId="20577"/>
+      <pc:sldChg chg="addSp delSp modSp add del mod modNotesTx">
+        <pc:chgData name="Maximilian Schlake" userId="d69807565a22ab48" providerId="LiveId" clId="{497DC6A5-6E98-4823-B94B-BA98122E7321}" dt="2023-06-01T14:57:26.310" v="637" actId="47"/>
         <pc:sldMkLst>
           <pc:docMk/>
           <pc:sldMk cId="2877771453" sldId="266"/>
@@ -343,15 +482,15 @@
           </ac:spMkLst>
         </pc:spChg>
         <pc:spChg chg="mod">
-          <ac:chgData name="Maximilian Schlake" userId="d69807565a22ab48" providerId="LiveId" clId="{497DC6A5-6E98-4823-B94B-BA98122E7321}" dt="2023-06-01T11:16:19.897" v="578" actId="20577"/>
+          <ac:chgData name="Maximilian Schlake" userId="d69807565a22ab48" providerId="LiveId" clId="{497DC6A5-6E98-4823-B94B-BA98122E7321}" dt="2023-06-01T14:56:01.016" v="624" actId="20577"/>
           <ac:spMkLst>
             <pc:docMk/>
             <pc:sldMk cId="2877771453" sldId="266"/>
             <ac:spMk id="7" creationId="{38434C18-E629-8B9D-4E85-3B193564F614}"/>
           </ac:spMkLst>
         </pc:spChg>
-        <pc:picChg chg="add mod">
-          <ac:chgData name="Maximilian Schlake" userId="d69807565a22ab48" providerId="LiveId" clId="{497DC6A5-6E98-4823-B94B-BA98122E7321}" dt="2023-06-01T10:08:21.867" v="151" actId="1076"/>
+        <pc:picChg chg="add del mod">
+          <ac:chgData name="Maximilian Schlake" userId="d69807565a22ab48" providerId="LiveId" clId="{497DC6A5-6E98-4823-B94B-BA98122E7321}" dt="2023-06-01T14:54:33.854" v="592" actId="21"/>
           <ac:picMkLst>
             <pc:docMk/>
             <pc:sldMk cId="2877771453" sldId="266"/>
@@ -359,11 +498,35 @@
           </ac:picMkLst>
         </pc:picChg>
         <pc:picChg chg="add mod">
-          <ac:chgData name="Maximilian Schlake" userId="d69807565a22ab48" providerId="LiveId" clId="{497DC6A5-6E98-4823-B94B-BA98122E7321}" dt="2023-06-01T10:08:31.795" v="152" actId="1076"/>
+          <ac:chgData name="Maximilian Schlake" userId="d69807565a22ab48" providerId="LiveId" clId="{497DC6A5-6E98-4823-B94B-BA98122E7321}" dt="2023-06-01T14:56:18.938" v="626" actId="1076"/>
+          <ac:picMkLst>
+            <pc:docMk/>
+            <pc:sldMk cId="2877771453" sldId="266"/>
+            <ac:picMk id="4" creationId="{58BC7E4A-C1EB-3DDC-1C17-6EAF6CD6A58B}"/>
+          </ac:picMkLst>
+        </pc:picChg>
+        <pc:picChg chg="add del mod">
+          <ac:chgData name="Maximilian Schlake" userId="d69807565a22ab48" providerId="LiveId" clId="{497DC6A5-6E98-4823-B94B-BA98122E7321}" dt="2023-06-01T14:54:07.592" v="585" actId="21"/>
           <ac:picMkLst>
             <pc:docMk/>
             <pc:sldMk cId="2877771453" sldId="266"/>
             <ac:picMk id="5" creationId="{DBDEEF7F-1D3B-737D-9027-905F1B043533}"/>
+          </ac:picMkLst>
+        </pc:picChg>
+        <pc:picChg chg="add mod">
+          <ac:chgData name="Maximilian Schlake" userId="d69807565a22ab48" providerId="LiveId" clId="{497DC6A5-6E98-4823-B94B-BA98122E7321}" dt="2023-06-01T14:56:18.938" v="626" actId="1076"/>
+          <ac:picMkLst>
+            <pc:docMk/>
+            <pc:sldMk cId="2877771453" sldId="266"/>
+            <ac:picMk id="6" creationId="{1625A561-FC7F-2DED-FE96-B9F946F40664}"/>
+          </ac:picMkLst>
+        </pc:picChg>
+        <pc:picChg chg="add mod">
+          <ac:chgData name="Maximilian Schlake" userId="d69807565a22ab48" providerId="LiveId" clId="{497DC6A5-6E98-4823-B94B-BA98122E7321}" dt="2023-06-01T14:56:18.938" v="626" actId="1076"/>
+          <ac:picMkLst>
+            <pc:docMk/>
+            <pc:sldMk cId="2877771453" sldId="266"/>
+            <ac:picMk id="8" creationId="{140363BC-B5D3-3CD1-B3AE-221D35E3B81C}"/>
           </ac:picMkLst>
         </pc:picChg>
         <pc:picChg chg="del">
@@ -376,13 +539,13 @@
         </pc:picChg>
       </pc:sldChg>
       <pc:sldChg chg="addSp delSp modSp add mod">
-        <pc:chgData name="Maximilian Schlake" userId="d69807565a22ab48" providerId="LiveId" clId="{497DC6A5-6E98-4823-B94B-BA98122E7321}" dt="2023-06-01T11:09:25.438" v="538" actId="20577"/>
+        <pc:chgData name="Maximilian Schlake" userId="d69807565a22ab48" providerId="LiveId" clId="{497DC6A5-6E98-4823-B94B-BA98122E7321}" dt="2023-06-01T17:19:34.063" v="1955" actId="113"/>
         <pc:sldMkLst>
           <pc:docMk/>
           <pc:sldMk cId="852344474" sldId="267"/>
         </pc:sldMkLst>
         <pc:spChg chg="mod">
-          <ac:chgData name="Maximilian Schlake" userId="d69807565a22ab48" providerId="LiveId" clId="{497DC6A5-6E98-4823-B94B-BA98122E7321}" dt="2023-06-01T11:09:25.438" v="538" actId="20577"/>
+          <ac:chgData name="Maximilian Schlake" userId="d69807565a22ab48" providerId="LiveId" clId="{497DC6A5-6E98-4823-B94B-BA98122E7321}" dt="2023-06-01T17:19:23.266" v="1953" actId="1076"/>
           <ac:spMkLst>
             <pc:docMk/>
             <pc:sldMk cId="852344474" sldId="267"/>
@@ -390,7 +553,7 @@
           </ac:spMkLst>
         </pc:spChg>
         <pc:spChg chg="mod">
-          <ac:chgData name="Maximilian Schlake" userId="d69807565a22ab48" providerId="LiveId" clId="{497DC6A5-6E98-4823-B94B-BA98122E7321}" dt="2023-06-01T10:34:16.775" v="203" actId="20577"/>
+          <ac:chgData name="Maximilian Schlake" userId="d69807565a22ab48" providerId="LiveId" clId="{497DC6A5-6E98-4823-B94B-BA98122E7321}" dt="2023-06-01T17:19:34.063" v="1955" actId="113"/>
           <ac:spMkLst>
             <pc:docMk/>
             <pc:sldMk cId="852344474" sldId="267"/>
@@ -403,6 +566,22 @@
             <pc:docMk/>
             <pc:sldMk cId="852344474" sldId="267"/>
             <ac:picMk id="3" creationId="{057CC8B5-B4A5-56F9-3445-E53C7CBDE4B1}"/>
+          </ac:picMkLst>
+        </pc:picChg>
+        <pc:picChg chg="add del mod">
+          <ac:chgData name="Maximilian Schlake" userId="d69807565a22ab48" providerId="LiveId" clId="{497DC6A5-6E98-4823-B94B-BA98122E7321}" dt="2023-06-01T14:55:33.520" v="605" actId="21"/>
+          <ac:picMkLst>
+            <pc:docMk/>
+            <pc:sldMk cId="852344474" sldId="267"/>
+            <ac:picMk id="3" creationId="{E2816256-79EB-BE6D-7E48-D81C82598559}"/>
+          </ac:picMkLst>
+        </pc:picChg>
+        <pc:picChg chg="add del mod">
+          <ac:chgData name="Maximilian Schlake" userId="d69807565a22ab48" providerId="LiveId" clId="{497DC6A5-6E98-4823-B94B-BA98122E7321}" dt="2023-06-01T14:55:33.520" v="605" actId="21"/>
+          <ac:picMkLst>
+            <pc:docMk/>
+            <pc:sldMk cId="852344474" sldId="267"/>
+            <ac:picMk id="4" creationId="{880451C0-5A41-FF35-2691-7A2159FD0A6B}"/>
           </ac:picMkLst>
         </pc:picChg>
         <pc:picChg chg="del">
@@ -421,6 +600,14 @@
             <ac:picMk id="6" creationId="{63D627F6-5C7E-ECDE-6812-5A0255CC8FE1}"/>
           </ac:picMkLst>
         </pc:picChg>
+        <pc:picChg chg="add del mod">
+          <ac:chgData name="Maximilian Schlake" userId="d69807565a22ab48" providerId="LiveId" clId="{497DC6A5-6E98-4823-B94B-BA98122E7321}" dt="2023-06-01T14:55:33.520" v="605" actId="21"/>
+          <ac:picMkLst>
+            <pc:docMk/>
+            <pc:sldMk cId="852344474" sldId="267"/>
+            <ac:picMk id="8" creationId="{02377EC1-C64A-F212-9D6F-21ABB84B543B}"/>
+          </ac:picMkLst>
+        </pc:picChg>
         <pc:picChg chg="add mod">
           <ac:chgData name="Maximilian Schlake" userId="d69807565a22ab48" providerId="LiveId" clId="{497DC6A5-6E98-4823-B94B-BA98122E7321}" dt="2023-06-01T10:50:34.944" v="241" actId="1076"/>
           <ac:picMkLst>
@@ -435,6 +622,392 @@
             <pc:docMk/>
             <pc:sldMk cId="852344474" sldId="267"/>
             <ac:picMk id="11" creationId="{CA2F37BF-7AA0-41BB-813B-DBFE232C748F}"/>
+          </ac:picMkLst>
+        </pc:picChg>
+        <pc:picChg chg="add del mod">
+          <ac:chgData name="Maximilian Schlake" userId="d69807565a22ab48" providerId="LiveId" clId="{497DC6A5-6E98-4823-B94B-BA98122E7321}" dt="2023-06-01T15:55:58.614" v="1054" actId="478"/>
+          <ac:picMkLst>
+            <pc:docMk/>
+            <pc:sldMk cId="852344474" sldId="267"/>
+            <ac:picMk id="12" creationId="{532A058C-1296-F864-C043-833495F099C4}"/>
+          </ac:picMkLst>
+        </pc:picChg>
+        <pc:picChg chg="add del mod">
+          <ac:chgData name="Maximilian Schlake" userId="d69807565a22ab48" providerId="LiveId" clId="{497DC6A5-6E98-4823-B94B-BA98122E7321}" dt="2023-06-01T15:55:59.483" v="1056" actId="478"/>
+          <ac:picMkLst>
+            <pc:docMk/>
+            <pc:sldMk cId="852344474" sldId="267"/>
+            <ac:picMk id="14" creationId="{9F10B256-8BF6-112F-0323-051D9ACBEC37}"/>
+          </ac:picMkLst>
+        </pc:picChg>
+        <pc:picChg chg="add del mod">
+          <ac:chgData name="Maximilian Schlake" userId="d69807565a22ab48" providerId="LiveId" clId="{497DC6A5-6E98-4823-B94B-BA98122E7321}" dt="2023-06-01T15:55:59.098" v="1055" actId="478"/>
+          <ac:picMkLst>
+            <pc:docMk/>
+            <pc:sldMk cId="852344474" sldId="267"/>
+            <ac:picMk id="16" creationId="{D6A81889-1B18-8808-6870-99E5DDBCAE2F}"/>
+          </ac:picMkLst>
+        </pc:picChg>
+      </pc:sldChg>
+      <pc:sldChg chg="addSp delSp modSp add mod ord">
+        <pc:chgData name="Maximilian Schlake" userId="d69807565a22ab48" providerId="LiveId" clId="{497DC6A5-6E98-4823-B94B-BA98122E7321}" dt="2023-06-01T17:19:45.184" v="1957" actId="20577"/>
+        <pc:sldMkLst>
+          <pc:docMk/>
+          <pc:sldMk cId="3410715490" sldId="268"/>
+        </pc:sldMkLst>
+        <pc:spChg chg="mod">
+          <ac:chgData name="Maximilian Schlake" userId="d69807565a22ab48" providerId="LiveId" clId="{497DC6A5-6E98-4823-B94B-BA98122E7321}" dt="2023-06-01T17:19:45.184" v="1957" actId="20577"/>
+          <ac:spMkLst>
+            <pc:docMk/>
+            <pc:sldMk cId="3410715490" sldId="268"/>
+            <ac:spMk id="7" creationId="{38434C18-E629-8B9D-4E85-3B193564F614}"/>
+          </ac:spMkLst>
+        </pc:spChg>
+        <pc:picChg chg="add mod">
+          <ac:chgData name="Maximilian Schlake" userId="d69807565a22ab48" providerId="LiveId" clId="{497DC6A5-6E98-4823-B94B-BA98122E7321}" dt="2023-06-01T14:57:10.080" v="635" actId="1076"/>
+          <ac:picMkLst>
+            <pc:docMk/>
+            <pc:sldMk cId="3410715490" sldId="268"/>
+            <ac:picMk id="3" creationId="{5BC247A6-A026-C28A-A020-9106CC410CAE}"/>
+          </ac:picMkLst>
+        </pc:picChg>
+        <pc:picChg chg="add mod">
+          <ac:chgData name="Maximilian Schlake" userId="d69807565a22ab48" providerId="LiveId" clId="{497DC6A5-6E98-4823-B94B-BA98122E7321}" dt="2023-06-01T14:57:05.897" v="633" actId="1076"/>
+          <ac:picMkLst>
+            <pc:docMk/>
+            <pc:sldMk cId="3410715490" sldId="268"/>
+            <ac:picMk id="4" creationId="{885F2D1A-3EA9-F9CA-54EC-A7D30DEA74D9}"/>
+          </ac:picMkLst>
+        </pc:picChg>
+        <pc:picChg chg="add del mod">
+          <ac:chgData name="Maximilian Schlake" userId="d69807565a22ab48" providerId="LiveId" clId="{497DC6A5-6E98-4823-B94B-BA98122E7321}" dt="2023-06-01T15:58:54.319" v="1082" actId="478"/>
+          <ac:picMkLst>
+            <pc:docMk/>
+            <pc:sldMk cId="3410715490" sldId="268"/>
+            <ac:picMk id="5" creationId="{F4190311-180F-744E-B7E8-C06FEB15EDE5}"/>
+          </ac:picMkLst>
+        </pc:picChg>
+        <pc:picChg chg="del">
+          <ac:chgData name="Maximilian Schlake" userId="d69807565a22ab48" providerId="LiveId" clId="{497DC6A5-6E98-4823-B94B-BA98122E7321}" dt="2023-06-01T14:56:46.906" v="630" actId="478"/>
+          <ac:picMkLst>
+            <pc:docMk/>
+            <pc:sldMk cId="3410715490" sldId="268"/>
+            <ac:picMk id="6" creationId="{63D627F6-5C7E-ECDE-6812-5A0255CC8FE1}"/>
+          </ac:picMkLst>
+        </pc:picChg>
+        <pc:picChg chg="del">
+          <ac:chgData name="Maximilian Schlake" userId="d69807565a22ab48" providerId="LiveId" clId="{497DC6A5-6E98-4823-B94B-BA98122E7321}" dt="2023-06-01T14:57:07.373" v="634" actId="478"/>
+          <ac:picMkLst>
+            <pc:docMk/>
+            <pc:sldMk cId="3410715490" sldId="268"/>
+            <ac:picMk id="9" creationId="{82C6D728-F90C-831C-54F8-A60161E93EE7}"/>
+          </ac:picMkLst>
+        </pc:picChg>
+        <pc:picChg chg="add mod">
+          <ac:chgData name="Maximilian Schlake" userId="d69807565a22ab48" providerId="LiveId" clId="{497DC6A5-6E98-4823-B94B-BA98122E7321}" dt="2023-06-01T15:59:04.362" v="1085" actId="14100"/>
+          <ac:picMkLst>
+            <pc:docMk/>
+            <pc:sldMk cId="3410715490" sldId="268"/>
+            <ac:picMk id="10" creationId="{9BFAD784-9041-FA98-28D7-236DC96E30F9}"/>
+          </ac:picMkLst>
+        </pc:picChg>
+        <pc:picChg chg="del">
+          <ac:chgData name="Maximilian Schlake" userId="d69807565a22ab48" providerId="LiveId" clId="{497DC6A5-6E98-4823-B94B-BA98122E7321}" dt="2023-06-01T14:56:48.241" v="631" actId="478"/>
+          <ac:picMkLst>
+            <pc:docMk/>
+            <pc:sldMk cId="3410715490" sldId="268"/>
+            <ac:picMk id="11" creationId="{CA2F37BF-7AA0-41BB-813B-DBFE232C748F}"/>
+          </ac:picMkLst>
+        </pc:picChg>
+      </pc:sldChg>
+      <pc:sldChg chg="addSp delSp modSp add mod">
+        <pc:chgData name="Maximilian Schlake" userId="d69807565a22ab48" providerId="LiveId" clId="{497DC6A5-6E98-4823-B94B-BA98122E7321}" dt="2023-06-01T17:19:20.061" v="1951" actId="113"/>
+        <pc:sldMkLst>
+          <pc:docMk/>
+          <pc:sldMk cId="404323534" sldId="269"/>
+        </pc:sldMkLst>
+        <pc:spChg chg="mod">
+          <ac:chgData name="Maximilian Schlake" userId="d69807565a22ab48" providerId="LiveId" clId="{497DC6A5-6E98-4823-B94B-BA98122E7321}" dt="2023-06-01T17:19:20.061" v="1951" actId="113"/>
+          <ac:spMkLst>
+            <pc:docMk/>
+            <pc:sldMk cId="404323534" sldId="269"/>
+            <ac:spMk id="7" creationId="{38434C18-E629-8B9D-4E85-3B193564F614}"/>
+          </ac:spMkLst>
+        </pc:spChg>
+        <pc:graphicFrameChg chg="add mod modGraphic">
+          <ac:chgData name="Maximilian Schlake" userId="d69807565a22ab48" providerId="LiveId" clId="{497DC6A5-6E98-4823-B94B-BA98122E7321}" dt="2023-06-01T15:16:59.037" v="987" actId="20577"/>
+          <ac:graphicFrameMkLst>
+            <pc:docMk/>
+            <pc:sldMk cId="404323534" sldId="269"/>
+            <ac:graphicFrameMk id="3" creationId="{D5968D79-A2E6-BAD1-BD4B-05FB00C12F0F}"/>
+          </ac:graphicFrameMkLst>
+        </pc:graphicFrameChg>
+        <pc:picChg chg="del">
+          <ac:chgData name="Maximilian Schlake" userId="d69807565a22ab48" providerId="LiveId" clId="{497DC6A5-6E98-4823-B94B-BA98122E7321}" dt="2023-06-01T14:58:47.058" v="668" actId="478"/>
+          <ac:picMkLst>
+            <pc:docMk/>
+            <pc:sldMk cId="404323534" sldId="269"/>
+            <ac:picMk id="6" creationId="{63D627F6-5C7E-ECDE-6812-5A0255CC8FE1}"/>
+          </ac:picMkLst>
+        </pc:picChg>
+        <pc:picChg chg="del">
+          <ac:chgData name="Maximilian Schlake" userId="d69807565a22ab48" providerId="LiveId" clId="{497DC6A5-6E98-4823-B94B-BA98122E7321}" dt="2023-06-01T14:58:46.623" v="667" actId="478"/>
+          <ac:picMkLst>
+            <pc:docMk/>
+            <pc:sldMk cId="404323534" sldId="269"/>
+            <ac:picMk id="9" creationId="{82C6D728-F90C-831C-54F8-A60161E93EE7}"/>
+          </ac:picMkLst>
+        </pc:picChg>
+        <pc:picChg chg="del">
+          <ac:chgData name="Maximilian Schlake" userId="d69807565a22ab48" providerId="LiveId" clId="{497DC6A5-6E98-4823-B94B-BA98122E7321}" dt="2023-06-01T14:58:47.363" v="669" actId="478"/>
+          <ac:picMkLst>
+            <pc:docMk/>
+            <pc:sldMk cId="404323534" sldId="269"/>
+            <ac:picMk id="11" creationId="{CA2F37BF-7AA0-41BB-813B-DBFE232C748F}"/>
+          </ac:picMkLst>
+        </pc:picChg>
+      </pc:sldChg>
+      <pc:sldChg chg="delSp modSp add del mod">
+        <pc:chgData name="Maximilian Schlake" userId="d69807565a22ab48" providerId="LiveId" clId="{497DC6A5-6E98-4823-B94B-BA98122E7321}" dt="2023-06-01T15:56:51.547" v="1081" actId="2696"/>
+        <pc:sldMkLst>
+          <pc:docMk/>
+          <pc:sldMk cId="1744504504" sldId="270"/>
+        </pc:sldMkLst>
+        <pc:spChg chg="mod">
+          <ac:chgData name="Maximilian Schlake" userId="d69807565a22ab48" providerId="LiveId" clId="{497DC6A5-6E98-4823-B94B-BA98122E7321}" dt="2023-06-01T15:18:26.724" v="1028" actId="20577"/>
+          <ac:spMkLst>
+            <pc:docMk/>
+            <pc:sldMk cId="1744504504" sldId="270"/>
+            <ac:spMk id="7" creationId="{38434C18-E629-8B9D-4E85-3B193564F614}"/>
+          </ac:spMkLst>
+        </pc:spChg>
+        <pc:graphicFrameChg chg="del">
+          <ac:chgData name="Maximilian Schlake" userId="d69807565a22ab48" providerId="LiveId" clId="{497DC6A5-6E98-4823-B94B-BA98122E7321}" dt="2023-06-01T15:19:03.794" v="1029" actId="478"/>
+          <ac:graphicFrameMkLst>
+            <pc:docMk/>
+            <pc:sldMk cId="1744504504" sldId="270"/>
+            <ac:graphicFrameMk id="3" creationId="{D5968D79-A2E6-BAD1-BD4B-05FB00C12F0F}"/>
+          </ac:graphicFrameMkLst>
+        </pc:graphicFrameChg>
+      </pc:sldChg>
+      <pc:sldChg chg="delSp modSp add mod ord">
+        <pc:chgData name="Maximilian Schlake" userId="d69807565a22ab48" providerId="LiveId" clId="{497DC6A5-6E98-4823-B94B-BA98122E7321}" dt="2023-06-01T17:19:09.770" v="1949" actId="113"/>
+        <pc:sldMkLst>
+          <pc:docMk/>
+          <pc:sldMk cId="3603686234" sldId="271"/>
+        </pc:sldMkLst>
+        <pc:spChg chg="mod">
+          <ac:chgData name="Maximilian Schlake" userId="d69807565a22ab48" providerId="LiveId" clId="{497DC6A5-6E98-4823-B94B-BA98122E7321}" dt="2023-06-01T17:19:09.770" v="1949" actId="113"/>
+          <ac:spMkLst>
+            <pc:docMk/>
+            <pc:sldMk cId="3603686234" sldId="271"/>
+            <ac:spMk id="7" creationId="{38434C18-E629-8B9D-4E85-3B193564F614}"/>
+          </ac:spMkLst>
+        </pc:spChg>
+        <pc:picChg chg="del">
+          <ac:chgData name="Maximilian Schlake" userId="d69807565a22ab48" providerId="LiveId" clId="{497DC6A5-6E98-4823-B94B-BA98122E7321}" dt="2023-06-01T15:56:05.147" v="1059" actId="478"/>
+          <ac:picMkLst>
+            <pc:docMk/>
+            <pc:sldMk cId="3603686234" sldId="271"/>
+            <ac:picMk id="6" creationId="{63D627F6-5C7E-ECDE-6812-5A0255CC8FE1}"/>
+          </ac:picMkLst>
+        </pc:picChg>
+        <pc:picChg chg="del">
+          <ac:chgData name="Maximilian Schlake" userId="d69807565a22ab48" providerId="LiveId" clId="{497DC6A5-6E98-4823-B94B-BA98122E7321}" dt="2023-06-01T15:56:15.973" v="1061" actId="478"/>
+          <ac:picMkLst>
+            <pc:docMk/>
+            <pc:sldMk cId="3603686234" sldId="271"/>
+            <ac:picMk id="9" creationId="{82C6D728-F90C-831C-54F8-A60161E93EE7}"/>
+          </ac:picMkLst>
+        </pc:picChg>
+        <pc:picChg chg="del">
+          <ac:chgData name="Maximilian Schlake" userId="d69807565a22ab48" providerId="LiveId" clId="{497DC6A5-6E98-4823-B94B-BA98122E7321}" dt="2023-06-01T15:56:02.002" v="1057" actId="478"/>
+          <ac:picMkLst>
+            <pc:docMk/>
+            <pc:sldMk cId="3603686234" sldId="271"/>
+            <ac:picMk id="11" creationId="{CA2F37BF-7AA0-41BB-813B-DBFE232C748F}"/>
+          </ac:picMkLst>
+        </pc:picChg>
+        <pc:picChg chg="mod">
+          <ac:chgData name="Maximilian Schlake" userId="d69807565a22ab48" providerId="LiveId" clId="{497DC6A5-6E98-4823-B94B-BA98122E7321}" dt="2023-06-01T15:56:03.901" v="1058" actId="1076"/>
+          <ac:picMkLst>
+            <pc:docMk/>
+            <pc:sldMk cId="3603686234" sldId="271"/>
+            <ac:picMk id="12" creationId="{532A058C-1296-F864-C043-833495F099C4}"/>
+          </ac:picMkLst>
+        </pc:picChg>
+        <pc:picChg chg="mod">
+          <ac:chgData name="Maximilian Schlake" userId="d69807565a22ab48" providerId="LiveId" clId="{497DC6A5-6E98-4823-B94B-BA98122E7321}" dt="2023-06-01T15:56:17.899" v="1062" actId="1076"/>
+          <ac:picMkLst>
+            <pc:docMk/>
+            <pc:sldMk cId="3603686234" sldId="271"/>
+            <ac:picMk id="14" creationId="{9F10B256-8BF6-112F-0323-051D9ACBEC37}"/>
+          </ac:picMkLst>
+        </pc:picChg>
+        <pc:picChg chg="mod">
+          <ac:chgData name="Maximilian Schlake" userId="d69807565a22ab48" providerId="LiveId" clId="{497DC6A5-6E98-4823-B94B-BA98122E7321}" dt="2023-06-01T15:56:14.611" v="1060" actId="1076"/>
+          <ac:picMkLst>
+            <pc:docMk/>
+            <pc:sldMk cId="3603686234" sldId="271"/>
+            <ac:picMk id="16" creationId="{D6A81889-1B18-8808-6870-99E5DDBCAE2F}"/>
+          </ac:picMkLst>
+        </pc:picChg>
+      </pc:sldChg>
+      <pc:sldChg chg="addSp delSp modSp add mod">
+        <pc:chgData name="Maximilian Schlake" userId="d69807565a22ab48" providerId="LiveId" clId="{497DC6A5-6E98-4823-B94B-BA98122E7321}" dt="2023-06-01T17:33:12.919" v="1989" actId="20577"/>
+        <pc:sldMkLst>
+          <pc:docMk/>
+          <pc:sldMk cId="3193646607" sldId="272"/>
+        </pc:sldMkLst>
+        <pc:spChg chg="add mod">
+          <ac:chgData name="Maximilian Schlake" userId="d69807565a22ab48" providerId="LiveId" clId="{497DC6A5-6E98-4823-B94B-BA98122E7321}" dt="2023-06-01T17:33:12.919" v="1989" actId="20577"/>
+          <ac:spMkLst>
+            <pc:docMk/>
+            <pc:sldMk cId="3193646607" sldId="272"/>
+            <ac:spMk id="7" creationId="{C286ED0A-2D4D-8B04-1FBE-436025404D2D}"/>
+          </ac:spMkLst>
+        </pc:spChg>
+        <pc:spChg chg="del">
+          <ac:chgData name="Maximilian Schlake" userId="d69807565a22ab48" providerId="LiveId" clId="{497DC6A5-6E98-4823-B94B-BA98122E7321}" dt="2023-06-01T16:35:43.114" v="1340" actId="478"/>
+          <ac:spMkLst>
+            <pc:docMk/>
+            <pc:sldMk cId="3193646607" sldId="272"/>
+            <ac:spMk id="27" creationId="{453E651C-77D0-0470-10FA-8D90E1A97A08}"/>
+          </ac:spMkLst>
+        </pc:spChg>
+        <pc:picChg chg="add mod">
+          <ac:chgData name="Maximilian Schlake" userId="d69807565a22ab48" providerId="LiveId" clId="{497DC6A5-6E98-4823-B94B-BA98122E7321}" dt="2023-06-01T16:39:27.615" v="1344" actId="1076"/>
+          <ac:picMkLst>
+            <pc:docMk/>
+            <pc:sldMk cId="3193646607" sldId="272"/>
+            <ac:picMk id="4" creationId="{755555F1-081E-F6D6-A388-D039EDDF956A}"/>
+          </ac:picMkLst>
+        </pc:picChg>
+        <pc:picChg chg="add mod">
+          <ac:chgData name="Maximilian Schlake" userId="d69807565a22ab48" providerId="LiveId" clId="{497DC6A5-6E98-4823-B94B-BA98122E7321}" dt="2023-06-01T16:39:33.079" v="1347" actId="14100"/>
+          <ac:picMkLst>
+            <pc:docMk/>
+            <pc:sldMk cId="3193646607" sldId="272"/>
+            <ac:picMk id="6" creationId="{6C341124-2E2F-A537-88CC-4904C85A4DCD}"/>
+          </ac:picMkLst>
+        </pc:picChg>
+        <pc:picChg chg="del">
+          <ac:chgData name="Maximilian Schlake" userId="d69807565a22ab48" providerId="LiveId" clId="{497DC6A5-6E98-4823-B94B-BA98122E7321}" dt="2023-06-01T16:35:40.297" v="1337" actId="478"/>
+          <ac:picMkLst>
+            <pc:docMk/>
+            <pc:sldMk cId="3193646607" sldId="272"/>
+            <ac:picMk id="8" creationId="{A30CBB7A-1EB9-0A6D-51B4-3AC5B27C270F}"/>
+          </ac:picMkLst>
+        </pc:picChg>
+        <pc:picChg chg="del">
+          <ac:chgData name="Maximilian Schlake" userId="d69807565a22ab48" providerId="LiveId" clId="{497DC6A5-6E98-4823-B94B-BA98122E7321}" dt="2023-06-01T16:35:39.695" v="1336" actId="478"/>
+          <ac:picMkLst>
+            <pc:docMk/>
+            <pc:sldMk cId="3193646607" sldId="272"/>
+            <ac:picMk id="10" creationId="{93918629-06E7-5106-3F99-C27FCC165D06}"/>
+          </ac:picMkLst>
+        </pc:picChg>
+        <pc:picChg chg="del">
+          <ac:chgData name="Maximilian Schlake" userId="d69807565a22ab48" providerId="LiveId" clId="{497DC6A5-6E98-4823-B94B-BA98122E7321}" dt="2023-06-01T16:35:41.121" v="1339" actId="478"/>
+          <ac:picMkLst>
+            <pc:docMk/>
+            <pc:sldMk cId="3193646607" sldId="272"/>
+            <ac:picMk id="18" creationId="{279F2486-289C-FE77-D752-22634B8DAECD}"/>
+          </ac:picMkLst>
+        </pc:picChg>
+        <pc:picChg chg="del">
+          <ac:chgData name="Maximilian Schlake" userId="d69807565a22ab48" providerId="LiveId" clId="{497DC6A5-6E98-4823-B94B-BA98122E7321}" dt="2023-06-01T16:35:40.615" v="1338" actId="478"/>
+          <ac:picMkLst>
+            <pc:docMk/>
+            <pc:sldMk cId="3193646607" sldId="272"/>
+            <ac:picMk id="24" creationId="{EADBC34E-9B58-7E6E-2D57-D76381B3C42B}"/>
+          </ac:picMkLst>
+        </pc:picChg>
+      </pc:sldChg>
+      <pc:sldChg chg="addSp delSp modSp add mod">
+        <pc:chgData name="Maximilian Schlake" userId="d69807565a22ab48" providerId="LiveId" clId="{497DC6A5-6E98-4823-B94B-BA98122E7321}" dt="2023-06-01T17:23:03.466" v="1988" actId="20577"/>
+        <pc:sldMkLst>
+          <pc:docMk/>
+          <pc:sldMk cId="3831600297" sldId="273"/>
+        </pc:sldMkLst>
+        <pc:spChg chg="mod">
+          <ac:chgData name="Maximilian Schlake" userId="d69807565a22ab48" providerId="LiveId" clId="{497DC6A5-6E98-4823-B94B-BA98122E7321}" dt="2023-06-01T16:50:46.378" v="1475" actId="20577"/>
+          <ac:spMkLst>
+            <pc:docMk/>
+            <pc:sldMk cId="3831600297" sldId="273"/>
+            <ac:spMk id="2" creationId="{497E08B4-1A21-5C4A-FF59-0254370A8800}"/>
+          </ac:spMkLst>
+        </pc:spChg>
+        <pc:spChg chg="del">
+          <ac:chgData name="Maximilian Schlake" userId="d69807565a22ab48" providerId="LiveId" clId="{497DC6A5-6E98-4823-B94B-BA98122E7321}" dt="2023-06-01T16:54:22.590" v="1478" actId="478"/>
+          <ac:spMkLst>
+            <pc:docMk/>
+            <pc:sldMk cId="3831600297" sldId="273"/>
+            <ac:spMk id="7" creationId="{C286ED0A-2D4D-8B04-1FBE-436025404D2D}"/>
+          </ac:spMkLst>
+        </pc:spChg>
+        <pc:spChg chg="add mod">
+          <ac:chgData name="Maximilian Schlake" userId="d69807565a22ab48" providerId="LiveId" clId="{497DC6A5-6E98-4823-B94B-BA98122E7321}" dt="2023-06-01T17:05:19.416" v="1808" actId="1076"/>
+          <ac:spMkLst>
+            <pc:docMk/>
+            <pc:sldMk cId="3831600297" sldId="273"/>
+            <ac:spMk id="12" creationId="{266858B4-C6E2-2B4A-F0DA-96BD82EB3B96}"/>
+          </ac:spMkLst>
+        </pc:spChg>
+        <pc:spChg chg="add mod">
+          <ac:chgData name="Maximilian Schlake" userId="d69807565a22ab48" providerId="LiveId" clId="{497DC6A5-6E98-4823-B94B-BA98122E7321}" dt="2023-06-01T17:23:03.466" v="1988" actId="20577"/>
+          <ac:spMkLst>
+            <pc:docMk/>
+            <pc:sldMk cId="3831600297" sldId="273"/>
+            <ac:spMk id="13" creationId="{54F54134-9C78-4D9C-A321-13C4B1DFD359}"/>
+          </ac:spMkLst>
+        </pc:spChg>
+        <pc:picChg chg="del">
+          <ac:chgData name="Maximilian Schlake" userId="d69807565a22ab48" providerId="LiveId" clId="{497DC6A5-6E98-4823-B94B-BA98122E7321}" dt="2023-06-01T16:51:00.299" v="1477" actId="478"/>
+          <ac:picMkLst>
+            <pc:docMk/>
+            <pc:sldMk cId="3831600297" sldId="273"/>
+            <ac:picMk id="4" creationId="{755555F1-081E-F6D6-A388-D039EDDF956A}"/>
+          </ac:picMkLst>
+        </pc:picChg>
+        <pc:picChg chg="add mod">
+          <ac:chgData name="Maximilian Schlake" userId="d69807565a22ab48" providerId="LiveId" clId="{497DC6A5-6E98-4823-B94B-BA98122E7321}" dt="2023-06-01T16:54:26.804" v="1480" actId="1076"/>
+          <ac:picMkLst>
+            <pc:docMk/>
+            <pc:sldMk cId="3831600297" sldId="273"/>
+            <ac:picMk id="5" creationId="{0A0B0805-49C9-35E5-0D01-D59E026167D1}"/>
+          </ac:picMkLst>
+        </pc:picChg>
+        <pc:picChg chg="del">
+          <ac:chgData name="Maximilian Schlake" userId="d69807565a22ab48" providerId="LiveId" clId="{497DC6A5-6E98-4823-B94B-BA98122E7321}" dt="2023-06-01T16:50:59.131" v="1476" actId="478"/>
+          <ac:picMkLst>
+            <pc:docMk/>
+            <pc:sldMk cId="3831600297" sldId="273"/>
+            <ac:picMk id="6" creationId="{6C341124-2E2F-A537-88CC-4904C85A4DCD}"/>
+          </ac:picMkLst>
+        </pc:picChg>
+        <pc:picChg chg="add del mod">
+          <ac:chgData name="Maximilian Schlake" userId="d69807565a22ab48" providerId="LiveId" clId="{497DC6A5-6E98-4823-B94B-BA98122E7321}" dt="2023-06-01T17:15:08.040" v="1809" actId="478"/>
+          <ac:picMkLst>
+            <pc:docMk/>
+            <pc:sldMk cId="3831600297" sldId="273"/>
+            <ac:picMk id="9" creationId="{60B395CC-C894-8DC8-FC12-33A41BB3FDEB}"/>
+          </ac:picMkLst>
+        </pc:picChg>
+        <pc:picChg chg="add mod">
+          <ac:chgData name="Maximilian Schlake" userId="d69807565a22ab48" providerId="LiveId" clId="{497DC6A5-6E98-4823-B94B-BA98122E7321}" dt="2023-06-01T16:59:31.719" v="1583" actId="1035"/>
+          <ac:picMkLst>
+            <pc:docMk/>
+            <pc:sldMk cId="3831600297" sldId="273"/>
+            <ac:picMk id="11" creationId="{BA72DC02-707B-335E-BFB2-752C5EEA1288}"/>
+          </ac:picMkLst>
+        </pc:picChg>
+        <pc:picChg chg="add mod">
+          <ac:chgData name="Maximilian Schlake" userId="d69807565a22ab48" providerId="LiveId" clId="{497DC6A5-6E98-4823-B94B-BA98122E7321}" dt="2023-06-01T17:15:17.271" v="1811" actId="1076"/>
+          <ac:picMkLst>
+            <pc:docMk/>
+            <pc:sldMk cId="3831600297" sldId="273"/>
+            <ac:picMk id="15" creationId="{51CD6BD5-3F4C-DDA2-1657-3D56D7F22735}"/>
           </ac:picMkLst>
         </pc:picChg>
       </pc:sldChg>
@@ -1038,6 +1611,174 @@
 </p:notes>
 </file>
 
+<file path=ppt/notesSlides/notesSlide10.xml><?xml version="1.0" encoding="utf-8"?>
+<p:notes xmlns:a="http://schemas.openxmlformats.org/drawingml/2006/main" xmlns:r="http://schemas.openxmlformats.org/officeDocument/2006/relationships" xmlns:p="http://schemas.openxmlformats.org/presentationml/2006/main">
+  <p:cSld>
+    <p:spTree>
+      <p:nvGrpSpPr>
+        <p:cNvPr id="1" name=""/>
+        <p:cNvGrpSpPr/>
+        <p:nvPr/>
+      </p:nvGrpSpPr>
+      <p:grpSpPr>
+        <a:xfrm>
+          <a:off x="0" y="0"/>
+          <a:ext cx="0" cy="0"/>
+          <a:chOff x="0" y="0"/>
+          <a:chExt cx="0" cy="0"/>
+        </a:xfrm>
+      </p:grpSpPr>
+      <p:sp>
+        <p:nvSpPr>
+          <p:cNvPr id="2" name="Slide Image Placeholder 1"/>
+          <p:cNvSpPr>
+            <a:spLocks noGrp="1" noRot="1" noChangeAspect="1"/>
+          </p:cNvSpPr>
+          <p:nvPr>
+            <p:ph type="sldImg"/>
+          </p:nvPr>
+        </p:nvSpPr>
+        <p:spPr/>
+      </p:sp>
+      <p:sp>
+        <p:nvSpPr>
+          <p:cNvPr id="3" name="Notes Placeholder 2"/>
+          <p:cNvSpPr>
+            <a:spLocks noGrp="1"/>
+          </p:cNvSpPr>
+          <p:nvPr>
+            <p:ph type="body" idx="1"/>
+          </p:nvPr>
+        </p:nvSpPr>
+        <p:spPr/>
+        <p:txBody>
+          <a:bodyPr/>
+          <a:lstStyle/>
+          <a:p>
+            <a:endParaRPr lang="en-GB" dirty="0"/>
+          </a:p>
+        </p:txBody>
+      </p:sp>
+      <p:sp>
+        <p:nvSpPr>
+          <p:cNvPr id="4" name="Slide Number Placeholder 3"/>
+          <p:cNvSpPr>
+            <a:spLocks noGrp="1"/>
+          </p:cNvSpPr>
+          <p:nvPr>
+            <p:ph type="sldNum" sz="quarter" idx="5"/>
+          </p:nvPr>
+        </p:nvSpPr>
+        <p:spPr/>
+        <p:txBody>
+          <a:bodyPr/>
+          <a:lstStyle/>
+          <a:p>
+            <a:fld id="{85EBC9E2-2C9A-438E-83DE-17F69134D413}" type="slidenum">
+              <a:rPr lang="en-GB" smtClean="0"/>
+              <a:t>11</a:t>
+            </a:fld>
+            <a:endParaRPr lang="en-GB"/>
+          </a:p>
+        </p:txBody>
+      </p:sp>
+    </p:spTree>
+    <p:extLst>
+      <p:ext uri="{BB962C8B-B14F-4D97-AF65-F5344CB8AC3E}">
+        <p14:creationId xmlns:p14="http://schemas.microsoft.com/office/powerpoint/2010/main" val="3430114397"/>
+      </p:ext>
+    </p:extLst>
+  </p:cSld>
+  <p:clrMapOvr>
+    <a:masterClrMapping/>
+  </p:clrMapOvr>
+</p:notes>
+</file>
+
+<file path=ppt/notesSlides/notesSlide11.xml><?xml version="1.0" encoding="utf-8"?>
+<p:notes xmlns:a="http://schemas.openxmlformats.org/drawingml/2006/main" xmlns:r="http://schemas.openxmlformats.org/officeDocument/2006/relationships" xmlns:p="http://schemas.openxmlformats.org/presentationml/2006/main">
+  <p:cSld>
+    <p:spTree>
+      <p:nvGrpSpPr>
+        <p:cNvPr id="1" name=""/>
+        <p:cNvGrpSpPr/>
+        <p:nvPr/>
+      </p:nvGrpSpPr>
+      <p:grpSpPr>
+        <a:xfrm>
+          <a:off x="0" y="0"/>
+          <a:ext cx="0" cy="0"/>
+          <a:chOff x="0" y="0"/>
+          <a:chExt cx="0" cy="0"/>
+        </a:xfrm>
+      </p:grpSpPr>
+      <p:sp>
+        <p:nvSpPr>
+          <p:cNvPr id="2" name="Slide Image Placeholder 1"/>
+          <p:cNvSpPr>
+            <a:spLocks noGrp="1" noRot="1" noChangeAspect="1"/>
+          </p:cNvSpPr>
+          <p:nvPr>
+            <p:ph type="sldImg"/>
+          </p:nvPr>
+        </p:nvSpPr>
+        <p:spPr/>
+      </p:sp>
+      <p:sp>
+        <p:nvSpPr>
+          <p:cNvPr id="3" name="Notes Placeholder 2"/>
+          <p:cNvSpPr>
+            <a:spLocks noGrp="1"/>
+          </p:cNvSpPr>
+          <p:nvPr>
+            <p:ph type="body" idx="1"/>
+          </p:nvPr>
+        </p:nvSpPr>
+        <p:spPr/>
+        <p:txBody>
+          <a:bodyPr/>
+          <a:lstStyle/>
+          <a:p>
+            <a:endParaRPr lang="en-GB" dirty="0"/>
+          </a:p>
+        </p:txBody>
+      </p:sp>
+      <p:sp>
+        <p:nvSpPr>
+          <p:cNvPr id="4" name="Slide Number Placeholder 3"/>
+          <p:cNvSpPr>
+            <a:spLocks noGrp="1"/>
+          </p:cNvSpPr>
+          <p:nvPr>
+            <p:ph type="sldNum" sz="quarter" idx="5"/>
+          </p:nvPr>
+        </p:nvSpPr>
+        <p:spPr/>
+        <p:txBody>
+          <a:bodyPr/>
+          <a:lstStyle/>
+          <a:p>
+            <a:fld id="{85EBC9E2-2C9A-438E-83DE-17F69134D413}" type="slidenum">
+              <a:rPr lang="en-GB" smtClean="0"/>
+              <a:t>12</a:t>
+            </a:fld>
+            <a:endParaRPr lang="en-GB"/>
+          </a:p>
+        </p:txBody>
+      </p:sp>
+    </p:spTree>
+    <p:extLst>
+      <p:ext uri="{BB962C8B-B14F-4D97-AF65-F5344CB8AC3E}">
+        <p14:creationId xmlns:p14="http://schemas.microsoft.com/office/powerpoint/2010/main" val="1799670140"/>
+      </p:ext>
+    </p:extLst>
+  </p:cSld>
+  <p:clrMapOvr>
+    <a:masterClrMapping/>
+  </p:clrMapOvr>
+</p:notes>
+</file>
+
 <file path=ppt/notesSlides/notesSlide2.xml><?xml version="1.0" encoding="utf-8"?>
 <p:notes xmlns:a="http://schemas.openxmlformats.org/drawingml/2006/main" xmlns:r="http://schemas.openxmlformats.org/officeDocument/2006/relationships" xmlns:p="http://schemas.openxmlformats.org/presentationml/2006/main">
   <p:cSld>
@@ -1380,7 +2121,7 @@
     </p:spTree>
     <p:extLst>
       <p:ext uri="{BB962C8B-B14F-4D97-AF65-F5344CB8AC3E}">
-        <p14:creationId xmlns:p14="http://schemas.microsoft.com/office/powerpoint/2010/main" val="745004438"/>
+        <p14:creationId xmlns:p14="http://schemas.microsoft.com/office/powerpoint/2010/main" val="1338066391"/>
       </p:ext>
     </p:extLst>
   </p:cSld>
@@ -1518,7 +2259,91 @@
           <a:bodyPr/>
           <a:lstStyle/>
           <a:p>
-            <a:endParaRPr lang="en-GB" dirty="0"/>
+            <a:endParaRPr lang="en-GB" b="0" dirty="0"/>
+          </a:p>
+        </p:txBody>
+      </p:sp>
+      <p:sp>
+        <p:nvSpPr>
+          <p:cNvPr id="4" name="Slide Number Placeholder 3"/>
+          <p:cNvSpPr>
+            <a:spLocks noGrp="1"/>
+          </p:cNvSpPr>
+          <p:nvPr>
+            <p:ph type="sldNum" sz="quarter" idx="5"/>
+          </p:nvPr>
+        </p:nvSpPr>
+        <p:spPr/>
+        <p:txBody>
+          <a:bodyPr/>
+          <a:lstStyle/>
+          <a:p>
+            <a:fld id="{85EBC9E2-2C9A-438E-83DE-17F69134D413}" type="slidenum">
+              <a:rPr lang="en-GB" smtClean="0"/>
+              <a:t>7</a:t>
+            </a:fld>
+            <a:endParaRPr lang="en-GB"/>
+          </a:p>
+        </p:txBody>
+      </p:sp>
+    </p:spTree>
+    <p:extLst>
+      <p:ext uri="{BB962C8B-B14F-4D97-AF65-F5344CB8AC3E}">
+        <p14:creationId xmlns:p14="http://schemas.microsoft.com/office/powerpoint/2010/main" val="1437128128"/>
+      </p:ext>
+    </p:extLst>
+  </p:cSld>
+  <p:clrMapOvr>
+    <a:masterClrMapping/>
+  </p:clrMapOvr>
+</p:notes>
+</file>
+
+<file path=ppt/notesSlides/notesSlide7.xml><?xml version="1.0" encoding="utf-8"?>
+<p:notes xmlns:a="http://schemas.openxmlformats.org/drawingml/2006/main" xmlns:r="http://schemas.openxmlformats.org/officeDocument/2006/relationships" xmlns:p="http://schemas.openxmlformats.org/presentationml/2006/main">
+  <p:cSld>
+    <p:spTree>
+      <p:nvGrpSpPr>
+        <p:cNvPr id="1" name=""/>
+        <p:cNvGrpSpPr/>
+        <p:nvPr/>
+      </p:nvGrpSpPr>
+      <p:grpSpPr>
+        <a:xfrm>
+          <a:off x="0" y="0"/>
+          <a:ext cx="0" cy="0"/>
+          <a:chOff x="0" y="0"/>
+          <a:chExt cx="0" cy="0"/>
+        </a:xfrm>
+      </p:grpSpPr>
+      <p:sp>
+        <p:nvSpPr>
+          <p:cNvPr id="2" name="Slide Image Placeholder 1"/>
+          <p:cNvSpPr>
+            <a:spLocks noGrp="1" noRot="1" noChangeAspect="1"/>
+          </p:cNvSpPr>
+          <p:nvPr>
+            <p:ph type="sldImg"/>
+          </p:nvPr>
+        </p:nvSpPr>
+        <p:spPr/>
+      </p:sp>
+      <p:sp>
+        <p:nvSpPr>
+          <p:cNvPr id="3" name="Notes Placeholder 2"/>
+          <p:cNvSpPr>
+            <a:spLocks noGrp="1"/>
+          </p:cNvSpPr>
+          <p:nvPr>
+            <p:ph type="body" idx="1"/>
+          </p:nvPr>
+        </p:nvSpPr>
+        <p:spPr/>
+        <p:txBody>
+          <a:bodyPr/>
+          <a:lstStyle/>
+          <a:p>
+            <a:endParaRPr lang="en-GB" b="0" dirty="0"/>
           </a:p>
         </p:txBody>
       </p:sp>
@@ -1548,7 +2373,175 @@
     </p:spTree>
     <p:extLst>
       <p:ext uri="{BB962C8B-B14F-4D97-AF65-F5344CB8AC3E}">
-        <p14:creationId xmlns:p14="http://schemas.microsoft.com/office/powerpoint/2010/main" val="1799670140"/>
+        <p14:creationId xmlns:p14="http://schemas.microsoft.com/office/powerpoint/2010/main" val="1352248156"/>
+      </p:ext>
+    </p:extLst>
+  </p:cSld>
+  <p:clrMapOvr>
+    <a:masterClrMapping/>
+  </p:clrMapOvr>
+</p:notes>
+</file>
+
+<file path=ppt/notesSlides/notesSlide8.xml><?xml version="1.0" encoding="utf-8"?>
+<p:notes xmlns:a="http://schemas.openxmlformats.org/drawingml/2006/main" xmlns:r="http://schemas.openxmlformats.org/officeDocument/2006/relationships" xmlns:p="http://schemas.openxmlformats.org/presentationml/2006/main">
+  <p:cSld>
+    <p:spTree>
+      <p:nvGrpSpPr>
+        <p:cNvPr id="1" name=""/>
+        <p:cNvGrpSpPr/>
+        <p:nvPr/>
+      </p:nvGrpSpPr>
+      <p:grpSpPr>
+        <a:xfrm>
+          <a:off x="0" y="0"/>
+          <a:ext cx="0" cy="0"/>
+          <a:chOff x="0" y="0"/>
+          <a:chExt cx="0" cy="0"/>
+        </a:xfrm>
+      </p:grpSpPr>
+      <p:sp>
+        <p:nvSpPr>
+          <p:cNvPr id="2" name="Slide Image Placeholder 1"/>
+          <p:cNvSpPr>
+            <a:spLocks noGrp="1" noRot="1" noChangeAspect="1"/>
+          </p:cNvSpPr>
+          <p:nvPr>
+            <p:ph type="sldImg"/>
+          </p:nvPr>
+        </p:nvSpPr>
+        <p:spPr/>
+      </p:sp>
+      <p:sp>
+        <p:nvSpPr>
+          <p:cNvPr id="3" name="Notes Placeholder 2"/>
+          <p:cNvSpPr>
+            <a:spLocks noGrp="1"/>
+          </p:cNvSpPr>
+          <p:nvPr>
+            <p:ph type="body" idx="1"/>
+          </p:nvPr>
+        </p:nvSpPr>
+        <p:spPr/>
+        <p:txBody>
+          <a:bodyPr/>
+          <a:lstStyle/>
+          <a:p>
+            <a:endParaRPr lang="en-GB" dirty="0"/>
+          </a:p>
+        </p:txBody>
+      </p:sp>
+      <p:sp>
+        <p:nvSpPr>
+          <p:cNvPr id="4" name="Slide Number Placeholder 3"/>
+          <p:cNvSpPr>
+            <a:spLocks noGrp="1"/>
+          </p:cNvSpPr>
+          <p:nvPr>
+            <p:ph type="sldNum" sz="quarter" idx="5"/>
+          </p:nvPr>
+        </p:nvSpPr>
+        <p:spPr/>
+        <p:txBody>
+          <a:bodyPr/>
+          <a:lstStyle/>
+          <a:p>
+            <a:fld id="{85EBC9E2-2C9A-438E-83DE-17F69134D413}" type="slidenum">
+              <a:rPr lang="en-GB" smtClean="0"/>
+              <a:t>9</a:t>
+            </a:fld>
+            <a:endParaRPr lang="en-GB"/>
+          </a:p>
+        </p:txBody>
+      </p:sp>
+    </p:spTree>
+    <p:extLst>
+      <p:ext uri="{BB962C8B-B14F-4D97-AF65-F5344CB8AC3E}">
+        <p14:creationId xmlns:p14="http://schemas.microsoft.com/office/powerpoint/2010/main" val="2652534523"/>
+      </p:ext>
+    </p:extLst>
+  </p:cSld>
+  <p:clrMapOvr>
+    <a:masterClrMapping/>
+  </p:clrMapOvr>
+</p:notes>
+</file>
+
+<file path=ppt/notesSlides/notesSlide9.xml><?xml version="1.0" encoding="utf-8"?>
+<p:notes xmlns:a="http://schemas.openxmlformats.org/drawingml/2006/main" xmlns:r="http://schemas.openxmlformats.org/officeDocument/2006/relationships" xmlns:p="http://schemas.openxmlformats.org/presentationml/2006/main">
+  <p:cSld>
+    <p:spTree>
+      <p:nvGrpSpPr>
+        <p:cNvPr id="1" name=""/>
+        <p:cNvGrpSpPr/>
+        <p:nvPr/>
+      </p:nvGrpSpPr>
+      <p:grpSpPr>
+        <a:xfrm>
+          <a:off x="0" y="0"/>
+          <a:ext cx="0" cy="0"/>
+          <a:chOff x="0" y="0"/>
+          <a:chExt cx="0" cy="0"/>
+        </a:xfrm>
+      </p:grpSpPr>
+      <p:sp>
+        <p:nvSpPr>
+          <p:cNvPr id="2" name="Slide Image Placeholder 1"/>
+          <p:cNvSpPr>
+            <a:spLocks noGrp="1" noRot="1" noChangeAspect="1"/>
+          </p:cNvSpPr>
+          <p:nvPr>
+            <p:ph type="sldImg"/>
+          </p:nvPr>
+        </p:nvSpPr>
+        <p:spPr/>
+      </p:sp>
+      <p:sp>
+        <p:nvSpPr>
+          <p:cNvPr id="3" name="Notes Placeholder 2"/>
+          <p:cNvSpPr>
+            <a:spLocks noGrp="1"/>
+          </p:cNvSpPr>
+          <p:nvPr>
+            <p:ph type="body" idx="1"/>
+          </p:nvPr>
+        </p:nvSpPr>
+        <p:spPr/>
+        <p:txBody>
+          <a:bodyPr/>
+          <a:lstStyle/>
+          <a:p>
+            <a:endParaRPr lang="en-GB" dirty="0"/>
+          </a:p>
+        </p:txBody>
+      </p:sp>
+      <p:sp>
+        <p:nvSpPr>
+          <p:cNvPr id="4" name="Slide Number Placeholder 3"/>
+          <p:cNvSpPr>
+            <a:spLocks noGrp="1"/>
+          </p:cNvSpPr>
+          <p:nvPr>
+            <p:ph type="sldNum" sz="quarter" idx="5"/>
+          </p:nvPr>
+        </p:nvSpPr>
+        <p:spPr/>
+        <p:txBody>
+          <a:bodyPr/>
+          <a:lstStyle/>
+          <a:p>
+            <a:fld id="{85EBC9E2-2C9A-438E-83DE-17F69134D413}" type="slidenum">
+              <a:rPr lang="en-GB" smtClean="0"/>
+              <a:t>10</a:t>
+            </a:fld>
+            <a:endParaRPr lang="en-GB"/>
+          </a:p>
+        </p:txBody>
+      </p:sp>
+    </p:spTree>
+    <p:extLst>
+      <p:ext uri="{BB962C8B-B14F-4D97-AF65-F5344CB8AC3E}">
+        <p14:creationId xmlns:p14="http://schemas.microsoft.com/office/powerpoint/2010/main" val="2530224052"/>
       </p:ext>
     </p:extLst>
   </p:cSld>
@@ -6156,6 +7149,1027 @@
           <a:p>
             <a:r>
               <a:rPr lang="es-ES" dirty="0" err="1"/>
+              <a:t>ii</a:t>
+            </a:r>
+            <a:r>
+              <a:rPr lang="es-ES" dirty="0"/>
+              <a:t>. </a:t>
+            </a:r>
+            <a:r>
+              <a:rPr lang="es-ES" dirty="0" err="1"/>
+              <a:t>Multivariate</a:t>
+            </a:r>
+            <a:r>
+              <a:rPr lang="es-ES" dirty="0"/>
+              <a:t> Cox </a:t>
+            </a:r>
+            <a:r>
+              <a:rPr lang="es-ES" dirty="0" err="1"/>
+              <a:t>regression</a:t>
+            </a:r>
+            <a:r>
+              <a:rPr lang="es-ES" dirty="0"/>
+              <a:t> </a:t>
+            </a:r>
+            <a:r>
+              <a:rPr lang="es-ES" dirty="0" err="1"/>
+              <a:t>model</a:t>
+            </a:r>
+            <a:br>
+              <a:rPr lang="es-ES" dirty="0"/>
+            </a:br>
+            <a:r>
+              <a:rPr lang="es-ES" dirty="0"/>
+              <a:t>A. Base </a:t>
+            </a:r>
+            <a:r>
+              <a:rPr lang="es-ES" dirty="0" err="1"/>
+              <a:t>model</a:t>
+            </a:r>
+            <a:endParaRPr lang="en-GB" dirty="0"/>
+          </a:p>
+        </p:txBody>
+      </p:sp>
+      <p:pic>
+        <p:nvPicPr>
+          <p:cNvPr id="4" name="Picture 3">
+            <a:extLst>
+              <a:ext uri="{FF2B5EF4-FFF2-40B4-BE49-F238E27FC236}">
+                <a16:creationId xmlns:a16="http://schemas.microsoft.com/office/drawing/2014/main" id="{755555F1-081E-F6D6-A388-D039EDDF956A}"/>
+              </a:ext>
+            </a:extLst>
+          </p:cNvPr>
+          <p:cNvPicPr>
+            <a:picLocks noChangeAspect="1"/>
+          </p:cNvPicPr>
+          <p:nvPr/>
+        </p:nvPicPr>
+        <p:blipFill>
+          <a:blip r:embed="rId3"/>
+          <a:stretch>
+            <a:fillRect/>
+          </a:stretch>
+        </p:blipFill>
+        <p:spPr>
+          <a:xfrm>
+            <a:off x="1223375" y="2104246"/>
+            <a:ext cx="4572000" cy="4572000"/>
+          </a:xfrm>
+          <a:prstGeom prst="rect">
+            <a:avLst/>
+          </a:prstGeom>
+        </p:spPr>
+      </p:pic>
+      <p:pic>
+        <p:nvPicPr>
+          <p:cNvPr id="6" name="Picture 5">
+            <a:extLst>
+              <a:ext uri="{FF2B5EF4-FFF2-40B4-BE49-F238E27FC236}">
+                <a16:creationId xmlns:a16="http://schemas.microsoft.com/office/drawing/2014/main" id="{6C341124-2E2F-A537-88CC-4904C85A4DCD}"/>
+              </a:ext>
+            </a:extLst>
+          </p:cNvPr>
+          <p:cNvPicPr>
+            <a:picLocks noChangeAspect="1"/>
+          </p:cNvPicPr>
+          <p:nvPr/>
+        </p:nvPicPr>
+        <p:blipFill>
+          <a:blip r:embed="rId4"/>
+          <a:stretch>
+            <a:fillRect/>
+          </a:stretch>
+        </p:blipFill>
+        <p:spPr>
+          <a:xfrm>
+            <a:off x="1206674" y="1667078"/>
+            <a:ext cx="4572001" cy="313051"/>
+          </a:xfrm>
+          <a:prstGeom prst="rect">
+            <a:avLst/>
+          </a:prstGeom>
+        </p:spPr>
+      </p:pic>
+      <p:sp>
+        <p:nvSpPr>
+          <p:cNvPr id="7" name="TextBox 6">
+            <a:extLst>
+              <a:ext uri="{FF2B5EF4-FFF2-40B4-BE49-F238E27FC236}">
+                <a16:creationId xmlns:a16="http://schemas.microsoft.com/office/drawing/2014/main" id="{C286ED0A-2D4D-8B04-1FBE-436025404D2D}"/>
+              </a:ext>
+            </a:extLst>
+          </p:cNvPr>
+          <p:cNvSpPr txBox="1"/>
+          <p:nvPr/>
+        </p:nvSpPr>
+        <p:spPr>
+          <a:xfrm>
+            <a:off x="6590973" y="3466916"/>
+            <a:ext cx="4296427" cy="1200329"/>
+          </a:xfrm>
+          <a:prstGeom prst="rect">
+            <a:avLst/>
+          </a:prstGeom>
+          <a:noFill/>
+        </p:spPr>
+        <p:txBody>
+          <a:bodyPr wrap="square" rtlCol="0">
+            <a:spAutoFit/>
+          </a:bodyPr>
+          <a:lstStyle/>
+          <a:p>
+            <a:r>
+              <a:rPr lang="es-ES" b="1" dirty="0"/>
+              <a:t>Cox </a:t>
+            </a:r>
+            <a:r>
+              <a:rPr lang="es-ES" b="1" dirty="0" err="1"/>
+              <a:t>Proportional</a:t>
+            </a:r>
+            <a:r>
+              <a:rPr lang="es-ES" b="1" dirty="0"/>
+              <a:t> Hazard </a:t>
+            </a:r>
+            <a:r>
+              <a:rPr lang="es-ES" b="1" dirty="0" err="1"/>
+              <a:t>model</a:t>
+            </a:r>
+            <a:r>
+              <a:rPr lang="es-ES" dirty="0"/>
+              <a:t>: </a:t>
+            </a:r>
+            <a:r>
+              <a:rPr lang="es-ES" dirty="0" err="1"/>
+              <a:t>The</a:t>
+            </a:r>
+            <a:r>
+              <a:rPr lang="es-ES" dirty="0"/>
+              <a:t> Cox </a:t>
+            </a:r>
+            <a:r>
+              <a:rPr lang="es-ES" dirty="0" err="1"/>
+              <a:t>model</a:t>
+            </a:r>
+            <a:r>
+              <a:rPr lang="es-ES" dirty="0"/>
+              <a:t> </a:t>
+            </a:r>
+            <a:r>
+              <a:rPr lang="es-ES" dirty="0" err="1"/>
+              <a:t>including</a:t>
+            </a:r>
+            <a:r>
+              <a:rPr lang="es-ES" dirty="0"/>
+              <a:t> </a:t>
+            </a:r>
+            <a:r>
+              <a:rPr lang="es-ES" dirty="0" err="1"/>
+              <a:t>all</a:t>
+            </a:r>
+            <a:r>
+              <a:rPr lang="es-ES" dirty="0"/>
+              <a:t> variables </a:t>
+            </a:r>
+            <a:r>
+              <a:rPr lang="es-ES" dirty="0" err="1"/>
+              <a:t>overestimates</a:t>
+            </a:r>
+            <a:r>
+              <a:rPr lang="es-ES" dirty="0"/>
+              <a:t> </a:t>
+            </a:r>
+            <a:r>
+              <a:rPr lang="es-ES" dirty="0" err="1"/>
+              <a:t>survival</a:t>
+            </a:r>
+            <a:r>
+              <a:rPr lang="es-ES" dirty="0"/>
+              <a:t> </a:t>
+            </a:r>
+            <a:r>
+              <a:rPr lang="es-ES" dirty="0" err="1"/>
+              <a:t>compared</a:t>
+            </a:r>
+            <a:r>
+              <a:rPr lang="es-ES" dirty="0"/>
+              <a:t> </a:t>
+            </a:r>
+            <a:r>
+              <a:rPr lang="es-ES" dirty="0" err="1"/>
+              <a:t>to</a:t>
+            </a:r>
+            <a:r>
+              <a:rPr lang="es-ES" dirty="0"/>
+              <a:t> </a:t>
+            </a:r>
+            <a:r>
+              <a:rPr lang="es-ES" dirty="0" err="1"/>
+              <a:t>the</a:t>
+            </a:r>
+            <a:r>
+              <a:rPr lang="es-ES" dirty="0"/>
+              <a:t> </a:t>
+            </a:r>
+            <a:r>
+              <a:rPr lang="es-ES" dirty="0" err="1"/>
+              <a:t>observed</a:t>
+            </a:r>
+            <a:r>
+              <a:rPr lang="es-ES" dirty="0"/>
+              <a:t> KM </a:t>
+            </a:r>
+            <a:r>
+              <a:rPr lang="es-ES" dirty="0" err="1"/>
+              <a:t>estimates</a:t>
+            </a:r>
+            <a:r>
+              <a:rPr lang="es-ES" dirty="0"/>
+              <a:t>.</a:t>
+            </a:r>
+            <a:endParaRPr lang="en-GB" dirty="0"/>
+          </a:p>
+        </p:txBody>
+      </p:sp>
+    </p:spTree>
+    <p:extLst>
+      <p:ext uri="{BB962C8B-B14F-4D97-AF65-F5344CB8AC3E}">
+        <p14:creationId xmlns:p14="http://schemas.microsoft.com/office/powerpoint/2010/main" val="3193646607"/>
+      </p:ext>
+    </p:extLst>
+  </p:cSld>
+  <p:clrMapOvr>
+    <a:masterClrMapping/>
+  </p:clrMapOvr>
+</p:sld>
+</file>
+
+<file path=ppt/slides/slide11.xml><?xml version="1.0" encoding="utf-8"?>
+<p:sld xmlns:a="http://schemas.openxmlformats.org/drawingml/2006/main" xmlns:r="http://schemas.openxmlformats.org/officeDocument/2006/relationships" xmlns:p="http://schemas.openxmlformats.org/presentationml/2006/main">
+  <p:cSld>
+    <p:spTree>
+      <p:nvGrpSpPr>
+        <p:cNvPr id="1" name=""/>
+        <p:cNvGrpSpPr/>
+        <p:nvPr/>
+      </p:nvGrpSpPr>
+      <p:grpSpPr>
+        <a:xfrm>
+          <a:off x="0" y="0"/>
+          <a:ext cx="0" cy="0"/>
+          <a:chOff x="0" y="0"/>
+          <a:chExt cx="0" cy="0"/>
+        </a:xfrm>
+      </p:grpSpPr>
+      <p:sp>
+        <p:nvSpPr>
+          <p:cNvPr id="2" name="Title 1">
+            <a:extLst>
+              <a:ext uri="{FF2B5EF4-FFF2-40B4-BE49-F238E27FC236}">
+                <a16:creationId xmlns:a16="http://schemas.microsoft.com/office/drawing/2014/main" id="{497E08B4-1A21-5C4A-FF59-0254370A8800}"/>
+              </a:ext>
+            </a:extLst>
+          </p:cNvPr>
+          <p:cNvSpPr>
+            <a:spLocks noGrp="1"/>
+          </p:cNvSpPr>
+          <p:nvPr>
+            <p:ph type="title"/>
+          </p:nvPr>
+        </p:nvSpPr>
+        <p:spPr/>
+        <p:txBody>
+          <a:bodyPr/>
+          <a:lstStyle/>
+          <a:p>
+            <a:r>
+              <a:rPr lang="es-ES" dirty="0" err="1"/>
+              <a:t>ii</a:t>
+            </a:r>
+            <a:r>
+              <a:rPr lang="es-ES" dirty="0"/>
+              <a:t>. </a:t>
+            </a:r>
+            <a:r>
+              <a:rPr lang="es-ES" dirty="0" err="1"/>
+              <a:t>Multivariate</a:t>
+            </a:r>
+            <a:r>
+              <a:rPr lang="es-ES" dirty="0"/>
+              <a:t> Cox </a:t>
+            </a:r>
+            <a:r>
+              <a:rPr lang="es-ES" dirty="0" err="1"/>
+              <a:t>regression</a:t>
+            </a:r>
+            <a:r>
+              <a:rPr lang="es-ES" dirty="0"/>
+              <a:t> </a:t>
+            </a:r>
+            <a:r>
+              <a:rPr lang="es-ES" dirty="0" err="1"/>
+              <a:t>model</a:t>
+            </a:r>
+            <a:br>
+              <a:rPr lang="es-ES" dirty="0"/>
+            </a:br>
+            <a:r>
+              <a:rPr lang="es-ES" dirty="0"/>
+              <a:t>B. </a:t>
+            </a:r>
+            <a:r>
+              <a:rPr lang="es-ES" dirty="0" err="1"/>
+              <a:t>Reduced</a:t>
+            </a:r>
+            <a:r>
+              <a:rPr lang="es-ES" dirty="0"/>
+              <a:t> </a:t>
+            </a:r>
+            <a:r>
+              <a:rPr lang="es-ES" dirty="0" err="1"/>
+              <a:t>model</a:t>
+            </a:r>
+            <a:endParaRPr lang="en-GB" dirty="0"/>
+          </a:p>
+        </p:txBody>
+      </p:sp>
+      <p:pic>
+        <p:nvPicPr>
+          <p:cNvPr id="5" name="Picture 4">
+            <a:extLst>
+              <a:ext uri="{FF2B5EF4-FFF2-40B4-BE49-F238E27FC236}">
+                <a16:creationId xmlns:a16="http://schemas.microsoft.com/office/drawing/2014/main" id="{0A0B0805-49C9-35E5-0D01-D59E026167D1}"/>
+              </a:ext>
+            </a:extLst>
+          </p:cNvPr>
+          <p:cNvPicPr>
+            <a:picLocks noChangeAspect="1"/>
+          </p:cNvPicPr>
+          <p:nvPr/>
+        </p:nvPicPr>
+        <p:blipFill>
+          <a:blip r:embed="rId3"/>
+          <a:stretch>
+            <a:fillRect/>
+          </a:stretch>
+        </p:blipFill>
+        <p:spPr>
+          <a:xfrm>
+            <a:off x="1247932" y="2037783"/>
+            <a:ext cx="6614733" cy="1028789"/>
+          </a:xfrm>
+          <a:prstGeom prst="rect">
+            <a:avLst/>
+          </a:prstGeom>
+        </p:spPr>
+      </p:pic>
+      <p:pic>
+        <p:nvPicPr>
+          <p:cNvPr id="11" name="Picture 10">
+            <a:extLst>
+              <a:ext uri="{FF2B5EF4-FFF2-40B4-BE49-F238E27FC236}">
+                <a16:creationId xmlns:a16="http://schemas.microsoft.com/office/drawing/2014/main" id="{BA72DC02-707B-335E-BFB2-752C5EEA1288}"/>
+              </a:ext>
+            </a:extLst>
+          </p:cNvPr>
+          <p:cNvPicPr>
+            <a:picLocks noChangeAspect="1"/>
+          </p:cNvPicPr>
+          <p:nvPr/>
+        </p:nvPicPr>
+        <p:blipFill>
+          <a:blip r:embed="rId4"/>
+          <a:stretch>
+            <a:fillRect/>
+          </a:stretch>
+        </p:blipFill>
+        <p:spPr>
+          <a:xfrm>
+            <a:off x="1247932" y="4795280"/>
+            <a:ext cx="2834886" cy="1501270"/>
+          </a:xfrm>
+          <a:prstGeom prst="rect">
+            <a:avLst/>
+          </a:prstGeom>
+        </p:spPr>
+      </p:pic>
+      <p:sp>
+        <p:nvSpPr>
+          <p:cNvPr id="12" name="TextBox 11">
+            <a:extLst>
+              <a:ext uri="{FF2B5EF4-FFF2-40B4-BE49-F238E27FC236}">
+                <a16:creationId xmlns:a16="http://schemas.microsoft.com/office/drawing/2014/main" id="{266858B4-C6E2-2B4A-F0DA-96BD82EB3B96}"/>
+              </a:ext>
+            </a:extLst>
+          </p:cNvPr>
+          <p:cNvSpPr txBox="1"/>
+          <p:nvPr/>
+        </p:nvSpPr>
+        <p:spPr>
+          <a:xfrm>
+            <a:off x="1247932" y="3371567"/>
+            <a:ext cx="9975389" cy="646331"/>
+          </a:xfrm>
+          <a:prstGeom prst="rect">
+            <a:avLst/>
+          </a:prstGeom>
+          <a:noFill/>
+        </p:spPr>
+        <p:txBody>
+          <a:bodyPr wrap="square" rtlCol="0">
+            <a:spAutoFit/>
+          </a:bodyPr>
+          <a:lstStyle/>
+          <a:p>
+            <a:r>
+              <a:rPr lang="es-ES" b="1" dirty="0" err="1"/>
+              <a:t>Backward</a:t>
+            </a:r>
+            <a:r>
+              <a:rPr lang="es-ES" b="1" dirty="0"/>
+              <a:t> </a:t>
+            </a:r>
+            <a:r>
+              <a:rPr lang="es-ES" b="1" dirty="0" err="1"/>
+              <a:t>selection</a:t>
+            </a:r>
+            <a:r>
+              <a:rPr lang="es-ES" dirty="0"/>
+              <a:t>: </a:t>
+            </a:r>
+            <a:r>
+              <a:rPr lang="es-ES" dirty="0" err="1"/>
+              <a:t>We</a:t>
+            </a:r>
+            <a:r>
+              <a:rPr lang="es-ES" dirty="0"/>
+              <a:t> are </a:t>
+            </a:r>
+            <a:r>
+              <a:rPr lang="es-ES" dirty="0" err="1"/>
+              <a:t>gradually</a:t>
+            </a:r>
+            <a:r>
+              <a:rPr lang="es-ES" dirty="0"/>
+              <a:t> </a:t>
+            </a:r>
+            <a:r>
+              <a:rPr lang="es-ES" dirty="0" err="1"/>
+              <a:t>reducing</a:t>
+            </a:r>
+            <a:r>
+              <a:rPr lang="es-ES" dirty="0"/>
+              <a:t> </a:t>
+            </a:r>
+            <a:r>
+              <a:rPr lang="es-ES" dirty="0" err="1"/>
+              <a:t>our</a:t>
+            </a:r>
+            <a:r>
+              <a:rPr lang="es-ES" dirty="0"/>
+              <a:t> </a:t>
+            </a:r>
+            <a:r>
+              <a:rPr lang="es-ES" dirty="0" err="1"/>
+              <a:t>baseline</a:t>
+            </a:r>
+            <a:r>
+              <a:rPr lang="es-ES" dirty="0"/>
+              <a:t> </a:t>
+            </a:r>
+            <a:r>
+              <a:rPr lang="es-ES" dirty="0" err="1"/>
+              <a:t>model</a:t>
+            </a:r>
+            <a:r>
+              <a:rPr lang="es-ES" dirty="0"/>
+              <a:t>, </a:t>
+            </a:r>
+            <a:r>
+              <a:rPr lang="es-ES" i="1" dirty="0" err="1">
+                <a:solidFill>
+                  <a:srgbClr val="FFFF00"/>
+                </a:solidFill>
+              </a:rPr>
+              <a:t>cox_all</a:t>
+            </a:r>
+            <a:r>
+              <a:rPr lang="es-ES" dirty="0"/>
+              <a:t>, </a:t>
+            </a:r>
+            <a:r>
+              <a:rPr lang="es-ES" dirty="0" err="1"/>
+              <a:t>by</a:t>
+            </a:r>
+            <a:r>
+              <a:rPr lang="es-ES" dirty="0"/>
+              <a:t> </a:t>
+            </a:r>
+            <a:r>
+              <a:rPr lang="es-ES" dirty="0" err="1"/>
+              <a:t>four</a:t>
+            </a:r>
+            <a:r>
+              <a:rPr lang="es-ES" dirty="0"/>
+              <a:t> variables </a:t>
+            </a:r>
+            <a:r>
+              <a:rPr lang="es-ES" dirty="0" err="1"/>
+              <a:t>which</a:t>
+            </a:r>
+            <a:r>
+              <a:rPr lang="es-ES" dirty="0"/>
+              <a:t> do </a:t>
+            </a:r>
+            <a:r>
+              <a:rPr lang="es-ES" dirty="0" err="1"/>
+              <a:t>not</a:t>
+            </a:r>
+            <a:r>
+              <a:rPr lang="es-ES" dirty="0"/>
+              <a:t> show </a:t>
+            </a:r>
+            <a:r>
+              <a:rPr lang="es-ES" dirty="0" err="1"/>
+              <a:t>significant</a:t>
+            </a:r>
+            <a:r>
+              <a:rPr lang="es-ES" dirty="0"/>
+              <a:t> </a:t>
+            </a:r>
+            <a:r>
+              <a:rPr lang="es-ES" dirty="0" err="1"/>
+              <a:t>effects</a:t>
+            </a:r>
+            <a:r>
+              <a:rPr lang="es-ES" dirty="0"/>
+              <a:t>. </a:t>
+            </a:r>
+            <a:r>
+              <a:rPr lang="es-ES" dirty="0" err="1"/>
+              <a:t>The</a:t>
+            </a:r>
+            <a:r>
+              <a:rPr lang="es-ES" dirty="0"/>
+              <a:t> </a:t>
+            </a:r>
+            <a:r>
+              <a:rPr lang="es-ES" dirty="0" err="1"/>
+              <a:t>remaining</a:t>
+            </a:r>
+            <a:r>
+              <a:rPr lang="es-ES" dirty="0"/>
+              <a:t> variables in </a:t>
+            </a:r>
+            <a:r>
+              <a:rPr lang="es-ES" i="1" dirty="0" err="1">
+                <a:solidFill>
+                  <a:srgbClr val="FFFF00"/>
+                </a:solidFill>
+              </a:rPr>
+              <a:t>cox_reduced</a:t>
+            </a:r>
+            <a:r>
+              <a:rPr lang="es-ES" i="1" dirty="0">
+                <a:solidFill>
+                  <a:srgbClr val="FFFF00"/>
+                </a:solidFill>
+              </a:rPr>
+              <a:t> </a:t>
+            </a:r>
+            <a:r>
+              <a:rPr lang="es-ES" dirty="0"/>
+              <a:t>are </a:t>
+            </a:r>
+            <a:r>
+              <a:rPr lang="es-ES" dirty="0" err="1"/>
+              <a:t>all</a:t>
+            </a:r>
+            <a:r>
+              <a:rPr lang="es-ES" dirty="0"/>
+              <a:t> </a:t>
+            </a:r>
+            <a:r>
+              <a:rPr lang="es-ES" dirty="0" err="1"/>
+              <a:t>significant</a:t>
+            </a:r>
+            <a:r>
+              <a:rPr lang="es-ES" dirty="0"/>
+              <a:t>. </a:t>
+            </a:r>
+            <a:endParaRPr lang="en-GB" dirty="0"/>
+          </a:p>
+        </p:txBody>
+      </p:sp>
+      <p:sp>
+        <p:nvSpPr>
+          <p:cNvPr id="13" name="TextBox 12">
+            <a:extLst>
+              <a:ext uri="{FF2B5EF4-FFF2-40B4-BE49-F238E27FC236}">
+                <a16:creationId xmlns:a16="http://schemas.microsoft.com/office/drawing/2014/main" id="{54F54134-9C78-4D9C-A321-13C4B1DFD359}"/>
+              </a:ext>
+            </a:extLst>
+          </p:cNvPr>
+          <p:cNvSpPr txBox="1"/>
+          <p:nvPr/>
+        </p:nvSpPr>
+        <p:spPr>
+          <a:xfrm>
+            <a:off x="4388345" y="4876020"/>
+            <a:ext cx="6722242" cy="1200329"/>
+          </a:xfrm>
+          <a:prstGeom prst="rect">
+            <a:avLst/>
+          </a:prstGeom>
+          <a:noFill/>
+        </p:spPr>
+        <p:txBody>
+          <a:bodyPr wrap="square" rtlCol="0">
+            <a:spAutoFit/>
+          </a:bodyPr>
+          <a:lstStyle/>
+          <a:p>
+            <a:r>
+              <a:rPr lang="es-ES" b="1" dirty="0" err="1"/>
+              <a:t>Testing</a:t>
+            </a:r>
+            <a:r>
+              <a:rPr lang="es-ES" b="1" dirty="0"/>
+              <a:t> </a:t>
+            </a:r>
+            <a:r>
+              <a:rPr lang="es-ES" b="1" dirty="0" err="1"/>
+              <a:t>for</a:t>
+            </a:r>
+            <a:r>
+              <a:rPr lang="es-ES" b="1" dirty="0"/>
+              <a:t> </a:t>
+            </a:r>
+            <a:r>
+              <a:rPr lang="es-ES" b="1" dirty="0" err="1"/>
+              <a:t>proportional</a:t>
+            </a:r>
+            <a:r>
+              <a:rPr lang="es-ES" b="1" dirty="0"/>
+              <a:t> </a:t>
+            </a:r>
+            <a:r>
+              <a:rPr lang="es-ES" b="1" dirty="0" err="1"/>
+              <a:t>hazard</a:t>
+            </a:r>
+            <a:r>
+              <a:rPr lang="es-ES" dirty="0"/>
+              <a:t>: </a:t>
+            </a:r>
+            <a:r>
+              <a:rPr lang="en-US" dirty="0"/>
+              <a:t>Globally, the PH assumption stands in all tests. Only </a:t>
+            </a:r>
+            <a:r>
+              <a:rPr lang="en-US" i="1" dirty="0" err="1">
+                <a:solidFill>
+                  <a:srgbClr val="FFFF00"/>
+                </a:solidFill>
+              </a:rPr>
+              <a:t>Ejection.Fraction</a:t>
+            </a:r>
+            <a:r>
+              <a:rPr lang="en-US" i="1" dirty="0">
+                <a:solidFill>
+                  <a:srgbClr val="FFFF00"/>
+                </a:solidFill>
+              </a:rPr>
+              <a:t> </a:t>
+            </a:r>
+            <a:r>
+              <a:rPr lang="en-US" dirty="0"/>
+              <a:t>shows inconsistent </a:t>
+            </a:r>
+            <a:r>
+              <a:rPr lang="en-US" dirty="0" err="1"/>
+              <a:t>behaviour</a:t>
+            </a:r>
+            <a:r>
+              <a:rPr lang="en-US" dirty="0"/>
+              <a:t> for the PH assumption under the 'identity' and 'km’ transformations.</a:t>
+            </a:r>
+            <a:endParaRPr lang="en-GB" dirty="0"/>
+          </a:p>
+        </p:txBody>
+      </p:sp>
+      <p:pic>
+        <p:nvPicPr>
+          <p:cNvPr id="15" name="Picture 14">
+            <a:extLst>
+              <a:ext uri="{FF2B5EF4-FFF2-40B4-BE49-F238E27FC236}">
+                <a16:creationId xmlns:a16="http://schemas.microsoft.com/office/drawing/2014/main" id="{51CD6BD5-3F4C-DDA2-1657-3D56D7F22735}"/>
+              </a:ext>
+            </a:extLst>
+          </p:cNvPr>
+          <p:cNvPicPr>
+            <a:picLocks noChangeAspect="1"/>
+          </p:cNvPicPr>
+          <p:nvPr/>
+        </p:nvPicPr>
+        <p:blipFill>
+          <a:blip r:embed="rId5"/>
+          <a:stretch>
+            <a:fillRect/>
+          </a:stretch>
+        </p:blipFill>
+        <p:spPr>
+          <a:xfrm>
+            <a:off x="1247932" y="4322893"/>
+            <a:ext cx="6264183" cy="320068"/>
+          </a:xfrm>
+          <a:prstGeom prst="rect">
+            <a:avLst/>
+          </a:prstGeom>
+        </p:spPr>
+      </p:pic>
+    </p:spTree>
+    <p:extLst>
+      <p:ext uri="{BB962C8B-B14F-4D97-AF65-F5344CB8AC3E}">
+        <p14:creationId xmlns:p14="http://schemas.microsoft.com/office/powerpoint/2010/main" val="3831600297"/>
+      </p:ext>
+    </p:extLst>
+  </p:cSld>
+  <p:clrMapOvr>
+    <a:masterClrMapping/>
+  </p:clrMapOvr>
+</p:sld>
+</file>
+
+<file path=ppt/slides/slide12.xml><?xml version="1.0" encoding="utf-8"?>
+<p:sld xmlns:a="http://schemas.openxmlformats.org/drawingml/2006/main" xmlns:r="http://schemas.openxmlformats.org/officeDocument/2006/relationships" xmlns:p="http://schemas.openxmlformats.org/presentationml/2006/main">
+  <p:cSld>
+    <p:spTree>
+      <p:nvGrpSpPr>
+        <p:cNvPr id="1" name=""/>
+        <p:cNvGrpSpPr/>
+        <p:nvPr/>
+      </p:nvGrpSpPr>
+      <p:grpSpPr>
+        <a:xfrm>
+          <a:off x="0" y="0"/>
+          <a:ext cx="0" cy="0"/>
+          <a:chOff x="0" y="0"/>
+          <a:chExt cx="0" cy="0"/>
+        </a:xfrm>
+      </p:grpSpPr>
+      <p:sp>
+        <p:nvSpPr>
+          <p:cNvPr id="2" name="Title 1">
+            <a:extLst>
+              <a:ext uri="{FF2B5EF4-FFF2-40B4-BE49-F238E27FC236}">
+                <a16:creationId xmlns:a16="http://schemas.microsoft.com/office/drawing/2014/main" id="{497E08B4-1A21-5C4A-FF59-0254370A8800}"/>
+              </a:ext>
+            </a:extLst>
+          </p:cNvPr>
+          <p:cNvSpPr>
+            <a:spLocks noGrp="1"/>
+          </p:cNvSpPr>
+          <p:nvPr>
+            <p:ph type="title"/>
+          </p:nvPr>
+        </p:nvSpPr>
+        <p:spPr/>
+        <p:txBody>
+          <a:bodyPr/>
+          <a:lstStyle/>
+          <a:p>
+            <a:r>
+              <a:rPr lang="es-ES" dirty="0" err="1"/>
+              <a:t>ii</a:t>
+            </a:r>
+            <a:r>
+              <a:rPr lang="es-ES" dirty="0"/>
+              <a:t>. </a:t>
+            </a:r>
+            <a:r>
+              <a:rPr lang="es-ES" dirty="0" err="1"/>
+              <a:t>Multivariate</a:t>
+            </a:r>
+            <a:r>
+              <a:rPr lang="es-ES" dirty="0"/>
+              <a:t> Cox </a:t>
+            </a:r>
+            <a:r>
+              <a:rPr lang="es-ES" dirty="0" err="1"/>
+              <a:t>regression</a:t>
+            </a:r>
+            <a:r>
+              <a:rPr lang="es-ES" dirty="0"/>
+              <a:t> </a:t>
+            </a:r>
+            <a:r>
+              <a:rPr lang="es-ES" dirty="0" err="1"/>
+              <a:t>model</a:t>
+            </a:r>
+            <a:br>
+              <a:rPr lang="es-ES" dirty="0"/>
+            </a:br>
+            <a:r>
+              <a:rPr lang="es-ES" dirty="0"/>
+              <a:t>C. </a:t>
+            </a:r>
+            <a:r>
+              <a:rPr lang="es-ES" dirty="0" err="1"/>
+              <a:t>With</a:t>
+            </a:r>
+            <a:r>
+              <a:rPr lang="es-ES" dirty="0"/>
+              <a:t> time </a:t>
+            </a:r>
+            <a:r>
+              <a:rPr lang="es-ES" dirty="0" err="1"/>
+              <a:t>varying</a:t>
+            </a:r>
+            <a:r>
+              <a:rPr lang="es-ES" dirty="0"/>
+              <a:t> </a:t>
+            </a:r>
+            <a:r>
+              <a:rPr lang="es-ES" dirty="0" err="1"/>
+              <a:t>coefficients</a:t>
+            </a:r>
+            <a:endParaRPr lang="en-GB" dirty="0"/>
+          </a:p>
+        </p:txBody>
+      </p:sp>
+      <p:sp>
+        <p:nvSpPr>
+          <p:cNvPr id="3" name="Content Placeholder 2">
+            <a:extLst>
+              <a:ext uri="{FF2B5EF4-FFF2-40B4-BE49-F238E27FC236}">
+                <a16:creationId xmlns:a16="http://schemas.microsoft.com/office/drawing/2014/main" id="{00097D50-5ACB-4FDD-50C2-902AABD801B5}"/>
+              </a:ext>
+            </a:extLst>
+          </p:cNvPr>
+          <p:cNvSpPr>
+            <a:spLocks noGrp="1"/>
+          </p:cNvSpPr>
+          <p:nvPr>
+            <p:ph idx="1"/>
+          </p:nvPr>
+        </p:nvSpPr>
+        <p:spPr/>
+        <p:txBody>
+          <a:bodyPr/>
+          <a:lstStyle/>
+          <a:p>
+            <a:endParaRPr lang="en-GB"/>
+          </a:p>
+        </p:txBody>
+      </p:sp>
+    </p:spTree>
+    <p:extLst>
+      <p:ext uri="{BB962C8B-B14F-4D97-AF65-F5344CB8AC3E}">
+        <p14:creationId xmlns:p14="http://schemas.microsoft.com/office/powerpoint/2010/main" val="3708354059"/>
+      </p:ext>
+    </p:extLst>
+  </p:cSld>
+  <p:clrMapOvr>
+    <a:masterClrMapping/>
+  </p:clrMapOvr>
+</p:sld>
+</file>
+
+<file path=ppt/slides/slide13.xml><?xml version="1.0" encoding="utf-8"?>
+<p:sld xmlns:a="http://schemas.openxmlformats.org/drawingml/2006/main" xmlns:r="http://schemas.openxmlformats.org/officeDocument/2006/relationships" xmlns:p="http://schemas.openxmlformats.org/presentationml/2006/main">
+  <p:cSld>
+    <p:spTree>
+      <p:nvGrpSpPr>
+        <p:cNvPr id="1" name=""/>
+        <p:cNvGrpSpPr/>
+        <p:nvPr/>
+      </p:nvGrpSpPr>
+      <p:grpSpPr>
+        <a:xfrm>
+          <a:off x="0" y="0"/>
+          <a:ext cx="0" cy="0"/>
+          <a:chOff x="0" y="0"/>
+          <a:chExt cx="0" cy="0"/>
+        </a:xfrm>
+      </p:grpSpPr>
+      <p:sp>
+        <p:nvSpPr>
+          <p:cNvPr id="2" name="Title 1">
+            <a:extLst>
+              <a:ext uri="{FF2B5EF4-FFF2-40B4-BE49-F238E27FC236}">
+                <a16:creationId xmlns:a16="http://schemas.microsoft.com/office/drawing/2014/main" id="{497E08B4-1A21-5C4A-FF59-0254370A8800}"/>
+              </a:ext>
+            </a:extLst>
+          </p:cNvPr>
+          <p:cNvSpPr>
+            <a:spLocks noGrp="1"/>
+          </p:cNvSpPr>
+          <p:nvPr>
+            <p:ph type="title"/>
+          </p:nvPr>
+        </p:nvSpPr>
+        <p:spPr/>
+        <p:txBody>
+          <a:bodyPr/>
+          <a:lstStyle/>
+          <a:p>
+            <a:r>
+              <a:rPr lang="es-ES" dirty="0" err="1"/>
+              <a:t>iii</a:t>
+            </a:r>
+            <a:r>
+              <a:rPr lang="es-ES" dirty="0"/>
+              <a:t>. </a:t>
+            </a:r>
+            <a:r>
+              <a:rPr lang="es-ES" dirty="0" err="1"/>
+              <a:t>Linearity</a:t>
+            </a:r>
+            <a:r>
+              <a:rPr lang="es-ES" dirty="0"/>
+              <a:t> test</a:t>
+            </a:r>
+            <a:endParaRPr lang="en-GB" dirty="0"/>
+          </a:p>
+        </p:txBody>
+      </p:sp>
+      <p:sp>
+        <p:nvSpPr>
+          <p:cNvPr id="3" name="Content Placeholder 2">
+            <a:extLst>
+              <a:ext uri="{FF2B5EF4-FFF2-40B4-BE49-F238E27FC236}">
+                <a16:creationId xmlns:a16="http://schemas.microsoft.com/office/drawing/2014/main" id="{00097D50-5ACB-4FDD-50C2-902AABD801B5}"/>
+              </a:ext>
+            </a:extLst>
+          </p:cNvPr>
+          <p:cNvSpPr>
+            <a:spLocks noGrp="1"/>
+          </p:cNvSpPr>
+          <p:nvPr>
+            <p:ph idx="1"/>
+          </p:nvPr>
+        </p:nvSpPr>
+        <p:spPr/>
+        <p:txBody>
+          <a:bodyPr/>
+          <a:lstStyle/>
+          <a:p>
+            <a:endParaRPr lang="en-GB"/>
+          </a:p>
+        </p:txBody>
+      </p:sp>
+    </p:spTree>
+    <p:extLst>
+      <p:ext uri="{BB962C8B-B14F-4D97-AF65-F5344CB8AC3E}">
+        <p14:creationId xmlns:p14="http://schemas.microsoft.com/office/powerpoint/2010/main" val="3148376159"/>
+      </p:ext>
+    </p:extLst>
+  </p:cSld>
+  <p:clrMapOvr>
+    <a:masterClrMapping/>
+  </p:clrMapOvr>
+</p:sld>
+</file>
+
+<file path=ppt/slides/slide14.xml><?xml version="1.0" encoding="utf-8"?>
+<p:sld xmlns:a="http://schemas.openxmlformats.org/drawingml/2006/main" xmlns:r="http://schemas.openxmlformats.org/officeDocument/2006/relationships" xmlns:p="http://schemas.openxmlformats.org/presentationml/2006/main">
+  <p:cSld>
+    <p:spTree>
+      <p:nvGrpSpPr>
+        <p:cNvPr id="1" name=""/>
+        <p:cNvGrpSpPr/>
+        <p:nvPr/>
+      </p:nvGrpSpPr>
+      <p:grpSpPr>
+        <a:xfrm>
+          <a:off x="0" y="0"/>
+          <a:ext cx="0" cy="0"/>
+          <a:chOff x="0" y="0"/>
+          <a:chExt cx="0" cy="0"/>
+        </a:xfrm>
+      </p:grpSpPr>
+      <p:sp>
+        <p:nvSpPr>
+          <p:cNvPr id="2" name="Title 1">
+            <a:extLst>
+              <a:ext uri="{FF2B5EF4-FFF2-40B4-BE49-F238E27FC236}">
+                <a16:creationId xmlns:a16="http://schemas.microsoft.com/office/drawing/2014/main" id="{497E08B4-1A21-5C4A-FF59-0254370A8800}"/>
+              </a:ext>
+            </a:extLst>
+          </p:cNvPr>
+          <p:cNvSpPr>
+            <a:spLocks noGrp="1"/>
+          </p:cNvSpPr>
+          <p:nvPr>
+            <p:ph type="title"/>
+          </p:nvPr>
+        </p:nvSpPr>
+        <p:spPr/>
+        <p:txBody>
+          <a:bodyPr/>
+          <a:lstStyle/>
+          <a:p>
+            <a:r>
+              <a:rPr lang="es-ES" dirty="0" err="1"/>
               <a:t>iv</a:t>
             </a:r>
             <a:r>
@@ -6248,7 +8262,7 @@
 </p:sld>
 </file>
 
-<file path=ppt/slides/slide11.xml><?xml version="1.0" encoding="utf-8"?>
+<file path=ppt/slides/slide15.xml><?xml version="1.0" encoding="utf-8"?>
 <p:sld xmlns:a="http://schemas.openxmlformats.org/drawingml/2006/main" xmlns:r="http://schemas.openxmlformats.org/officeDocument/2006/relationships" xmlns:p="http://schemas.openxmlformats.org/presentationml/2006/main">
   <p:cSld>
     <p:spTree>
@@ -6459,7 +8473,9 @@
           </a:xfrm>
         </p:spPr>
         <p:txBody>
-          <a:bodyPr/>
+          <a:bodyPr>
+            <a:normAutofit lnSpcReduction="10000"/>
+          </a:bodyPr>
           <a:lstStyle/>
           <a:p>
             <a:pPr marL="514350" indent="-514350">
@@ -6545,6 +8561,25 @@
             <a:r>
               <a:rPr lang="es-ES" dirty="0"/>
               <a:t>Base </a:t>
+            </a:r>
+            <a:r>
+              <a:rPr lang="es-ES" dirty="0" err="1"/>
+              <a:t>model</a:t>
+            </a:r>
+            <a:endParaRPr lang="es-ES" dirty="0"/>
+          </a:p>
+          <a:p>
+            <a:pPr marL="908050" lvl="1" indent="-457200">
+              <a:buFont typeface="+mj-lt"/>
+              <a:buAutoNum type="alphaUcPeriod"/>
+            </a:pPr>
+            <a:r>
+              <a:rPr lang="es-ES" dirty="0" err="1"/>
+              <a:t>Reduced</a:t>
+            </a:r>
+            <a:r>
+              <a:rPr lang="es-ES" dirty="0"/>
+              <a:t> </a:t>
             </a:r>
             <a:r>
               <a:rPr lang="es-ES" dirty="0" err="1"/>
@@ -7226,7 +9261,7 @@
             </a:pPr>
             <a:r>
               <a:rPr lang="en-GB" sz="1300" i="1" dirty="0"/>
-              <a:t>* indicates that an additional factor variable with 4 levels was created </a:t>
+              <a:t>* indicates that an additional factor variable with 4 levels was added </a:t>
             </a:r>
           </a:p>
         </p:txBody>
@@ -7374,24 +9409,28 @@
           <a:lstStyle/>
           <a:p>
             <a:r>
-              <a:rPr lang="es-ES" dirty="0" err="1"/>
+              <a:rPr lang="es-ES" b="1" dirty="0" err="1"/>
               <a:t>Overall</a:t>
             </a:r>
             <a:r>
+              <a:rPr lang="es-ES" b="1" dirty="0"/>
+              <a:t> </a:t>
+            </a:r>
+            <a:r>
+              <a:rPr lang="es-ES" b="1" dirty="0" err="1"/>
+              <a:t>Survival</a:t>
+            </a:r>
+            <a:r>
+              <a:rPr lang="es-ES" b="1" dirty="0"/>
+              <a:t> </a:t>
+            </a:r>
+            <a:r>
+              <a:rPr lang="es-ES" b="1" dirty="0" err="1"/>
+              <a:t>Probability</a:t>
+            </a:r>
+            <a:r>
               <a:rPr lang="es-ES" dirty="0"/>
-              <a:t> </a:t>
-            </a:r>
-            <a:r>
-              <a:rPr lang="es-ES" dirty="0" err="1"/>
-              <a:t>Survival</a:t>
-            </a:r>
-            <a:r>
-              <a:rPr lang="es-ES" dirty="0"/>
-              <a:t> </a:t>
-            </a:r>
-            <a:r>
-              <a:rPr lang="es-ES" dirty="0" err="1"/>
-              <a:t>Probability</a:t>
+              <a:t>:</a:t>
             </a:r>
             <a:endParaRPr lang="en-GB" dirty="0"/>
           </a:p>
@@ -7529,8 +9568,24 @@
           <a:lstStyle/>
           <a:p>
             <a:r>
+              <a:rPr lang="es-ES" b="1" dirty="0" err="1"/>
+              <a:t>Survival</a:t>
+            </a:r>
+            <a:r>
+              <a:rPr lang="es-ES" b="1" dirty="0"/>
+              <a:t> </a:t>
+            </a:r>
+            <a:r>
+              <a:rPr lang="es-ES" b="1" dirty="0" err="1"/>
+              <a:t>Probability</a:t>
+            </a:r>
+            <a:r>
+              <a:rPr lang="es-ES" b="1" dirty="0"/>
+              <a:t> </a:t>
+            </a:r>
+            <a:r>
               <a:rPr lang="es-ES" dirty="0" err="1"/>
-              <a:t>Survival</a:t>
+              <a:t>by</a:t>
             </a:r>
             <a:r>
               <a:rPr lang="es-ES" dirty="0"/>
@@ -7538,7 +9593,7 @@
             </a:r>
             <a:r>
               <a:rPr lang="es-ES" dirty="0" err="1"/>
-              <a:t>Probability</a:t>
+              <a:t>Blood</a:t>
             </a:r>
             <a:r>
               <a:rPr lang="es-ES" dirty="0"/>
@@ -7546,22 +9601,6 @@
             </a:r>
             <a:r>
               <a:rPr lang="es-ES" dirty="0" err="1"/>
-              <a:t>by</a:t>
-            </a:r>
-            <a:r>
-              <a:rPr lang="es-ES" dirty="0"/>
-              <a:t> </a:t>
-            </a:r>
-            <a:r>
-              <a:rPr lang="es-ES" dirty="0" err="1"/>
-              <a:t>Blood</a:t>
-            </a:r>
-            <a:r>
-              <a:rPr lang="es-ES" dirty="0"/>
-              <a:t> </a:t>
-            </a:r>
-            <a:r>
-              <a:rPr lang="es-ES" dirty="0" err="1"/>
               <a:t>Pressure</a:t>
             </a:r>
             <a:r>
@@ -7582,23 +9621,7 @@
             </a:r>
             <a:r>
               <a:rPr lang="es-ES" dirty="0"/>
-              <a:t> (</a:t>
-            </a:r>
-            <a:r>
-              <a:rPr lang="es-ES" dirty="0" err="1"/>
-              <a:t>to</a:t>
-            </a:r>
-            <a:r>
-              <a:rPr lang="es-ES" dirty="0"/>
-              <a:t> be </a:t>
-            </a:r>
-            <a:r>
-              <a:rPr lang="es-ES" dirty="0" err="1"/>
-              <a:t>added</a:t>
-            </a:r>
-            <a:r>
-              <a:rPr lang="es-ES"/>
-              <a:t>)</a:t>
+              <a:t>:</a:t>
             </a:r>
             <a:endParaRPr lang="en-GB" dirty="0"/>
           </a:p>
@@ -7606,10 +9629,10 @@
       </p:sp>
       <p:pic>
         <p:nvPicPr>
-          <p:cNvPr id="3" name="Content Placeholder 4">
+          <p:cNvPr id="3" name="Picture 2">
             <a:extLst>
               <a:ext uri="{FF2B5EF4-FFF2-40B4-BE49-F238E27FC236}">
-                <a16:creationId xmlns:a16="http://schemas.microsoft.com/office/drawing/2014/main" id="{057CC8B5-B4A5-56F9-3445-E53C7CBDE4B1}"/>
+                <a16:creationId xmlns:a16="http://schemas.microsoft.com/office/drawing/2014/main" id="{5BC247A6-A026-C28A-A020-9106CC410CAE}"/>
               </a:ext>
             </a:extLst>
           </p:cNvPr>
@@ -7626,8 +9649,8 @@
         </p:blipFill>
         <p:spPr>
           <a:xfrm>
-            <a:off x="6368453" y="2055866"/>
-            <a:ext cx="4704343" cy="4704343"/>
+            <a:off x="1073107" y="2238705"/>
+            <a:ext cx="3272625" cy="3272625"/>
           </a:xfrm>
           <a:prstGeom prst="rect">
             <a:avLst/>
@@ -7636,10 +9659,10 @@
       </p:pic>
       <p:pic>
         <p:nvPicPr>
-          <p:cNvPr id="5" name="Picture 4">
+          <p:cNvPr id="4" name="Content Placeholder 4">
             <a:extLst>
               <a:ext uri="{FF2B5EF4-FFF2-40B4-BE49-F238E27FC236}">
-                <a16:creationId xmlns:a16="http://schemas.microsoft.com/office/drawing/2014/main" id="{DBDEEF7F-1D3B-737D-9027-905F1B043533}"/>
+                <a16:creationId xmlns:a16="http://schemas.microsoft.com/office/drawing/2014/main" id="{885F2D1A-3EA9-F9CA-54EC-A7D30DEA74D9}"/>
               </a:ext>
             </a:extLst>
           </p:cNvPr>
@@ -7656,8 +9679,38 @@
         </p:blipFill>
         <p:spPr>
           <a:xfrm>
-            <a:off x="1119205" y="2055866"/>
-            <a:ext cx="4704343" cy="4704343"/>
+            <a:off x="4510456" y="2238705"/>
+            <a:ext cx="3272625" cy="3272625"/>
+          </a:xfrm>
+          <a:prstGeom prst="rect">
+            <a:avLst/>
+          </a:prstGeom>
+        </p:spPr>
+      </p:pic>
+      <p:pic>
+        <p:nvPicPr>
+          <p:cNvPr id="10" name="Picture 9">
+            <a:extLst>
+              <a:ext uri="{FF2B5EF4-FFF2-40B4-BE49-F238E27FC236}">
+                <a16:creationId xmlns:a16="http://schemas.microsoft.com/office/drawing/2014/main" id="{9BFAD784-9041-FA98-28D7-236DC96E30F9}"/>
+              </a:ext>
+            </a:extLst>
+          </p:cNvPr>
+          <p:cNvPicPr>
+            <a:picLocks noChangeAspect="1"/>
+          </p:cNvPicPr>
+          <p:nvPr/>
+        </p:nvPicPr>
+        <p:blipFill>
+          <a:blip r:embed="rId5"/>
+          <a:stretch>
+            <a:fillRect/>
+          </a:stretch>
+        </p:blipFill>
+        <p:spPr>
+          <a:xfrm>
+            <a:off x="7947805" y="2238705"/>
+            <a:ext cx="3272625" cy="3272625"/>
           </a:xfrm>
           <a:prstGeom prst="rect">
             <a:avLst/>
@@ -7667,7 +9720,7 @@
     </p:spTree>
     <p:extLst>
       <p:ext uri="{BB962C8B-B14F-4D97-AF65-F5344CB8AC3E}">
-        <p14:creationId xmlns:p14="http://schemas.microsoft.com/office/powerpoint/2010/main" val="2877771453"/>
+        <p14:creationId xmlns:p14="http://schemas.microsoft.com/office/powerpoint/2010/main" val="3410715490"/>
       </p:ext>
     </p:extLst>
   </p:cSld>
@@ -7766,19 +9819,19 @@
           <a:lstStyle/>
           <a:p>
             <a:r>
-              <a:rPr lang="es-ES" dirty="0" err="1"/>
+              <a:rPr lang="es-ES" b="1" dirty="0" err="1"/>
               <a:t>Cloglog</a:t>
             </a:r>
             <a:r>
-              <a:rPr lang="es-ES" dirty="0"/>
+              <a:rPr lang="es-ES" b="1" dirty="0"/>
               <a:t> </a:t>
             </a:r>
             <a:r>
-              <a:rPr lang="es-ES" dirty="0" err="1"/>
+              <a:rPr lang="es-ES" b="1" dirty="0" err="1"/>
               <a:t>transformation</a:t>
             </a:r>
             <a:r>
-              <a:rPr lang="es-ES" dirty="0"/>
+              <a:rPr lang="es-ES" b="1" dirty="0"/>
               <a:t> </a:t>
             </a:r>
             <a:r>
@@ -7792,6 +9845,10 @@
             <a:r>
               <a:rPr lang="es-ES" dirty="0" err="1"/>
               <a:t>assumption</a:t>
+            </a:r>
+            <a:r>
+              <a:rPr lang="es-ES" dirty="0"/>
+              <a:t>:</a:t>
             </a:r>
             <a:endParaRPr lang="en-GB" dirty="0"/>
           </a:p>
@@ -7922,7 +9979,7 @@
           <p:cNvPr id="2" name="Title 1">
             <a:extLst>
               <a:ext uri="{FF2B5EF4-FFF2-40B4-BE49-F238E27FC236}">
-                <a16:creationId xmlns:a16="http://schemas.microsoft.com/office/drawing/2014/main" id="{497E08B4-1A21-5C4A-FF59-0254370A8800}"/>
+                <a16:creationId xmlns:a16="http://schemas.microsoft.com/office/drawing/2014/main" id="{9CEF219F-A752-AF3A-FEDC-8EB897838D43}"/>
               </a:ext>
             </a:extLst>
           </p:cNvPr>
@@ -7948,15 +10005,7 @@
             </a:r>
             <a:r>
               <a:rPr lang="es-ES" dirty="0" err="1"/>
-              <a:t>Multivariate</a:t>
-            </a:r>
-            <a:r>
-              <a:rPr lang="es-ES" dirty="0"/>
-              <a:t> Cox </a:t>
-            </a:r>
-            <a:r>
-              <a:rPr lang="es-ES" dirty="0" err="1"/>
-              <a:t>regression</a:t>
+              <a:t>Univariate</a:t>
             </a:r>
             <a:r>
               <a:rPr lang="es-ES" dirty="0"/>
@@ -7964,18 +10013,7 @@
             </a:r>
             <a:r>
               <a:rPr lang="es-ES" dirty="0" err="1"/>
-              <a:t>model</a:t>
-            </a:r>
-            <a:br>
-              <a:rPr lang="es-ES" dirty="0"/>
-            </a:br>
-            <a:r>
-              <a:rPr lang="es-ES" dirty="0"/>
-              <a:t>A. Base </a:t>
-            </a:r>
-            <a:r>
-              <a:rPr lang="es-ES" dirty="0" err="1"/>
-              <a:t>model</a:t>
+              <a:t>analysis</a:t>
             </a:r>
             <a:endParaRPr lang="en-GB" dirty="0"/>
           </a:p>
@@ -7986,7 +10024,7 @@
           <p:cNvPr id="7" name="Content Placeholder 6">
             <a:extLst>
               <a:ext uri="{FF2B5EF4-FFF2-40B4-BE49-F238E27FC236}">
-                <a16:creationId xmlns:a16="http://schemas.microsoft.com/office/drawing/2014/main" id="{9C296F9C-B501-5452-9A38-DC9F1E00FA23}"/>
+                <a16:creationId xmlns:a16="http://schemas.microsoft.com/office/drawing/2014/main" id="{38434C18-E629-8B9D-4E85-3B193564F614}"/>
               </a:ext>
             </a:extLst>
           </p:cNvPr>
@@ -7997,19 +10035,888 @@
             <p:ph idx="1"/>
           </p:nvPr>
         </p:nvSpPr>
-        <p:spPr/>
+        <p:spPr>
+          <a:xfrm>
+            <a:off x="2197729" y="1346670"/>
+            <a:ext cx="7796540" cy="895621"/>
+          </a:xfrm>
+        </p:spPr>
         <p:txBody>
           <a:bodyPr/>
           <a:lstStyle/>
           <a:p>
-            <a:endParaRPr lang="en-GB" dirty="0"/>
-          </a:p>
-        </p:txBody>
-      </p:sp>
+            <a:r>
+              <a:rPr lang="es-ES" b="1" dirty="0" err="1"/>
+              <a:t>Logrank</a:t>
+            </a:r>
+            <a:r>
+              <a:rPr lang="es-ES" b="1" dirty="0"/>
+              <a:t> and Wilcoxon </a:t>
+            </a:r>
+            <a:r>
+              <a:rPr lang="es-ES" b="1" dirty="0" err="1"/>
+              <a:t>tests</a:t>
+            </a:r>
+            <a:r>
+              <a:rPr lang="es-ES" dirty="0"/>
+              <a:t>: </a:t>
+            </a:r>
+            <a:r>
+              <a:rPr lang="es-ES" sz="1400" i="1" dirty="0"/>
+              <a:t>(* </a:t>
+            </a:r>
+            <a:r>
+              <a:rPr lang="es-ES" sz="1400" i="1" dirty="0" err="1"/>
+              <a:t>indicates</a:t>
+            </a:r>
+            <a:r>
+              <a:rPr lang="es-ES" sz="1400" i="1" dirty="0"/>
+              <a:t> </a:t>
+            </a:r>
+            <a:r>
+              <a:rPr lang="es-ES" sz="1400" i="1" dirty="0" err="1"/>
+              <a:t>significance</a:t>
+            </a:r>
+            <a:r>
+              <a:rPr lang="es-ES" sz="1400" i="1" dirty="0"/>
+              <a:t> </a:t>
+            </a:r>
+            <a:r>
+              <a:rPr lang="es-ES" sz="1400" i="1" dirty="0" err="1"/>
+              <a:t>on</a:t>
+            </a:r>
+            <a:r>
+              <a:rPr lang="es-ES" sz="1400" i="1" dirty="0"/>
+              <a:t> </a:t>
+            </a:r>
+            <a:r>
+              <a:rPr lang="es-ES" sz="1400" i="1" dirty="0" err="1"/>
+              <a:t>the</a:t>
+            </a:r>
+            <a:r>
+              <a:rPr lang="es-ES" sz="1400" i="1" dirty="0"/>
+              <a:t> 5%-</a:t>
+            </a:r>
+            <a:r>
+              <a:rPr lang="es-ES" sz="1400" i="1" dirty="0" err="1"/>
+              <a:t>level</a:t>
+            </a:r>
+            <a:r>
+              <a:rPr lang="es-ES" sz="1400" i="1" dirty="0"/>
+              <a:t>)</a:t>
+            </a:r>
+            <a:endParaRPr lang="en-GB" i="1" dirty="0"/>
+          </a:p>
+        </p:txBody>
+      </p:sp>
+      <p:graphicFrame>
+        <p:nvGraphicFramePr>
+          <p:cNvPr id="3" name="Table 3">
+            <a:extLst>
+              <a:ext uri="{FF2B5EF4-FFF2-40B4-BE49-F238E27FC236}">
+                <a16:creationId xmlns:a16="http://schemas.microsoft.com/office/drawing/2014/main" id="{D5968D79-A2E6-BAD1-BD4B-05FB00C12F0F}"/>
+              </a:ext>
+            </a:extLst>
+          </p:cNvPr>
+          <p:cNvGraphicFramePr>
+            <a:graphicFrameLocks noGrp="1"/>
+          </p:cNvGraphicFramePr>
+          <p:nvPr>
+            <p:extLst>
+              <p:ext uri="{D42A27DB-BD31-4B8C-83A1-F6EECF244321}">
+                <p14:modId xmlns:p14="http://schemas.microsoft.com/office/powerpoint/2010/main" val="1349351641"/>
+              </p:ext>
+            </p:extLst>
+          </p:nvPr>
+        </p:nvGraphicFramePr>
+        <p:xfrm>
+          <a:off x="2197729" y="2060791"/>
+          <a:ext cx="8127999" cy="4424680"/>
+        </p:xfrm>
+        <a:graphic>
+          <a:graphicData uri="http://schemas.openxmlformats.org/drawingml/2006/table">
+            <a:tbl>
+              <a:tblPr firstRow="1" bandRow="1">
+                <a:tableStyleId>{5C22544A-7EE6-4342-B048-85BDC9FD1C3A}</a:tableStyleId>
+              </a:tblPr>
+              <a:tblGrid>
+                <a:gridCol w="2709333">
+                  <a:extLst>
+                    <a:ext uri="{9D8B030D-6E8A-4147-A177-3AD203B41FA5}">
+                      <a16:colId xmlns:a16="http://schemas.microsoft.com/office/drawing/2014/main" val="609590367"/>
+                    </a:ext>
+                  </a:extLst>
+                </a:gridCol>
+                <a:gridCol w="2709333">
+                  <a:extLst>
+                    <a:ext uri="{9D8B030D-6E8A-4147-A177-3AD203B41FA5}">
+                      <a16:colId xmlns:a16="http://schemas.microsoft.com/office/drawing/2014/main" val="3073907434"/>
+                    </a:ext>
+                  </a:extLst>
+                </a:gridCol>
+                <a:gridCol w="2709333">
+                  <a:extLst>
+                    <a:ext uri="{9D8B030D-6E8A-4147-A177-3AD203B41FA5}">
+                      <a16:colId xmlns:a16="http://schemas.microsoft.com/office/drawing/2014/main" val="4112593623"/>
+                    </a:ext>
+                  </a:extLst>
+                </a:gridCol>
+              </a:tblGrid>
+              <a:tr h="370840">
+                <a:tc>
+                  <a:txBody>
+                    <a:bodyPr/>
+                    <a:lstStyle/>
+                    <a:p>
+                      <a:r>
+                        <a:rPr lang="es-ES" dirty="0">
+                          <a:solidFill>
+                            <a:schemeClr val="bg1"/>
+                          </a:solidFill>
+                        </a:rPr>
+                        <a:t>Variable</a:t>
+                      </a:r>
+                      <a:endParaRPr lang="en-GB" dirty="0">
+                        <a:solidFill>
+                          <a:schemeClr val="bg1"/>
+                        </a:solidFill>
+                      </a:endParaRPr>
+                    </a:p>
+                  </a:txBody>
+                  <a:tcPr/>
+                </a:tc>
+                <a:tc>
+                  <a:txBody>
+                    <a:bodyPr/>
+                    <a:lstStyle/>
+                    <a:p>
+                      <a:r>
+                        <a:rPr lang="es-ES" dirty="0" err="1">
+                          <a:solidFill>
+                            <a:schemeClr val="bg1"/>
+                          </a:solidFill>
+                        </a:rPr>
+                        <a:t>Logrank</a:t>
+                      </a:r>
+                      <a:r>
+                        <a:rPr lang="es-ES" dirty="0">
+                          <a:solidFill>
+                            <a:schemeClr val="bg1"/>
+                          </a:solidFill>
+                        </a:rPr>
+                        <a:t> test (p-</a:t>
+                      </a:r>
+                      <a:r>
+                        <a:rPr lang="es-ES" dirty="0" err="1">
+                          <a:solidFill>
+                            <a:schemeClr val="bg1"/>
+                          </a:solidFill>
+                        </a:rPr>
+                        <a:t>value</a:t>
+                      </a:r>
+                      <a:r>
+                        <a:rPr lang="es-ES" dirty="0">
+                          <a:solidFill>
+                            <a:schemeClr val="bg1"/>
+                          </a:solidFill>
+                        </a:rPr>
+                        <a:t>)</a:t>
+                      </a:r>
+                      <a:endParaRPr lang="en-GB" dirty="0">
+                        <a:solidFill>
+                          <a:schemeClr val="bg1"/>
+                        </a:solidFill>
+                      </a:endParaRPr>
+                    </a:p>
+                  </a:txBody>
+                  <a:tcPr/>
+                </a:tc>
+                <a:tc>
+                  <a:txBody>
+                    <a:bodyPr/>
+                    <a:lstStyle/>
+                    <a:p>
+                      <a:r>
+                        <a:rPr lang="es-ES" dirty="0">
+                          <a:solidFill>
+                            <a:schemeClr val="bg1"/>
+                          </a:solidFill>
+                        </a:rPr>
+                        <a:t>Wilcoxon test (p-</a:t>
+                      </a:r>
+                      <a:r>
+                        <a:rPr lang="es-ES" dirty="0" err="1">
+                          <a:solidFill>
+                            <a:schemeClr val="bg1"/>
+                          </a:solidFill>
+                        </a:rPr>
+                        <a:t>value</a:t>
+                      </a:r>
+                      <a:r>
+                        <a:rPr lang="es-ES" dirty="0">
+                          <a:solidFill>
+                            <a:schemeClr val="bg1"/>
+                          </a:solidFill>
+                        </a:rPr>
+                        <a:t>)</a:t>
+                      </a:r>
+                      <a:endParaRPr lang="en-GB" dirty="0">
+                        <a:solidFill>
+                          <a:schemeClr val="bg1"/>
+                        </a:solidFill>
+                      </a:endParaRPr>
+                    </a:p>
+                  </a:txBody>
+                  <a:tcPr/>
+                </a:tc>
+                <a:extLst>
+                  <a:ext uri="{0D108BD9-81ED-4DB2-BD59-A6C34878D82A}">
+                    <a16:rowId xmlns:a16="http://schemas.microsoft.com/office/drawing/2014/main" val="423016576"/>
+                  </a:ext>
+                </a:extLst>
+              </a:tr>
+              <a:tr h="370840">
+                <a:tc>
+                  <a:txBody>
+                    <a:bodyPr/>
+                    <a:lstStyle/>
+                    <a:p>
+                      <a:r>
+                        <a:rPr lang="es-ES" i="1" dirty="0" err="1"/>
+                        <a:t>Gender</a:t>
+                      </a:r>
+                      <a:endParaRPr lang="en-GB" i="1" dirty="0"/>
+                    </a:p>
+                  </a:txBody>
+                  <a:tcPr/>
+                </a:tc>
+                <a:tc>
+                  <a:txBody>
+                    <a:bodyPr/>
+                    <a:lstStyle/>
+                    <a:p>
+                      <a:r>
+                        <a:rPr lang="es-ES" dirty="0">
+                          <a:solidFill>
+                            <a:schemeClr val="tx1">
+                              <a:lumMod val="65000"/>
+                            </a:schemeClr>
+                          </a:solidFill>
+                        </a:rPr>
+                        <a:t>0.9</a:t>
+                      </a:r>
+                      <a:endParaRPr lang="en-GB" dirty="0">
+                        <a:solidFill>
+                          <a:schemeClr val="tx1">
+                            <a:lumMod val="65000"/>
+                          </a:schemeClr>
+                        </a:solidFill>
+                      </a:endParaRPr>
+                    </a:p>
+                  </a:txBody>
+                  <a:tcPr/>
+                </a:tc>
+                <a:tc>
+                  <a:txBody>
+                    <a:bodyPr/>
+                    <a:lstStyle/>
+                    <a:p>
+                      <a:r>
+                        <a:rPr lang="es-ES" dirty="0"/>
+                        <a:t>0.9</a:t>
+                      </a:r>
+                      <a:endParaRPr lang="en-GB" dirty="0"/>
+                    </a:p>
+                  </a:txBody>
+                  <a:tcPr/>
+                </a:tc>
+                <a:extLst>
+                  <a:ext uri="{0D108BD9-81ED-4DB2-BD59-A6C34878D82A}">
+                    <a16:rowId xmlns:a16="http://schemas.microsoft.com/office/drawing/2014/main" val="349952682"/>
+                  </a:ext>
+                </a:extLst>
+              </a:tr>
+              <a:tr h="370840">
+                <a:tc>
+                  <a:txBody>
+                    <a:bodyPr/>
+                    <a:lstStyle/>
+                    <a:p>
+                      <a:r>
+                        <a:rPr lang="es-ES" i="1" dirty="0"/>
+                        <a:t>Smoking</a:t>
+                      </a:r>
+                      <a:endParaRPr lang="en-GB" i="1" dirty="0"/>
+                    </a:p>
+                  </a:txBody>
+                  <a:tcPr/>
+                </a:tc>
+                <a:tc>
+                  <a:txBody>
+                    <a:bodyPr/>
+                    <a:lstStyle/>
+                    <a:p>
+                      <a:r>
+                        <a:rPr lang="es-ES" dirty="0">
+                          <a:solidFill>
+                            <a:schemeClr val="tx1">
+                              <a:lumMod val="65000"/>
+                            </a:schemeClr>
+                          </a:solidFill>
+                        </a:rPr>
+                        <a:t>1.0</a:t>
+                      </a:r>
+                      <a:endParaRPr lang="en-GB" dirty="0">
+                        <a:solidFill>
+                          <a:schemeClr val="tx1">
+                            <a:lumMod val="65000"/>
+                          </a:schemeClr>
+                        </a:solidFill>
+                      </a:endParaRPr>
+                    </a:p>
+                  </a:txBody>
+                  <a:tcPr/>
+                </a:tc>
+                <a:tc>
+                  <a:txBody>
+                    <a:bodyPr/>
+                    <a:lstStyle/>
+                    <a:p>
+                      <a:r>
+                        <a:rPr lang="es-ES" dirty="0"/>
+                        <a:t>1.0</a:t>
+                      </a:r>
+                      <a:endParaRPr lang="en-GB" dirty="0"/>
+                    </a:p>
+                  </a:txBody>
+                  <a:tcPr/>
+                </a:tc>
+                <a:extLst>
+                  <a:ext uri="{0D108BD9-81ED-4DB2-BD59-A6C34878D82A}">
+                    <a16:rowId xmlns:a16="http://schemas.microsoft.com/office/drawing/2014/main" val="93902608"/>
+                  </a:ext>
+                </a:extLst>
+              </a:tr>
+              <a:tr h="370840">
+                <a:tc>
+                  <a:txBody>
+                    <a:bodyPr/>
+                    <a:lstStyle/>
+                    <a:p>
+                      <a:r>
+                        <a:rPr lang="es-ES" i="1" dirty="0"/>
+                        <a:t>Diabetes</a:t>
+                      </a:r>
+                      <a:endParaRPr lang="en-GB" i="1" dirty="0"/>
+                    </a:p>
+                  </a:txBody>
+                  <a:tcPr/>
+                </a:tc>
+                <a:tc>
+                  <a:txBody>
+                    <a:bodyPr/>
+                    <a:lstStyle/>
+                    <a:p>
+                      <a:r>
+                        <a:rPr lang="es-ES" dirty="0">
+                          <a:solidFill>
+                            <a:schemeClr val="tx1">
+                              <a:lumMod val="65000"/>
+                            </a:schemeClr>
+                          </a:solidFill>
+                        </a:rPr>
+                        <a:t>0.8</a:t>
+                      </a:r>
+                      <a:endParaRPr lang="en-GB" dirty="0">
+                        <a:solidFill>
+                          <a:schemeClr val="tx1">
+                            <a:lumMod val="65000"/>
+                          </a:schemeClr>
+                        </a:solidFill>
+                      </a:endParaRPr>
+                    </a:p>
+                  </a:txBody>
+                  <a:tcPr/>
+                </a:tc>
+                <a:tc>
+                  <a:txBody>
+                    <a:bodyPr/>
+                    <a:lstStyle/>
+                    <a:p>
+                      <a:r>
+                        <a:rPr lang="es-ES" dirty="0"/>
+                        <a:t>0.9</a:t>
+                      </a:r>
+                      <a:endParaRPr lang="en-GB" dirty="0"/>
+                    </a:p>
+                  </a:txBody>
+                  <a:tcPr/>
+                </a:tc>
+                <a:extLst>
+                  <a:ext uri="{0D108BD9-81ED-4DB2-BD59-A6C34878D82A}">
+                    <a16:rowId xmlns:a16="http://schemas.microsoft.com/office/drawing/2014/main" val="794258951"/>
+                  </a:ext>
+                </a:extLst>
+              </a:tr>
+              <a:tr h="370840">
+                <a:tc>
+                  <a:txBody>
+                    <a:bodyPr/>
+                    <a:lstStyle/>
+                    <a:p>
+                      <a:r>
+                        <a:rPr lang="es-ES" i="1" dirty="0"/>
+                        <a:t>BP</a:t>
+                      </a:r>
+                      <a:endParaRPr lang="en-GB" i="1" dirty="0"/>
+                    </a:p>
+                  </a:txBody>
+                  <a:tcPr/>
+                </a:tc>
+                <a:tc>
+                  <a:txBody>
+                    <a:bodyPr/>
+                    <a:lstStyle/>
+                    <a:p>
+                      <a:r>
+                        <a:rPr lang="es-ES" dirty="0"/>
+                        <a:t>0.04*</a:t>
+                      </a:r>
+                      <a:endParaRPr lang="en-GB" dirty="0"/>
+                    </a:p>
+                  </a:txBody>
+                  <a:tcPr/>
+                </a:tc>
+                <a:tc>
+                  <a:txBody>
+                    <a:bodyPr/>
+                    <a:lstStyle/>
+                    <a:p>
+                      <a:r>
+                        <a:rPr lang="es-ES" dirty="0"/>
+                        <a:t>0.03*</a:t>
+                      </a:r>
+                      <a:endParaRPr lang="en-GB" dirty="0"/>
+                    </a:p>
+                  </a:txBody>
+                  <a:tcPr/>
+                </a:tc>
+                <a:extLst>
+                  <a:ext uri="{0D108BD9-81ED-4DB2-BD59-A6C34878D82A}">
+                    <a16:rowId xmlns:a16="http://schemas.microsoft.com/office/drawing/2014/main" val="4169310468"/>
+                  </a:ext>
+                </a:extLst>
+              </a:tr>
+              <a:tr h="370840">
+                <a:tc>
+                  <a:txBody>
+                    <a:bodyPr/>
+                    <a:lstStyle/>
+                    <a:p>
+                      <a:r>
+                        <a:rPr lang="es-ES" i="1" dirty="0" err="1"/>
+                        <a:t>Anaemia</a:t>
+                      </a:r>
+                      <a:endParaRPr lang="en-GB" i="1" dirty="0"/>
+                    </a:p>
+                  </a:txBody>
+                  <a:tcPr/>
+                </a:tc>
+                <a:tc>
+                  <a:txBody>
+                    <a:bodyPr/>
+                    <a:lstStyle/>
+                    <a:p>
+                      <a:r>
+                        <a:rPr lang="es-ES" dirty="0"/>
+                        <a:t>0.1</a:t>
+                      </a:r>
+                      <a:endParaRPr lang="en-GB" dirty="0"/>
+                    </a:p>
+                  </a:txBody>
+                  <a:tcPr/>
+                </a:tc>
+                <a:tc>
+                  <a:txBody>
+                    <a:bodyPr/>
+                    <a:lstStyle/>
+                    <a:p>
+                      <a:r>
+                        <a:rPr lang="es-ES" dirty="0"/>
+                        <a:t>0.08</a:t>
+                      </a:r>
+                      <a:endParaRPr lang="en-GB" dirty="0"/>
+                    </a:p>
+                  </a:txBody>
+                  <a:tcPr/>
+                </a:tc>
+                <a:extLst>
+                  <a:ext uri="{0D108BD9-81ED-4DB2-BD59-A6C34878D82A}">
+                    <a16:rowId xmlns:a16="http://schemas.microsoft.com/office/drawing/2014/main" val="3225914729"/>
+                  </a:ext>
+                </a:extLst>
+              </a:tr>
+              <a:tr h="370840">
+                <a:tc>
+                  <a:txBody>
+                    <a:bodyPr/>
+                    <a:lstStyle/>
+                    <a:p>
+                      <a:r>
+                        <a:rPr lang="es-ES" i="1" dirty="0" err="1"/>
+                        <a:t>Age_group</a:t>
+                      </a:r>
+                      <a:endParaRPr lang="en-GB" i="1" dirty="0"/>
+                    </a:p>
+                  </a:txBody>
+                  <a:tcPr/>
+                </a:tc>
+                <a:tc>
+                  <a:txBody>
+                    <a:bodyPr/>
+                    <a:lstStyle/>
+                    <a:p>
+                      <a:r>
+                        <a:rPr lang="en-GB" dirty="0">
+                          <a:solidFill>
+                            <a:schemeClr val="tx1">
+                              <a:lumMod val="65000"/>
+                            </a:schemeClr>
+                          </a:solidFill>
+                        </a:rPr>
+                        <a:t>0.000004*</a:t>
+                      </a:r>
+                    </a:p>
+                  </a:txBody>
+                  <a:tcPr/>
+                </a:tc>
+                <a:tc>
+                  <a:txBody>
+                    <a:bodyPr/>
+                    <a:lstStyle/>
+                    <a:p>
+                      <a:r>
+                        <a:rPr lang="en-GB" dirty="0"/>
+                        <a:t>0.000007*</a:t>
+                      </a:r>
+                    </a:p>
+                  </a:txBody>
+                  <a:tcPr/>
+                </a:tc>
+                <a:extLst>
+                  <a:ext uri="{0D108BD9-81ED-4DB2-BD59-A6C34878D82A}">
+                    <a16:rowId xmlns:a16="http://schemas.microsoft.com/office/drawing/2014/main" val="2857183528"/>
+                  </a:ext>
+                </a:extLst>
+              </a:tr>
+              <a:tr h="0">
+                <a:tc>
+                  <a:txBody>
+                    <a:bodyPr/>
+                    <a:lstStyle/>
+                    <a:p>
+                      <a:r>
+                        <a:rPr lang="es-ES" i="1" dirty="0" err="1"/>
+                        <a:t>Ejection.Fraction</a:t>
+                      </a:r>
+                      <a:endParaRPr lang="en-GB" i="1" dirty="0"/>
+                    </a:p>
+                  </a:txBody>
+                  <a:tcPr/>
+                </a:tc>
+                <a:tc>
+                  <a:txBody>
+                    <a:bodyPr/>
+                    <a:lstStyle/>
+                    <a:p>
+                      <a:r>
+                        <a:rPr lang="en-GB" dirty="0">
+                          <a:solidFill>
+                            <a:schemeClr val="tx1">
+                              <a:lumMod val="65000"/>
+                            </a:schemeClr>
+                          </a:solidFill>
+                        </a:rPr>
+                        <a:t>0.0000006*</a:t>
+                      </a:r>
+                    </a:p>
+                  </a:txBody>
+                  <a:tcPr/>
+                </a:tc>
+                <a:tc>
+                  <a:txBody>
+                    <a:bodyPr/>
+                    <a:lstStyle/>
+                    <a:p>
+                      <a:pPr marL="0" marR="0" lvl="0" indent="0" algn="l" defTabSz="914400" rtl="0" eaLnBrk="1" fontAlgn="auto" latinLnBrk="0" hangingPunct="1">
+                        <a:lnSpc>
+                          <a:spcPct val="100000"/>
+                        </a:lnSpc>
+                        <a:spcBef>
+                          <a:spcPts val="0"/>
+                        </a:spcBef>
+                        <a:spcAft>
+                          <a:spcPts val="0"/>
+                        </a:spcAft>
+                        <a:buClrTx/>
+                        <a:buSzTx/>
+                        <a:buFontTx/>
+                        <a:buNone/>
+                        <a:tabLst/>
+                        <a:defRPr/>
+                      </a:pPr>
+                      <a:r>
+                        <a:rPr lang="en-GB" dirty="0"/>
+                        <a:t>0.000007*</a:t>
+                      </a:r>
+                    </a:p>
+                  </a:txBody>
+                  <a:tcPr/>
+                </a:tc>
+                <a:extLst>
+                  <a:ext uri="{0D108BD9-81ED-4DB2-BD59-A6C34878D82A}">
+                    <a16:rowId xmlns:a16="http://schemas.microsoft.com/office/drawing/2014/main" val="2682710705"/>
+                  </a:ext>
+                </a:extLst>
+              </a:tr>
+              <a:tr h="273050">
+                <a:tc>
+                  <a:txBody>
+                    <a:bodyPr/>
+                    <a:lstStyle/>
+                    <a:p>
+                      <a:r>
+                        <a:rPr lang="es-ES" i="1" dirty="0" err="1"/>
+                        <a:t>Sodium_group</a:t>
+                      </a:r>
+                      <a:endParaRPr lang="en-GB" i="1" dirty="0"/>
+                    </a:p>
+                  </a:txBody>
+                  <a:tcPr/>
+                </a:tc>
+                <a:tc>
+                  <a:txBody>
+                    <a:bodyPr/>
+                    <a:lstStyle/>
+                    <a:p>
+                      <a:r>
+                        <a:rPr lang="es-ES" dirty="0">
+                          <a:solidFill>
+                            <a:schemeClr val="tx1">
+                              <a:lumMod val="65000"/>
+                            </a:schemeClr>
+                          </a:solidFill>
+                        </a:rPr>
+                        <a:t>0.001*</a:t>
+                      </a:r>
+                      <a:endParaRPr lang="en-GB" dirty="0">
+                        <a:solidFill>
+                          <a:schemeClr val="tx1">
+                            <a:lumMod val="65000"/>
+                          </a:schemeClr>
+                        </a:solidFill>
+                      </a:endParaRPr>
+                    </a:p>
+                  </a:txBody>
+                  <a:tcPr/>
+                </a:tc>
+                <a:tc>
+                  <a:txBody>
+                    <a:bodyPr/>
+                    <a:lstStyle/>
+                    <a:p>
+                      <a:r>
+                        <a:rPr lang="es-ES" dirty="0"/>
+                        <a:t>0.002*</a:t>
+                      </a:r>
+                      <a:endParaRPr lang="en-GB" dirty="0"/>
+                    </a:p>
+                  </a:txBody>
+                  <a:tcPr/>
+                </a:tc>
+                <a:extLst>
+                  <a:ext uri="{0D108BD9-81ED-4DB2-BD59-A6C34878D82A}">
+                    <a16:rowId xmlns:a16="http://schemas.microsoft.com/office/drawing/2014/main" val="741059790"/>
+                  </a:ext>
+                </a:extLst>
+              </a:tr>
+              <a:tr h="180340">
+                <a:tc>
+                  <a:txBody>
+                    <a:bodyPr/>
+                    <a:lstStyle/>
+                    <a:p>
+                      <a:r>
+                        <a:rPr lang="es-ES" i="1" dirty="0" err="1"/>
+                        <a:t>Creatinine_group</a:t>
+                      </a:r>
+                      <a:endParaRPr lang="en-GB" i="1" dirty="0"/>
+                    </a:p>
+                  </a:txBody>
+                  <a:tcPr/>
+                </a:tc>
+                <a:tc>
+                  <a:txBody>
+                    <a:bodyPr/>
+                    <a:lstStyle/>
+                    <a:p>
+                      <a:r>
+                        <a:rPr lang="en-GB" dirty="0"/>
+                        <a:t>0.000000001*</a:t>
+                      </a:r>
+                    </a:p>
+                  </a:txBody>
+                  <a:tcPr/>
+                </a:tc>
+                <a:tc>
+                  <a:txBody>
+                    <a:bodyPr/>
+                    <a:lstStyle/>
+                    <a:p>
+                      <a:r>
+                        <a:rPr lang="en-GB" dirty="0"/>
+                        <a:t>0.000000008*</a:t>
+                      </a:r>
+                    </a:p>
+                  </a:txBody>
+                  <a:tcPr/>
+                </a:tc>
+                <a:extLst>
+                  <a:ext uri="{0D108BD9-81ED-4DB2-BD59-A6C34878D82A}">
+                    <a16:rowId xmlns:a16="http://schemas.microsoft.com/office/drawing/2014/main" val="2461947988"/>
+                  </a:ext>
+                </a:extLst>
+              </a:tr>
+              <a:tr h="182880">
+                <a:tc>
+                  <a:txBody>
+                    <a:bodyPr/>
+                    <a:lstStyle/>
+                    <a:p>
+                      <a:r>
+                        <a:rPr lang="es-ES" i="1" dirty="0" err="1"/>
+                        <a:t>Pletelets_group</a:t>
+                      </a:r>
+                      <a:endParaRPr lang="en-GB" i="1" dirty="0"/>
+                    </a:p>
+                  </a:txBody>
+                  <a:tcPr/>
+                </a:tc>
+                <a:tc>
+                  <a:txBody>
+                    <a:bodyPr/>
+                    <a:lstStyle/>
+                    <a:p>
+                      <a:r>
+                        <a:rPr lang="es-ES" dirty="0">
+                          <a:solidFill>
+                            <a:schemeClr val="tx1">
+                              <a:lumMod val="65000"/>
+                            </a:schemeClr>
+                          </a:solidFill>
+                        </a:rPr>
+                        <a:t>0.3</a:t>
+                      </a:r>
+                      <a:endParaRPr lang="en-GB" dirty="0">
+                        <a:solidFill>
+                          <a:schemeClr val="tx1">
+                            <a:lumMod val="65000"/>
+                          </a:schemeClr>
+                        </a:solidFill>
+                      </a:endParaRPr>
+                    </a:p>
+                  </a:txBody>
+                  <a:tcPr/>
+                </a:tc>
+                <a:tc>
+                  <a:txBody>
+                    <a:bodyPr/>
+                    <a:lstStyle/>
+                    <a:p>
+                      <a:r>
+                        <a:rPr lang="es-ES" dirty="0"/>
+                        <a:t>0.2</a:t>
+                      </a:r>
+                      <a:endParaRPr lang="en-GB" dirty="0"/>
+                    </a:p>
+                  </a:txBody>
+                  <a:tcPr/>
+                </a:tc>
+                <a:extLst>
+                  <a:ext uri="{0D108BD9-81ED-4DB2-BD59-A6C34878D82A}">
+                    <a16:rowId xmlns:a16="http://schemas.microsoft.com/office/drawing/2014/main" val="2075297352"/>
+                  </a:ext>
+                </a:extLst>
+              </a:tr>
+              <a:tr h="182880">
+                <a:tc>
+                  <a:txBody>
+                    <a:bodyPr/>
+                    <a:lstStyle/>
+                    <a:p>
+                      <a:r>
+                        <a:rPr lang="es-ES" i="1" dirty="0" err="1"/>
+                        <a:t>CPK_group</a:t>
+                      </a:r>
+                      <a:endParaRPr lang="en-GB" i="1" dirty="0"/>
+                    </a:p>
+                  </a:txBody>
+                  <a:tcPr/>
+                </a:tc>
+                <a:tc>
+                  <a:txBody>
+                    <a:bodyPr/>
+                    <a:lstStyle/>
+                    <a:p>
+                      <a:r>
+                        <a:rPr lang="es-ES" dirty="0">
+                          <a:solidFill>
+                            <a:schemeClr val="tx1">
+                              <a:lumMod val="65000"/>
+                            </a:schemeClr>
+                          </a:solidFill>
+                        </a:rPr>
+                        <a:t>0.3</a:t>
+                      </a:r>
+                      <a:endParaRPr lang="en-GB" dirty="0">
+                        <a:solidFill>
+                          <a:schemeClr val="tx1">
+                            <a:lumMod val="65000"/>
+                          </a:schemeClr>
+                        </a:solidFill>
+                      </a:endParaRPr>
+                    </a:p>
+                  </a:txBody>
+                  <a:tcPr/>
+                </a:tc>
+                <a:tc>
+                  <a:txBody>
+                    <a:bodyPr/>
+                    <a:lstStyle/>
+                    <a:p>
+                      <a:r>
+                        <a:rPr lang="es-ES" dirty="0"/>
+                        <a:t>0.3</a:t>
+                      </a:r>
+                      <a:endParaRPr lang="en-GB" dirty="0"/>
+                    </a:p>
+                  </a:txBody>
+                  <a:tcPr/>
+                </a:tc>
+                <a:extLst>
+                  <a:ext uri="{0D108BD9-81ED-4DB2-BD59-A6C34878D82A}">
+                    <a16:rowId xmlns:a16="http://schemas.microsoft.com/office/drawing/2014/main" val="1241581971"/>
+                  </a:ext>
+                </a:extLst>
+              </a:tr>
+            </a:tbl>
+          </a:graphicData>
+        </a:graphic>
+      </p:graphicFrame>
     </p:spTree>
     <p:extLst>
       <p:ext uri="{BB962C8B-B14F-4D97-AF65-F5344CB8AC3E}">
-        <p14:creationId xmlns:p14="http://schemas.microsoft.com/office/powerpoint/2010/main" val="2082576824"/>
+        <p14:creationId xmlns:p14="http://schemas.microsoft.com/office/powerpoint/2010/main" val="404323534"/>
       </p:ext>
     </p:extLst>
   </p:cSld>
@@ -8041,7 +10948,7 @@
           <p:cNvPr id="2" name="Title 1">
             <a:extLst>
               <a:ext uri="{FF2B5EF4-FFF2-40B4-BE49-F238E27FC236}">
-                <a16:creationId xmlns:a16="http://schemas.microsoft.com/office/drawing/2014/main" id="{497E08B4-1A21-5C4A-FF59-0254370A8800}"/>
+                <a16:creationId xmlns:a16="http://schemas.microsoft.com/office/drawing/2014/main" id="{9CEF219F-A752-AF3A-FEDC-8EB897838D43}"/>
               </a:ext>
             </a:extLst>
           </p:cNvPr>
@@ -8067,15 +10974,7 @@
             </a:r>
             <a:r>
               <a:rPr lang="es-ES" dirty="0" err="1"/>
-              <a:t>Multivariate</a:t>
-            </a:r>
-            <a:r>
-              <a:rPr lang="es-ES" dirty="0"/>
-              <a:t> Cox </a:t>
-            </a:r>
-            <a:r>
-              <a:rPr lang="es-ES" dirty="0" err="1"/>
-              <a:t>regression</a:t>
+              <a:t>Univariate</a:t>
             </a:r>
             <a:r>
               <a:rPr lang="es-ES" dirty="0"/>
@@ -8083,34 +10982,7 @@
             </a:r>
             <a:r>
               <a:rPr lang="es-ES" dirty="0" err="1"/>
-              <a:t>model</a:t>
-            </a:r>
-            <a:br>
-              <a:rPr lang="es-ES" dirty="0"/>
-            </a:br>
-            <a:r>
-              <a:rPr lang="es-ES" dirty="0"/>
-              <a:t>B. </a:t>
-            </a:r>
-            <a:r>
-              <a:rPr lang="es-ES" dirty="0" err="1"/>
-              <a:t>With</a:t>
-            </a:r>
-            <a:r>
-              <a:rPr lang="es-ES" dirty="0"/>
-              <a:t> time </a:t>
-            </a:r>
-            <a:r>
-              <a:rPr lang="es-ES" dirty="0" err="1"/>
-              <a:t>varying</a:t>
-            </a:r>
-            <a:r>
-              <a:rPr lang="es-ES" dirty="0"/>
-              <a:t> </a:t>
-            </a:r>
-            <a:r>
-              <a:rPr lang="es-ES" dirty="0" err="1"/>
-              <a:t>coefficients</a:t>
+              <a:t>analysis</a:t>
             </a:r>
             <a:endParaRPr lang="en-GB" dirty="0"/>
           </a:p>
@@ -8118,10 +10990,10 @@
       </p:sp>
       <p:sp>
         <p:nvSpPr>
-          <p:cNvPr id="3" name="Content Placeholder 2">
+          <p:cNvPr id="7" name="Content Placeholder 6">
             <a:extLst>
               <a:ext uri="{FF2B5EF4-FFF2-40B4-BE49-F238E27FC236}">
-                <a16:creationId xmlns:a16="http://schemas.microsoft.com/office/drawing/2014/main" id="{00097D50-5ACB-4FDD-50C2-902AABD801B5}"/>
+                <a16:creationId xmlns:a16="http://schemas.microsoft.com/office/drawing/2014/main" id="{38434C18-E629-8B9D-4E85-3B193564F614}"/>
               </a:ext>
             </a:extLst>
           </p:cNvPr>
@@ -8132,19 +11004,126 @@
             <p:ph idx="1"/>
           </p:nvPr>
         </p:nvSpPr>
-        <p:spPr/>
+        <p:spPr>
+          <a:xfrm>
+            <a:off x="2197729" y="1346670"/>
+            <a:ext cx="7796540" cy="895621"/>
+          </a:xfrm>
+        </p:spPr>
         <p:txBody>
           <a:bodyPr/>
           <a:lstStyle/>
           <a:p>
-            <a:endParaRPr lang="en-GB"/>
-          </a:p>
-        </p:txBody>
-      </p:sp>
+            <a:r>
+              <a:rPr lang="es-ES" b="1" dirty="0" err="1"/>
+              <a:t>Fitting</a:t>
+            </a:r>
+            <a:r>
+              <a:rPr lang="es-ES" b="1" dirty="0"/>
+              <a:t> KM vs. Cox</a:t>
+            </a:r>
+            <a:r>
+              <a:rPr lang="es-ES" dirty="0"/>
+              <a:t>:</a:t>
+            </a:r>
+            <a:endParaRPr lang="en-GB" dirty="0"/>
+          </a:p>
+        </p:txBody>
+      </p:sp>
+      <p:pic>
+        <p:nvPicPr>
+          <p:cNvPr id="12" name="Picture 11">
+            <a:extLst>
+              <a:ext uri="{FF2B5EF4-FFF2-40B4-BE49-F238E27FC236}">
+                <a16:creationId xmlns:a16="http://schemas.microsoft.com/office/drawing/2014/main" id="{532A058C-1296-F864-C043-833495F099C4}"/>
+              </a:ext>
+            </a:extLst>
+          </p:cNvPr>
+          <p:cNvPicPr>
+            <a:picLocks noChangeAspect="1"/>
+          </p:cNvPicPr>
+          <p:nvPr/>
+        </p:nvPicPr>
+        <p:blipFill>
+          <a:blip r:embed="rId3"/>
+          <a:stretch>
+            <a:fillRect/>
+          </a:stretch>
+        </p:blipFill>
+        <p:spPr>
+          <a:xfrm>
+            <a:off x="7966027" y="2242291"/>
+            <a:ext cx="3291694" cy="3291694"/>
+          </a:xfrm>
+          <a:prstGeom prst="rect">
+            <a:avLst/>
+          </a:prstGeom>
+        </p:spPr>
+      </p:pic>
+      <p:pic>
+        <p:nvPicPr>
+          <p:cNvPr id="14" name="Picture 13">
+            <a:extLst>
+              <a:ext uri="{FF2B5EF4-FFF2-40B4-BE49-F238E27FC236}">
+                <a16:creationId xmlns:a16="http://schemas.microsoft.com/office/drawing/2014/main" id="{9F10B256-8BF6-112F-0323-051D9ACBEC37}"/>
+              </a:ext>
+            </a:extLst>
+          </p:cNvPr>
+          <p:cNvPicPr>
+            <a:picLocks noChangeAspect="1"/>
+          </p:cNvPicPr>
+          <p:nvPr/>
+        </p:nvPicPr>
+        <p:blipFill>
+          <a:blip r:embed="rId4"/>
+          <a:stretch>
+            <a:fillRect/>
+          </a:stretch>
+        </p:blipFill>
+        <p:spPr>
+          <a:xfrm>
+            <a:off x="1090196" y="2261359"/>
+            <a:ext cx="3272626" cy="3272626"/>
+          </a:xfrm>
+          <a:prstGeom prst="rect">
+            <a:avLst/>
+          </a:prstGeom>
+        </p:spPr>
+      </p:pic>
+      <p:pic>
+        <p:nvPicPr>
+          <p:cNvPr id="16" name="Picture 15">
+            <a:extLst>
+              <a:ext uri="{FF2B5EF4-FFF2-40B4-BE49-F238E27FC236}">
+                <a16:creationId xmlns:a16="http://schemas.microsoft.com/office/drawing/2014/main" id="{D6A81889-1B18-8808-6870-99E5DDBCAE2F}"/>
+              </a:ext>
+            </a:extLst>
+          </p:cNvPr>
+          <p:cNvPicPr>
+            <a:picLocks noChangeAspect="1"/>
+          </p:cNvPicPr>
+          <p:nvPr/>
+        </p:nvPicPr>
+        <p:blipFill>
+          <a:blip r:embed="rId5"/>
+          <a:stretch>
+            <a:fillRect/>
+          </a:stretch>
+        </p:blipFill>
+        <p:spPr>
+          <a:xfrm>
+            <a:off x="4528112" y="2242291"/>
+            <a:ext cx="3272625" cy="3272625"/>
+          </a:xfrm>
+          <a:prstGeom prst="rect">
+            <a:avLst/>
+          </a:prstGeom>
+        </p:spPr>
+      </p:pic>
     </p:spTree>
     <p:extLst>
       <p:ext uri="{BB962C8B-B14F-4D97-AF65-F5344CB8AC3E}">
-        <p14:creationId xmlns:p14="http://schemas.microsoft.com/office/powerpoint/2010/main" val="3708354059"/>
+        <p14:creationId xmlns:p14="http://schemas.microsoft.com/office/powerpoint/2010/main" val="3603686234"/>
       </p:ext>
     </p:extLst>
   </p:cSld>
@@ -8194,7 +11173,7 @@
           <a:p>
             <a:r>
               <a:rPr lang="es-ES" dirty="0" err="1"/>
-              <a:t>iii</a:t>
+              <a:t>ii</a:t>
             </a:r>
             <a:r>
               <a:rPr lang="es-ES" dirty="0"/>
@@ -8202,45 +11181,340 @@
             </a:r>
             <a:r>
               <a:rPr lang="es-ES" dirty="0" err="1"/>
-              <a:t>Linearity</a:t>
+              <a:t>Multivariate</a:t>
             </a:r>
             <a:r>
               <a:rPr lang="es-ES" dirty="0"/>
-              <a:t> test</a:t>
+              <a:t> Cox </a:t>
+            </a:r>
+            <a:r>
+              <a:rPr lang="es-ES" dirty="0" err="1"/>
+              <a:t>regression</a:t>
+            </a:r>
+            <a:r>
+              <a:rPr lang="es-ES" dirty="0"/>
+              <a:t> </a:t>
+            </a:r>
+            <a:r>
+              <a:rPr lang="es-ES" dirty="0" err="1"/>
+              <a:t>model</a:t>
+            </a:r>
+            <a:br>
+              <a:rPr lang="es-ES" dirty="0"/>
+            </a:br>
+            <a:r>
+              <a:rPr lang="es-ES" dirty="0"/>
+              <a:t>A. Base </a:t>
+            </a:r>
+            <a:r>
+              <a:rPr lang="es-ES" dirty="0" err="1"/>
+              <a:t>model</a:t>
             </a:r>
             <a:endParaRPr lang="en-GB" dirty="0"/>
           </a:p>
         </p:txBody>
       </p:sp>
-      <p:sp>
-        <p:nvSpPr>
-          <p:cNvPr id="3" name="Content Placeholder 2">
+      <p:pic>
+        <p:nvPicPr>
+          <p:cNvPr id="8" name="Picture 7">
             <a:extLst>
               <a:ext uri="{FF2B5EF4-FFF2-40B4-BE49-F238E27FC236}">
-                <a16:creationId xmlns:a16="http://schemas.microsoft.com/office/drawing/2014/main" id="{00097D50-5ACB-4FDD-50C2-902AABD801B5}"/>
+                <a16:creationId xmlns:a16="http://schemas.microsoft.com/office/drawing/2014/main" id="{A30CBB7A-1EB9-0A6D-51B4-3AC5B27C270F}"/>
               </a:ext>
             </a:extLst>
           </p:cNvPr>
-          <p:cNvSpPr>
-            <a:spLocks noGrp="1"/>
-          </p:cNvSpPr>
-          <p:nvPr>
-            <p:ph idx="1"/>
-          </p:nvPr>
-        </p:nvSpPr>
-        <p:spPr/>
-        <p:txBody>
-          <a:bodyPr/>
+          <p:cNvPicPr>
+            <a:picLocks noChangeAspect="1"/>
+          </p:cNvPicPr>
+          <p:nvPr/>
+        </p:nvPicPr>
+        <p:blipFill>
+          <a:blip r:embed="rId3"/>
+          <a:stretch>
+            <a:fillRect/>
+          </a:stretch>
+        </p:blipFill>
+        <p:spPr>
+          <a:xfrm>
+            <a:off x="1168921" y="1572135"/>
+            <a:ext cx="6059905" cy="479921"/>
+          </a:xfrm>
+          <a:prstGeom prst="rect">
+            <a:avLst/>
+          </a:prstGeom>
+        </p:spPr>
+      </p:pic>
+      <p:pic>
+        <p:nvPicPr>
+          <p:cNvPr id="10" name="Picture 9">
+            <a:extLst>
+              <a:ext uri="{FF2B5EF4-FFF2-40B4-BE49-F238E27FC236}">
+                <a16:creationId xmlns:a16="http://schemas.microsoft.com/office/drawing/2014/main" id="{93918629-06E7-5106-3F99-C27FCC165D06}"/>
+              </a:ext>
+            </a:extLst>
+          </p:cNvPr>
+          <p:cNvPicPr>
+            <a:picLocks noChangeAspect="1"/>
+          </p:cNvPicPr>
+          <p:nvPr/>
+        </p:nvPicPr>
+        <p:blipFill>
+          <a:blip r:embed="rId4"/>
+          <a:stretch>
+            <a:fillRect/>
+          </a:stretch>
+        </p:blipFill>
+        <p:spPr>
+          <a:xfrm>
+            <a:off x="1168921" y="2195813"/>
+            <a:ext cx="6059905" cy="3540981"/>
+          </a:xfrm>
+          <a:prstGeom prst="rect">
+            <a:avLst/>
+          </a:prstGeom>
+        </p:spPr>
+      </p:pic>
+      <p:pic>
+        <p:nvPicPr>
+          <p:cNvPr id="18" name="Picture 17">
+            <a:extLst>
+              <a:ext uri="{FF2B5EF4-FFF2-40B4-BE49-F238E27FC236}">
+                <a16:creationId xmlns:a16="http://schemas.microsoft.com/office/drawing/2014/main" id="{279F2486-289C-FE77-D752-22634B8DAECD}"/>
+              </a:ext>
+            </a:extLst>
+          </p:cNvPr>
+          <p:cNvPicPr>
+            <a:picLocks noChangeAspect="1"/>
+          </p:cNvPicPr>
+          <p:nvPr/>
+        </p:nvPicPr>
+        <p:blipFill>
+          <a:blip r:embed="rId5"/>
+          <a:stretch>
+            <a:fillRect/>
+          </a:stretch>
+        </p:blipFill>
+        <p:spPr>
+          <a:xfrm>
+            <a:off x="7342399" y="1892022"/>
+            <a:ext cx="3093988" cy="160034"/>
+          </a:xfrm>
+          <a:prstGeom prst="rect">
+            <a:avLst/>
+          </a:prstGeom>
+        </p:spPr>
+      </p:pic>
+      <p:pic>
+        <p:nvPicPr>
+          <p:cNvPr id="24" name="Picture 23">
+            <a:extLst>
+              <a:ext uri="{FF2B5EF4-FFF2-40B4-BE49-F238E27FC236}">
+                <a16:creationId xmlns:a16="http://schemas.microsoft.com/office/drawing/2014/main" id="{EADBC34E-9B58-7E6E-2D57-D76381B3C42B}"/>
+              </a:ext>
+            </a:extLst>
+          </p:cNvPr>
+          <p:cNvPicPr>
+            <a:picLocks noChangeAspect="1"/>
+          </p:cNvPicPr>
+          <p:nvPr/>
+        </p:nvPicPr>
+        <p:blipFill>
+          <a:blip r:embed="rId6"/>
+          <a:stretch>
+            <a:fillRect/>
+          </a:stretch>
+        </p:blipFill>
+        <p:spPr>
+          <a:xfrm>
+            <a:off x="7342399" y="2195812"/>
+            <a:ext cx="3907290" cy="3540982"/>
+          </a:xfrm>
+          <a:prstGeom prst="rect">
+            <a:avLst/>
+          </a:prstGeom>
+        </p:spPr>
+      </p:pic>
+      <p:sp>
+        <p:nvSpPr>
+          <p:cNvPr id="27" name="TextBox 26">
+            <a:extLst>
+              <a:ext uri="{FF2B5EF4-FFF2-40B4-BE49-F238E27FC236}">
+                <a16:creationId xmlns:a16="http://schemas.microsoft.com/office/drawing/2014/main" id="{453E651C-77D0-0470-10FA-8D90E1A97A08}"/>
+              </a:ext>
+            </a:extLst>
+          </p:cNvPr>
+          <p:cNvSpPr txBox="1"/>
+          <p:nvPr/>
+        </p:nvSpPr>
+        <p:spPr>
+          <a:xfrm>
+            <a:off x="1168921" y="5880550"/>
+            <a:ext cx="8517698" cy="923330"/>
+          </a:xfrm>
+          <a:prstGeom prst="rect">
+            <a:avLst/>
+          </a:prstGeom>
+          <a:noFill/>
+        </p:spPr>
+        <p:txBody>
+          <a:bodyPr wrap="square" rtlCol="0">
+            <a:spAutoFit/>
+          </a:bodyPr>
           <a:lstStyle/>
           <a:p>
-            <a:endParaRPr lang="en-GB"/>
+            <a:r>
+              <a:rPr lang="es-ES" dirty="0" err="1"/>
+              <a:t>Significant</a:t>
+            </a:r>
+            <a:r>
+              <a:rPr lang="es-ES" dirty="0"/>
+              <a:t> </a:t>
+            </a:r>
+            <a:r>
+              <a:rPr lang="es-ES" dirty="0" err="1"/>
+              <a:t>risk</a:t>
+            </a:r>
+            <a:r>
+              <a:rPr lang="es-ES" dirty="0"/>
+              <a:t> </a:t>
+            </a:r>
+            <a:r>
+              <a:rPr lang="es-ES" dirty="0" err="1"/>
+              <a:t>factors</a:t>
+            </a:r>
+            <a:r>
+              <a:rPr lang="es-ES" dirty="0"/>
+              <a:t>: </a:t>
+            </a:r>
+            <a:r>
+              <a:rPr lang="es-ES" i="1" dirty="0">
+                <a:solidFill>
+                  <a:srgbClr val="FFFF00"/>
+                </a:solidFill>
+              </a:rPr>
+              <a:t>Age</a:t>
+            </a:r>
+            <a:r>
+              <a:rPr lang="es-ES" dirty="0"/>
+              <a:t>, </a:t>
+            </a:r>
+            <a:r>
+              <a:rPr lang="es-ES" i="1" dirty="0" err="1">
+                <a:solidFill>
+                  <a:srgbClr val="FFFF00"/>
+                </a:solidFill>
+              </a:rPr>
+              <a:t>Creatinine</a:t>
+            </a:r>
+            <a:r>
+              <a:rPr lang="es-ES" dirty="0"/>
+              <a:t>, </a:t>
+            </a:r>
+            <a:r>
+              <a:rPr lang="es-ES" i="1" dirty="0">
+                <a:solidFill>
+                  <a:srgbClr val="FFFF00"/>
+                </a:solidFill>
+              </a:rPr>
+              <a:t>BP</a:t>
+            </a:r>
+            <a:r>
+              <a:rPr lang="es-ES" dirty="0"/>
+              <a:t>, </a:t>
+            </a:r>
+            <a:r>
+              <a:rPr lang="es-ES" i="1" dirty="0" err="1">
+                <a:solidFill>
+                  <a:srgbClr val="FFFF00"/>
+                </a:solidFill>
+              </a:rPr>
+              <a:t>Anaemia</a:t>
+            </a:r>
+            <a:endParaRPr lang="es-ES" i="1" dirty="0">
+              <a:solidFill>
+                <a:srgbClr val="FFFF00"/>
+              </a:solidFill>
+            </a:endParaRPr>
+          </a:p>
+          <a:p>
+            <a:r>
+              <a:rPr lang="es-ES" dirty="0" err="1"/>
+              <a:t>Significant</a:t>
+            </a:r>
+            <a:r>
+              <a:rPr lang="es-ES" dirty="0"/>
+              <a:t> </a:t>
+            </a:r>
+            <a:r>
+              <a:rPr lang="es-ES" dirty="0" err="1"/>
+              <a:t>protective</a:t>
+            </a:r>
+            <a:r>
+              <a:rPr lang="es-ES" dirty="0"/>
+              <a:t> </a:t>
+            </a:r>
+            <a:r>
+              <a:rPr lang="es-ES" dirty="0" err="1"/>
+              <a:t>factors</a:t>
+            </a:r>
+            <a:r>
+              <a:rPr lang="es-ES" dirty="0"/>
+              <a:t>: </a:t>
+            </a:r>
+            <a:r>
+              <a:rPr lang="es-ES" i="1" dirty="0" err="1">
+                <a:solidFill>
+                  <a:srgbClr val="FFFF00"/>
+                </a:solidFill>
+              </a:rPr>
+              <a:t>Ejection.Fraction</a:t>
+            </a:r>
+            <a:r>
+              <a:rPr lang="es-ES" dirty="0"/>
+              <a:t>,</a:t>
+            </a:r>
+          </a:p>
+          <a:p>
+            <a:r>
+              <a:rPr lang="es-ES" dirty="0" err="1"/>
+              <a:t>Borderline</a:t>
+            </a:r>
+            <a:r>
+              <a:rPr lang="es-ES" dirty="0"/>
+              <a:t> cases: </a:t>
+            </a:r>
+            <a:r>
+              <a:rPr lang="es-ES" i="1" dirty="0" err="1">
+                <a:solidFill>
+                  <a:srgbClr val="FFFF00"/>
+                </a:solidFill>
+              </a:rPr>
+              <a:t>Sodium</a:t>
+            </a:r>
+            <a:r>
+              <a:rPr lang="es-ES" dirty="0"/>
+              <a:t>, </a:t>
+            </a:r>
+            <a:r>
+              <a:rPr lang="es-ES" i="1" dirty="0">
+                <a:solidFill>
+                  <a:srgbClr val="FFFF00"/>
+                </a:solidFill>
+              </a:rPr>
+              <a:t>CPK</a:t>
+            </a:r>
+            <a:r>
+              <a:rPr lang="es-ES" dirty="0"/>
+              <a:t> </a:t>
+            </a:r>
+            <a:endParaRPr lang="en-GB" dirty="0"/>
           </a:p>
         </p:txBody>
       </p:sp>
     </p:spTree>
     <p:extLst>
       <p:ext uri="{BB962C8B-B14F-4D97-AF65-F5344CB8AC3E}">
-        <p14:creationId xmlns:p14="http://schemas.microsoft.com/office/powerpoint/2010/main" val="3148376159"/>
+        <p14:creationId xmlns:p14="http://schemas.microsoft.com/office/powerpoint/2010/main" val="2082576824"/>
       </p:ext>
     </p:extLst>
   </p:cSld>

</xml_diff>

<commit_message>
final updates on presentation
</commit_message>
<xml_diff>
--- a/presentation.pptx
+++ b/presentation.pptx
@@ -5,7 +5,7 @@
     <p:sldMasterId id="2147483672" r:id="rId1"/>
   </p:sldMasterIdLst>
   <p:notesMasterIdLst>
-    <p:notesMasterId r:id="rId26"/>
+    <p:notesMasterId r:id="rId25"/>
   </p:notesMasterIdLst>
   <p:sldIdLst>
     <p:sldId id="256" r:id="rId2"/>
@@ -17,21 +17,20 @@
     <p:sldId id="267" r:id="rId8"/>
     <p:sldId id="269" r:id="rId9"/>
     <p:sldId id="271" r:id="rId10"/>
-    <p:sldId id="282" r:id="rId11"/>
-    <p:sldId id="259" r:id="rId12"/>
-    <p:sldId id="272" r:id="rId13"/>
-    <p:sldId id="273" r:id="rId14"/>
-    <p:sldId id="274" r:id="rId15"/>
-    <p:sldId id="260" r:id="rId16"/>
-    <p:sldId id="276" r:id="rId17"/>
-    <p:sldId id="261" r:id="rId18"/>
-    <p:sldId id="277" r:id="rId19"/>
-    <p:sldId id="278" r:id="rId20"/>
-    <p:sldId id="280" r:id="rId21"/>
-    <p:sldId id="283" r:id="rId22"/>
-    <p:sldId id="262" r:id="rId23"/>
-    <p:sldId id="284" r:id="rId24"/>
-    <p:sldId id="263" r:id="rId25"/>
+    <p:sldId id="259" r:id="rId11"/>
+    <p:sldId id="272" r:id="rId12"/>
+    <p:sldId id="273" r:id="rId13"/>
+    <p:sldId id="274" r:id="rId14"/>
+    <p:sldId id="260" r:id="rId15"/>
+    <p:sldId id="276" r:id="rId16"/>
+    <p:sldId id="261" r:id="rId17"/>
+    <p:sldId id="277" r:id="rId18"/>
+    <p:sldId id="278" r:id="rId19"/>
+    <p:sldId id="280" r:id="rId20"/>
+    <p:sldId id="283" r:id="rId21"/>
+    <p:sldId id="262" r:id="rId22"/>
+    <p:sldId id="284" r:id="rId23"/>
+    <p:sldId id="263" r:id="rId24"/>
   </p:sldIdLst>
   <p:sldSz cx="12192000" cy="6858000"/>
   <p:notesSz cx="6858000" cy="9144000"/>
@@ -1779,7 +1778,7 @@
           <a:p>
             <a:fld id="{0C8215FD-C011-40F7-B8C6-36FA60F83152}" type="datetimeFigureOut">
               <a:rPr lang="en-GB" smtClean="0"/>
-              <a:t>04/06/2023</a:t>
+              <a:t>06/06/2023</a:t>
             </a:fld>
             <a:endParaRPr lang="en-GB"/>
           </a:p>
@@ -2176,76 +2175,40 @@
           <a:lstStyle/>
           <a:p>
             <a:r>
-              <a:rPr lang="es-ES" dirty="0" err="1"/>
-              <a:t>For</a:t>
-            </a:r>
-            <a:r>
-              <a:rPr lang="es-ES" dirty="0"/>
-              <a:t> CPK, </a:t>
-            </a:r>
-            <a:r>
-              <a:rPr lang="es-ES" dirty="0" err="1"/>
-              <a:t>the</a:t>
-            </a:r>
-            <a:r>
-              <a:rPr lang="es-ES" dirty="0"/>
-              <a:t> </a:t>
-            </a:r>
-            <a:r>
-              <a:rPr lang="es-ES" dirty="0" err="1"/>
-              <a:t>exact</a:t>
-            </a:r>
-            <a:r>
-              <a:rPr lang="es-ES" dirty="0"/>
-              <a:t> </a:t>
-            </a:r>
-            <a:r>
-              <a:rPr lang="es-ES" dirty="0" err="1"/>
-              <a:t>value</a:t>
-            </a:r>
-            <a:r>
-              <a:rPr lang="es-ES" dirty="0"/>
-              <a:t> </a:t>
-            </a:r>
-            <a:r>
-              <a:rPr lang="es-ES" dirty="0" err="1"/>
-              <a:t>is</a:t>
-            </a:r>
-            <a:r>
-              <a:rPr lang="es-ES" dirty="0"/>
-              <a:t>: </a:t>
-            </a:r>
-            <a:r>
-              <a:rPr lang="es-ES" dirty="0" err="1"/>
-              <a:t>exp</a:t>
-            </a:r>
-            <a:r>
-              <a:rPr lang="es-ES" dirty="0"/>
-              <a:t>(</a:t>
-            </a:r>
-            <a:r>
-              <a:rPr lang="es-ES" dirty="0" err="1"/>
-              <a:t>coef</a:t>
-            </a:r>
-            <a:r>
-              <a:rPr lang="es-ES" dirty="0"/>
-              <a:t>) = 1.000221 -&gt; </a:t>
-            </a:r>
-            <a:r>
-              <a:rPr lang="es-ES" dirty="0" err="1"/>
-              <a:t>significant</a:t>
-            </a:r>
-            <a:r>
-              <a:rPr lang="es-ES" dirty="0"/>
-              <a:t> </a:t>
-            </a:r>
-            <a:r>
-              <a:rPr lang="es-ES" dirty="0" err="1"/>
-              <a:t>risk</a:t>
-            </a:r>
-            <a:r>
-              <a:rPr lang="es-ES" dirty="0"/>
-              <a:t> factor</a:t>
+              <a:rPr lang="es-ES" dirty="0"/>
+              <a:t>DONE: </a:t>
+            </a:r>
+            <a:r>
+              <a:rPr lang="es-ES" dirty="0" err="1"/>
+              <a:t>add</a:t>
+            </a:r>
+            <a:r>
+              <a:rPr lang="es-ES" dirty="0"/>
+              <a:t> </a:t>
+            </a:r>
+            <a:r>
+              <a:rPr lang="es-ES" dirty="0" err="1"/>
+              <a:t>legend</a:t>
+            </a:r>
+            <a:r>
+              <a:rPr lang="es-ES" dirty="0"/>
+              <a:t> and </a:t>
+            </a:r>
+            <a:r>
+              <a:rPr lang="es-ES" dirty="0" err="1"/>
+              <a:t>change</a:t>
+            </a:r>
+            <a:r>
+              <a:rPr lang="es-ES" dirty="0"/>
+              <a:t> color </a:t>
+            </a:r>
+            <a:r>
+              <a:rPr lang="es-ES" dirty="0" err="1"/>
+              <a:t>of</a:t>
+            </a:r>
+            <a:r>
+              <a:rPr lang="es-ES" dirty="0"/>
+              <a:t> KM</a:t>
             </a:r>
             <a:endParaRPr lang="en-GB" dirty="0"/>
           </a:p>
@@ -2277,7 +2240,7 @@
     </p:spTree>
     <p:extLst>
       <p:ext uri="{BB962C8B-B14F-4D97-AF65-F5344CB8AC3E}">
-        <p14:creationId xmlns:p14="http://schemas.microsoft.com/office/powerpoint/2010/main" val="2652534523"/>
+        <p14:creationId xmlns:p14="http://schemas.microsoft.com/office/powerpoint/2010/main" val="2530224052"/>
       </p:ext>
     </p:extLst>
   </p:cSld>
@@ -2331,42 +2294,98 @@
           <a:bodyPr/>
           <a:lstStyle/>
           <a:p>
-            <a:r>
-              <a:rPr lang="es-ES" dirty="0"/>
-              <a:t>DONE: </a:t>
-            </a:r>
-            <a:r>
-              <a:rPr lang="es-ES" dirty="0" err="1"/>
-              <a:t>add</a:t>
-            </a:r>
-            <a:r>
-              <a:rPr lang="es-ES" dirty="0"/>
-              <a:t> </a:t>
-            </a:r>
-            <a:r>
-              <a:rPr lang="es-ES" dirty="0" err="1"/>
-              <a:t>legend</a:t>
-            </a:r>
-            <a:r>
-              <a:rPr lang="es-ES" dirty="0"/>
-              <a:t> and </a:t>
-            </a:r>
-            <a:r>
-              <a:rPr lang="es-ES" dirty="0" err="1"/>
-              <a:t>change</a:t>
-            </a:r>
-            <a:r>
-              <a:rPr lang="es-ES" dirty="0"/>
-              <a:t> color </a:t>
-            </a:r>
-            <a:r>
-              <a:rPr lang="es-ES" dirty="0" err="1"/>
-              <a:t>of</a:t>
-            </a:r>
-            <a:r>
-              <a:rPr lang="es-ES" dirty="0"/>
-              <a:t> KM</a:t>
-            </a:r>
+            <a:pPr marL="0" marR="0" lvl="0" indent="0" algn="l" defTabSz="914400" rtl="0" eaLnBrk="1" fontAlgn="auto" latinLnBrk="0" hangingPunct="1">
+              <a:lnSpc>
+                <a:spcPct val="100000"/>
+              </a:lnSpc>
+              <a:spcBef>
+                <a:spcPts val="0"/>
+              </a:spcBef>
+              <a:spcAft>
+                <a:spcPts val="0"/>
+              </a:spcAft>
+              <a:buClrTx/>
+              <a:buSzTx/>
+              <a:buFontTx/>
+              <a:buNone/>
+              <a:tabLst/>
+              <a:defRPr/>
+            </a:pPr>
+            <a:r>
+              <a:rPr lang="es-ES" dirty="0" err="1"/>
+              <a:t>For</a:t>
+            </a:r>
+            <a:r>
+              <a:rPr lang="es-ES" dirty="0"/>
+              <a:t> CPK, </a:t>
+            </a:r>
+            <a:r>
+              <a:rPr lang="es-ES" dirty="0" err="1"/>
+              <a:t>the</a:t>
+            </a:r>
+            <a:r>
+              <a:rPr lang="es-ES" dirty="0"/>
+              <a:t> </a:t>
+            </a:r>
+            <a:r>
+              <a:rPr lang="es-ES" dirty="0" err="1"/>
+              <a:t>exact</a:t>
+            </a:r>
+            <a:r>
+              <a:rPr lang="es-ES" dirty="0"/>
+              <a:t> </a:t>
+            </a:r>
+            <a:r>
+              <a:rPr lang="es-ES" dirty="0" err="1"/>
+              <a:t>value</a:t>
+            </a:r>
+            <a:r>
+              <a:rPr lang="es-ES" dirty="0"/>
+              <a:t> </a:t>
+            </a:r>
+            <a:r>
+              <a:rPr lang="es-ES" dirty="0" err="1"/>
+              <a:t>is</a:t>
+            </a:r>
+            <a:r>
+              <a:rPr lang="es-ES" dirty="0"/>
+              <a:t>: </a:t>
+            </a:r>
+            <a:r>
+              <a:rPr lang="es-ES" dirty="0" err="1"/>
+              <a:t>exp</a:t>
+            </a:r>
+            <a:r>
+              <a:rPr lang="es-ES" dirty="0"/>
+              <a:t>(</a:t>
+            </a:r>
+            <a:r>
+              <a:rPr lang="es-ES" dirty="0" err="1"/>
+              <a:t>coef</a:t>
+            </a:r>
+            <a:r>
+              <a:rPr lang="es-ES" dirty="0"/>
+              <a:t>) = 1.000221 -&gt; </a:t>
+            </a:r>
+            <a:r>
+              <a:rPr lang="es-ES" dirty="0" err="1"/>
+              <a:t>significant</a:t>
+            </a:r>
+            <a:r>
+              <a:rPr lang="es-ES" dirty="0"/>
+              <a:t> </a:t>
+            </a:r>
+            <a:r>
+              <a:rPr lang="es-ES" dirty="0" err="1"/>
+              <a:t>risk</a:t>
+            </a:r>
+            <a:r>
+              <a:rPr lang="es-ES" dirty="0"/>
+              <a:t> factor</a:t>
+            </a:r>
+            <a:endParaRPr lang="en-GB" dirty="0"/>
+          </a:p>
+          <a:p>
             <a:endParaRPr lang="en-GB" dirty="0"/>
           </a:p>
         </p:txBody>
@@ -2397,7 +2416,7 @@
     </p:spTree>
     <p:extLst>
       <p:ext uri="{BB962C8B-B14F-4D97-AF65-F5344CB8AC3E}">
-        <p14:creationId xmlns:p14="http://schemas.microsoft.com/office/powerpoint/2010/main" val="2530224052"/>
+        <p14:creationId xmlns:p14="http://schemas.microsoft.com/office/powerpoint/2010/main" val="3430114397"/>
       </p:ext>
     </p:extLst>
   </p:cSld>
@@ -2451,30 +2470,17 @@
           <a:bodyPr/>
           <a:lstStyle/>
           <a:p>
-            <a:pPr marL="0" marR="0" lvl="0" indent="0" algn="l" defTabSz="914400" rtl="0" eaLnBrk="1" fontAlgn="auto" latinLnBrk="0" hangingPunct="1">
-              <a:lnSpc>
-                <a:spcPct val="100000"/>
-              </a:lnSpc>
-              <a:spcBef>
-                <a:spcPts val="0"/>
-              </a:spcBef>
-              <a:spcAft>
-                <a:spcPts val="0"/>
-              </a:spcAft>
-              <a:buClrTx/>
-              <a:buSzTx/>
-              <a:buFontTx/>
-              <a:buNone/>
-              <a:tabLst/>
-              <a:defRPr/>
-            </a:pPr>
-            <a:r>
-              <a:rPr lang="es-ES" dirty="0" err="1"/>
-              <a:t>For</a:t>
-            </a:r>
-            <a:r>
-              <a:rPr lang="es-ES" dirty="0"/>
-              <a:t> CPK, </a:t>
+            <a:r>
+              <a:rPr lang="es-ES" dirty="0"/>
+              <a:t>SOLVED: </a:t>
+            </a:r>
+            <a:r>
+              <a:rPr lang="es-ES" dirty="0" err="1"/>
+              <a:t>Globally</a:t>
+            </a:r>
+            <a:r>
+              <a:rPr lang="es-ES" dirty="0"/>
+              <a:t>, </a:t>
             </a:r>
             <a:r>
               <a:rPr lang="es-ES" dirty="0" err="1"/>
@@ -2482,67 +2488,235 @@
             </a:r>
             <a:r>
               <a:rPr lang="es-ES" dirty="0"/>
-              <a:t> </a:t>
-            </a:r>
-            <a:r>
-              <a:rPr lang="es-ES" dirty="0" err="1"/>
-              <a:t>exact</a:t>
-            </a:r>
-            <a:r>
-              <a:rPr lang="es-ES" dirty="0"/>
-              <a:t> </a:t>
-            </a:r>
-            <a:r>
-              <a:rPr lang="es-ES" dirty="0" err="1"/>
-              <a:t>value</a:t>
-            </a:r>
-            <a:r>
-              <a:rPr lang="es-ES" dirty="0"/>
-              <a:t> </a:t>
-            </a:r>
-            <a:r>
-              <a:rPr lang="es-ES" dirty="0" err="1"/>
-              <a:t>is</a:t>
-            </a:r>
-            <a:r>
-              <a:rPr lang="es-ES" dirty="0"/>
-              <a:t>: </a:t>
-            </a:r>
-            <a:r>
-              <a:rPr lang="es-ES" dirty="0" err="1"/>
-              <a:t>exp</a:t>
-            </a:r>
-            <a:r>
-              <a:rPr lang="es-ES" dirty="0"/>
-              <a:t>(</a:t>
-            </a:r>
-            <a:r>
-              <a:rPr lang="es-ES" dirty="0" err="1"/>
-              <a:t>coef</a:t>
-            </a:r>
-            <a:r>
-              <a:rPr lang="es-ES" dirty="0"/>
-              <a:t>) = 1.000221 -&gt; </a:t>
-            </a:r>
-            <a:r>
-              <a:rPr lang="es-ES" dirty="0" err="1"/>
-              <a:t>significant</a:t>
-            </a:r>
-            <a:r>
-              <a:rPr lang="es-ES" dirty="0"/>
-              <a:t> </a:t>
-            </a:r>
-            <a:r>
-              <a:rPr lang="es-ES" dirty="0" err="1"/>
-              <a:t>risk</a:t>
-            </a:r>
-            <a:r>
-              <a:rPr lang="es-ES" dirty="0"/>
-              <a:t> factor</a:t>
-            </a:r>
-            <a:endParaRPr lang="en-GB" dirty="0"/>
-          </a:p>
-          <a:p>
+              <a:t> PH </a:t>
+            </a:r>
+            <a:r>
+              <a:rPr lang="es-ES" dirty="0" err="1"/>
+              <a:t>assumptions</a:t>
+            </a:r>
+            <a:r>
+              <a:rPr lang="es-ES" dirty="0"/>
+              <a:t> </a:t>
+            </a:r>
+            <a:r>
+              <a:rPr lang="es-ES" dirty="0" err="1"/>
+              <a:t>holds</a:t>
+            </a:r>
+            <a:r>
+              <a:rPr lang="es-ES" dirty="0"/>
+              <a:t>, </a:t>
+            </a:r>
+            <a:r>
+              <a:rPr lang="es-ES" dirty="0" err="1"/>
+              <a:t>but</a:t>
+            </a:r>
+            <a:r>
+              <a:rPr lang="es-ES" dirty="0"/>
+              <a:t> </a:t>
+            </a:r>
+            <a:r>
+              <a:rPr lang="es-ES" dirty="0" err="1"/>
+              <a:t>all</a:t>
+            </a:r>
+            <a:r>
+              <a:rPr lang="es-ES" dirty="0"/>
+              <a:t> </a:t>
+            </a:r>
+            <a:r>
+              <a:rPr lang="es-ES" dirty="0" err="1"/>
+              <a:t>our</a:t>
+            </a:r>
+            <a:r>
+              <a:rPr lang="es-ES" dirty="0"/>
+              <a:t> </a:t>
+            </a:r>
+            <a:r>
+              <a:rPr lang="es-ES" dirty="0" err="1"/>
+              <a:t>residuals</a:t>
+            </a:r>
+            <a:r>
+              <a:rPr lang="es-ES" dirty="0"/>
+              <a:t> look </a:t>
+            </a:r>
+            <a:r>
+              <a:rPr lang="es-ES" dirty="0" err="1"/>
+              <a:t>pretty</a:t>
+            </a:r>
+            <a:r>
+              <a:rPr lang="es-ES" dirty="0"/>
+              <a:t> non-</a:t>
+            </a:r>
+            <a:r>
+              <a:rPr lang="es-ES" dirty="0" err="1"/>
+              <a:t>constant</a:t>
+            </a:r>
+            <a:r>
+              <a:rPr lang="es-ES" dirty="0"/>
+              <a:t>. </a:t>
+            </a:r>
+            <a:r>
+              <a:rPr lang="es-ES" dirty="0" err="1"/>
+              <a:t>How</a:t>
+            </a:r>
+            <a:r>
+              <a:rPr lang="es-ES" dirty="0"/>
+              <a:t> </a:t>
+            </a:r>
+            <a:r>
+              <a:rPr lang="es-ES" dirty="0" err="1"/>
+              <a:t>does</a:t>
+            </a:r>
+            <a:r>
+              <a:rPr lang="es-ES" dirty="0"/>
+              <a:t> </a:t>
+            </a:r>
+            <a:r>
+              <a:rPr lang="es-ES" dirty="0" err="1"/>
+              <a:t>that</a:t>
+            </a:r>
+            <a:r>
+              <a:rPr lang="es-ES" dirty="0"/>
+              <a:t> </a:t>
+            </a:r>
+            <a:r>
+              <a:rPr lang="es-ES" dirty="0" err="1"/>
+              <a:t>fit</a:t>
+            </a:r>
+            <a:r>
+              <a:rPr lang="es-ES" dirty="0"/>
+              <a:t> </a:t>
+            </a:r>
+            <a:r>
+              <a:rPr lang="es-ES" dirty="0" err="1"/>
+              <a:t>together</a:t>
+            </a:r>
+            <a:r>
+              <a:rPr lang="es-ES" dirty="0"/>
+              <a:t>? -&gt; 1) </a:t>
+            </a:r>
+            <a:r>
+              <a:rPr lang="es-ES" dirty="0" err="1"/>
+              <a:t>depends</a:t>
+            </a:r>
+            <a:r>
+              <a:rPr lang="es-ES" dirty="0"/>
+              <a:t> </a:t>
+            </a:r>
+            <a:r>
+              <a:rPr lang="es-ES" dirty="0" err="1"/>
+              <a:t>on</a:t>
+            </a:r>
+            <a:r>
+              <a:rPr lang="es-ES" dirty="0"/>
+              <a:t> </a:t>
+            </a:r>
+            <a:r>
+              <a:rPr lang="es-ES" dirty="0" err="1"/>
+              <a:t>the</a:t>
+            </a:r>
+            <a:r>
+              <a:rPr lang="es-ES" dirty="0"/>
+              <a:t> </a:t>
+            </a:r>
+            <a:r>
+              <a:rPr lang="es-ES" dirty="0" err="1"/>
+              <a:t>scale</a:t>
+            </a:r>
+            <a:r>
+              <a:rPr lang="es-ES" dirty="0"/>
+              <a:t>, 2) </a:t>
+            </a:r>
+            <a:r>
+              <a:rPr lang="es-ES" dirty="0" err="1"/>
+              <a:t>CIs</a:t>
+            </a:r>
+            <a:r>
+              <a:rPr lang="es-ES" dirty="0"/>
+              <a:t> </a:t>
+            </a:r>
+            <a:r>
+              <a:rPr lang="es-ES" dirty="0" err="1"/>
+              <a:t>seem</a:t>
+            </a:r>
+            <a:r>
+              <a:rPr lang="es-ES" dirty="0"/>
+              <a:t> </a:t>
+            </a:r>
+            <a:r>
+              <a:rPr lang="es-ES" dirty="0" err="1"/>
+              <a:t>to</a:t>
+            </a:r>
+            <a:r>
+              <a:rPr lang="es-ES" dirty="0"/>
+              <a:t> </a:t>
+            </a:r>
+            <a:r>
+              <a:rPr lang="es-ES" dirty="0" err="1"/>
+              <a:t>include</a:t>
+            </a:r>
+            <a:r>
+              <a:rPr lang="es-ES" dirty="0"/>
+              <a:t> a </a:t>
+            </a:r>
+            <a:r>
+              <a:rPr lang="es-ES" dirty="0" err="1"/>
+              <a:t>constant</a:t>
+            </a:r>
+            <a:r>
+              <a:rPr lang="es-ES" dirty="0"/>
+              <a:t> line</a:t>
+            </a:r>
+          </a:p>
+          <a:p>
+            <a:endParaRPr lang="es-ES" dirty="0"/>
+          </a:p>
+          <a:p>
+            <a:r>
+              <a:rPr lang="es-ES" dirty="0"/>
+              <a:t>H0: </a:t>
+            </a:r>
+            <a:r>
+              <a:rPr lang="es-ES" dirty="0" err="1"/>
+              <a:t>Proportional</a:t>
+            </a:r>
+            <a:r>
+              <a:rPr lang="es-ES" dirty="0"/>
+              <a:t> Hazard</a:t>
+            </a:r>
+          </a:p>
+          <a:p>
+            <a:r>
+              <a:rPr lang="es-ES" dirty="0"/>
+              <a:t>-&gt; </a:t>
+            </a:r>
+            <a:r>
+              <a:rPr lang="es-ES" dirty="0" err="1"/>
+              <a:t>rejected</a:t>
+            </a:r>
+            <a:r>
+              <a:rPr lang="es-ES" dirty="0"/>
+              <a:t> </a:t>
+            </a:r>
+            <a:r>
+              <a:rPr lang="es-ES" dirty="0" err="1"/>
+              <a:t>for</a:t>
+            </a:r>
+            <a:r>
+              <a:rPr lang="es-ES" dirty="0"/>
+              <a:t> </a:t>
+            </a:r>
+            <a:r>
+              <a:rPr lang="es-ES" dirty="0" err="1"/>
+              <a:t>Ejection.Fraction</a:t>
+            </a:r>
+            <a:r>
+              <a:rPr lang="es-ES" dirty="0"/>
+              <a:t> </a:t>
+            </a:r>
+            <a:r>
+              <a:rPr lang="es-ES" dirty="0" err="1"/>
+              <a:t>only</a:t>
+            </a:r>
             <a:endParaRPr lang="en-GB" dirty="0"/>
           </a:p>
         </p:txBody>
@@ -2573,7 +2747,7 @@
     </p:spTree>
     <p:extLst>
       <p:ext uri="{BB962C8B-B14F-4D97-AF65-F5344CB8AC3E}">
-        <p14:creationId xmlns:p14="http://schemas.microsoft.com/office/powerpoint/2010/main" val="3430114397"/>
+        <p14:creationId xmlns:p14="http://schemas.microsoft.com/office/powerpoint/2010/main" val="388395520"/>
       </p:ext>
     </p:extLst>
   </p:cSld>
@@ -2633,7 +2807,79 @@
             </a:r>
             <a:r>
               <a:rPr lang="es-ES" dirty="0" err="1"/>
-              <a:t>Globally</a:t>
+              <a:t>We</a:t>
+            </a:r>
+            <a:r>
+              <a:rPr lang="es-ES" dirty="0"/>
+              <a:t> </a:t>
+            </a:r>
+            <a:r>
+              <a:rPr lang="es-ES" dirty="0" err="1"/>
+              <a:t>go</a:t>
+            </a:r>
+            <a:r>
+              <a:rPr lang="es-ES" dirty="0"/>
+              <a:t> </a:t>
+            </a:r>
+            <a:r>
+              <a:rPr lang="es-ES" dirty="0" err="1"/>
+              <a:t>for</a:t>
+            </a:r>
+            <a:r>
+              <a:rPr lang="es-ES" dirty="0"/>
+              <a:t> </a:t>
+            </a:r>
+            <a:r>
+              <a:rPr lang="es-ES" dirty="0" err="1"/>
+              <a:t>the</a:t>
+            </a:r>
+            <a:r>
+              <a:rPr lang="es-ES" dirty="0"/>
+              <a:t> </a:t>
+            </a:r>
+            <a:r>
+              <a:rPr lang="es-ES" dirty="0" err="1"/>
+              <a:t>model</a:t>
+            </a:r>
+            <a:r>
+              <a:rPr lang="es-ES" dirty="0"/>
+              <a:t> </a:t>
+            </a:r>
+            <a:r>
+              <a:rPr lang="es-ES" dirty="0" err="1"/>
+              <a:t>with</a:t>
+            </a:r>
+            <a:r>
+              <a:rPr lang="es-ES" dirty="0"/>
+              <a:t> log(time) </a:t>
+            </a:r>
+            <a:r>
+              <a:rPr lang="es-ES" dirty="0" err="1"/>
+              <a:t>instead</a:t>
+            </a:r>
+            <a:r>
+              <a:rPr lang="es-ES" dirty="0"/>
+              <a:t> </a:t>
+            </a:r>
+            <a:r>
+              <a:rPr lang="es-ES" dirty="0" err="1"/>
+              <a:t>of</a:t>
+            </a:r>
+            <a:r>
+              <a:rPr lang="es-ES" dirty="0"/>
+              <a:t> </a:t>
+            </a:r>
+            <a:r>
+              <a:rPr lang="es-ES" dirty="0" err="1"/>
+              <a:t>just</a:t>
+            </a:r>
+            <a:r>
+              <a:rPr lang="es-ES" dirty="0"/>
+              <a:t> time </a:t>
+            </a:r>
+            <a:r>
+              <a:rPr lang="es-ES" dirty="0" err="1"/>
+              <a:t>here</a:t>
             </a:r>
             <a:r>
               <a:rPr lang="es-ES" dirty="0"/>
@@ -2641,159 +2887,38 @@
             </a:r>
             <a:r>
               <a:rPr lang="es-ES" dirty="0" err="1"/>
-              <a:t>the</a:t>
-            </a:r>
-            <a:r>
-              <a:rPr lang="es-ES" dirty="0"/>
-              <a:t> PH </a:t>
-            </a:r>
-            <a:r>
-              <a:rPr lang="es-ES" dirty="0" err="1"/>
-              <a:t>assumptions</a:t>
-            </a:r>
-            <a:r>
-              <a:rPr lang="es-ES" dirty="0"/>
-              <a:t> </a:t>
-            </a:r>
-            <a:r>
-              <a:rPr lang="es-ES" dirty="0" err="1"/>
-              <a:t>holds</a:t>
-            </a:r>
-            <a:r>
-              <a:rPr lang="es-ES" dirty="0"/>
-              <a:t>, </a:t>
-            </a:r>
-            <a:r>
-              <a:rPr lang="es-ES" dirty="0" err="1"/>
-              <a:t>but</a:t>
-            </a:r>
-            <a:r>
-              <a:rPr lang="es-ES" dirty="0"/>
-              <a:t> </a:t>
-            </a:r>
-            <a:r>
-              <a:rPr lang="es-ES" dirty="0" err="1"/>
-              <a:t>all</a:t>
-            </a:r>
-            <a:r>
-              <a:rPr lang="es-ES" dirty="0"/>
-              <a:t> </a:t>
-            </a:r>
-            <a:r>
-              <a:rPr lang="es-ES" dirty="0" err="1"/>
-              <a:t>our</a:t>
-            </a:r>
-            <a:r>
-              <a:rPr lang="es-ES" dirty="0"/>
-              <a:t> </a:t>
-            </a:r>
-            <a:r>
-              <a:rPr lang="es-ES" dirty="0" err="1"/>
-              <a:t>residuals</a:t>
-            </a:r>
-            <a:r>
-              <a:rPr lang="es-ES" dirty="0"/>
-              <a:t> look </a:t>
-            </a:r>
-            <a:r>
-              <a:rPr lang="es-ES" dirty="0" err="1"/>
-              <a:t>pretty</a:t>
-            </a:r>
-            <a:r>
-              <a:rPr lang="es-ES" dirty="0"/>
-              <a:t> non-</a:t>
-            </a:r>
-            <a:r>
-              <a:rPr lang="es-ES" dirty="0" err="1"/>
-              <a:t>constant</a:t>
-            </a:r>
-            <a:r>
-              <a:rPr lang="es-ES" dirty="0"/>
-              <a:t>. </a:t>
-            </a:r>
-            <a:r>
-              <a:rPr lang="es-ES" dirty="0" err="1"/>
-              <a:t>How</a:t>
-            </a:r>
-            <a:r>
-              <a:rPr lang="es-ES" dirty="0"/>
-              <a:t> </a:t>
-            </a:r>
-            <a:r>
-              <a:rPr lang="es-ES" dirty="0" err="1"/>
-              <a:t>does</a:t>
-            </a:r>
-            <a:r>
-              <a:rPr lang="es-ES" dirty="0"/>
-              <a:t> </a:t>
-            </a:r>
-            <a:r>
-              <a:rPr lang="es-ES" dirty="0" err="1"/>
-              <a:t>that</a:t>
-            </a:r>
-            <a:r>
-              <a:rPr lang="es-ES" dirty="0"/>
-              <a:t> </a:t>
-            </a:r>
-            <a:r>
-              <a:rPr lang="es-ES" dirty="0" err="1"/>
-              <a:t>fit</a:t>
-            </a:r>
-            <a:r>
-              <a:rPr lang="es-ES" dirty="0"/>
-              <a:t> </a:t>
-            </a:r>
-            <a:r>
-              <a:rPr lang="es-ES" dirty="0" err="1"/>
-              <a:t>together</a:t>
-            </a:r>
-            <a:r>
-              <a:rPr lang="es-ES" dirty="0"/>
-              <a:t>? -&gt; 1) </a:t>
-            </a:r>
-            <a:r>
-              <a:rPr lang="es-ES" dirty="0" err="1"/>
-              <a:t>depends</a:t>
-            </a:r>
-            <a:r>
-              <a:rPr lang="es-ES" dirty="0"/>
-              <a:t> </a:t>
-            </a:r>
-            <a:r>
-              <a:rPr lang="es-ES" dirty="0" err="1"/>
-              <a:t>on</a:t>
-            </a:r>
-            <a:r>
-              <a:rPr lang="es-ES" dirty="0"/>
-              <a:t> </a:t>
-            </a:r>
-            <a:r>
-              <a:rPr lang="es-ES" dirty="0" err="1"/>
-              <a:t>the</a:t>
-            </a:r>
-            <a:r>
-              <a:rPr lang="es-ES" dirty="0"/>
-              <a:t> </a:t>
-            </a:r>
-            <a:r>
-              <a:rPr lang="es-ES" dirty="0" err="1"/>
-              <a:t>scale</a:t>
-            </a:r>
-            <a:r>
-              <a:rPr lang="es-ES" dirty="0"/>
-              <a:t>, 2) </a:t>
-            </a:r>
-            <a:r>
-              <a:rPr lang="es-ES" dirty="0" err="1"/>
-              <a:t>CIs</a:t>
-            </a:r>
-            <a:r>
-              <a:rPr lang="es-ES" dirty="0"/>
-              <a:t> </a:t>
-            </a:r>
-            <a:r>
-              <a:rPr lang="es-ES" dirty="0" err="1"/>
-              <a:t>seem</a:t>
+              <a:t>right</a:t>
+            </a:r>
+            <a:r>
+              <a:rPr lang="es-ES" dirty="0"/>
+              <a:t>? -&gt; yes</a:t>
+            </a:r>
+          </a:p>
+          <a:p>
+            <a:pPr marL="0" marR="0" lvl="0" indent="0" algn="l" defTabSz="914400" rtl="0" eaLnBrk="1" fontAlgn="auto" latinLnBrk="0" hangingPunct="1">
+              <a:lnSpc>
+                <a:spcPct val="100000"/>
+              </a:lnSpc>
+              <a:spcBef>
+                <a:spcPts val="0"/>
+              </a:spcBef>
+              <a:spcAft>
+                <a:spcPts val="0"/>
+              </a:spcAft>
+              <a:buClrTx/>
+              <a:buSzTx/>
+              <a:buFontTx/>
+              <a:buNone/>
+              <a:tabLst/>
+              <a:defRPr/>
+            </a:pPr>
+            <a:r>
+              <a:rPr lang="es-ES" dirty="0"/>
+              <a:t>DONE: </a:t>
+            </a:r>
+            <a:r>
+              <a:rPr lang="es-ES" dirty="0" err="1"/>
+              <a:t>change</a:t>
             </a:r>
             <a:r>
               <a:rPr lang="es-ES" dirty="0"/>
@@ -2805,24 +2930,15 @@
             </a:r>
             <a:r>
               <a:rPr lang="es-ES" dirty="0"/>
-              <a:t> </a:t>
-            </a:r>
-            <a:r>
-              <a:rPr lang="es-ES" dirty="0" err="1"/>
-              <a:t>include</a:t>
-            </a:r>
-            <a:r>
-              <a:rPr lang="es-ES" dirty="0"/>
-              <a:t> a </a:t>
-            </a:r>
-            <a:r>
-              <a:rPr lang="es-ES" dirty="0" err="1"/>
-              <a:t>constant</a:t>
-            </a:r>
-            <a:r>
-              <a:rPr lang="es-ES" dirty="0"/>
-              <a:t> line</a:t>
-            </a:r>
+              <a:t> complete time </a:t>
+            </a:r>
+            <a:r>
+              <a:rPr lang="es-ES" dirty="0" err="1"/>
+              <a:t>model</a:t>
+            </a:r>
+            <a:endParaRPr lang="en-GB" dirty="0"/>
+          </a:p>
+          <a:p>
             <a:endParaRPr lang="en-GB" dirty="0"/>
           </a:p>
         </p:txBody>
@@ -2853,7 +2969,7 @@
     </p:spTree>
     <p:extLst>
       <p:ext uri="{BB962C8B-B14F-4D97-AF65-F5344CB8AC3E}">
-        <p14:creationId xmlns:p14="http://schemas.microsoft.com/office/powerpoint/2010/main" val="388395520"/>
+        <p14:creationId xmlns:p14="http://schemas.microsoft.com/office/powerpoint/2010/main" val="1799670140"/>
       </p:ext>
     </p:extLst>
   </p:cSld>
@@ -2909,142 +3025,28 @@
           <a:p>
             <a:r>
               <a:rPr lang="es-ES" dirty="0"/>
-              <a:t>SOLVED: </a:t>
-            </a:r>
-            <a:r>
-              <a:rPr lang="es-ES" dirty="0" err="1"/>
-              <a:t>We</a:t>
-            </a:r>
-            <a:r>
-              <a:rPr lang="es-ES" dirty="0"/>
-              <a:t> </a:t>
-            </a:r>
-            <a:r>
-              <a:rPr lang="es-ES" dirty="0" err="1"/>
-              <a:t>go</a:t>
-            </a:r>
-            <a:r>
-              <a:rPr lang="es-ES" dirty="0"/>
-              <a:t> </a:t>
-            </a:r>
-            <a:r>
-              <a:rPr lang="es-ES" dirty="0" err="1"/>
-              <a:t>for</a:t>
-            </a:r>
-            <a:r>
-              <a:rPr lang="es-ES" dirty="0"/>
-              <a:t> </a:t>
-            </a:r>
-            <a:r>
-              <a:rPr lang="es-ES" dirty="0" err="1"/>
-              <a:t>the</a:t>
-            </a:r>
-            <a:r>
-              <a:rPr lang="es-ES" dirty="0"/>
-              <a:t> </a:t>
+              <a:t>DONE: </a:t>
+            </a:r>
+            <a:r>
+              <a:rPr lang="es-ES" dirty="0" err="1"/>
+              <a:t>change</a:t>
+            </a:r>
+            <a:r>
+              <a:rPr lang="es-ES" dirty="0"/>
+              <a:t> </a:t>
+            </a:r>
+            <a:r>
+              <a:rPr lang="es-ES" dirty="0" err="1"/>
+              <a:t>to</a:t>
+            </a:r>
+            <a:r>
+              <a:rPr lang="es-ES" dirty="0"/>
+              <a:t> complete time </a:t>
             </a:r>
             <a:r>
               <a:rPr lang="es-ES" dirty="0" err="1"/>
               <a:t>model</a:t>
             </a:r>
-            <a:r>
-              <a:rPr lang="es-ES" dirty="0"/>
-              <a:t> </a:t>
-            </a:r>
-            <a:r>
-              <a:rPr lang="es-ES" dirty="0" err="1"/>
-              <a:t>with</a:t>
-            </a:r>
-            <a:r>
-              <a:rPr lang="es-ES" dirty="0"/>
-              <a:t> log(time) </a:t>
-            </a:r>
-            <a:r>
-              <a:rPr lang="es-ES" dirty="0" err="1"/>
-              <a:t>instead</a:t>
-            </a:r>
-            <a:r>
-              <a:rPr lang="es-ES" dirty="0"/>
-              <a:t> </a:t>
-            </a:r>
-            <a:r>
-              <a:rPr lang="es-ES" dirty="0" err="1"/>
-              <a:t>of</a:t>
-            </a:r>
-            <a:r>
-              <a:rPr lang="es-ES" dirty="0"/>
-              <a:t> </a:t>
-            </a:r>
-            <a:r>
-              <a:rPr lang="es-ES" dirty="0" err="1"/>
-              <a:t>just</a:t>
-            </a:r>
-            <a:r>
-              <a:rPr lang="es-ES" dirty="0"/>
-              <a:t> time </a:t>
-            </a:r>
-            <a:r>
-              <a:rPr lang="es-ES" dirty="0" err="1"/>
-              <a:t>here</a:t>
-            </a:r>
-            <a:r>
-              <a:rPr lang="es-ES" dirty="0"/>
-              <a:t>, </a:t>
-            </a:r>
-            <a:r>
-              <a:rPr lang="es-ES" dirty="0" err="1"/>
-              <a:t>right</a:t>
-            </a:r>
-            <a:r>
-              <a:rPr lang="es-ES" dirty="0"/>
-              <a:t>? -&gt; yes</a:t>
-            </a:r>
-          </a:p>
-          <a:p>
-            <a:pPr marL="0" marR="0" lvl="0" indent="0" algn="l" defTabSz="914400" rtl="0" eaLnBrk="1" fontAlgn="auto" latinLnBrk="0" hangingPunct="1">
-              <a:lnSpc>
-                <a:spcPct val="100000"/>
-              </a:lnSpc>
-              <a:spcBef>
-                <a:spcPts val="0"/>
-              </a:spcBef>
-              <a:spcAft>
-                <a:spcPts val="0"/>
-              </a:spcAft>
-              <a:buClrTx/>
-              <a:buSzTx/>
-              <a:buFontTx/>
-              <a:buNone/>
-              <a:tabLst/>
-              <a:defRPr/>
-            </a:pPr>
-            <a:r>
-              <a:rPr lang="es-ES" dirty="0"/>
-              <a:t>DONE: </a:t>
-            </a:r>
-            <a:r>
-              <a:rPr lang="es-ES" dirty="0" err="1"/>
-              <a:t>change</a:t>
-            </a:r>
-            <a:r>
-              <a:rPr lang="es-ES" dirty="0"/>
-              <a:t> </a:t>
-            </a:r>
-            <a:r>
-              <a:rPr lang="es-ES" dirty="0" err="1"/>
-              <a:t>to</a:t>
-            </a:r>
-            <a:r>
-              <a:rPr lang="es-ES" dirty="0"/>
-              <a:t> complete time </a:t>
-            </a:r>
-            <a:r>
-              <a:rPr lang="es-ES" dirty="0" err="1"/>
-              <a:t>model</a:t>
-            </a:r>
-            <a:endParaRPr lang="en-GB" dirty="0"/>
-          </a:p>
-          <a:p>
             <a:endParaRPr lang="en-GB" dirty="0"/>
           </a:p>
         </p:txBody>
@@ -3075,7 +3077,7 @@
     </p:spTree>
     <p:extLst>
       <p:ext uri="{BB962C8B-B14F-4D97-AF65-F5344CB8AC3E}">
-        <p14:creationId xmlns:p14="http://schemas.microsoft.com/office/powerpoint/2010/main" val="1799670140"/>
+        <p14:creationId xmlns:p14="http://schemas.microsoft.com/office/powerpoint/2010/main" val="811532236"/>
       </p:ext>
     </p:extLst>
   </p:cSld>
@@ -3131,11 +3133,27 @@
           <a:p>
             <a:r>
               <a:rPr lang="es-ES" dirty="0"/>
-              <a:t>DONE: </a:t>
-            </a:r>
-            <a:r>
-              <a:rPr lang="es-ES" dirty="0" err="1"/>
-              <a:t>change</a:t>
+              <a:t>Note: </a:t>
+            </a:r>
+            <a:r>
+              <a:rPr lang="es-ES" dirty="0" err="1"/>
+              <a:t>Martingale</a:t>
+            </a:r>
+            <a:r>
+              <a:rPr lang="es-ES" dirty="0"/>
+              <a:t> </a:t>
+            </a:r>
+            <a:r>
+              <a:rPr lang="es-ES" dirty="0" err="1"/>
+              <a:t>residuals</a:t>
+            </a:r>
+            <a:r>
+              <a:rPr lang="es-ES" dirty="0"/>
+              <a:t> are </a:t>
+            </a:r>
+            <a:r>
+              <a:rPr lang="es-ES" dirty="0" err="1"/>
+              <a:t>useful</a:t>
             </a:r>
             <a:r>
               <a:rPr lang="es-ES" dirty="0"/>
@@ -3147,11 +3165,212 @@
             </a:r>
             <a:r>
               <a:rPr lang="es-ES" dirty="0"/>
-              <a:t> complete time </a:t>
-            </a:r>
-            <a:r>
-              <a:rPr lang="es-ES" dirty="0" err="1"/>
-              <a:t>model</a:t>
+              <a:t> </a:t>
+            </a:r>
+            <a:r>
+              <a:rPr lang="es-ES" dirty="0" err="1"/>
+              <a:t>check</a:t>
+            </a:r>
+            <a:r>
+              <a:rPr lang="es-ES" dirty="0"/>
+              <a:t> </a:t>
+            </a:r>
+            <a:r>
+              <a:rPr lang="es-ES" dirty="0" err="1"/>
+              <a:t>the</a:t>
+            </a:r>
+            <a:r>
+              <a:rPr lang="es-ES" dirty="0"/>
+              <a:t> </a:t>
+            </a:r>
+            <a:r>
+              <a:rPr lang="es-ES" dirty="0" err="1"/>
+              <a:t>linearity</a:t>
+            </a:r>
+            <a:r>
+              <a:rPr lang="es-ES" dirty="0"/>
+              <a:t> </a:t>
+            </a:r>
+            <a:r>
+              <a:rPr lang="es-ES" dirty="0" err="1"/>
+              <a:t>assumption</a:t>
+            </a:r>
+            <a:r>
+              <a:rPr lang="es-ES" dirty="0"/>
+              <a:t> as </a:t>
+            </a:r>
+            <a:r>
+              <a:rPr lang="es-ES" dirty="0" err="1"/>
+              <a:t>it</a:t>
+            </a:r>
+            <a:r>
+              <a:rPr lang="es-ES" dirty="0"/>
+              <a:t> </a:t>
+            </a:r>
+            <a:r>
+              <a:rPr lang="es-ES" dirty="0" err="1"/>
+              <a:t>gives</a:t>
+            </a:r>
+            <a:r>
+              <a:rPr lang="es-ES" dirty="0"/>
+              <a:t> </a:t>
+            </a:r>
+            <a:r>
+              <a:rPr lang="es-ES" dirty="0" err="1"/>
+              <a:t>us</a:t>
+            </a:r>
+            <a:r>
+              <a:rPr lang="es-ES" dirty="0"/>
+              <a:t> </a:t>
+            </a:r>
+            <a:r>
+              <a:rPr lang="es-ES" dirty="0" err="1"/>
+              <a:t>an</a:t>
+            </a:r>
+            <a:r>
+              <a:rPr lang="es-ES" dirty="0"/>
+              <a:t> idea </a:t>
+            </a:r>
+            <a:r>
+              <a:rPr lang="es-ES" dirty="0" err="1"/>
+              <a:t>of</a:t>
+            </a:r>
+            <a:r>
+              <a:rPr lang="es-ES" dirty="0"/>
+              <a:t> </a:t>
+            </a:r>
+            <a:r>
+              <a:rPr lang="es-ES" dirty="0" err="1"/>
+              <a:t>the</a:t>
+            </a:r>
+            <a:r>
+              <a:rPr lang="es-ES" dirty="0"/>
+              <a:t> </a:t>
+            </a:r>
+            <a:r>
+              <a:rPr lang="es-ES" dirty="0" err="1"/>
+              <a:t>effect</a:t>
+            </a:r>
+            <a:r>
+              <a:rPr lang="es-ES" dirty="0"/>
+              <a:t> </a:t>
+            </a:r>
+            <a:r>
+              <a:rPr lang="es-ES" dirty="0" err="1"/>
+              <a:t>for</a:t>
+            </a:r>
+            <a:r>
+              <a:rPr lang="es-ES" dirty="0"/>
+              <a:t> </a:t>
+            </a:r>
+            <a:r>
+              <a:rPr lang="es-ES" dirty="0" err="1"/>
+              <a:t>each</a:t>
+            </a:r>
+            <a:r>
+              <a:rPr lang="es-ES" dirty="0"/>
+              <a:t> covariate</a:t>
+            </a:r>
+          </a:p>
+          <a:p>
+            <a:endParaRPr lang="es-ES" dirty="0"/>
+          </a:p>
+          <a:p>
+            <a:r>
+              <a:rPr lang="es-ES" dirty="0" err="1"/>
+              <a:t>Question</a:t>
+            </a:r>
+            <a:r>
+              <a:rPr lang="es-ES" dirty="0"/>
+              <a:t>: </a:t>
+            </a:r>
+            <a:r>
+              <a:rPr lang="es-ES" dirty="0" err="1"/>
+              <a:t>Should</a:t>
+            </a:r>
+            <a:r>
+              <a:rPr lang="es-ES" dirty="0"/>
+              <a:t> </a:t>
+            </a:r>
+            <a:r>
+              <a:rPr lang="es-ES" dirty="0" err="1"/>
+              <a:t>we</a:t>
+            </a:r>
+            <a:r>
+              <a:rPr lang="es-ES" dirty="0"/>
+              <a:t> </a:t>
+            </a:r>
+            <a:r>
+              <a:rPr lang="es-ES" dirty="0" err="1"/>
+              <a:t>give</a:t>
+            </a:r>
+            <a:r>
+              <a:rPr lang="es-ES" dirty="0"/>
+              <a:t> </a:t>
+            </a:r>
+            <a:r>
+              <a:rPr lang="es-ES" dirty="0" err="1"/>
+              <a:t>any</a:t>
+            </a:r>
+            <a:r>
+              <a:rPr lang="es-ES" dirty="0"/>
+              <a:t> </a:t>
+            </a:r>
+            <a:r>
+              <a:rPr lang="es-ES" dirty="0" err="1"/>
+              <a:t>reason</a:t>
+            </a:r>
+            <a:r>
+              <a:rPr lang="es-ES" dirty="0"/>
+              <a:t> </a:t>
+            </a:r>
+            <a:r>
+              <a:rPr lang="es-ES" dirty="0" err="1"/>
+              <a:t>why</a:t>
+            </a:r>
+            <a:r>
+              <a:rPr lang="es-ES" dirty="0"/>
+              <a:t> </a:t>
+            </a:r>
+            <a:r>
+              <a:rPr lang="es-ES" dirty="0" err="1"/>
+              <a:t>we</a:t>
+            </a:r>
+            <a:r>
+              <a:rPr lang="es-ES" dirty="0"/>
+              <a:t> are </a:t>
+            </a:r>
+            <a:r>
+              <a:rPr lang="es-ES" dirty="0" err="1"/>
+              <a:t>choosing</a:t>
+            </a:r>
+            <a:r>
+              <a:rPr lang="es-ES" dirty="0"/>
+              <a:t> </a:t>
+            </a:r>
+            <a:r>
+              <a:rPr lang="es-ES" dirty="0" err="1"/>
+              <a:t>cox_reduced</a:t>
+            </a:r>
+            <a:r>
+              <a:rPr lang="es-ES" dirty="0"/>
+              <a:t> </a:t>
+            </a:r>
+            <a:r>
+              <a:rPr lang="es-ES" dirty="0" err="1"/>
+              <a:t>here</a:t>
+            </a:r>
+            <a:r>
+              <a:rPr lang="es-ES" dirty="0"/>
+              <a:t>? -&gt; </a:t>
+            </a:r>
+            <a:r>
+              <a:rPr lang="es-ES" dirty="0" err="1"/>
+              <a:t>still</a:t>
+            </a:r>
+            <a:r>
+              <a:rPr lang="es-ES" dirty="0"/>
+              <a:t> open</a:t>
             </a:r>
             <a:endParaRPr lang="en-GB" dirty="0"/>
           </a:p>
@@ -3183,7 +3402,7 @@
     </p:spTree>
     <p:extLst>
       <p:ext uri="{BB962C8B-B14F-4D97-AF65-F5344CB8AC3E}">
-        <p14:creationId xmlns:p14="http://schemas.microsoft.com/office/powerpoint/2010/main" val="811532236"/>
+        <p14:creationId xmlns:p14="http://schemas.microsoft.com/office/powerpoint/2010/main" val="3713656712"/>
       </p:ext>
     </p:extLst>
   </p:cSld>
@@ -3243,6 +3462,38 @@
             </a:r>
             <a:r>
               <a:rPr lang="es-ES" dirty="0" err="1"/>
+              <a:t>Deviance</a:t>
+            </a:r>
+            <a:r>
+              <a:rPr lang="es-ES" dirty="0"/>
+              <a:t> </a:t>
+            </a:r>
+            <a:r>
+              <a:rPr lang="es-ES" dirty="0" err="1"/>
+              <a:t>residuals</a:t>
+            </a:r>
+            <a:r>
+              <a:rPr lang="es-ES" dirty="0"/>
+              <a:t> are </a:t>
+            </a:r>
+            <a:r>
+              <a:rPr lang="es-ES" dirty="0" err="1"/>
+              <a:t>transformations</a:t>
+            </a:r>
+            <a:r>
+              <a:rPr lang="es-ES" dirty="0"/>
+              <a:t> </a:t>
+            </a:r>
+            <a:r>
+              <a:rPr lang="es-ES" dirty="0" err="1"/>
+              <a:t>of</a:t>
+            </a:r>
+            <a:r>
+              <a:rPr lang="es-ES" dirty="0"/>
+              <a:t> </a:t>
+            </a:r>
+            <a:r>
+              <a:rPr lang="es-ES" dirty="0" err="1"/>
               <a:t>Martingale</a:t>
             </a:r>
             <a:r>
@@ -3255,107 +3506,59 @@
             </a:r>
             <a:r>
               <a:rPr lang="es-ES" dirty="0"/>
-              <a:t> are </a:t>
-            </a:r>
-            <a:r>
-              <a:rPr lang="es-ES" dirty="0" err="1"/>
-              <a:t>useful</a:t>
-            </a:r>
-            <a:r>
-              <a:rPr lang="es-ES" dirty="0"/>
-              <a:t> </a:t>
-            </a:r>
-            <a:r>
-              <a:rPr lang="es-ES" dirty="0" err="1"/>
-              <a:t>to</a:t>
-            </a:r>
-            <a:r>
-              <a:rPr lang="es-ES" dirty="0"/>
-              <a:t> </a:t>
-            </a:r>
-            <a:r>
-              <a:rPr lang="es-ES" dirty="0" err="1"/>
-              <a:t>check</a:t>
-            </a:r>
-            <a:r>
-              <a:rPr lang="es-ES" dirty="0"/>
-              <a:t> </a:t>
-            </a:r>
-            <a:r>
-              <a:rPr lang="es-ES" dirty="0" err="1"/>
-              <a:t>the</a:t>
-            </a:r>
-            <a:r>
-              <a:rPr lang="es-ES" dirty="0"/>
-              <a:t> </a:t>
-            </a:r>
-            <a:r>
-              <a:rPr lang="es-ES" dirty="0" err="1"/>
-              <a:t>linearity</a:t>
-            </a:r>
-            <a:r>
-              <a:rPr lang="es-ES" dirty="0"/>
-              <a:t> </a:t>
-            </a:r>
-            <a:r>
-              <a:rPr lang="es-ES" dirty="0" err="1"/>
-              <a:t>assumption</a:t>
-            </a:r>
-            <a:r>
-              <a:rPr lang="es-ES" dirty="0"/>
-              <a:t> as </a:t>
-            </a:r>
-            <a:r>
-              <a:rPr lang="es-ES" dirty="0" err="1"/>
-              <a:t>it</a:t>
-            </a:r>
-            <a:r>
-              <a:rPr lang="es-ES" dirty="0"/>
-              <a:t> </a:t>
-            </a:r>
-            <a:r>
-              <a:rPr lang="es-ES" dirty="0" err="1"/>
-              <a:t>gives</a:t>
-            </a:r>
-            <a:r>
-              <a:rPr lang="es-ES" dirty="0"/>
-              <a:t> </a:t>
-            </a:r>
-            <a:r>
-              <a:rPr lang="es-ES" dirty="0" err="1"/>
-              <a:t>us</a:t>
-            </a:r>
-            <a:r>
-              <a:rPr lang="es-ES" dirty="0"/>
-              <a:t> </a:t>
-            </a:r>
-            <a:r>
-              <a:rPr lang="es-ES" dirty="0" err="1"/>
-              <a:t>an</a:t>
-            </a:r>
-            <a:r>
-              <a:rPr lang="es-ES" dirty="0"/>
-              <a:t> idea </a:t>
-            </a:r>
-            <a:r>
-              <a:rPr lang="es-ES" dirty="0" err="1"/>
-              <a:t>of</a:t>
-            </a:r>
-            <a:r>
-              <a:rPr lang="es-ES" dirty="0"/>
-              <a:t> </a:t>
-            </a:r>
-            <a:r>
-              <a:rPr lang="es-ES" dirty="0" err="1"/>
-              <a:t>the</a:t>
-            </a:r>
-            <a:r>
-              <a:rPr lang="es-ES" dirty="0"/>
-              <a:t> </a:t>
-            </a:r>
-            <a:r>
-              <a:rPr lang="es-ES" dirty="0" err="1"/>
-              <a:t>effect</a:t>
+              <a:t>. </a:t>
+            </a:r>
+            <a:r>
+              <a:rPr lang="es-ES" dirty="0" err="1"/>
+              <a:t>They</a:t>
+            </a:r>
+            <a:r>
+              <a:rPr lang="es-ES" dirty="0"/>
+              <a:t> can be </a:t>
+            </a:r>
+            <a:r>
+              <a:rPr lang="es-ES" dirty="0" err="1"/>
+              <a:t>used</a:t>
+            </a:r>
+            <a:r>
+              <a:rPr lang="es-ES" dirty="0"/>
+              <a:t> more </a:t>
+            </a:r>
+            <a:r>
+              <a:rPr lang="es-ES" dirty="0" err="1"/>
+              <a:t>or</a:t>
+            </a:r>
+            <a:r>
+              <a:rPr lang="es-ES" dirty="0"/>
+              <a:t> </a:t>
+            </a:r>
+            <a:r>
+              <a:rPr lang="es-ES" dirty="0" err="1"/>
+              <a:t>less</a:t>
+            </a:r>
+            <a:r>
+              <a:rPr lang="es-ES" dirty="0"/>
+              <a:t> </a:t>
+            </a:r>
+            <a:r>
+              <a:rPr lang="es-ES" dirty="0" err="1"/>
+              <a:t>like</a:t>
+            </a:r>
+            <a:r>
+              <a:rPr lang="es-ES" dirty="0"/>
+              <a:t> </a:t>
+            </a:r>
+            <a:r>
+              <a:rPr lang="es-ES" dirty="0" err="1"/>
+              <a:t>standardized</a:t>
+            </a:r>
+            <a:r>
+              <a:rPr lang="es-ES" dirty="0"/>
+              <a:t> </a:t>
+            </a:r>
+            <a:r>
+              <a:rPr lang="es-ES" dirty="0" err="1"/>
+              <a:t>residuals</a:t>
             </a:r>
             <a:r>
               <a:rPr lang="es-ES" dirty="0"/>
@@ -3367,116 +3570,11 @@
             </a:r>
             <a:r>
               <a:rPr lang="es-ES" dirty="0"/>
-              <a:t> </a:t>
-            </a:r>
-            <a:r>
-              <a:rPr lang="es-ES" dirty="0" err="1"/>
-              <a:t>each</a:t>
-            </a:r>
-            <a:r>
-              <a:rPr lang="es-ES" dirty="0"/>
-              <a:t> covariate</a:t>
-            </a:r>
-          </a:p>
-          <a:p>
-            <a:endParaRPr lang="es-ES" dirty="0"/>
-          </a:p>
-          <a:p>
-            <a:r>
-              <a:rPr lang="es-ES" dirty="0" err="1"/>
-              <a:t>Question</a:t>
-            </a:r>
-            <a:r>
-              <a:rPr lang="es-ES" dirty="0"/>
-              <a:t>: </a:t>
-            </a:r>
-            <a:r>
-              <a:rPr lang="es-ES" dirty="0" err="1"/>
-              <a:t>Should</a:t>
-            </a:r>
-            <a:r>
-              <a:rPr lang="es-ES" dirty="0"/>
-              <a:t> </a:t>
-            </a:r>
-            <a:r>
-              <a:rPr lang="es-ES" dirty="0" err="1"/>
-              <a:t>we</a:t>
-            </a:r>
-            <a:r>
-              <a:rPr lang="es-ES" dirty="0"/>
-              <a:t> </a:t>
-            </a:r>
-            <a:r>
-              <a:rPr lang="es-ES" dirty="0" err="1"/>
-              <a:t>give</a:t>
-            </a:r>
-            <a:r>
-              <a:rPr lang="es-ES" dirty="0"/>
-              <a:t> </a:t>
-            </a:r>
-            <a:r>
-              <a:rPr lang="es-ES" dirty="0" err="1"/>
-              <a:t>any</a:t>
-            </a:r>
-            <a:r>
-              <a:rPr lang="es-ES" dirty="0"/>
-              <a:t> </a:t>
-            </a:r>
-            <a:r>
-              <a:rPr lang="es-ES" dirty="0" err="1"/>
-              <a:t>reason</a:t>
-            </a:r>
-            <a:r>
-              <a:rPr lang="es-ES" dirty="0"/>
-              <a:t> </a:t>
-            </a:r>
-            <a:r>
-              <a:rPr lang="es-ES" dirty="0" err="1"/>
-              <a:t>why</a:t>
-            </a:r>
-            <a:r>
-              <a:rPr lang="es-ES" dirty="0"/>
-              <a:t> </a:t>
-            </a:r>
-            <a:r>
-              <a:rPr lang="es-ES" dirty="0" err="1"/>
-              <a:t>we</a:t>
-            </a:r>
-            <a:r>
-              <a:rPr lang="es-ES" dirty="0"/>
-              <a:t> are </a:t>
-            </a:r>
-            <a:r>
-              <a:rPr lang="es-ES" dirty="0" err="1"/>
-              <a:t>choosing</a:t>
-            </a:r>
-            <a:r>
-              <a:rPr lang="es-ES" dirty="0"/>
-              <a:t> </a:t>
-            </a:r>
-            <a:r>
-              <a:rPr lang="es-ES" dirty="0" err="1"/>
-              <a:t>cox_reduced</a:t>
-            </a:r>
-            <a:r>
-              <a:rPr lang="es-ES" dirty="0"/>
-              <a:t> </a:t>
-            </a:r>
-            <a:r>
-              <a:rPr lang="es-ES" dirty="0" err="1"/>
-              <a:t>here</a:t>
-            </a:r>
-            <a:r>
-              <a:rPr lang="es-ES" dirty="0"/>
-              <a:t>? -&gt; </a:t>
-            </a:r>
-            <a:r>
-              <a:rPr lang="es-ES" dirty="0" err="1"/>
-              <a:t>still</a:t>
-            </a:r>
-            <a:r>
-              <a:rPr lang="es-ES" dirty="0"/>
-              <a:t> open</a:t>
+              <a:t> linear </a:t>
+            </a:r>
+            <a:r>
+              <a:rPr lang="es-ES" dirty="0" err="1"/>
+              <a:t>models</a:t>
             </a:r>
             <a:endParaRPr lang="en-GB" dirty="0"/>
           </a:p>
@@ -3508,7 +3606,7 @@
     </p:spTree>
     <p:extLst>
       <p:ext uri="{BB962C8B-B14F-4D97-AF65-F5344CB8AC3E}">
-        <p14:creationId xmlns:p14="http://schemas.microsoft.com/office/powerpoint/2010/main" val="3713656712"/>
+        <p14:creationId xmlns:p14="http://schemas.microsoft.com/office/powerpoint/2010/main" val="3245281593"/>
       </p:ext>
     </p:extLst>
   </p:cSld>
@@ -3563,52 +3661,72 @@
           <a:lstStyle/>
           <a:p>
             <a:r>
-              <a:rPr lang="es-ES" dirty="0"/>
-              <a:t>Note: </a:t>
-            </a:r>
-            <a:r>
-              <a:rPr lang="es-ES" dirty="0" err="1"/>
-              <a:t>Deviance</a:t>
-            </a:r>
-            <a:r>
-              <a:rPr lang="es-ES" dirty="0"/>
-              <a:t> </a:t>
-            </a:r>
-            <a:r>
-              <a:rPr lang="es-ES" dirty="0" err="1"/>
-              <a:t>residuals</a:t>
-            </a:r>
-            <a:r>
-              <a:rPr lang="es-ES" dirty="0"/>
-              <a:t> are </a:t>
-            </a:r>
-            <a:r>
-              <a:rPr lang="es-ES" dirty="0" err="1"/>
-              <a:t>transformations</a:t>
-            </a:r>
-            <a:r>
-              <a:rPr lang="es-ES" dirty="0"/>
-              <a:t> </a:t>
-            </a:r>
-            <a:r>
-              <a:rPr lang="es-ES" dirty="0" err="1"/>
-              <a:t>of</a:t>
-            </a:r>
-            <a:r>
-              <a:rPr lang="es-ES" dirty="0"/>
-              <a:t> </a:t>
-            </a:r>
-            <a:r>
-              <a:rPr lang="es-ES" dirty="0" err="1"/>
-              <a:t>Martingale</a:t>
-            </a:r>
-            <a:r>
-              <a:rPr lang="es-ES" dirty="0"/>
-              <a:t> </a:t>
-            </a:r>
-            <a:r>
-              <a:rPr lang="es-ES" dirty="0" err="1"/>
-              <a:t>residuals</a:t>
+              <a:rPr lang="es-ES" dirty="0" err="1"/>
+              <a:t>Question</a:t>
+            </a:r>
+            <a:r>
+              <a:rPr lang="es-ES" dirty="0"/>
+              <a:t>: </a:t>
+            </a:r>
+            <a:r>
+              <a:rPr lang="es-ES" dirty="0" err="1"/>
+              <a:t>Not</a:t>
+            </a:r>
+            <a:r>
+              <a:rPr lang="es-ES" dirty="0"/>
+              <a:t> </a:t>
+            </a:r>
+            <a:r>
+              <a:rPr lang="es-ES" dirty="0" err="1"/>
+              <a:t>sure</a:t>
+            </a:r>
+            <a:r>
+              <a:rPr lang="es-ES" dirty="0"/>
+              <a:t> </a:t>
+            </a:r>
+            <a:r>
+              <a:rPr lang="es-ES" dirty="0" err="1"/>
+              <a:t>how</a:t>
+            </a:r>
+            <a:r>
+              <a:rPr lang="es-ES" dirty="0"/>
+              <a:t> </a:t>
+            </a:r>
+            <a:r>
+              <a:rPr lang="es-ES" dirty="0" err="1"/>
+              <a:t>else</a:t>
+            </a:r>
+            <a:r>
+              <a:rPr lang="es-ES" dirty="0"/>
+              <a:t> </a:t>
+            </a:r>
+            <a:r>
+              <a:rPr lang="es-ES" dirty="0" err="1"/>
+              <a:t>to</a:t>
+            </a:r>
+            <a:r>
+              <a:rPr lang="es-ES" dirty="0"/>
+              <a:t> </a:t>
+            </a:r>
+            <a:r>
+              <a:rPr lang="es-ES" dirty="0" err="1"/>
+              <a:t>interpret</a:t>
+            </a:r>
+            <a:r>
+              <a:rPr lang="es-ES" dirty="0"/>
+              <a:t> </a:t>
+            </a:r>
+            <a:r>
+              <a:rPr lang="es-ES" dirty="0" err="1"/>
+              <a:t>this</a:t>
+            </a:r>
+            <a:r>
+              <a:rPr lang="es-ES" dirty="0"/>
+              <a:t> </a:t>
+            </a:r>
+            <a:r>
+              <a:rPr lang="es-ES" dirty="0" err="1"/>
+              <a:t>part</a:t>
             </a:r>
             <a:r>
               <a:rPr lang="es-ES" dirty="0"/>
@@ -3616,55 +3734,103 @@
             </a:r>
             <a:r>
               <a:rPr lang="es-ES" dirty="0" err="1"/>
-              <a:t>They</a:t>
-            </a:r>
-            <a:r>
-              <a:rPr lang="es-ES" dirty="0"/>
-              <a:t> can be </a:t>
-            </a:r>
-            <a:r>
-              <a:rPr lang="es-ES" dirty="0" err="1"/>
-              <a:t>used</a:t>
-            </a:r>
-            <a:r>
-              <a:rPr lang="es-ES" dirty="0"/>
-              <a:t> more </a:t>
-            </a:r>
-            <a:r>
-              <a:rPr lang="es-ES" dirty="0" err="1"/>
-              <a:t>or</a:t>
-            </a:r>
-            <a:r>
-              <a:rPr lang="es-ES" dirty="0"/>
-              <a:t> </a:t>
-            </a:r>
-            <a:r>
-              <a:rPr lang="es-ES" dirty="0" err="1"/>
-              <a:t>less</a:t>
-            </a:r>
-            <a:r>
-              <a:rPr lang="es-ES" dirty="0"/>
-              <a:t> </a:t>
-            </a:r>
-            <a:r>
-              <a:rPr lang="es-ES" dirty="0" err="1"/>
-              <a:t>like</a:t>
-            </a:r>
-            <a:r>
-              <a:rPr lang="es-ES" dirty="0"/>
-              <a:t> </a:t>
-            </a:r>
-            <a:r>
-              <a:rPr lang="es-ES" dirty="0" err="1"/>
-              <a:t>standardized</a:t>
-            </a:r>
-            <a:r>
-              <a:rPr lang="es-ES" dirty="0"/>
-              <a:t> </a:t>
-            </a:r>
-            <a:r>
-              <a:rPr lang="es-ES" dirty="0" err="1"/>
-              <a:t>residuals</a:t>
+              <a:t>Basically</a:t>
+            </a:r>
+            <a:r>
+              <a:rPr lang="es-ES" dirty="0"/>
+              <a:t> </a:t>
+            </a:r>
+            <a:r>
+              <a:rPr lang="es-ES" dirty="0" err="1"/>
+              <a:t>our</a:t>
+            </a:r>
+            <a:r>
+              <a:rPr lang="es-ES" dirty="0"/>
+              <a:t> </a:t>
+            </a:r>
+            <a:r>
+              <a:rPr lang="es-ES" dirty="0" err="1"/>
+              <a:t>linearity</a:t>
+            </a:r>
+            <a:r>
+              <a:rPr lang="es-ES" dirty="0"/>
+              <a:t> </a:t>
+            </a:r>
+            <a:r>
+              <a:rPr lang="es-ES" dirty="0" err="1"/>
+              <a:t>assumption</a:t>
+            </a:r>
+            <a:r>
+              <a:rPr lang="es-ES" dirty="0"/>
+              <a:t> </a:t>
+            </a:r>
+            <a:r>
+              <a:rPr lang="es-ES" dirty="0" err="1"/>
+              <a:t>is</a:t>
+            </a:r>
+            <a:r>
+              <a:rPr lang="es-ES" dirty="0"/>
+              <a:t> </a:t>
+            </a:r>
+            <a:r>
+              <a:rPr lang="es-ES" dirty="0" err="1"/>
+              <a:t>does</a:t>
+            </a:r>
+            <a:r>
+              <a:rPr lang="es-ES" dirty="0"/>
+              <a:t> </a:t>
+            </a:r>
+            <a:r>
+              <a:rPr lang="es-ES" dirty="0" err="1"/>
+              <a:t>not</a:t>
+            </a:r>
+            <a:r>
+              <a:rPr lang="es-ES" dirty="0"/>
+              <a:t> </a:t>
+            </a:r>
+            <a:r>
+              <a:rPr lang="es-ES" dirty="0" err="1"/>
+              <a:t>hold</a:t>
+            </a:r>
+            <a:r>
+              <a:rPr lang="es-ES" dirty="0"/>
+              <a:t> </a:t>
+            </a:r>
+            <a:r>
+              <a:rPr lang="es-ES" dirty="0" err="1"/>
+              <a:t>which</a:t>
+            </a:r>
+            <a:r>
+              <a:rPr lang="es-ES" dirty="0"/>
+              <a:t> </a:t>
+            </a:r>
+            <a:r>
+              <a:rPr lang="es-ES" dirty="0" err="1"/>
+              <a:t>gives</a:t>
+            </a:r>
+            <a:r>
+              <a:rPr lang="es-ES" dirty="0"/>
+              <a:t> </a:t>
+            </a:r>
+            <a:r>
+              <a:rPr lang="es-ES" dirty="0" err="1"/>
+              <a:t>us</a:t>
+            </a:r>
+            <a:r>
+              <a:rPr lang="es-ES" dirty="0"/>
+              <a:t> </a:t>
+            </a:r>
+            <a:r>
+              <a:rPr lang="es-ES" dirty="0" err="1"/>
+              <a:t>another</a:t>
+            </a:r>
+            <a:r>
+              <a:rPr lang="es-ES" dirty="0"/>
+              <a:t> </a:t>
+            </a:r>
+            <a:r>
+              <a:rPr lang="es-ES" dirty="0" err="1"/>
+              <a:t>argument</a:t>
             </a:r>
             <a:r>
               <a:rPr lang="es-ES" dirty="0"/>
@@ -3676,11 +3842,39 @@
             </a:r>
             <a:r>
               <a:rPr lang="es-ES" dirty="0"/>
-              <a:t> linear </a:t>
-            </a:r>
-            <a:r>
-              <a:rPr lang="es-ES" dirty="0" err="1"/>
-              <a:t>models</a:t>
+              <a:t> </a:t>
+            </a:r>
+            <a:r>
+              <a:rPr lang="es-ES" dirty="0" err="1"/>
+              <a:t>the</a:t>
+            </a:r>
+            <a:r>
+              <a:rPr lang="es-ES" dirty="0"/>
+              <a:t> </a:t>
+            </a:r>
+            <a:r>
+              <a:rPr lang="es-ES" dirty="0" err="1"/>
+              <a:t>Royston</a:t>
+            </a:r>
+            <a:r>
+              <a:rPr lang="es-ES" dirty="0"/>
+              <a:t>/Altman test? (</a:t>
+            </a:r>
+            <a:r>
+              <a:rPr lang="es-ES" dirty="0" err="1"/>
+              <a:t>next</a:t>
+            </a:r>
+            <a:r>
+              <a:rPr lang="es-ES" dirty="0"/>
+              <a:t> </a:t>
+            </a:r>
+            <a:r>
+              <a:rPr lang="es-ES" dirty="0" err="1"/>
+              <a:t>slide</a:t>
+            </a:r>
+            <a:r>
+              <a:rPr lang="es-ES" dirty="0"/>
+              <a:t>)</a:t>
             </a:r>
             <a:endParaRPr lang="en-GB" dirty="0"/>
           </a:p>
@@ -3712,7 +3906,7 @@
     </p:spTree>
     <p:extLst>
       <p:ext uri="{BB962C8B-B14F-4D97-AF65-F5344CB8AC3E}">
-        <p14:creationId xmlns:p14="http://schemas.microsoft.com/office/powerpoint/2010/main" val="3245281593"/>
+        <p14:creationId xmlns:p14="http://schemas.microsoft.com/office/powerpoint/2010/main" val="3177459909"/>
       </p:ext>
     </p:extLst>
   </p:cSld>
@@ -3766,223 +3960,7 @@
           <a:bodyPr/>
           <a:lstStyle/>
           <a:p>
-            <a:r>
-              <a:rPr lang="es-ES" dirty="0" err="1"/>
-              <a:t>Question</a:t>
-            </a:r>
-            <a:r>
-              <a:rPr lang="es-ES" dirty="0"/>
-              <a:t>: </a:t>
-            </a:r>
-            <a:r>
-              <a:rPr lang="es-ES" dirty="0" err="1"/>
-              <a:t>Not</a:t>
-            </a:r>
-            <a:r>
-              <a:rPr lang="es-ES" dirty="0"/>
-              <a:t> </a:t>
-            </a:r>
-            <a:r>
-              <a:rPr lang="es-ES" dirty="0" err="1"/>
-              <a:t>sure</a:t>
-            </a:r>
-            <a:r>
-              <a:rPr lang="es-ES" dirty="0"/>
-              <a:t> </a:t>
-            </a:r>
-            <a:r>
-              <a:rPr lang="es-ES" dirty="0" err="1"/>
-              <a:t>how</a:t>
-            </a:r>
-            <a:r>
-              <a:rPr lang="es-ES" dirty="0"/>
-              <a:t> </a:t>
-            </a:r>
-            <a:r>
-              <a:rPr lang="es-ES" dirty="0" err="1"/>
-              <a:t>else</a:t>
-            </a:r>
-            <a:r>
-              <a:rPr lang="es-ES" dirty="0"/>
-              <a:t> </a:t>
-            </a:r>
-            <a:r>
-              <a:rPr lang="es-ES" dirty="0" err="1"/>
-              <a:t>to</a:t>
-            </a:r>
-            <a:r>
-              <a:rPr lang="es-ES" dirty="0"/>
-              <a:t> </a:t>
-            </a:r>
-            <a:r>
-              <a:rPr lang="es-ES" dirty="0" err="1"/>
-              <a:t>interpret</a:t>
-            </a:r>
-            <a:r>
-              <a:rPr lang="es-ES" dirty="0"/>
-              <a:t> </a:t>
-            </a:r>
-            <a:r>
-              <a:rPr lang="es-ES" dirty="0" err="1"/>
-              <a:t>this</a:t>
-            </a:r>
-            <a:r>
-              <a:rPr lang="es-ES" dirty="0"/>
-              <a:t> </a:t>
-            </a:r>
-            <a:r>
-              <a:rPr lang="es-ES" dirty="0" err="1"/>
-              <a:t>part</a:t>
-            </a:r>
-            <a:r>
-              <a:rPr lang="es-ES" dirty="0"/>
-              <a:t>. </a:t>
-            </a:r>
-            <a:r>
-              <a:rPr lang="es-ES" dirty="0" err="1"/>
-              <a:t>Basically</a:t>
-            </a:r>
-            <a:r>
-              <a:rPr lang="es-ES" dirty="0"/>
-              <a:t> </a:t>
-            </a:r>
-            <a:r>
-              <a:rPr lang="es-ES" dirty="0" err="1"/>
-              <a:t>our</a:t>
-            </a:r>
-            <a:r>
-              <a:rPr lang="es-ES" dirty="0"/>
-              <a:t> </a:t>
-            </a:r>
-            <a:r>
-              <a:rPr lang="es-ES" dirty="0" err="1"/>
-              <a:t>linearity</a:t>
-            </a:r>
-            <a:r>
-              <a:rPr lang="es-ES" dirty="0"/>
-              <a:t> </a:t>
-            </a:r>
-            <a:r>
-              <a:rPr lang="es-ES" dirty="0" err="1"/>
-              <a:t>assumption</a:t>
-            </a:r>
-            <a:r>
-              <a:rPr lang="es-ES" dirty="0"/>
-              <a:t> </a:t>
-            </a:r>
-            <a:r>
-              <a:rPr lang="es-ES" dirty="0" err="1"/>
-              <a:t>is</a:t>
-            </a:r>
-            <a:r>
-              <a:rPr lang="es-ES" dirty="0"/>
-              <a:t> </a:t>
-            </a:r>
-            <a:r>
-              <a:rPr lang="es-ES" dirty="0" err="1"/>
-              <a:t>does</a:t>
-            </a:r>
-            <a:r>
-              <a:rPr lang="es-ES" dirty="0"/>
-              <a:t> </a:t>
-            </a:r>
-            <a:r>
-              <a:rPr lang="es-ES" dirty="0" err="1"/>
-              <a:t>not</a:t>
-            </a:r>
-            <a:r>
-              <a:rPr lang="es-ES" dirty="0"/>
-              <a:t> </a:t>
-            </a:r>
-            <a:r>
-              <a:rPr lang="es-ES" dirty="0" err="1"/>
-              <a:t>hold</a:t>
-            </a:r>
-            <a:r>
-              <a:rPr lang="es-ES" dirty="0"/>
-              <a:t> </a:t>
-            </a:r>
-            <a:r>
-              <a:rPr lang="es-ES" dirty="0" err="1"/>
-              <a:t>which</a:t>
-            </a:r>
-            <a:r>
-              <a:rPr lang="es-ES" dirty="0"/>
-              <a:t> </a:t>
-            </a:r>
-            <a:r>
-              <a:rPr lang="es-ES" dirty="0" err="1"/>
-              <a:t>gives</a:t>
-            </a:r>
-            <a:r>
-              <a:rPr lang="es-ES" dirty="0"/>
-              <a:t> </a:t>
-            </a:r>
-            <a:r>
-              <a:rPr lang="es-ES" dirty="0" err="1"/>
-              <a:t>us</a:t>
-            </a:r>
-            <a:r>
-              <a:rPr lang="es-ES" dirty="0"/>
-              <a:t> </a:t>
-            </a:r>
-            <a:r>
-              <a:rPr lang="es-ES" dirty="0" err="1"/>
-              <a:t>another</a:t>
-            </a:r>
-            <a:r>
-              <a:rPr lang="es-ES" dirty="0"/>
-              <a:t> </a:t>
-            </a:r>
-            <a:r>
-              <a:rPr lang="es-ES" dirty="0" err="1"/>
-              <a:t>argument</a:t>
-            </a:r>
-            <a:r>
-              <a:rPr lang="es-ES" dirty="0"/>
-              <a:t> </a:t>
-            </a:r>
-            <a:r>
-              <a:rPr lang="es-ES" dirty="0" err="1"/>
-              <a:t>for</a:t>
-            </a:r>
-            <a:r>
-              <a:rPr lang="es-ES" dirty="0"/>
-              <a:t> </a:t>
-            </a:r>
-            <a:r>
-              <a:rPr lang="es-ES" dirty="0" err="1"/>
-              <a:t>the</a:t>
-            </a:r>
-            <a:r>
-              <a:rPr lang="es-ES" dirty="0"/>
-              <a:t> </a:t>
-            </a:r>
-            <a:r>
-              <a:rPr lang="es-ES" dirty="0" err="1"/>
-              <a:t>Royston</a:t>
-            </a:r>
-            <a:r>
-              <a:rPr lang="es-ES" dirty="0"/>
-              <a:t>/Altman test? (</a:t>
-            </a:r>
-            <a:r>
-              <a:rPr lang="es-ES" dirty="0" err="1"/>
-              <a:t>next</a:t>
-            </a:r>
-            <a:r>
-              <a:rPr lang="es-ES" dirty="0"/>
-              <a:t> </a:t>
-            </a:r>
-            <a:r>
-              <a:rPr lang="es-ES" dirty="0" err="1"/>
-              <a:t>slide</a:t>
-            </a:r>
-            <a:r>
-              <a:rPr lang="es-ES" dirty="0"/>
-              <a:t>)</a:t>
-            </a:r>
-            <a:endParaRPr lang="en-GB" dirty="0"/>
+            <a:endParaRPr lang="es-ES" dirty="0"/>
           </a:p>
         </p:txBody>
       </p:sp>
@@ -4012,7 +3990,7 @@
     </p:spTree>
     <p:extLst>
       <p:ext uri="{BB962C8B-B14F-4D97-AF65-F5344CB8AC3E}">
-        <p14:creationId xmlns:p14="http://schemas.microsoft.com/office/powerpoint/2010/main" val="3177459909"/>
+        <p14:creationId xmlns:p14="http://schemas.microsoft.com/office/powerpoint/2010/main" val="313783324"/>
       </p:ext>
     </p:extLst>
   </p:cSld>
@@ -4068,125 +4046,17 @@
           <a:p>
             <a:r>
               <a:rPr lang="es-ES" dirty="0"/>
-              <a:t>Note: </a:t>
-            </a:r>
-            <a:r>
-              <a:rPr lang="es-ES" dirty="0" err="1"/>
-              <a:t>Deviance</a:t>
-            </a:r>
-            <a:r>
-              <a:rPr lang="es-ES" dirty="0"/>
-              <a:t> </a:t>
-            </a:r>
-            <a:r>
-              <a:rPr lang="es-ES" dirty="0" err="1"/>
-              <a:t>residuals</a:t>
-            </a:r>
-            <a:r>
-              <a:rPr lang="es-ES" dirty="0"/>
-              <a:t> are </a:t>
-            </a:r>
-            <a:r>
-              <a:rPr lang="es-ES" dirty="0" err="1"/>
-              <a:t>transformations</a:t>
-            </a:r>
-            <a:r>
-              <a:rPr lang="es-ES" dirty="0"/>
-              <a:t> </a:t>
-            </a:r>
-            <a:r>
-              <a:rPr lang="es-ES" dirty="0" err="1"/>
-              <a:t>of</a:t>
-            </a:r>
-            <a:r>
-              <a:rPr lang="es-ES" dirty="0"/>
-              <a:t> </a:t>
-            </a:r>
-            <a:r>
-              <a:rPr lang="es-ES" dirty="0" err="1"/>
-              <a:t>Martingale</a:t>
-            </a:r>
-            <a:r>
-              <a:rPr lang="es-ES" dirty="0"/>
-              <a:t> </a:t>
-            </a:r>
-            <a:r>
-              <a:rPr lang="es-ES" dirty="0" err="1"/>
-              <a:t>residuals</a:t>
-            </a:r>
-            <a:r>
-              <a:rPr lang="es-ES" dirty="0"/>
-              <a:t>. </a:t>
-            </a:r>
-            <a:r>
-              <a:rPr lang="es-ES" dirty="0" err="1"/>
-              <a:t>They</a:t>
-            </a:r>
-            <a:r>
-              <a:rPr lang="es-ES" dirty="0"/>
-              <a:t> can be </a:t>
-            </a:r>
-            <a:r>
-              <a:rPr lang="es-ES" dirty="0" err="1"/>
-              <a:t>used</a:t>
-            </a:r>
-            <a:r>
-              <a:rPr lang="es-ES" dirty="0"/>
-              <a:t> more </a:t>
-            </a:r>
-            <a:r>
-              <a:rPr lang="es-ES" dirty="0" err="1"/>
-              <a:t>or</a:t>
-            </a:r>
-            <a:r>
-              <a:rPr lang="es-ES" dirty="0"/>
-              <a:t> </a:t>
-            </a:r>
-            <a:r>
-              <a:rPr lang="es-ES" dirty="0" err="1"/>
-              <a:t>less</a:t>
-            </a:r>
-            <a:r>
-              <a:rPr lang="es-ES" dirty="0"/>
-              <a:t> </a:t>
-            </a:r>
-            <a:r>
-              <a:rPr lang="es-ES" dirty="0" err="1"/>
-              <a:t>like</a:t>
-            </a:r>
-            <a:r>
-              <a:rPr lang="es-ES" dirty="0"/>
-              <a:t> </a:t>
-            </a:r>
-            <a:r>
-              <a:rPr lang="es-ES" dirty="0" err="1"/>
-              <a:t>standardized</a:t>
-            </a:r>
-            <a:r>
-              <a:rPr lang="es-ES" dirty="0"/>
-              <a:t> </a:t>
-            </a:r>
-            <a:r>
-              <a:rPr lang="es-ES" dirty="0" err="1"/>
-              <a:t>residuals</a:t>
-            </a:r>
-            <a:r>
-              <a:rPr lang="es-ES" dirty="0"/>
-              <a:t> </a:t>
-            </a:r>
-            <a:r>
-              <a:rPr lang="es-ES" dirty="0" err="1"/>
-              <a:t>for</a:t>
-            </a:r>
-            <a:r>
-              <a:rPr lang="es-ES" dirty="0"/>
-              <a:t> linear </a:t>
-            </a:r>
-            <a:r>
-              <a:rPr lang="es-ES" dirty="0" err="1"/>
-              <a:t>models</a:t>
-            </a:r>
-            <a:endParaRPr lang="es-ES" dirty="0"/>
+              <a:t>DONE: </a:t>
+            </a:r>
+            <a:r>
+              <a:rPr lang="es-ES" dirty="0" err="1"/>
+              <a:t>add</a:t>
+            </a:r>
+            <a:r>
+              <a:rPr lang="es-ES" dirty="0"/>
+              <a:t> AIC</a:t>
+            </a:r>
+            <a:endParaRPr lang="en-GB" dirty="0"/>
           </a:p>
         </p:txBody>
       </p:sp>
@@ -4216,7 +4086,7 @@
     </p:spTree>
     <p:extLst>
       <p:ext uri="{BB962C8B-B14F-4D97-AF65-F5344CB8AC3E}">
-        <p14:creationId xmlns:p14="http://schemas.microsoft.com/office/powerpoint/2010/main" val="313783324"/>
+        <p14:creationId xmlns:p14="http://schemas.microsoft.com/office/powerpoint/2010/main" val="1775229365"/>
       </p:ext>
     </p:extLst>
   </p:cSld>
@@ -4454,18 +4324,6 @@
           <a:bodyPr/>
           <a:lstStyle/>
           <a:p>
-            <a:r>
-              <a:rPr lang="es-ES" dirty="0"/>
-              <a:t>DONE: </a:t>
-            </a:r>
-            <a:r>
-              <a:rPr lang="es-ES" dirty="0" err="1"/>
-              <a:t>add</a:t>
-            </a:r>
-            <a:r>
-              <a:rPr lang="es-ES" dirty="0"/>
-              <a:t> AIC</a:t>
-            </a:r>
             <a:endParaRPr lang="en-GB" dirty="0"/>
           </a:p>
         </p:txBody>
@@ -4496,7 +4354,7 @@
     </p:spTree>
     <p:extLst>
       <p:ext uri="{BB962C8B-B14F-4D97-AF65-F5344CB8AC3E}">
-        <p14:creationId xmlns:p14="http://schemas.microsoft.com/office/powerpoint/2010/main" val="1775229365"/>
+        <p14:creationId xmlns:p14="http://schemas.microsoft.com/office/powerpoint/2010/main" val="2794133896"/>
       </p:ext>
     </p:extLst>
   </p:cSld>
@@ -4550,6 +4408,70 @@
           <a:bodyPr/>
           <a:lstStyle/>
           <a:p>
+            <a:pPr marL="0" marR="0" lvl="0" indent="0" algn="l" defTabSz="914400" rtl="0" eaLnBrk="1" fontAlgn="auto" latinLnBrk="0" hangingPunct="1">
+              <a:lnSpc>
+                <a:spcPct val="100000"/>
+              </a:lnSpc>
+              <a:spcBef>
+                <a:spcPts val="0"/>
+              </a:spcBef>
+              <a:spcAft>
+                <a:spcPts val="0"/>
+              </a:spcAft>
+              <a:buClrTx/>
+              <a:buSzTx/>
+              <a:buFontTx/>
+              <a:buNone/>
+              <a:tabLst/>
+              <a:defRPr/>
+            </a:pPr>
+            <a:r>
+              <a:rPr lang="en-US" dirty="0"/>
+              <a:t>Here are some potential interpretations based on this pattern:</a:t>
+            </a:r>
+            <a:br>
+              <a:rPr lang="en-US" dirty="0"/>
+            </a:br>
+            <a:br>
+              <a:rPr lang="en-US" dirty="0"/>
+            </a:br>
+            <a:r>
+              <a:rPr lang="en-US" dirty="0"/>
+              <a:t>Early High Risk: The initial phase of the curve being above the horizontal line indicates a higher risk or hazard rate in the early stages of the study. This suggests that individuals are more likely to experience the event of interest soon after entering the study or at the beginning of the follow-up period. </a:t>
+            </a:r>
+            <a:br>
+              <a:rPr lang="en-US" dirty="0"/>
+            </a:br>
+            <a:br>
+              <a:rPr lang="en-US" dirty="0"/>
+            </a:br>
+            <a:r>
+              <a:rPr lang="en-US" dirty="0"/>
+              <a:t>Stable Hazard: The middle portion of the curve being similar to a horizontal line suggests that the hazard rate remains relatively constant or stable over time. This implies that the risk of the event remains consistent throughout this period.</a:t>
+            </a:r>
+            <a:br>
+              <a:rPr lang="en-US" dirty="0"/>
+            </a:br>
+            <a:br>
+              <a:rPr lang="en-US" dirty="0"/>
+            </a:br>
+            <a:r>
+              <a:rPr lang="en-US" dirty="0"/>
+              <a:t>Late Increased Risk: The curve rising above the horizontal line towards the end indicates an increased hazard rate in the later stages of the study or follow-up period. This suggests that individuals become more susceptible to experiencing the event as time progresses.</a:t>
+            </a:r>
+            <a:br>
+              <a:rPr lang="en-US" dirty="0"/>
+            </a:br>
+            <a:br>
+              <a:rPr lang="en-US" dirty="0"/>
+            </a:br>
+            <a:r>
+              <a:rPr lang="en-US" dirty="0"/>
+              <a:t>The observed pattern could indicate non-proportional hazards, which means that the hazard ratios associated with certain covariates or variables are not constant over time. This violation of the proportional hazards assumption might suggest that the effect of certain factors on the event of interest changes over time.</a:t>
+            </a:r>
+            <a:endParaRPr lang="en-GB" dirty="0"/>
+          </a:p>
+          <a:p>
             <a:endParaRPr lang="en-GB" dirty="0"/>
           </a:p>
         </p:txBody>
@@ -4572,90 +4494,6 @@
             <a:fld id="{85EBC9E2-2C9A-438E-83DE-17F69134D413}" type="slidenum">
               <a:rPr lang="en-GB" smtClean="0"/>
               <a:t>22</a:t>
-            </a:fld>
-            <a:endParaRPr lang="en-GB"/>
-          </a:p>
-        </p:txBody>
-      </p:sp>
-    </p:spTree>
-    <p:extLst>
-      <p:ext uri="{BB962C8B-B14F-4D97-AF65-F5344CB8AC3E}">
-        <p14:creationId xmlns:p14="http://schemas.microsoft.com/office/powerpoint/2010/main" val="2794133896"/>
-      </p:ext>
-    </p:extLst>
-  </p:cSld>
-  <p:clrMapOvr>
-    <a:masterClrMapping/>
-  </p:clrMapOvr>
-</p:notes>
-</file>
-
-<file path=ppt/notesSlides/notesSlide22.xml><?xml version="1.0" encoding="utf-8"?>
-<p:notes xmlns:a="http://schemas.openxmlformats.org/drawingml/2006/main" xmlns:r="http://schemas.openxmlformats.org/officeDocument/2006/relationships" xmlns:p="http://schemas.openxmlformats.org/presentationml/2006/main">
-  <p:cSld>
-    <p:spTree>
-      <p:nvGrpSpPr>
-        <p:cNvPr id="1" name=""/>
-        <p:cNvGrpSpPr/>
-        <p:nvPr/>
-      </p:nvGrpSpPr>
-      <p:grpSpPr>
-        <a:xfrm>
-          <a:off x="0" y="0"/>
-          <a:ext cx="0" cy="0"/>
-          <a:chOff x="0" y="0"/>
-          <a:chExt cx="0" cy="0"/>
-        </a:xfrm>
-      </p:grpSpPr>
-      <p:sp>
-        <p:nvSpPr>
-          <p:cNvPr id="2" name="Slide Image Placeholder 1"/>
-          <p:cNvSpPr>
-            <a:spLocks noGrp="1" noRot="1" noChangeAspect="1"/>
-          </p:cNvSpPr>
-          <p:nvPr>
-            <p:ph type="sldImg"/>
-          </p:nvPr>
-        </p:nvSpPr>
-        <p:spPr/>
-      </p:sp>
-      <p:sp>
-        <p:nvSpPr>
-          <p:cNvPr id="3" name="Notes Placeholder 2"/>
-          <p:cNvSpPr>
-            <a:spLocks noGrp="1"/>
-          </p:cNvSpPr>
-          <p:nvPr>
-            <p:ph type="body" idx="1"/>
-          </p:nvPr>
-        </p:nvSpPr>
-        <p:spPr/>
-        <p:txBody>
-          <a:bodyPr/>
-          <a:lstStyle/>
-          <a:p>
-            <a:endParaRPr lang="en-GB" dirty="0"/>
-          </a:p>
-        </p:txBody>
-      </p:sp>
-      <p:sp>
-        <p:nvSpPr>
-          <p:cNvPr id="4" name="Slide Number Placeholder 3"/>
-          <p:cNvSpPr>
-            <a:spLocks noGrp="1"/>
-          </p:cNvSpPr>
-          <p:nvPr>
-            <p:ph type="sldNum" sz="quarter" idx="5"/>
-          </p:nvPr>
-        </p:nvSpPr>
-        <p:spPr/>
-        <p:txBody>
-          <a:bodyPr/>
-          <a:lstStyle/>
-          <a:p>
-            <a:fld id="{85EBC9E2-2C9A-438E-83DE-17F69134D413}" type="slidenum">
-              <a:rPr lang="en-GB" smtClean="0"/>
-              <a:t>23</a:t>
             </a:fld>
             <a:endParaRPr lang="en-GB"/>
           </a:p>
@@ -5651,6 +5489,191 @@
               <a:rPr lang="es-ES" b="0" dirty="0"/>
               <a:t> use Wilcoxon.</a:t>
             </a:r>
+          </a:p>
+          <a:p>
+            <a:endParaRPr lang="es-ES" b="0" dirty="0"/>
+          </a:p>
+          <a:p>
+            <a:r>
+              <a:rPr lang="es-ES" b="0" dirty="0"/>
+              <a:t>H0 in </a:t>
+            </a:r>
+            <a:r>
+              <a:rPr lang="es-ES" b="0" dirty="0" err="1"/>
+              <a:t>both</a:t>
+            </a:r>
+            <a:r>
+              <a:rPr lang="es-ES" b="0" dirty="0"/>
+              <a:t> </a:t>
+            </a:r>
+            <a:r>
+              <a:rPr lang="es-ES" b="0" dirty="0" err="1"/>
+              <a:t>tests</a:t>
+            </a:r>
+            <a:r>
+              <a:rPr lang="es-ES" b="0" dirty="0"/>
+              <a:t>: No </a:t>
+            </a:r>
+            <a:r>
+              <a:rPr lang="es-ES" b="0" dirty="0" err="1"/>
+              <a:t>effect</a:t>
+            </a:r>
+            <a:r>
+              <a:rPr lang="es-ES" b="0" dirty="0"/>
+              <a:t> </a:t>
+            </a:r>
+            <a:r>
+              <a:rPr lang="es-ES" b="0" dirty="0" err="1"/>
+              <a:t>of</a:t>
+            </a:r>
+            <a:r>
+              <a:rPr lang="es-ES" b="0" dirty="0"/>
+              <a:t> </a:t>
+            </a:r>
+            <a:r>
+              <a:rPr lang="es-ES" b="0" dirty="0" err="1"/>
+              <a:t>the</a:t>
+            </a:r>
+            <a:r>
+              <a:rPr lang="es-ES" b="0" dirty="0"/>
+              <a:t> </a:t>
+            </a:r>
+            <a:r>
+              <a:rPr lang="es-ES" b="0" dirty="0" err="1"/>
+              <a:t>corresponding</a:t>
+            </a:r>
+            <a:r>
+              <a:rPr lang="es-ES" b="0" dirty="0"/>
+              <a:t> variable </a:t>
+            </a:r>
+            <a:r>
+              <a:rPr lang="es-ES" b="0" dirty="0" err="1"/>
+              <a:t>on</a:t>
+            </a:r>
+            <a:r>
+              <a:rPr lang="es-ES" b="0" dirty="0"/>
+              <a:t> </a:t>
+            </a:r>
+            <a:r>
+              <a:rPr lang="es-ES" b="0" dirty="0" err="1"/>
+              <a:t>the</a:t>
+            </a:r>
+            <a:r>
+              <a:rPr lang="es-ES" b="0" dirty="0"/>
+              <a:t> </a:t>
+            </a:r>
+            <a:r>
+              <a:rPr lang="es-ES" b="0" dirty="0" err="1"/>
+              <a:t>survival</a:t>
+            </a:r>
+            <a:r>
+              <a:rPr lang="es-ES" b="0" dirty="0"/>
+              <a:t> </a:t>
+            </a:r>
+            <a:r>
+              <a:rPr lang="es-ES" b="0" dirty="0" err="1"/>
+              <a:t>probability</a:t>
+            </a:r>
+            <a:r>
+              <a:rPr lang="es-ES" b="0" dirty="0"/>
+              <a:t>. </a:t>
+            </a:r>
+            <a:r>
+              <a:rPr lang="es-ES" b="0" dirty="0" err="1"/>
+              <a:t>Therefore</a:t>
+            </a:r>
+            <a:r>
+              <a:rPr lang="es-ES" b="0" dirty="0"/>
+              <a:t>, </a:t>
+            </a:r>
+            <a:r>
+              <a:rPr lang="es-ES" b="0" dirty="0" err="1"/>
+              <a:t>the</a:t>
+            </a:r>
+            <a:r>
+              <a:rPr lang="es-ES" b="0" dirty="0"/>
+              <a:t> </a:t>
+            </a:r>
+            <a:r>
+              <a:rPr lang="es-ES" b="0" dirty="0" err="1"/>
+              <a:t>low</a:t>
+            </a:r>
+            <a:r>
+              <a:rPr lang="es-ES" b="0" dirty="0"/>
+              <a:t> p-</a:t>
+            </a:r>
+            <a:r>
+              <a:rPr lang="es-ES" b="0" dirty="0" err="1"/>
+              <a:t>values</a:t>
+            </a:r>
+            <a:r>
+              <a:rPr lang="es-ES" b="0" dirty="0"/>
+              <a:t> </a:t>
+            </a:r>
+            <a:r>
+              <a:rPr lang="es-ES" b="0" dirty="0" err="1"/>
+              <a:t>for</a:t>
+            </a:r>
+            <a:r>
+              <a:rPr lang="es-ES" b="0" dirty="0"/>
+              <a:t> </a:t>
+            </a:r>
+            <a:r>
+              <a:rPr lang="es-ES" b="0" dirty="0" err="1"/>
+              <a:t>some</a:t>
+            </a:r>
+            <a:r>
+              <a:rPr lang="es-ES" b="0" dirty="0"/>
+              <a:t> variables </a:t>
+            </a:r>
+            <a:r>
+              <a:rPr lang="es-ES" b="0" dirty="0" err="1"/>
+              <a:t>indicate</a:t>
+            </a:r>
+            <a:r>
+              <a:rPr lang="es-ES" b="0" dirty="0"/>
+              <a:t> </a:t>
+            </a:r>
+            <a:r>
+              <a:rPr lang="es-ES" b="0" dirty="0" err="1"/>
+              <a:t>that</a:t>
+            </a:r>
+            <a:r>
+              <a:rPr lang="es-ES" b="0" dirty="0"/>
+              <a:t> </a:t>
+            </a:r>
+            <a:r>
+              <a:rPr lang="es-ES" b="0" dirty="0" err="1"/>
+              <a:t>there</a:t>
+            </a:r>
+            <a:r>
+              <a:rPr lang="es-ES" b="0" dirty="0"/>
+              <a:t> are </a:t>
+            </a:r>
+            <a:r>
+              <a:rPr lang="es-ES" b="0" dirty="0" err="1"/>
+              <a:t>some</a:t>
+            </a:r>
+            <a:r>
+              <a:rPr lang="es-ES" b="0" dirty="0"/>
+              <a:t> </a:t>
+            </a:r>
+            <a:r>
+              <a:rPr lang="es-ES" b="0" dirty="0" err="1"/>
+              <a:t>univariate</a:t>
+            </a:r>
+            <a:r>
+              <a:rPr lang="es-ES" b="0" dirty="0"/>
+              <a:t> </a:t>
+            </a:r>
+            <a:r>
+              <a:rPr lang="es-ES" b="0" dirty="0" err="1"/>
+              <a:t>effects</a:t>
+            </a:r>
+            <a:r>
+              <a:rPr lang="es-ES" b="0" dirty="0"/>
+              <a:t>.</a:t>
+            </a:r>
             <a:endParaRPr lang="en-GB" b="0" dirty="0"/>
           </a:p>
         </p:txBody>
@@ -5820,42 +5843,78 @@
           <a:lstStyle/>
           <a:p>
             <a:r>
-              <a:rPr lang="es-ES" b="0" dirty="0"/>
-              <a:t>DONE: Show </a:t>
-            </a:r>
-            <a:r>
-              <a:rPr lang="es-ES" b="0" dirty="0" err="1"/>
-              <a:t>some</a:t>
-            </a:r>
-            <a:r>
-              <a:rPr lang="es-ES" b="0" dirty="0"/>
-              <a:t> </a:t>
-            </a:r>
-            <a:r>
-              <a:rPr lang="es-ES" b="0" dirty="0" err="1"/>
-              <a:t>bad</a:t>
-            </a:r>
-            <a:r>
-              <a:rPr lang="es-ES" b="0" dirty="0"/>
-              <a:t> </a:t>
-            </a:r>
-            <a:r>
-              <a:rPr lang="es-ES" b="0" dirty="0" err="1"/>
-              <a:t>examples</a:t>
-            </a:r>
-            <a:r>
-              <a:rPr lang="es-ES" b="0" dirty="0"/>
-              <a:t> </a:t>
-            </a:r>
-            <a:r>
-              <a:rPr lang="es-ES" b="0" dirty="0" err="1"/>
-              <a:t>like</a:t>
-            </a:r>
-            <a:r>
-              <a:rPr lang="es-ES" b="0" dirty="0"/>
-              <a:t> CPK</a:t>
-            </a:r>
-            <a:endParaRPr lang="en-GB" b="0" dirty="0"/>
+              <a:rPr lang="es-ES" dirty="0" err="1"/>
+              <a:t>For</a:t>
+            </a:r>
+            <a:r>
+              <a:rPr lang="es-ES" dirty="0"/>
+              <a:t> CPK, </a:t>
+            </a:r>
+            <a:r>
+              <a:rPr lang="es-ES" dirty="0" err="1"/>
+              <a:t>the</a:t>
+            </a:r>
+            <a:r>
+              <a:rPr lang="es-ES" dirty="0"/>
+              <a:t> </a:t>
+            </a:r>
+            <a:r>
+              <a:rPr lang="es-ES" dirty="0" err="1"/>
+              <a:t>exact</a:t>
+            </a:r>
+            <a:r>
+              <a:rPr lang="es-ES" dirty="0"/>
+              <a:t> </a:t>
+            </a:r>
+            <a:r>
+              <a:rPr lang="es-ES" dirty="0" err="1"/>
+              <a:t>value</a:t>
+            </a:r>
+            <a:r>
+              <a:rPr lang="es-ES" dirty="0"/>
+              <a:t> </a:t>
+            </a:r>
+            <a:r>
+              <a:rPr lang="es-ES" dirty="0" err="1"/>
+              <a:t>is</a:t>
+            </a:r>
+            <a:r>
+              <a:rPr lang="es-ES" dirty="0"/>
+              <a:t>: </a:t>
+            </a:r>
+            <a:r>
+              <a:rPr lang="es-ES" dirty="0" err="1"/>
+              <a:t>exp</a:t>
+            </a:r>
+            <a:r>
+              <a:rPr lang="es-ES" dirty="0"/>
+              <a:t>(</a:t>
+            </a:r>
+            <a:r>
+              <a:rPr lang="es-ES" dirty="0" err="1"/>
+              <a:t>coef</a:t>
+            </a:r>
+            <a:r>
+              <a:rPr lang="es-ES" dirty="0"/>
+              <a:t>) = 1.000221 -&gt; </a:t>
+            </a:r>
+            <a:r>
+              <a:rPr lang="es-ES" dirty="0" err="1"/>
+              <a:t>significant</a:t>
+            </a:r>
+            <a:r>
+              <a:rPr lang="es-ES" dirty="0"/>
+              <a:t> </a:t>
+            </a:r>
+            <a:r>
+              <a:rPr lang="es-ES" dirty="0" err="1"/>
+              <a:t>risk</a:t>
+            </a:r>
+            <a:r>
+              <a:rPr lang="es-ES" dirty="0"/>
+              <a:t> factor</a:t>
+            </a:r>
+            <a:endParaRPr lang="en-GB" dirty="0"/>
           </a:p>
         </p:txBody>
       </p:sp>
@@ -5885,7 +5944,7 @@
     </p:spTree>
     <p:extLst>
       <p:ext uri="{BB962C8B-B14F-4D97-AF65-F5344CB8AC3E}">
-        <p14:creationId xmlns:p14="http://schemas.microsoft.com/office/powerpoint/2010/main" val="3595966724"/>
+        <p14:creationId xmlns:p14="http://schemas.microsoft.com/office/powerpoint/2010/main" val="2652534523"/>
       </p:ext>
     </p:extLst>
   </p:cSld>
@@ -6112,7 +6171,7 @@
           <a:p>
             <a:fld id="{A1B2EB48-0D68-46EB-BB33-70996AFA08CC}" type="datetimeFigureOut">
               <a:rPr lang="en-GB" smtClean="0"/>
-              <a:t>04/06/2023</a:t>
+              <a:t>06/06/2023</a:t>
             </a:fld>
             <a:endParaRPr lang="en-GB"/>
           </a:p>
@@ -6447,7 +6506,7 @@
           <a:p>
             <a:fld id="{A1B2EB48-0D68-46EB-BB33-70996AFA08CC}" type="datetimeFigureOut">
               <a:rPr lang="en-GB" smtClean="0"/>
-              <a:t>04/06/2023</a:t>
+              <a:t>06/06/2023</a:t>
             </a:fld>
             <a:endParaRPr lang="en-GB"/>
           </a:p>
@@ -6750,7 +6809,7 @@
           <a:p>
             <a:fld id="{A1B2EB48-0D68-46EB-BB33-70996AFA08CC}" type="datetimeFigureOut">
               <a:rPr lang="en-GB" smtClean="0"/>
-              <a:t>04/06/2023</a:t>
+              <a:t>06/06/2023</a:t>
             </a:fld>
             <a:endParaRPr lang="en-GB"/>
           </a:p>
@@ -6998,7 +7057,7 @@
           <a:p>
             <a:fld id="{A1B2EB48-0D68-46EB-BB33-70996AFA08CC}" type="datetimeFigureOut">
               <a:rPr lang="en-GB" smtClean="0"/>
-              <a:t>04/06/2023</a:t>
+              <a:t>06/06/2023</a:t>
             </a:fld>
             <a:endParaRPr lang="en-GB"/>
           </a:p>
@@ -7406,7 +7465,7 @@
           <a:p>
             <a:fld id="{A1B2EB48-0D68-46EB-BB33-70996AFA08CC}" type="datetimeFigureOut">
               <a:rPr lang="en-GB" smtClean="0"/>
-              <a:t>04/06/2023</a:t>
+              <a:t>06/06/2023</a:t>
             </a:fld>
             <a:endParaRPr lang="en-GB"/>
           </a:p>
@@ -7721,7 +7780,7 @@
           <a:p>
             <a:fld id="{A1B2EB48-0D68-46EB-BB33-70996AFA08CC}" type="datetimeFigureOut">
               <a:rPr lang="en-GB" smtClean="0"/>
-              <a:t>04/06/2023</a:t>
+              <a:t>06/06/2023</a:t>
             </a:fld>
             <a:endParaRPr lang="en-GB"/>
           </a:p>
@@ -8266,7 +8325,7 @@
           <a:p>
             <a:fld id="{A1B2EB48-0D68-46EB-BB33-70996AFA08CC}" type="datetimeFigureOut">
               <a:rPr lang="en-GB" smtClean="0"/>
-              <a:t>04/06/2023</a:t>
+              <a:t>06/06/2023</a:t>
             </a:fld>
             <a:endParaRPr lang="en-GB"/>
           </a:p>
@@ -8462,7 +8521,7 @@
           <a:p>
             <a:fld id="{A1B2EB48-0D68-46EB-BB33-70996AFA08CC}" type="datetimeFigureOut">
               <a:rPr lang="en-GB" smtClean="0"/>
-              <a:t>04/06/2023</a:t>
+              <a:t>06/06/2023</a:t>
             </a:fld>
             <a:endParaRPr lang="en-GB"/>
           </a:p>
@@ -8676,7 +8735,7 @@
           <a:p>
             <a:fld id="{A1B2EB48-0D68-46EB-BB33-70996AFA08CC}" type="datetimeFigureOut">
               <a:rPr lang="en-GB" smtClean="0"/>
-              <a:t>04/06/2023</a:t>
+              <a:t>06/06/2023</a:t>
             </a:fld>
             <a:endParaRPr lang="en-GB"/>
           </a:p>
@@ -9046,7 +9105,7 @@
           <a:p>
             <a:fld id="{A1B2EB48-0D68-46EB-BB33-70996AFA08CC}" type="datetimeFigureOut">
               <a:rPr lang="en-GB" smtClean="0"/>
-              <a:t>04/06/2023</a:t>
+              <a:t>06/06/2023</a:t>
             </a:fld>
             <a:endParaRPr lang="en-GB"/>
           </a:p>
@@ -9450,7 +9509,7 @@
           <a:p>
             <a:fld id="{A1B2EB48-0D68-46EB-BB33-70996AFA08CC}" type="datetimeFigureOut">
               <a:rPr lang="en-GB" smtClean="0"/>
-              <a:t>04/06/2023</a:t>
+              <a:t>06/06/2023</a:t>
             </a:fld>
             <a:endParaRPr lang="en-GB"/>
           </a:p>
@@ -9762,7 +9821,7 @@
           <a:p>
             <a:fld id="{A1B2EB48-0D68-46EB-BB33-70996AFA08CC}" type="datetimeFigureOut">
               <a:rPr lang="en-GB" smtClean="0"/>
-              <a:t>04/06/2023</a:t>
+              <a:t>06/06/2023</a:t>
             </a:fld>
             <a:endParaRPr lang="en-GB"/>
           </a:p>
@@ -10475,213 +10534,6 @@
           <p:cNvPr id="2" name="Title 1">
             <a:extLst>
               <a:ext uri="{FF2B5EF4-FFF2-40B4-BE49-F238E27FC236}">
-                <a16:creationId xmlns:a16="http://schemas.microsoft.com/office/drawing/2014/main" id="{9CEF219F-A752-AF3A-FEDC-8EB897838D43}"/>
-              </a:ext>
-            </a:extLst>
-          </p:cNvPr>
-          <p:cNvSpPr>
-            <a:spLocks noGrp="1"/>
-          </p:cNvSpPr>
-          <p:nvPr>
-            <p:ph type="title"/>
-          </p:nvPr>
-        </p:nvSpPr>
-        <p:spPr/>
-        <p:txBody>
-          <a:bodyPr/>
-          <a:lstStyle/>
-          <a:p>
-            <a:r>
-              <a:rPr lang="es-ES" dirty="0" err="1"/>
-              <a:t>ii</a:t>
-            </a:r>
-            <a:r>
-              <a:rPr lang="es-ES" dirty="0"/>
-              <a:t>. </a:t>
-            </a:r>
-            <a:r>
-              <a:rPr lang="es-ES" dirty="0" err="1"/>
-              <a:t>Univariate</a:t>
-            </a:r>
-            <a:r>
-              <a:rPr lang="es-ES" dirty="0"/>
-              <a:t> </a:t>
-            </a:r>
-            <a:r>
-              <a:rPr lang="es-ES" dirty="0" err="1"/>
-              <a:t>analysis</a:t>
-            </a:r>
-            <a:endParaRPr lang="en-GB" dirty="0"/>
-          </a:p>
-        </p:txBody>
-      </p:sp>
-      <p:sp>
-        <p:nvSpPr>
-          <p:cNvPr id="7" name="Content Placeholder 6">
-            <a:extLst>
-              <a:ext uri="{FF2B5EF4-FFF2-40B4-BE49-F238E27FC236}">
-                <a16:creationId xmlns:a16="http://schemas.microsoft.com/office/drawing/2014/main" id="{38434C18-E629-8B9D-4E85-3B193564F614}"/>
-              </a:ext>
-            </a:extLst>
-          </p:cNvPr>
-          <p:cNvSpPr>
-            <a:spLocks noGrp="1"/>
-          </p:cNvSpPr>
-          <p:nvPr>
-            <p:ph idx="1"/>
-          </p:nvPr>
-        </p:nvSpPr>
-        <p:spPr>
-          <a:xfrm>
-            <a:off x="2197729" y="1346670"/>
-            <a:ext cx="7796540" cy="895621"/>
-          </a:xfrm>
-        </p:spPr>
-        <p:txBody>
-          <a:bodyPr/>
-          <a:lstStyle/>
-          <a:p>
-            <a:r>
-              <a:rPr lang="es-ES" b="1" dirty="0" err="1"/>
-              <a:t>Fitting</a:t>
-            </a:r>
-            <a:r>
-              <a:rPr lang="es-ES" b="1" dirty="0"/>
-              <a:t> KM vs. Cox</a:t>
-            </a:r>
-            <a:r>
-              <a:rPr lang="es-ES" dirty="0"/>
-              <a:t>:</a:t>
-            </a:r>
-            <a:endParaRPr lang="en-GB" dirty="0"/>
-          </a:p>
-        </p:txBody>
-      </p:sp>
-      <p:pic>
-        <p:nvPicPr>
-          <p:cNvPr id="4" name="Picture 3">
-            <a:extLst>
-              <a:ext uri="{FF2B5EF4-FFF2-40B4-BE49-F238E27FC236}">
-                <a16:creationId xmlns:a16="http://schemas.microsoft.com/office/drawing/2014/main" id="{D0F543CC-75E1-85C8-3A06-00BC5D714534}"/>
-              </a:ext>
-            </a:extLst>
-          </p:cNvPr>
-          <p:cNvPicPr>
-            <a:picLocks noChangeAspect="1"/>
-          </p:cNvPicPr>
-          <p:nvPr/>
-        </p:nvPicPr>
-        <p:blipFill>
-          <a:blip r:embed="rId3"/>
-          <a:stretch>
-            <a:fillRect/>
-          </a:stretch>
-        </p:blipFill>
-        <p:spPr>
-          <a:xfrm>
-            <a:off x="7960321" y="2242291"/>
-            <a:ext cx="3291694" cy="3291694"/>
-          </a:xfrm>
-          <a:prstGeom prst="rect">
-            <a:avLst/>
-          </a:prstGeom>
-        </p:spPr>
-      </p:pic>
-      <p:pic>
-        <p:nvPicPr>
-          <p:cNvPr id="6" name="Picture 5">
-            <a:extLst>
-              <a:ext uri="{FF2B5EF4-FFF2-40B4-BE49-F238E27FC236}">
-                <a16:creationId xmlns:a16="http://schemas.microsoft.com/office/drawing/2014/main" id="{D4145D2D-23AC-AB5C-368A-11068A15779B}"/>
-              </a:ext>
-            </a:extLst>
-          </p:cNvPr>
-          <p:cNvPicPr>
-            <a:picLocks noChangeAspect="1"/>
-          </p:cNvPicPr>
-          <p:nvPr/>
-        </p:nvPicPr>
-        <p:blipFill>
-          <a:blip r:embed="rId4"/>
-          <a:stretch>
-            <a:fillRect/>
-          </a:stretch>
-        </p:blipFill>
-        <p:spPr>
-          <a:xfrm>
-            <a:off x="1102654" y="2232756"/>
-            <a:ext cx="3278574" cy="3278574"/>
-          </a:xfrm>
-          <a:prstGeom prst="rect">
-            <a:avLst/>
-          </a:prstGeom>
-        </p:spPr>
-      </p:pic>
-      <p:pic>
-        <p:nvPicPr>
-          <p:cNvPr id="9" name="Picture 8">
-            <a:extLst>
-              <a:ext uri="{FF2B5EF4-FFF2-40B4-BE49-F238E27FC236}">
-                <a16:creationId xmlns:a16="http://schemas.microsoft.com/office/drawing/2014/main" id="{9FC6682C-ED6B-1F30-0169-B0817D0C03CD}"/>
-              </a:ext>
-            </a:extLst>
-          </p:cNvPr>
-          <p:cNvPicPr>
-            <a:picLocks noChangeAspect="1"/>
-          </p:cNvPicPr>
-          <p:nvPr/>
-        </p:nvPicPr>
-        <p:blipFill>
-          <a:blip r:embed="rId5"/>
-          <a:stretch>
-            <a:fillRect/>
-          </a:stretch>
-        </p:blipFill>
-        <p:spPr>
-          <a:xfrm>
-            <a:off x="4538047" y="2232756"/>
-            <a:ext cx="3278574" cy="3278574"/>
-          </a:xfrm>
-          <a:prstGeom prst="rect">
-            <a:avLst/>
-          </a:prstGeom>
-        </p:spPr>
-      </p:pic>
-    </p:spTree>
-    <p:extLst>
-      <p:ext uri="{BB962C8B-B14F-4D97-AF65-F5344CB8AC3E}">
-        <p14:creationId xmlns:p14="http://schemas.microsoft.com/office/powerpoint/2010/main" val="2977306387"/>
-      </p:ext>
-    </p:extLst>
-  </p:cSld>
-  <p:clrMapOvr>
-    <a:masterClrMapping/>
-  </p:clrMapOvr>
-</p:sld>
-</file>
-
-<file path=ppt/slides/slide11.xml><?xml version="1.0" encoding="utf-8"?>
-<p:sld xmlns:a="http://schemas.openxmlformats.org/drawingml/2006/main" xmlns:r="http://schemas.openxmlformats.org/officeDocument/2006/relationships" xmlns:p="http://schemas.openxmlformats.org/presentationml/2006/main">
-  <p:cSld>
-    <p:spTree>
-      <p:nvGrpSpPr>
-        <p:cNvPr id="1" name=""/>
-        <p:cNvGrpSpPr/>
-        <p:nvPr/>
-      </p:nvGrpSpPr>
-      <p:grpSpPr>
-        <a:xfrm>
-          <a:off x="0" y="0"/>
-          <a:ext cx="0" cy="0"/>
-          <a:chOff x="0" y="0"/>
-          <a:chExt cx="0" cy="0"/>
-        </a:xfrm>
-      </p:grpSpPr>
-      <p:sp>
-        <p:nvSpPr>
-          <p:cNvPr id="2" name="Title 1">
-            <a:extLst>
-              <a:ext uri="{FF2B5EF4-FFF2-40B4-BE49-F238E27FC236}">
                 <a16:creationId xmlns:a16="http://schemas.microsoft.com/office/drawing/2014/main" id="{497E08B4-1A21-5C4A-FF59-0254370A8800}"/>
               </a:ext>
             </a:extLst>
@@ -11039,7 +10891,7 @@
 </p:sld>
 </file>
 
-<file path=ppt/slides/slide12.xml><?xml version="1.0" encoding="utf-8"?>
+<file path=ppt/slides/slide11.xml><?xml version="1.0" encoding="utf-8"?>
 <p:sld xmlns:a="http://schemas.openxmlformats.org/drawingml/2006/main" xmlns:r="http://schemas.openxmlformats.org/officeDocument/2006/relationships" xmlns:p="http://schemas.openxmlformats.org/presentationml/2006/main">
   <p:cSld>
     <p:spTree>
@@ -11337,7 +11189,7 @@
 </p:sld>
 </file>
 
-<file path=ppt/slides/slide13.xml><?xml version="1.0" encoding="utf-8"?>
+<file path=ppt/slides/slide12.xml><?xml version="1.0" encoding="utf-8"?>
 <p:sld xmlns:a="http://schemas.openxmlformats.org/drawingml/2006/main" xmlns:r="http://schemas.openxmlformats.org/officeDocument/2006/relationships" xmlns:p="http://schemas.openxmlformats.org/presentationml/2006/main">
   <p:cSld>
     <p:spTree>
@@ -11888,7 +11740,7 @@
 </p:sld>
 </file>
 
-<file path=ppt/slides/slide14.xml><?xml version="1.0" encoding="utf-8"?>
+<file path=ppt/slides/slide13.xml><?xml version="1.0" encoding="utf-8"?>
 <p:sld xmlns:a="http://schemas.openxmlformats.org/drawingml/2006/main" xmlns:r="http://schemas.openxmlformats.org/officeDocument/2006/relationships" xmlns:p="http://schemas.openxmlformats.org/presentationml/2006/main">
   <p:cSld>
     <p:spTree>
@@ -12274,7 +12126,7 @@
 </p:sld>
 </file>
 
-<file path=ppt/slides/slide15.xml><?xml version="1.0" encoding="utf-8"?>
+<file path=ppt/slides/slide14.xml><?xml version="1.0" encoding="utf-8"?>
 <p:sld xmlns:a="http://schemas.openxmlformats.org/drawingml/2006/main" xmlns:r="http://schemas.openxmlformats.org/officeDocument/2006/relationships" xmlns:p="http://schemas.openxmlformats.org/presentationml/2006/main">
   <p:cSld>
     <p:spTree>
@@ -12757,7 +12609,7 @@
 </p:sld>
 </file>
 
-<file path=ppt/slides/slide16.xml><?xml version="1.0" encoding="utf-8"?>
+<file path=ppt/slides/slide15.xml><?xml version="1.0" encoding="utf-8"?>
 <p:sld xmlns:a="http://schemas.openxmlformats.org/drawingml/2006/main" xmlns:r="http://schemas.openxmlformats.org/officeDocument/2006/relationships" xmlns:p="http://schemas.openxmlformats.org/presentationml/2006/main">
   <p:cSld>
     <p:spTree>
@@ -13531,7 +13383,7 @@
 </p:sld>
 </file>
 
-<file path=ppt/slides/slide17.xml><?xml version="1.0" encoding="utf-8"?>
+<file path=ppt/slides/slide16.xml><?xml version="1.0" encoding="utf-8"?>
 <p:sld xmlns:a="http://schemas.openxmlformats.org/drawingml/2006/main" xmlns:r="http://schemas.openxmlformats.org/officeDocument/2006/relationships" xmlns:p="http://schemas.openxmlformats.org/presentationml/2006/main">
   <p:cSld>
     <p:spTree>
@@ -13742,7 +13594,7 @@
 </p:sld>
 </file>
 
-<file path=ppt/slides/slide18.xml><?xml version="1.0" encoding="utf-8"?>
+<file path=ppt/slides/slide17.xml><?xml version="1.0" encoding="utf-8"?>
 <p:sld xmlns:a="http://schemas.openxmlformats.org/drawingml/2006/main" xmlns:r="http://schemas.openxmlformats.org/officeDocument/2006/relationships" xmlns:p="http://schemas.openxmlformats.org/presentationml/2006/main">
   <p:cSld>
     <p:spTree>
@@ -13953,7 +13805,7 @@
 </p:sld>
 </file>
 
-<file path=ppt/slides/slide19.xml><?xml version="1.0" encoding="utf-8"?>
+<file path=ppt/slides/slide18.xml><?xml version="1.0" encoding="utf-8"?>
 <p:sld xmlns:a="http://schemas.openxmlformats.org/drawingml/2006/main" xmlns:r="http://schemas.openxmlformats.org/officeDocument/2006/relationships" xmlns:p="http://schemas.openxmlformats.org/presentationml/2006/main">
   <p:cSld>
     <p:spTree>
@@ -14198,324 +14050,7 @@
 </p:sld>
 </file>
 
-<file path=ppt/slides/slide2.xml><?xml version="1.0" encoding="utf-8"?>
-<p:sld xmlns:a="http://schemas.openxmlformats.org/drawingml/2006/main" xmlns:r="http://schemas.openxmlformats.org/officeDocument/2006/relationships" xmlns:p="http://schemas.openxmlformats.org/presentationml/2006/main">
-  <p:cSld>
-    <p:spTree>
-      <p:nvGrpSpPr>
-        <p:cNvPr id="1" name=""/>
-        <p:cNvGrpSpPr/>
-        <p:nvPr/>
-      </p:nvGrpSpPr>
-      <p:grpSpPr>
-        <a:xfrm>
-          <a:off x="0" y="0"/>
-          <a:ext cx="0" cy="0"/>
-          <a:chOff x="0" y="0"/>
-          <a:chExt cx="0" cy="0"/>
-        </a:xfrm>
-      </p:grpSpPr>
-      <p:sp>
-        <p:nvSpPr>
-          <p:cNvPr id="2" name="Title 1">
-            <a:extLst>
-              <a:ext uri="{FF2B5EF4-FFF2-40B4-BE49-F238E27FC236}">
-                <a16:creationId xmlns:a16="http://schemas.microsoft.com/office/drawing/2014/main" id="{45B66112-171E-1ECA-8B21-B617C495018A}"/>
-              </a:ext>
-            </a:extLst>
-          </p:cNvPr>
-          <p:cNvSpPr>
-            <a:spLocks noGrp="1"/>
-          </p:cNvSpPr>
-          <p:nvPr>
-            <p:ph type="title"/>
-          </p:nvPr>
-        </p:nvSpPr>
-        <p:spPr/>
-        <p:txBody>
-          <a:bodyPr/>
-          <a:lstStyle/>
-          <a:p>
-            <a:r>
-              <a:rPr lang="es-ES" dirty="0"/>
-              <a:t>Table </a:t>
-            </a:r>
-            <a:r>
-              <a:rPr lang="es-ES" dirty="0" err="1"/>
-              <a:t>of</a:t>
-            </a:r>
-            <a:r>
-              <a:rPr lang="es-ES" dirty="0"/>
-              <a:t> </a:t>
-            </a:r>
-            <a:r>
-              <a:rPr lang="es-ES" dirty="0" err="1"/>
-              <a:t>Contents</a:t>
-            </a:r>
-            <a:endParaRPr lang="en-GB" dirty="0"/>
-          </a:p>
-        </p:txBody>
-      </p:sp>
-      <p:sp>
-        <p:nvSpPr>
-          <p:cNvPr id="3" name="Content Placeholder 2">
-            <a:extLst>
-              <a:ext uri="{FF2B5EF4-FFF2-40B4-BE49-F238E27FC236}">
-                <a16:creationId xmlns:a16="http://schemas.microsoft.com/office/drawing/2014/main" id="{9E28193F-FE09-8E4B-A363-00025BEC7E88}"/>
-              </a:ext>
-            </a:extLst>
-          </p:cNvPr>
-          <p:cNvSpPr>
-            <a:spLocks noGrp="1"/>
-          </p:cNvSpPr>
-          <p:nvPr>
-            <p:ph idx="1"/>
-          </p:nvPr>
-        </p:nvSpPr>
-        <p:spPr>
-          <a:xfrm>
-            <a:off x="2611808" y="1885285"/>
-            <a:ext cx="7958331" cy="4164659"/>
-          </a:xfrm>
-        </p:spPr>
-        <p:txBody>
-          <a:bodyPr>
-            <a:normAutofit lnSpcReduction="10000"/>
-          </a:bodyPr>
-          <a:lstStyle/>
-          <a:p>
-            <a:pPr marL="514350" indent="-514350">
-              <a:buFont typeface="+mj-lt"/>
-              <a:buAutoNum type="romanLcPeriod"/>
-            </a:pPr>
-            <a:r>
-              <a:rPr lang="es-ES" dirty="0" err="1"/>
-              <a:t>Introduction</a:t>
-            </a:r>
-            <a:r>
-              <a:rPr lang="es-ES" dirty="0"/>
-              <a:t> </a:t>
-            </a:r>
-            <a:r>
-              <a:rPr lang="es-ES" dirty="0" err="1"/>
-              <a:t>to</a:t>
-            </a:r>
-            <a:r>
-              <a:rPr lang="es-ES" dirty="0"/>
-              <a:t> </a:t>
-            </a:r>
-            <a:r>
-              <a:rPr lang="es-ES" dirty="0" err="1"/>
-              <a:t>the</a:t>
-            </a:r>
-            <a:r>
-              <a:rPr lang="es-ES" dirty="0"/>
-              <a:t> data</a:t>
-            </a:r>
-          </a:p>
-          <a:p>
-            <a:pPr marL="514350" indent="-514350">
-              <a:buFont typeface="+mj-lt"/>
-              <a:buAutoNum type="romanLcPeriod"/>
-            </a:pPr>
-            <a:r>
-              <a:rPr lang="es-ES" dirty="0" err="1"/>
-              <a:t>Univariate</a:t>
-            </a:r>
-            <a:r>
-              <a:rPr lang="es-ES" dirty="0"/>
-              <a:t> </a:t>
-            </a:r>
-            <a:r>
-              <a:rPr lang="es-ES" dirty="0" err="1"/>
-              <a:t>analysis</a:t>
-            </a:r>
-            <a:endParaRPr lang="es-ES" dirty="0"/>
-          </a:p>
-          <a:p>
-            <a:pPr marL="457200" indent="-457200">
-              <a:buFont typeface="+mj-lt"/>
-              <a:buAutoNum type="romanLcPeriod"/>
-            </a:pPr>
-            <a:r>
-              <a:rPr lang="es-ES" dirty="0" err="1"/>
-              <a:t>Multivariate</a:t>
-            </a:r>
-            <a:r>
-              <a:rPr lang="es-ES" dirty="0"/>
-              <a:t> Cox </a:t>
-            </a:r>
-            <a:r>
-              <a:rPr lang="es-ES" dirty="0" err="1"/>
-              <a:t>regression</a:t>
-            </a:r>
-            <a:r>
-              <a:rPr lang="es-ES" dirty="0"/>
-              <a:t> </a:t>
-            </a:r>
-            <a:r>
-              <a:rPr lang="es-ES" dirty="0" err="1"/>
-              <a:t>model</a:t>
-            </a:r>
-            <a:endParaRPr lang="es-ES" dirty="0"/>
-          </a:p>
-          <a:p>
-            <a:pPr marL="908050" lvl="1" indent="-457200">
-              <a:buFont typeface="+mj-lt"/>
-              <a:buAutoNum type="alphaUcPeriod"/>
-            </a:pPr>
-            <a:r>
-              <a:rPr lang="es-ES" dirty="0"/>
-              <a:t>Base </a:t>
-            </a:r>
-            <a:r>
-              <a:rPr lang="es-ES" dirty="0" err="1"/>
-              <a:t>model</a:t>
-            </a:r>
-            <a:endParaRPr lang="es-ES" dirty="0"/>
-          </a:p>
-          <a:p>
-            <a:pPr marL="908050" lvl="1" indent="-457200">
-              <a:buFont typeface="+mj-lt"/>
-              <a:buAutoNum type="alphaUcPeriod"/>
-            </a:pPr>
-            <a:r>
-              <a:rPr lang="es-ES" dirty="0" err="1"/>
-              <a:t>Reduced</a:t>
-            </a:r>
-            <a:r>
-              <a:rPr lang="es-ES" dirty="0"/>
-              <a:t> </a:t>
-            </a:r>
-            <a:r>
-              <a:rPr lang="es-ES" dirty="0" err="1"/>
-              <a:t>model</a:t>
-            </a:r>
-            <a:endParaRPr lang="es-ES" dirty="0"/>
-          </a:p>
-          <a:p>
-            <a:pPr marL="908050" lvl="1" indent="-457200">
-              <a:buFont typeface="+mj-lt"/>
-              <a:buAutoNum type="alphaUcPeriod"/>
-            </a:pPr>
-            <a:r>
-              <a:rPr lang="es-ES" dirty="0" err="1"/>
-              <a:t>Mode</a:t>
-            </a:r>
-            <a:r>
-              <a:rPr lang="es-ES" dirty="0"/>
-              <a:t> </a:t>
-            </a:r>
-            <a:r>
-              <a:rPr lang="es-ES" dirty="0" err="1"/>
-              <a:t>with</a:t>
-            </a:r>
-            <a:r>
-              <a:rPr lang="es-ES" dirty="0"/>
-              <a:t> time </a:t>
-            </a:r>
-            <a:r>
-              <a:rPr lang="es-ES" dirty="0" err="1"/>
-              <a:t>varying</a:t>
-            </a:r>
-            <a:r>
-              <a:rPr lang="es-ES" dirty="0"/>
-              <a:t> </a:t>
-            </a:r>
-            <a:r>
-              <a:rPr lang="es-ES" dirty="0" err="1"/>
-              <a:t>coefficients</a:t>
-            </a:r>
-            <a:endParaRPr lang="es-ES" dirty="0"/>
-          </a:p>
-          <a:p>
-            <a:pPr marL="457200" indent="-457200">
-              <a:buFont typeface="+mj-lt"/>
-              <a:buAutoNum type="romanLcPeriod"/>
-            </a:pPr>
-            <a:r>
-              <a:rPr lang="es-ES" dirty="0" err="1"/>
-              <a:t>Linearity</a:t>
-            </a:r>
-            <a:r>
-              <a:rPr lang="es-ES" dirty="0"/>
-              <a:t> test</a:t>
-            </a:r>
-          </a:p>
-          <a:p>
-            <a:pPr marL="457200" indent="-457200">
-              <a:buFont typeface="+mj-lt"/>
-              <a:buAutoNum type="romanLcPeriod"/>
-            </a:pPr>
-            <a:r>
-              <a:rPr lang="es-ES" dirty="0" err="1"/>
-              <a:t>Choice</a:t>
-            </a:r>
-            <a:r>
-              <a:rPr lang="es-ES" dirty="0"/>
-              <a:t> </a:t>
-            </a:r>
-            <a:r>
-              <a:rPr lang="es-ES" dirty="0" err="1"/>
-              <a:t>of</a:t>
-            </a:r>
-            <a:r>
-              <a:rPr lang="es-ES" dirty="0"/>
-              <a:t> </a:t>
-            </a:r>
-            <a:r>
-              <a:rPr lang="es-ES" dirty="0" err="1"/>
-              <a:t>the</a:t>
-            </a:r>
-            <a:r>
-              <a:rPr lang="es-ES" dirty="0"/>
-              <a:t> ‘</a:t>
-            </a:r>
-            <a:r>
-              <a:rPr lang="es-ES" dirty="0" err="1"/>
-              <a:t>best</a:t>
-            </a:r>
-            <a:r>
-              <a:rPr lang="es-ES" dirty="0"/>
-              <a:t>’ </a:t>
-            </a:r>
-            <a:r>
-              <a:rPr lang="es-ES" dirty="0" err="1"/>
-              <a:t>parametric</a:t>
-            </a:r>
-            <a:r>
-              <a:rPr lang="es-ES" dirty="0"/>
-              <a:t> </a:t>
-            </a:r>
-            <a:r>
-              <a:rPr lang="es-ES" dirty="0" err="1"/>
-              <a:t>model</a:t>
-            </a:r>
-            <a:endParaRPr lang="es-ES" dirty="0"/>
-          </a:p>
-          <a:p>
-            <a:pPr marL="457200" indent="-457200">
-              <a:buFont typeface="+mj-lt"/>
-              <a:buAutoNum type="romanLcPeriod"/>
-            </a:pPr>
-            <a:endParaRPr lang="en-GB" dirty="0"/>
-          </a:p>
-        </p:txBody>
-      </p:sp>
-    </p:spTree>
-    <p:extLst>
-      <p:ext uri="{BB962C8B-B14F-4D97-AF65-F5344CB8AC3E}">
-        <p14:creationId xmlns:p14="http://schemas.microsoft.com/office/powerpoint/2010/main" val="4972780"/>
-      </p:ext>
-    </p:extLst>
-  </p:cSld>
-  <p:clrMapOvr>
-    <a:masterClrMapping/>
-  </p:clrMapOvr>
-</p:sld>
-</file>
-
-<file path=ppt/slides/slide20.xml><?xml version="1.0" encoding="utf-8"?>
+<file path=ppt/slides/slide19.xml><?xml version="1.0" encoding="utf-8"?>
 <p:sld xmlns:a="http://schemas.openxmlformats.org/drawingml/2006/main" xmlns:r="http://schemas.openxmlformats.org/officeDocument/2006/relationships" xmlns:p="http://schemas.openxmlformats.org/presentationml/2006/main">
   <p:cSld>
     <p:spTree>
@@ -14946,7 +14481,324 @@
 </p:sld>
 </file>
 
-<file path=ppt/slides/slide21.xml><?xml version="1.0" encoding="utf-8"?>
+<file path=ppt/slides/slide2.xml><?xml version="1.0" encoding="utf-8"?>
+<p:sld xmlns:a="http://schemas.openxmlformats.org/drawingml/2006/main" xmlns:r="http://schemas.openxmlformats.org/officeDocument/2006/relationships" xmlns:p="http://schemas.openxmlformats.org/presentationml/2006/main">
+  <p:cSld>
+    <p:spTree>
+      <p:nvGrpSpPr>
+        <p:cNvPr id="1" name=""/>
+        <p:cNvGrpSpPr/>
+        <p:nvPr/>
+      </p:nvGrpSpPr>
+      <p:grpSpPr>
+        <a:xfrm>
+          <a:off x="0" y="0"/>
+          <a:ext cx="0" cy="0"/>
+          <a:chOff x="0" y="0"/>
+          <a:chExt cx="0" cy="0"/>
+        </a:xfrm>
+      </p:grpSpPr>
+      <p:sp>
+        <p:nvSpPr>
+          <p:cNvPr id="2" name="Title 1">
+            <a:extLst>
+              <a:ext uri="{FF2B5EF4-FFF2-40B4-BE49-F238E27FC236}">
+                <a16:creationId xmlns:a16="http://schemas.microsoft.com/office/drawing/2014/main" id="{45B66112-171E-1ECA-8B21-B617C495018A}"/>
+              </a:ext>
+            </a:extLst>
+          </p:cNvPr>
+          <p:cNvSpPr>
+            <a:spLocks noGrp="1"/>
+          </p:cNvSpPr>
+          <p:nvPr>
+            <p:ph type="title"/>
+          </p:nvPr>
+        </p:nvSpPr>
+        <p:spPr/>
+        <p:txBody>
+          <a:bodyPr/>
+          <a:lstStyle/>
+          <a:p>
+            <a:r>
+              <a:rPr lang="es-ES" dirty="0"/>
+              <a:t>Table </a:t>
+            </a:r>
+            <a:r>
+              <a:rPr lang="es-ES" dirty="0" err="1"/>
+              <a:t>of</a:t>
+            </a:r>
+            <a:r>
+              <a:rPr lang="es-ES" dirty="0"/>
+              <a:t> </a:t>
+            </a:r>
+            <a:r>
+              <a:rPr lang="es-ES" dirty="0" err="1"/>
+              <a:t>Contents</a:t>
+            </a:r>
+            <a:endParaRPr lang="en-GB" dirty="0"/>
+          </a:p>
+        </p:txBody>
+      </p:sp>
+      <p:sp>
+        <p:nvSpPr>
+          <p:cNvPr id="3" name="Content Placeholder 2">
+            <a:extLst>
+              <a:ext uri="{FF2B5EF4-FFF2-40B4-BE49-F238E27FC236}">
+                <a16:creationId xmlns:a16="http://schemas.microsoft.com/office/drawing/2014/main" id="{9E28193F-FE09-8E4B-A363-00025BEC7E88}"/>
+              </a:ext>
+            </a:extLst>
+          </p:cNvPr>
+          <p:cNvSpPr>
+            <a:spLocks noGrp="1"/>
+          </p:cNvSpPr>
+          <p:nvPr>
+            <p:ph idx="1"/>
+          </p:nvPr>
+        </p:nvSpPr>
+        <p:spPr>
+          <a:xfrm>
+            <a:off x="2611808" y="1885285"/>
+            <a:ext cx="7958331" cy="4164659"/>
+          </a:xfrm>
+        </p:spPr>
+        <p:txBody>
+          <a:bodyPr>
+            <a:normAutofit lnSpcReduction="10000"/>
+          </a:bodyPr>
+          <a:lstStyle/>
+          <a:p>
+            <a:pPr marL="514350" indent="-514350">
+              <a:buFont typeface="+mj-lt"/>
+              <a:buAutoNum type="romanLcPeriod"/>
+            </a:pPr>
+            <a:r>
+              <a:rPr lang="es-ES" dirty="0" err="1"/>
+              <a:t>Introduction</a:t>
+            </a:r>
+            <a:r>
+              <a:rPr lang="es-ES" dirty="0"/>
+              <a:t> </a:t>
+            </a:r>
+            <a:r>
+              <a:rPr lang="es-ES" dirty="0" err="1"/>
+              <a:t>to</a:t>
+            </a:r>
+            <a:r>
+              <a:rPr lang="es-ES" dirty="0"/>
+              <a:t> </a:t>
+            </a:r>
+            <a:r>
+              <a:rPr lang="es-ES" dirty="0" err="1"/>
+              <a:t>the</a:t>
+            </a:r>
+            <a:r>
+              <a:rPr lang="es-ES" dirty="0"/>
+              <a:t> data</a:t>
+            </a:r>
+          </a:p>
+          <a:p>
+            <a:pPr marL="514350" indent="-514350">
+              <a:buFont typeface="+mj-lt"/>
+              <a:buAutoNum type="romanLcPeriod"/>
+            </a:pPr>
+            <a:r>
+              <a:rPr lang="es-ES" dirty="0" err="1"/>
+              <a:t>Univariate</a:t>
+            </a:r>
+            <a:r>
+              <a:rPr lang="es-ES" dirty="0"/>
+              <a:t> </a:t>
+            </a:r>
+            <a:r>
+              <a:rPr lang="es-ES" dirty="0" err="1"/>
+              <a:t>analysis</a:t>
+            </a:r>
+            <a:endParaRPr lang="es-ES" dirty="0"/>
+          </a:p>
+          <a:p>
+            <a:pPr marL="457200" indent="-457200">
+              <a:buFont typeface="+mj-lt"/>
+              <a:buAutoNum type="romanLcPeriod"/>
+            </a:pPr>
+            <a:r>
+              <a:rPr lang="es-ES" dirty="0" err="1"/>
+              <a:t>Multivariate</a:t>
+            </a:r>
+            <a:r>
+              <a:rPr lang="es-ES" dirty="0"/>
+              <a:t> Cox </a:t>
+            </a:r>
+            <a:r>
+              <a:rPr lang="es-ES" dirty="0" err="1"/>
+              <a:t>regression</a:t>
+            </a:r>
+            <a:r>
+              <a:rPr lang="es-ES" dirty="0"/>
+              <a:t> </a:t>
+            </a:r>
+            <a:r>
+              <a:rPr lang="es-ES" dirty="0" err="1"/>
+              <a:t>model</a:t>
+            </a:r>
+            <a:endParaRPr lang="es-ES" dirty="0"/>
+          </a:p>
+          <a:p>
+            <a:pPr marL="908050" lvl="1" indent="-457200">
+              <a:buFont typeface="+mj-lt"/>
+              <a:buAutoNum type="alphaUcPeriod"/>
+            </a:pPr>
+            <a:r>
+              <a:rPr lang="es-ES" dirty="0"/>
+              <a:t>Base </a:t>
+            </a:r>
+            <a:r>
+              <a:rPr lang="es-ES" dirty="0" err="1"/>
+              <a:t>model</a:t>
+            </a:r>
+            <a:endParaRPr lang="es-ES" dirty="0"/>
+          </a:p>
+          <a:p>
+            <a:pPr marL="908050" lvl="1" indent="-457200">
+              <a:buFont typeface="+mj-lt"/>
+              <a:buAutoNum type="alphaUcPeriod"/>
+            </a:pPr>
+            <a:r>
+              <a:rPr lang="es-ES" dirty="0" err="1"/>
+              <a:t>Reduced</a:t>
+            </a:r>
+            <a:r>
+              <a:rPr lang="es-ES" dirty="0"/>
+              <a:t> </a:t>
+            </a:r>
+            <a:r>
+              <a:rPr lang="es-ES" dirty="0" err="1"/>
+              <a:t>model</a:t>
+            </a:r>
+            <a:endParaRPr lang="es-ES" dirty="0"/>
+          </a:p>
+          <a:p>
+            <a:pPr marL="908050" lvl="1" indent="-457200">
+              <a:buFont typeface="+mj-lt"/>
+              <a:buAutoNum type="alphaUcPeriod"/>
+            </a:pPr>
+            <a:r>
+              <a:rPr lang="es-ES" dirty="0" err="1"/>
+              <a:t>Mode</a:t>
+            </a:r>
+            <a:r>
+              <a:rPr lang="es-ES" dirty="0"/>
+              <a:t> </a:t>
+            </a:r>
+            <a:r>
+              <a:rPr lang="es-ES" dirty="0" err="1"/>
+              <a:t>with</a:t>
+            </a:r>
+            <a:r>
+              <a:rPr lang="es-ES" dirty="0"/>
+              <a:t> time </a:t>
+            </a:r>
+            <a:r>
+              <a:rPr lang="es-ES" dirty="0" err="1"/>
+              <a:t>varying</a:t>
+            </a:r>
+            <a:r>
+              <a:rPr lang="es-ES" dirty="0"/>
+              <a:t> </a:t>
+            </a:r>
+            <a:r>
+              <a:rPr lang="es-ES" dirty="0" err="1"/>
+              <a:t>coefficients</a:t>
+            </a:r>
+            <a:endParaRPr lang="es-ES" dirty="0"/>
+          </a:p>
+          <a:p>
+            <a:pPr marL="457200" indent="-457200">
+              <a:buFont typeface="+mj-lt"/>
+              <a:buAutoNum type="romanLcPeriod"/>
+            </a:pPr>
+            <a:r>
+              <a:rPr lang="es-ES" dirty="0" err="1"/>
+              <a:t>Linearity</a:t>
+            </a:r>
+            <a:r>
+              <a:rPr lang="es-ES" dirty="0"/>
+              <a:t> test</a:t>
+            </a:r>
+          </a:p>
+          <a:p>
+            <a:pPr marL="457200" indent="-457200">
+              <a:buFont typeface="+mj-lt"/>
+              <a:buAutoNum type="romanLcPeriod"/>
+            </a:pPr>
+            <a:r>
+              <a:rPr lang="es-ES" dirty="0" err="1"/>
+              <a:t>Choice</a:t>
+            </a:r>
+            <a:r>
+              <a:rPr lang="es-ES" dirty="0"/>
+              <a:t> </a:t>
+            </a:r>
+            <a:r>
+              <a:rPr lang="es-ES" dirty="0" err="1"/>
+              <a:t>of</a:t>
+            </a:r>
+            <a:r>
+              <a:rPr lang="es-ES" dirty="0"/>
+              <a:t> </a:t>
+            </a:r>
+            <a:r>
+              <a:rPr lang="es-ES" dirty="0" err="1"/>
+              <a:t>the</a:t>
+            </a:r>
+            <a:r>
+              <a:rPr lang="es-ES" dirty="0"/>
+              <a:t> ‘</a:t>
+            </a:r>
+            <a:r>
+              <a:rPr lang="es-ES" dirty="0" err="1"/>
+              <a:t>best</a:t>
+            </a:r>
+            <a:r>
+              <a:rPr lang="es-ES" dirty="0"/>
+              <a:t>’ </a:t>
+            </a:r>
+            <a:r>
+              <a:rPr lang="es-ES" dirty="0" err="1"/>
+              <a:t>parametric</a:t>
+            </a:r>
+            <a:r>
+              <a:rPr lang="es-ES" dirty="0"/>
+              <a:t> </a:t>
+            </a:r>
+            <a:r>
+              <a:rPr lang="es-ES" dirty="0" err="1"/>
+              <a:t>model</a:t>
+            </a:r>
+            <a:endParaRPr lang="es-ES" dirty="0"/>
+          </a:p>
+          <a:p>
+            <a:pPr marL="457200" indent="-457200">
+              <a:buFont typeface="+mj-lt"/>
+              <a:buAutoNum type="romanLcPeriod"/>
+            </a:pPr>
+            <a:endParaRPr lang="en-GB" dirty="0"/>
+          </a:p>
+        </p:txBody>
+      </p:sp>
+    </p:spTree>
+    <p:extLst>
+      <p:ext uri="{BB962C8B-B14F-4D97-AF65-F5344CB8AC3E}">
+        <p14:creationId xmlns:p14="http://schemas.microsoft.com/office/powerpoint/2010/main" val="4972780"/>
+      </p:ext>
+    </p:extLst>
+  </p:cSld>
+  <p:clrMapOvr>
+    <a:masterClrMapping/>
+  </p:clrMapOvr>
+</p:sld>
+</file>
+
+<file path=ppt/slides/slide20.xml><?xml version="1.0" encoding="utf-8"?>
 <p:sld xmlns:a="http://schemas.openxmlformats.org/drawingml/2006/main" xmlns:r="http://schemas.openxmlformats.org/officeDocument/2006/relationships" xmlns:p="http://schemas.openxmlformats.org/presentationml/2006/main">
   <p:cSld>
     <p:spTree>
@@ -15355,7 +15207,7 @@
 </p:sld>
 </file>
 
-<file path=ppt/slides/slide22.xml><?xml version="1.0" encoding="utf-8"?>
+<file path=ppt/slides/slide21.xml><?xml version="1.0" encoding="utf-8"?>
 <p:sld xmlns:a="http://schemas.openxmlformats.org/drawingml/2006/main" xmlns:r="http://schemas.openxmlformats.org/officeDocument/2006/relationships" xmlns:p="http://schemas.openxmlformats.org/presentationml/2006/main">
   <p:cSld>
     <p:spTree>
@@ -16047,7 +15899,7 @@
 </p:sld>
 </file>
 
-<file path=ppt/slides/slide23.xml><?xml version="1.0" encoding="utf-8"?>
+<file path=ppt/slides/slide22.xml><?xml version="1.0" encoding="utf-8"?>
 <p:sld xmlns:a="http://schemas.openxmlformats.org/drawingml/2006/main" xmlns:r="http://schemas.openxmlformats.org/officeDocument/2006/relationships" xmlns:p="http://schemas.openxmlformats.org/presentationml/2006/main">
   <p:cSld>
     <p:spTree>
@@ -16205,6 +16057,36 @@
           </a:p>
         </p:txBody>
       </p:sp>
+      <p:pic>
+        <p:nvPicPr>
+          <p:cNvPr id="3" name="Picture 2">
+            <a:extLst>
+              <a:ext uri="{FF2B5EF4-FFF2-40B4-BE49-F238E27FC236}">
+                <a16:creationId xmlns:a16="http://schemas.microsoft.com/office/drawing/2014/main" id="{FF9580AD-7644-F34E-24A9-5D6AB7E5BD91}"/>
+              </a:ext>
+            </a:extLst>
+          </p:cNvPr>
+          <p:cNvPicPr>
+            <a:picLocks noChangeAspect="1"/>
+          </p:cNvPicPr>
+          <p:nvPr/>
+        </p:nvPicPr>
+        <p:blipFill>
+          <a:blip r:embed="rId3"/>
+          <a:stretch>
+            <a:fillRect/>
+          </a:stretch>
+        </p:blipFill>
+        <p:spPr>
+          <a:xfrm>
+            <a:off x="2328405" y="2555059"/>
+            <a:ext cx="6163590" cy="2597121"/>
+          </a:xfrm>
+          <a:prstGeom prst="rect">
+            <a:avLst/>
+          </a:prstGeom>
+        </p:spPr>
+      </p:pic>
     </p:spTree>
     <p:extLst>
       <p:ext uri="{BB962C8B-B14F-4D97-AF65-F5344CB8AC3E}">
@@ -16218,7 +16100,7 @@
 </p:sld>
 </file>
 
-<file path=ppt/slides/slide24.xml><?xml version="1.0" encoding="utf-8"?>
+<file path=ppt/slides/slide23.xml><?xml version="1.0" encoding="utf-8"?>
 <p:sld xmlns:a="http://schemas.openxmlformats.org/drawingml/2006/main" xmlns:r="http://schemas.openxmlformats.org/officeDocument/2006/relationships" xmlns:p="http://schemas.openxmlformats.org/presentationml/2006/main">
   <p:cSld>
     <p:spTree>

</xml_diff>

<commit_message>
final updates on script and presentation
</commit_message>
<xml_diff>
--- a/presentation.pptx
+++ b/presentation.pptx
@@ -1778,7 +1778,7 @@
           <a:p>
             <a:fld id="{0C8215FD-C011-40F7-B8C6-36FA60F83152}" type="datetimeFigureOut">
               <a:rPr lang="en-GB" smtClean="0"/>
-              <a:t>06/06/2023</a:t>
+              <a:t>07/06/2023</a:t>
             </a:fld>
             <a:endParaRPr lang="en-GB"/>
           </a:p>
@@ -6171,7 +6171,7 @@
           <a:p>
             <a:fld id="{A1B2EB48-0D68-46EB-BB33-70996AFA08CC}" type="datetimeFigureOut">
               <a:rPr lang="en-GB" smtClean="0"/>
-              <a:t>06/06/2023</a:t>
+              <a:t>07/06/2023</a:t>
             </a:fld>
             <a:endParaRPr lang="en-GB"/>
           </a:p>
@@ -6506,7 +6506,7 @@
           <a:p>
             <a:fld id="{A1B2EB48-0D68-46EB-BB33-70996AFA08CC}" type="datetimeFigureOut">
               <a:rPr lang="en-GB" smtClean="0"/>
-              <a:t>06/06/2023</a:t>
+              <a:t>07/06/2023</a:t>
             </a:fld>
             <a:endParaRPr lang="en-GB"/>
           </a:p>
@@ -6809,7 +6809,7 @@
           <a:p>
             <a:fld id="{A1B2EB48-0D68-46EB-BB33-70996AFA08CC}" type="datetimeFigureOut">
               <a:rPr lang="en-GB" smtClean="0"/>
-              <a:t>06/06/2023</a:t>
+              <a:t>07/06/2023</a:t>
             </a:fld>
             <a:endParaRPr lang="en-GB"/>
           </a:p>
@@ -7057,7 +7057,7 @@
           <a:p>
             <a:fld id="{A1B2EB48-0D68-46EB-BB33-70996AFA08CC}" type="datetimeFigureOut">
               <a:rPr lang="en-GB" smtClean="0"/>
-              <a:t>06/06/2023</a:t>
+              <a:t>07/06/2023</a:t>
             </a:fld>
             <a:endParaRPr lang="en-GB"/>
           </a:p>
@@ -7465,7 +7465,7 @@
           <a:p>
             <a:fld id="{A1B2EB48-0D68-46EB-BB33-70996AFA08CC}" type="datetimeFigureOut">
               <a:rPr lang="en-GB" smtClean="0"/>
-              <a:t>06/06/2023</a:t>
+              <a:t>07/06/2023</a:t>
             </a:fld>
             <a:endParaRPr lang="en-GB"/>
           </a:p>
@@ -7780,7 +7780,7 @@
           <a:p>
             <a:fld id="{A1B2EB48-0D68-46EB-BB33-70996AFA08CC}" type="datetimeFigureOut">
               <a:rPr lang="en-GB" smtClean="0"/>
-              <a:t>06/06/2023</a:t>
+              <a:t>07/06/2023</a:t>
             </a:fld>
             <a:endParaRPr lang="en-GB"/>
           </a:p>
@@ -8325,7 +8325,7 @@
           <a:p>
             <a:fld id="{A1B2EB48-0D68-46EB-BB33-70996AFA08CC}" type="datetimeFigureOut">
               <a:rPr lang="en-GB" smtClean="0"/>
-              <a:t>06/06/2023</a:t>
+              <a:t>07/06/2023</a:t>
             </a:fld>
             <a:endParaRPr lang="en-GB"/>
           </a:p>
@@ -8521,7 +8521,7 @@
           <a:p>
             <a:fld id="{A1B2EB48-0D68-46EB-BB33-70996AFA08CC}" type="datetimeFigureOut">
               <a:rPr lang="en-GB" smtClean="0"/>
-              <a:t>06/06/2023</a:t>
+              <a:t>07/06/2023</a:t>
             </a:fld>
             <a:endParaRPr lang="en-GB"/>
           </a:p>
@@ -8735,7 +8735,7 @@
           <a:p>
             <a:fld id="{A1B2EB48-0D68-46EB-BB33-70996AFA08CC}" type="datetimeFigureOut">
               <a:rPr lang="en-GB" smtClean="0"/>
-              <a:t>06/06/2023</a:t>
+              <a:t>07/06/2023</a:t>
             </a:fld>
             <a:endParaRPr lang="en-GB"/>
           </a:p>
@@ -9105,7 +9105,7 @@
           <a:p>
             <a:fld id="{A1B2EB48-0D68-46EB-BB33-70996AFA08CC}" type="datetimeFigureOut">
               <a:rPr lang="en-GB" smtClean="0"/>
-              <a:t>06/06/2023</a:t>
+              <a:t>07/06/2023</a:t>
             </a:fld>
             <a:endParaRPr lang="en-GB"/>
           </a:p>
@@ -9509,7 +9509,7 @@
           <a:p>
             <a:fld id="{A1B2EB48-0D68-46EB-BB33-70996AFA08CC}" type="datetimeFigureOut">
               <a:rPr lang="en-GB" smtClean="0"/>
-              <a:t>06/06/2023</a:t>
+              <a:t>07/06/2023</a:t>
             </a:fld>
             <a:endParaRPr lang="en-GB"/>
           </a:p>
@@ -9821,7 +9821,7 @@
           <a:p>
             <a:fld id="{A1B2EB48-0D68-46EB-BB33-70996AFA08CC}" type="datetimeFigureOut">
               <a:rPr lang="en-GB" smtClean="0"/>
-              <a:t>06/06/2023</a:t>
+              <a:t>07/06/2023</a:t>
             </a:fld>
             <a:endParaRPr lang="en-GB"/>
           </a:p>
@@ -14001,7 +14001,7 @@
             </a:pPr>
             <a:r>
               <a:rPr lang="en-US" dirty="0"/>
-              <a:t>We do not seem to have any outliers, as all deviance residuals are smaller than 3 in absolute terms. The mean is close to zero. However, the residuals are not evenly scattered and we are seeing a slightly decreasing trend. Also, we can recognize two clusters in the data.</a:t>
+              <a:t>We do not seem to have any outliers, as all deviance residuals are smaller than 3 in absolute terms. The mean is close to zero. However, the residuals are not evenly scattered and we are seeing more of an S-shaped curve. Also, we can recognize two clusters in the data.</a:t>
             </a:r>
             <a:endParaRPr lang="en-GB" dirty="0"/>
           </a:p>
@@ -14009,10 +14009,10 @@
       </p:sp>
       <p:pic>
         <p:nvPicPr>
-          <p:cNvPr id="4" name="Picture 3">
+          <p:cNvPr id="5" name="Picture 4">
             <a:extLst>
               <a:ext uri="{FF2B5EF4-FFF2-40B4-BE49-F238E27FC236}">
-                <a16:creationId xmlns:a16="http://schemas.microsoft.com/office/drawing/2014/main" id="{24FA3289-9FD5-C3AD-39AC-3EBDB166DB4C}"/>
+                <a16:creationId xmlns:a16="http://schemas.microsoft.com/office/drawing/2014/main" id="{036A410F-799D-F75B-79EB-0D8306632571}"/>
               </a:ext>
             </a:extLst>
           </p:cNvPr>
@@ -14029,8 +14029,8 @@
         </p:blipFill>
         <p:spPr>
           <a:xfrm>
-            <a:off x="2611808" y="1966804"/>
-            <a:ext cx="7168800" cy="3584400"/>
+            <a:off x="2679597" y="2044192"/>
+            <a:ext cx="6848025" cy="3424013"/>
           </a:xfrm>
           <a:prstGeom prst="rect">
             <a:avLst/>

</xml_diff>